<commit_message>
added a specific view for the visualizer mockup
</commit_message>
<xml_diff>
--- a/Visualizer/Mockup.pptx
+++ b/Visualizer/Mockup.pptx
@@ -5,11 +5,13 @@
     <p:sldMasterId id="2147483648" r:id="rId1"/>
   </p:sldMasterIdLst>
   <p:notesMasterIdLst>
-    <p:notesMasterId r:id="rId4"/>
+    <p:notesMasterId r:id="rId6"/>
   </p:notesMasterIdLst>
   <p:sldIdLst>
     <p:sldId id="256" r:id="rId2"/>
     <p:sldId id="257" r:id="rId3"/>
+    <p:sldId id="258" r:id="rId4"/>
+    <p:sldId id="259" r:id="rId5"/>
   </p:sldIdLst>
   <p:sldSz cx="12192000" cy="6858000"/>
   <p:notesSz cx="6858000" cy="9144000"/>
@@ -108,6 +110,11 @@
       </a:defRPr>
     </a:lvl9pPr>
   </p:defaultTextStyle>
+  <p:extLst>
+    <p:ext uri="{EFAFB233-063F-42B5-8137-9DF3F51BA10A}">
+      <p15:sldGuideLst xmlns:p15="http://schemas.microsoft.com/office/powerpoint/2012/main"/>
+    </p:ext>
+  </p:extLst>
 </p:presentation>
 </file>
 
@@ -765,7 +772,7 @@
           <a:p>
             <a:fld id="{673963D5-4371-401D-8498-500035853EE3}" type="datetimeFigureOut">
               <a:rPr lang="en-US" smtClean="0"/>
-              <a:t>9/16/2018</a:t>
+              <a:t>9/25/18</a:t>
             </a:fld>
             <a:endParaRPr lang="en-US"/>
           </a:p>
@@ -1245,7 +1252,7 @@
           <p:cNvPr id="2" name="Title 1">
             <a:extLst>
               <a:ext uri="{FF2B5EF4-FFF2-40B4-BE49-F238E27FC236}">
-                <a16:creationId xmlns:a16="http://schemas.microsoft.com/office/drawing/2014/main" id="{553B6E79-7DCD-4ED3-91A4-44DC27CFA9B1}"/>
+                <a16:creationId xmlns:a16="http://schemas.microsoft.com/office/drawing/2014/main" xmlns="" id="{553B6E79-7DCD-4ED3-91A4-44DC27CFA9B1}"/>
               </a:ext>
             </a:extLst>
           </p:cNvPr>
@@ -1282,7 +1289,7 @@
           <p:cNvPr id="3" name="Subtitle 2">
             <a:extLst>
               <a:ext uri="{FF2B5EF4-FFF2-40B4-BE49-F238E27FC236}">
-                <a16:creationId xmlns:a16="http://schemas.microsoft.com/office/drawing/2014/main" id="{FF133992-35FF-48F9-8BCD-585C3D1BC692}"/>
+                <a16:creationId xmlns:a16="http://schemas.microsoft.com/office/drawing/2014/main" xmlns="" id="{FF133992-35FF-48F9-8BCD-585C3D1BC692}"/>
               </a:ext>
             </a:extLst>
           </p:cNvPr>
@@ -1352,7 +1359,7 @@
           <p:cNvPr id="4" name="Date Placeholder 3">
             <a:extLst>
               <a:ext uri="{FF2B5EF4-FFF2-40B4-BE49-F238E27FC236}">
-                <a16:creationId xmlns:a16="http://schemas.microsoft.com/office/drawing/2014/main" id="{E742DDB7-2C91-4453-B629-95462A7CA797}"/>
+                <a16:creationId xmlns:a16="http://schemas.microsoft.com/office/drawing/2014/main" xmlns="" id="{E742DDB7-2C91-4453-B629-95462A7CA797}"/>
               </a:ext>
             </a:extLst>
           </p:cNvPr>
@@ -1370,7 +1377,7 @@
           <a:p>
             <a:fld id="{38D4318C-2CF8-4E6B-ADD8-B5FDE2DDEB84}" type="datetimeFigureOut">
               <a:rPr lang="en-US" smtClean="0"/>
-              <a:t>9/16/2018</a:t>
+              <a:t>9/25/18</a:t>
             </a:fld>
             <a:endParaRPr lang="en-US"/>
           </a:p>
@@ -1381,7 +1388,7 @@
           <p:cNvPr id="5" name="Footer Placeholder 4">
             <a:extLst>
               <a:ext uri="{FF2B5EF4-FFF2-40B4-BE49-F238E27FC236}">
-                <a16:creationId xmlns:a16="http://schemas.microsoft.com/office/drawing/2014/main" id="{9B37D394-7771-4D7B-90C1-CD3BA89AB53B}"/>
+                <a16:creationId xmlns:a16="http://schemas.microsoft.com/office/drawing/2014/main" xmlns="" id="{9B37D394-7771-4D7B-90C1-CD3BA89AB53B}"/>
               </a:ext>
             </a:extLst>
           </p:cNvPr>
@@ -1406,7 +1413,7 @@
           <p:cNvPr id="6" name="Slide Number Placeholder 5">
             <a:extLst>
               <a:ext uri="{FF2B5EF4-FFF2-40B4-BE49-F238E27FC236}">
-                <a16:creationId xmlns:a16="http://schemas.microsoft.com/office/drawing/2014/main" id="{FBF6A34E-6E0D-4342-AFE6-776CAFFAE5EA}"/>
+                <a16:creationId xmlns:a16="http://schemas.microsoft.com/office/drawing/2014/main" xmlns="" id="{FBF6A34E-6E0D-4342-AFE6-776CAFFAE5EA}"/>
               </a:ext>
             </a:extLst>
           </p:cNvPr>
@@ -1465,7 +1472,7 @@
           <p:cNvPr id="2" name="Title 1">
             <a:extLst>
               <a:ext uri="{FF2B5EF4-FFF2-40B4-BE49-F238E27FC236}">
-                <a16:creationId xmlns:a16="http://schemas.microsoft.com/office/drawing/2014/main" id="{E2F3AC27-2B2B-4DD2-A3B2-A7B83B858C11}"/>
+                <a16:creationId xmlns:a16="http://schemas.microsoft.com/office/drawing/2014/main" xmlns="" id="{E2F3AC27-2B2B-4DD2-A3B2-A7B83B858C11}"/>
               </a:ext>
             </a:extLst>
           </p:cNvPr>
@@ -1493,7 +1500,7 @@
           <p:cNvPr id="3" name="Vertical Text Placeholder 2">
             <a:extLst>
               <a:ext uri="{FF2B5EF4-FFF2-40B4-BE49-F238E27FC236}">
-                <a16:creationId xmlns:a16="http://schemas.microsoft.com/office/drawing/2014/main" id="{DACBB971-8C51-4F13-82B5-F8DDA8043A5A}"/>
+                <a16:creationId xmlns:a16="http://schemas.microsoft.com/office/drawing/2014/main" xmlns="" id="{DACBB971-8C51-4F13-82B5-F8DDA8043A5A}"/>
               </a:ext>
             </a:extLst>
           </p:cNvPr>
@@ -1550,7 +1557,7 @@
           <p:cNvPr id="4" name="Date Placeholder 3">
             <a:extLst>
               <a:ext uri="{FF2B5EF4-FFF2-40B4-BE49-F238E27FC236}">
-                <a16:creationId xmlns:a16="http://schemas.microsoft.com/office/drawing/2014/main" id="{A4A1802B-7ADB-4AFC-96BC-CA634765E059}"/>
+                <a16:creationId xmlns:a16="http://schemas.microsoft.com/office/drawing/2014/main" xmlns="" id="{A4A1802B-7ADB-4AFC-96BC-CA634765E059}"/>
               </a:ext>
             </a:extLst>
           </p:cNvPr>
@@ -1568,7 +1575,7 @@
           <a:p>
             <a:fld id="{38D4318C-2CF8-4E6B-ADD8-B5FDE2DDEB84}" type="datetimeFigureOut">
               <a:rPr lang="en-US" smtClean="0"/>
-              <a:t>9/16/2018</a:t>
+              <a:t>9/25/18</a:t>
             </a:fld>
             <a:endParaRPr lang="en-US"/>
           </a:p>
@@ -1579,7 +1586,7 @@
           <p:cNvPr id="5" name="Footer Placeholder 4">
             <a:extLst>
               <a:ext uri="{FF2B5EF4-FFF2-40B4-BE49-F238E27FC236}">
-                <a16:creationId xmlns:a16="http://schemas.microsoft.com/office/drawing/2014/main" id="{8B4B1FF8-F774-42CE-BE8D-13A68CFEE4E1}"/>
+                <a16:creationId xmlns:a16="http://schemas.microsoft.com/office/drawing/2014/main" xmlns="" id="{8B4B1FF8-F774-42CE-BE8D-13A68CFEE4E1}"/>
               </a:ext>
             </a:extLst>
           </p:cNvPr>
@@ -1604,7 +1611,7 @@
           <p:cNvPr id="6" name="Slide Number Placeholder 5">
             <a:extLst>
               <a:ext uri="{FF2B5EF4-FFF2-40B4-BE49-F238E27FC236}">
-                <a16:creationId xmlns:a16="http://schemas.microsoft.com/office/drawing/2014/main" id="{CCB3DBFA-E232-45E2-8543-0D9D4BFA8466}"/>
+                <a16:creationId xmlns:a16="http://schemas.microsoft.com/office/drawing/2014/main" xmlns="" id="{CCB3DBFA-E232-45E2-8543-0D9D4BFA8466}"/>
               </a:ext>
             </a:extLst>
           </p:cNvPr>
@@ -1663,7 +1670,7 @@
           <p:cNvPr id="2" name="Vertical Title 1">
             <a:extLst>
               <a:ext uri="{FF2B5EF4-FFF2-40B4-BE49-F238E27FC236}">
-                <a16:creationId xmlns:a16="http://schemas.microsoft.com/office/drawing/2014/main" id="{ED1F32F3-BD63-4C18-8416-13192109A1A6}"/>
+                <a16:creationId xmlns:a16="http://schemas.microsoft.com/office/drawing/2014/main" xmlns="" id="{ED1F32F3-BD63-4C18-8416-13192109A1A6}"/>
               </a:ext>
             </a:extLst>
           </p:cNvPr>
@@ -1696,7 +1703,7 @@
           <p:cNvPr id="3" name="Vertical Text Placeholder 2">
             <a:extLst>
               <a:ext uri="{FF2B5EF4-FFF2-40B4-BE49-F238E27FC236}">
-                <a16:creationId xmlns:a16="http://schemas.microsoft.com/office/drawing/2014/main" id="{79AFEDA7-9D3C-4ED1-A72C-A6ED03095E6A}"/>
+                <a16:creationId xmlns:a16="http://schemas.microsoft.com/office/drawing/2014/main" xmlns="" id="{79AFEDA7-9D3C-4ED1-A72C-A6ED03095E6A}"/>
               </a:ext>
             </a:extLst>
           </p:cNvPr>
@@ -1758,7 +1765,7 @@
           <p:cNvPr id="4" name="Date Placeholder 3">
             <a:extLst>
               <a:ext uri="{FF2B5EF4-FFF2-40B4-BE49-F238E27FC236}">
-                <a16:creationId xmlns:a16="http://schemas.microsoft.com/office/drawing/2014/main" id="{250749DE-3DAA-49A4-A253-00A197FBE495}"/>
+                <a16:creationId xmlns:a16="http://schemas.microsoft.com/office/drawing/2014/main" xmlns="" id="{250749DE-3DAA-49A4-A253-00A197FBE495}"/>
               </a:ext>
             </a:extLst>
           </p:cNvPr>
@@ -1776,7 +1783,7 @@
           <a:p>
             <a:fld id="{38D4318C-2CF8-4E6B-ADD8-B5FDE2DDEB84}" type="datetimeFigureOut">
               <a:rPr lang="en-US" smtClean="0"/>
-              <a:t>9/16/2018</a:t>
+              <a:t>9/25/18</a:t>
             </a:fld>
             <a:endParaRPr lang="en-US"/>
           </a:p>
@@ -1787,7 +1794,7 @@
           <p:cNvPr id="5" name="Footer Placeholder 4">
             <a:extLst>
               <a:ext uri="{FF2B5EF4-FFF2-40B4-BE49-F238E27FC236}">
-                <a16:creationId xmlns:a16="http://schemas.microsoft.com/office/drawing/2014/main" id="{78233EA4-7F3B-423C-8FFC-D15CE8DED2FC}"/>
+                <a16:creationId xmlns:a16="http://schemas.microsoft.com/office/drawing/2014/main" xmlns="" id="{78233EA4-7F3B-423C-8FFC-D15CE8DED2FC}"/>
               </a:ext>
             </a:extLst>
           </p:cNvPr>
@@ -1812,7 +1819,7 @@
           <p:cNvPr id="6" name="Slide Number Placeholder 5">
             <a:extLst>
               <a:ext uri="{FF2B5EF4-FFF2-40B4-BE49-F238E27FC236}">
-                <a16:creationId xmlns:a16="http://schemas.microsoft.com/office/drawing/2014/main" id="{AAF9BF6B-2EE0-40E0-8B28-2D4EF7E56C0F}"/>
+                <a16:creationId xmlns:a16="http://schemas.microsoft.com/office/drawing/2014/main" xmlns="" id="{AAF9BF6B-2EE0-40E0-8B28-2D4EF7E56C0F}"/>
               </a:ext>
             </a:extLst>
           </p:cNvPr>
@@ -1871,7 +1878,7 @@
           <p:cNvPr id="2" name="Title 1">
             <a:extLst>
               <a:ext uri="{FF2B5EF4-FFF2-40B4-BE49-F238E27FC236}">
-                <a16:creationId xmlns:a16="http://schemas.microsoft.com/office/drawing/2014/main" id="{08F4761C-DFDF-4BED-B6DA-B12B84123C85}"/>
+                <a16:creationId xmlns:a16="http://schemas.microsoft.com/office/drawing/2014/main" xmlns="" id="{08F4761C-DFDF-4BED-B6DA-B12B84123C85}"/>
               </a:ext>
             </a:extLst>
           </p:cNvPr>
@@ -1899,7 +1906,7 @@
           <p:cNvPr id="3" name="Content Placeholder 2">
             <a:extLst>
               <a:ext uri="{FF2B5EF4-FFF2-40B4-BE49-F238E27FC236}">
-                <a16:creationId xmlns:a16="http://schemas.microsoft.com/office/drawing/2014/main" id="{79F31278-087B-4BEB-9BE3-0F8DC19F4A57}"/>
+                <a16:creationId xmlns:a16="http://schemas.microsoft.com/office/drawing/2014/main" xmlns="" id="{79F31278-087B-4BEB-9BE3-0F8DC19F4A57}"/>
               </a:ext>
             </a:extLst>
           </p:cNvPr>
@@ -1956,7 +1963,7 @@
           <p:cNvPr id="4" name="Date Placeholder 3">
             <a:extLst>
               <a:ext uri="{FF2B5EF4-FFF2-40B4-BE49-F238E27FC236}">
-                <a16:creationId xmlns:a16="http://schemas.microsoft.com/office/drawing/2014/main" id="{37E6CAAD-9100-4A5F-9A47-5E37CEE46E2E}"/>
+                <a16:creationId xmlns:a16="http://schemas.microsoft.com/office/drawing/2014/main" xmlns="" id="{37E6CAAD-9100-4A5F-9A47-5E37CEE46E2E}"/>
               </a:ext>
             </a:extLst>
           </p:cNvPr>
@@ -1974,7 +1981,7 @@
           <a:p>
             <a:fld id="{38D4318C-2CF8-4E6B-ADD8-B5FDE2DDEB84}" type="datetimeFigureOut">
               <a:rPr lang="en-US" smtClean="0"/>
-              <a:t>9/16/2018</a:t>
+              <a:t>9/25/18</a:t>
             </a:fld>
             <a:endParaRPr lang="en-US"/>
           </a:p>
@@ -1985,7 +1992,7 @@
           <p:cNvPr id="5" name="Footer Placeholder 4">
             <a:extLst>
               <a:ext uri="{FF2B5EF4-FFF2-40B4-BE49-F238E27FC236}">
-                <a16:creationId xmlns:a16="http://schemas.microsoft.com/office/drawing/2014/main" id="{A6346B6E-6081-4251-85B4-0F5F4EC66056}"/>
+                <a16:creationId xmlns:a16="http://schemas.microsoft.com/office/drawing/2014/main" xmlns="" id="{A6346B6E-6081-4251-85B4-0F5F4EC66056}"/>
               </a:ext>
             </a:extLst>
           </p:cNvPr>
@@ -2010,7 +2017,7 @@
           <p:cNvPr id="6" name="Slide Number Placeholder 5">
             <a:extLst>
               <a:ext uri="{FF2B5EF4-FFF2-40B4-BE49-F238E27FC236}">
-                <a16:creationId xmlns:a16="http://schemas.microsoft.com/office/drawing/2014/main" id="{A08ADCFC-1628-46AF-8D8B-11BF134F6FFB}"/>
+                <a16:creationId xmlns:a16="http://schemas.microsoft.com/office/drawing/2014/main" xmlns="" id="{A08ADCFC-1628-46AF-8D8B-11BF134F6FFB}"/>
               </a:ext>
             </a:extLst>
           </p:cNvPr>
@@ -2069,7 +2076,7 @@
           <p:cNvPr id="2" name="Title 1">
             <a:extLst>
               <a:ext uri="{FF2B5EF4-FFF2-40B4-BE49-F238E27FC236}">
-                <a16:creationId xmlns:a16="http://schemas.microsoft.com/office/drawing/2014/main" id="{20A06FCD-43B2-4062-ADE9-5196C80E947B}"/>
+                <a16:creationId xmlns:a16="http://schemas.microsoft.com/office/drawing/2014/main" xmlns="" id="{20A06FCD-43B2-4062-ADE9-5196C80E947B}"/>
               </a:ext>
             </a:extLst>
           </p:cNvPr>
@@ -2106,7 +2113,7 @@
           <p:cNvPr id="3" name="Text Placeholder 2">
             <a:extLst>
               <a:ext uri="{FF2B5EF4-FFF2-40B4-BE49-F238E27FC236}">
-                <a16:creationId xmlns:a16="http://schemas.microsoft.com/office/drawing/2014/main" id="{9689C800-F457-4EAA-8B68-FDB9E698C04A}"/>
+                <a16:creationId xmlns:a16="http://schemas.microsoft.com/office/drawing/2014/main" xmlns="" id="{9689C800-F457-4EAA-8B68-FDB9E698C04A}"/>
               </a:ext>
             </a:extLst>
           </p:cNvPr>
@@ -2231,7 +2238,7 @@
           <p:cNvPr id="4" name="Date Placeholder 3">
             <a:extLst>
               <a:ext uri="{FF2B5EF4-FFF2-40B4-BE49-F238E27FC236}">
-                <a16:creationId xmlns:a16="http://schemas.microsoft.com/office/drawing/2014/main" id="{DEEE74FC-0F00-42EC-9DA8-6938CA580240}"/>
+                <a16:creationId xmlns:a16="http://schemas.microsoft.com/office/drawing/2014/main" xmlns="" id="{DEEE74FC-0F00-42EC-9DA8-6938CA580240}"/>
               </a:ext>
             </a:extLst>
           </p:cNvPr>
@@ -2249,7 +2256,7 @@
           <a:p>
             <a:fld id="{38D4318C-2CF8-4E6B-ADD8-B5FDE2DDEB84}" type="datetimeFigureOut">
               <a:rPr lang="en-US" smtClean="0"/>
-              <a:t>9/16/2018</a:t>
+              <a:t>9/25/18</a:t>
             </a:fld>
             <a:endParaRPr lang="en-US"/>
           </a:p>
@@ -2260,7 +2267,7 @@
           <p:cNvPr id="5" name="Footer Placeholder 4">
             <a:extLst>
               <a:ext uri="{FF2B5EF4-FFF2-40B4-BE49-F238E27FC236}">
-                <a16:creationId xmlns:a16="http://schemas.microsoft.com/office/drawing/2014/main" id="{741D09C9-5481-4587-9C28-A3ED2A914B01}"/>
+                <a16:creationId xmlns:a16="http://schemas.microsoft.com/office/drawing/2014/main" xmlns="" id="{741D09C9-5481-4587-9C28-A3ED2A914B01}"/>
               </a:ext>
             </a:extLst>
           </p:cNvPr>
@@ -2285,7 +2292,7 @@
           <p:cNvPr id="6" name="Slide Number Placeholder 5">
             <a:extLst>
               <a:ext uri="{FF2B5EF4-FFF2-40B4-BE49-F238E27FC236}">
-                <a16:creationId xmlns:a16="http://schemas.microsoft.com/office/drawing/2014/main" id="{1AC83BC7-E8A4-486F-9C06-B334B53F37B9}"/>
+                <a16:creationId xmlns:a16="http://schemas.microsoft.com/office/drawing/2014/main" xmlns="" id="{1AC83BC7-E8A4-486F-9C06-B334B53F37B9}"/>
               </a:ext>
             </a:extLst>
           </p:cNvPr>
@@ -2344,7 +2351,7 @@
           <p:cNvPr id="2" name="Title 1">
             <a:extLst>
               <a:ext uri="{FF2B5EF4-FFF2-40B4-BE49-F238E27FC236}">
-                <a16:creationId xmlns:a16="http://schemas.microsoft.com/office/drawing/2014/main" id="{E81E36C7-0816-4A92-853C-ED3B09023EDB}"/>
+                <a16:creationId xmlns:a16="http://schemas.microsoft.com/office/drawing/2014/main" xmlns="" id="{E81E36C7-0816-4A92-853C-ED3B09023EDB}"/>
               </a:ext>
             </a:extLst>
           </p:cNvPr>
@@ -2372,7 +2379,7 @@
           <p:cNvPr id="3" name="Content Placeholder 2">
             <a:extLst>
               <a:ext uri="{FF2B5EF4-FFF2-40B4-BE49-F238E27FC236}">
-                <a16:creationId xmlns:a16="http://schemas.microsoft.com/office/drawing/2014/main" id="{7F707701-A54F-45E1-8A6C-2C8B8867BC9D}"/>
+                <a16:creationId xmlns:a16="http://schemas.microsoft.com/office/drawing/2014/main" xmlns="" id="{7F707701-A54F-45E1-8A6C-2C8B8867BC9D}"/>
               </a:ext>
             </a:extLst>
           </p:cNvPr>
@@ -2434,7 +2441,7 @@
           <p:cNvPr id="4" name="Content Placeholder 3">
             <a:extLst>
               <a:ext uri="{FF2B5EF4-FFF2-40B4-BE49-F238E27FC236}">
-                <a16:creationId xmlns:a16="http://schemas.microsoft.com/office/drawing/2014/main" id="{4B5786FD-7A65-4D8C-B15D-DA773068698C}"/>
+                <a16:creationId xmlns:a16="http://schemas.microsoft.com/office/drawing/2014/main" xmlns="" id="{4B5786FD-7A65-4D8C-B15D-DA773068698C}"/>
               </a:ext>
             </a:extLst>
           </p:cNvPr>
@@ -2496,7 +2503,7 @@
           <p:cNvPr id="5" name="Date Placeholder 4">
             <a:extLst>
               <a:ext uri="{FF2B5EF4-FFF2-40B4-BE49-F238E27FC236}">
-                <a16:creationId xmlns:a16="http://schemas.microsoft.com/office/drawing/2014/main" id="{CEAE3A29-2487-420C-866B-57CD44BF44A3}"/>
+                <a16:creationId xmlns:a16="http://schemas.microsoft.com/office/drawing/2014/main" xmlns="" id="{CEAE3A29-2487-420C-866B-57CD44BF44A3}"/>
               </a:ext>
             </a:extLst>
           </p:cNvPr>
@@ -2514,7 +2521,7 @@
           <a:p>
             <a:fld id="{38D4318C-2CF8-4E6B-ADD8-B5FDE2DDEB84}" type="datetimeFigureOut">
               <a:rPr lang="en-US" smtClean="0"/>
-              <a:t>9/16/2018</a:t>
+              <a:t>9/25/18</a:t>
             </a:fld>
             <a:endParaRPr lang="en-US"/>
           </a:p>
@@ -2525,7 +2532,7 @@
           <p:cNvPr id="6" name="Footer Placeholder 5">
             <a:extLst>
               <a:ext uri="{FF2B5EF4-FFF2-40B4-BE49-F238E27FC236}">
-                <a16:creationId xmlns:a16="http://schemas.microsoft.com/office/drawing/2014/main" id="{377443B9-9470-4D6A-AE0A-C326BCCBE642}"/>
+                <a16:creationId xmlns:a16="http://schemas.microsoft.com/office/drawing/2014/main" xmlns="" id="{377443B9-9470-4D6A-AE0A-C326BCCBE642}"/>
               </a:ext>
             </a:extLst>
           </p:cNvPr>
@@ -2550,7 +2557,7 @@
           <p:cNvPr id="7" name="Slide Number Placeholder 6">
             <a:extLst>
               <a:ext uri="{FF2B5EF4-FFF2-40B4-BE49-F238E27FC236}">
-                <a16:creationId xmlns:a16="http://schemas.microsoft.com/office/drawing/2014/main" id="{F90CCD6F-1F56-4850-98DF-5DD0EEE3738E}"/>
+                <a16:creationId xmlns:a16="http://schemas.microsoft.com/office/drawing/2014/main" xmlns="" id="{F90CCD6F-1F56-4850-98DF-5DD0EEE3738E}"/>
               </a:ext>
             </a:extLst>
           </p:cNvPr>
@@ -2609,7 +2616,7 @@
           <p:cNvPr id="2" name="Title 1">
             <a:extLst>
               <a:ext uri="{FF2B5EF4-FFF2-40B4-BE49-F238E27FC236}">
-                <a16:creationId xmlns:a16="http://schemas.microsoft.com/office/drawing/2014/main" id="{C3C414C3-8278-4588-933C-78CE8DB9A1BC}"/>
+                <a16:creationId xmlns:a16="http://schemas.microsoft.com/office/drawing/2014/main" xmlns="" id="{C3C414C3-8278-4588-933C-78CE8DB9A1BC}"/>
               </a:ext>
             </a:extLst>
           </p:cNvPr>
@@ -2642,7 +2649,7 @@
           <p:cNvPr id="3" name="Text Placeholder 2">
             <a:extLst>
               <a:ext uri="{FF2B5EF4-FFF2-40B4-BE49-F238E27FC236}">
-                <a16:creationId xmlns:a16="http://schemas.microsoft.com/office/drawing/2014/main" id="{71A200F1-57DD-46A6-A4EE-96E99875E1A2}"/>
+                <a16:creationId xmlns:a16="http://schemas.microsoft.com/office/drawing/2014/main" xmlns="" id="{71A200F1-57DD-46A6-A4EE-96E99875E1A2}"/>
               </a:ext>
             </a:extLst>
           </p:cNvPr>
@@ -2713,7 +2720,7 @@
           <p:cNvPr id="4" name="Content Placeholder 3">
             <a:extLst>
               <a:ext uri="{FF2B5EF4-FFF2-40B4-BE49-F238E27FC236}">
-                <a16:creationId xmlns:a16="http://schemas.microsoft.com/office/drawing/2014/main" id="{75083360-E32C-4B35-9766-9BA6CE824D44}"/>
+                <a16:creationId xmlns:a16="http://schemas.microsoft.com/office/drawing/2014/main" xmlns="" id="{75083360-E32C-4B35-9766-9BA6CE824D44}"/>
               </a:ext>
             </a:extLst>
           </p:cNvPr>
@@ -2775,7 +2782,7 @@
           <p:cNvPr id="5" name="Text Placeholder 4">
             <a:extLst>
               <a:ext uri="{FF2B5EF4-FFF2-40B4-BE49-F238E27FC236}">
-                <a16:creationId xmlns:a16="http://schemas.microsoft.com/office/drawing/2014/main" id="{9C302DCE-0AE3-4442-B76D-919B39B34647}"/>
+                <a16:creationId xmlns:a16="http://schemas.microsoft.com/office/drawing/2014/main" xmlns="" id="{9C302DCE-0AE3-4442-B76D-919B39B34647}"/>
               </a:ext>
             </a:extLst>
           </p:cNvPr>
@@ -2846,7 +2853,7 @@
           <p:cNvPr id="6" name="Content Placeholder 5">
             <a:extLst>
               <a:ext uri="{FF2B5EF4-FFF2-40B4-BE49-F238E27FC236}">
-                <a16:creationId xmlns:a16="http://schemas.microsoft.com/office/drawing/2014/main" id="{860A80C0-6965-48FB-B6A7-3D0F192940A6}"/>
+                <a16:creationId xmlns:a16="http://schemas.microsoft.com/office/drawing/2014/main" xmlns="" id="{860A80C0-6965-48FB-B6A7-3D0F192940A6}"/>
               </a:ext>
             </a:extLst>
           </p:cNvPr>
@@ -2908,7 +2915,7 @@
           <p:cNvPr id="7" name="Date Placeholder 6">
             <a:extLst>
               <a:ext uri="{FF2B5EF4-FFF2-40B4-BE49-F238E27FC236}">
-                <a16:creationId xmlns:a16="http://schemas.microsoft.com/office/drawing/2014/main" id="{FAA6129C-58F2-44B7-A8EB-4F5D1F1A7E66}"/>
+                <a16:creationId xmlns:a16="http://schemas.microsoft.com/office/drawing/2014/main" xmlns="" id="{FAA6129C-58F2-44B7-A8EB-4F5D1F1A7E66}"/>
               </a:ext>
             </a:extLst>
           </p:cNvPr>
@@ -2926,7 +2933,7 @@
           <a:p>
             <a:fld id="{38D4318C-2CF8-4E6B-ADD8-B5FDE2DDEB84}" type="datetimeFigureOut">
               <a:rPr lang="en-US" smtClean="0"/>
-              <a:t>9/16/2018</a:t>
+              <a:t>9/25/18</a:t>
             </a:fld>
             <a:endParaRPr lang="en-US"/>
           </a:p>
@@ -2937,7 +2944,7 @@
           <p:cNvPr id="8" name="Footer Placeholder 7">
             <a:extLst>
               <a:ext uri="{FF2B5EF4-FFF2-40B4-BE49-F238E27FC236}">
-                <a16:creationId xmlns:a16="http://schemas.microsoft.com/office/drawing/2014/main" id="{A6F5F6FD-2BE8-4B93-89BA-8F9D8CF99BB5}"/>
+                <a16:creationId xmlns:a16="http://schemas.microsoft.com/office/drawing/2014/main" xmlns="" id="{A6F5F6FD-2BE8-4B93-89BA-8F9D8CF99BB5}"/>
               </a:ext>
             </a:extLst>
           </p:cNvPr>
@@ -2962,7 +2969,7 @@
           <p:cNvPr id="9" name="Slide Number Placeholder 8">
             <a:extLst>
               <a:ext uri="{FF2B5EF4-FFF2-40B4-BE49-F238E27FC236}">
-                <a16:creationId xmlns:a16="http://schemas.microsoft.com/office/drawing/2014/main" id="{1F59AA36-72EF-4232-BC09-0155524D0938}"/>
+                <a16:creationId xmlns:a16="http://schemas.microsoft.com/office/drawing/2014/main" xmlns="" id="{1F59AA36-72EF-4232-BC09-0155524D0938}"/>
               </a:ext>
             </a:extLst>
           </p:cNvPr>
@@ -3021,7 +3028,7 @@
           <p:cNvPr id="2" name="Title 1">
             <a:extLst>
               <a:ext uri="{FF2B5EF4-FFF2-40B4-BE49-F238E27FC236}">
-                <a16:creationId xmlns:a16="http://schemas.microsoft.com/office/drawing/2014/main" id="{E81D2CF1-816D-48C2-ABCE-F0D1287A86EE}"/>
+                <a16:creationId xmlns:a16="http://schemas.microsoft.com/office/drawing/2014/main" xmlns="" id="{E81D2CF1-816D-48C2-ABCE-F0D1287A86EE}"/>
               </a:ext>
             </a:extLst>
           </p:cNvPr>
@@ -3049,7 +3056,7 @@
           <p:cNvPr id="3" name="Date Placeholder 2">
             <a:extLst>
               <a:ext uri="{FF2B5EF4-FFF2-40B4-BE49-F238E27FC236}">
-                <a16:creationId xmlns:a16="http://schemas.microsoft.com/office/drawing/2014/main" id="{AC9624E7-366F-48BC-B811-C38D8D34F6EF}"/>
+                <a16:creationId xmlns:a16="http://schemas.microsoft.com/office/drawing/2014/main" xmlns="" id="{AC9624E7-366F-48BC-B811-C38D8D34F6EF}"/>
               </a:ext>
             </a:extLst>
           </p:cNvPr>
@@ -3067,7 +3074,7 @@
           <a:p>
             <a:fld id="{38D4318C-2CF8-4E6B-ADD8-B5FDE2DDEB84}" type="datetimeFigureOut">
               <a:rPr lang="en-US" smtClean="0"/>
-              <a:t>9/16/2018</a:t>
+              <a:t>9/25/18</a:t>
             </a:fld>
             <a:endParaRPr lang="en-US"/>
           </a:p>
@@ -3078,7 +3085,7 @@
           <p:cNvPr id="4" name="Footer Placeholder 3">
             <a:extLst>
               <a:ext uri="{FF2B5EF4-FFF2-40B4-BE49-F238E27FC236}">
-                <a16:creationId xmlns:a16="http://schemas.microsoft.com/office/drawing/2014/main" id="{4BC120F3-5F3C-4B89-98B6-984CF95D89C8}"/>
+                <a16:creationId xmlns:a16="http://schemas.microsoft.com/office/drawing/2014/main" xmlns="" id="{4BC120F3-5F3C-4B89-98B6-984CF95D89C8}"/>
               </a:ext>
             </a:extLst>
           </p:cNvPr>
@@ -3103,7 +3110,7 @@
           <p:cNvPr id="5" name="Slide Number Placeholder 4">
             <a:extLst>
               <a:ext uri="{FF2B5EF4-FFF2-40B4-BE49-F238E27FC236}">
-                <a16:creationId xmlns:a16="http://schemas.microsoft.com/office/drawing/2014/main" id="{05D47124-544E-4C80-A43C-2E9B6C999EA9}"/>
+                <a16:creationId xmlns:a16="http://schemas.microsoft.com/office/drawing/2014/main" xmlns="" id="{05D47124-544E-4C80-A43C-2E9B6C999EA9}"/>
               </a:ext>
             </a:extLst>
           </p:cNvPr>
@@ -3162,7 +3169,7 @@
           <p:cNvPr id="2" name="Date Placeholder 1">
             <a:extLst>
               <a:ext uri="{FF2B5EF4-FFF2-40B4-BE49-F238E27FC236}">
-                <a16:creationId xmlns:a16="http://schemas.microsoft.com/office/drawing/2014/main" id="{641D9391-9D60-4076-8F79-DF77CFB04523}"/>
+                <a16:creationId xmlns:a16="http://schemas.microsoft.com/office/drawing/2014/main" xmlns="" id="{641D9391-9D60-4076-8F79-DF77CFB04523}"/>
               </a:ext>
             </a:extLst>
           </p:cNvPr>
@@ -3180,7 +3187,7 @@
           <a:p>
             <a:fld id="{38D4318C-2CF8-4E6B-ADD8-B5FDE2DDEB84}" type="datetimeFigureOut">
               <a:rPr lang="en-US" smtClean="0"/>
-              <a:t>9/16/2018</a:t>
+              <a:t>9/25/18</a:t>
             </a:fld>
             <a:endParaRPr lang="en-US"/>
           </a:p>
@@ -3191,7 +3198,7 @@
           <p:cNvPr id="3" name="Footer Placeholder 2">
             <a:extLst>
               <a:ext uri="{FF2B5EF4-FFF2-40B4-BE49-F238E27FC236}">
-                <a16:creationId xmlns:a16="http://schemas.microsoft.com/office/drawing/2014/main" id="{0E3F688F-5CA7-432F-B591-328DA41C4640}"/>
+                <a16:creationId xmlns:a16="http://schemas.microsoft.com/office/drawing/2014/main" xmlns="" id="{0E3F688F-5CA7-432F-B591-328DA41C4640}"/>
               </a:ext>
             </a:extLst>
           </p:cNvPr>
@@ -3216,7 +3223,7 @@
           <p:cNvPr id="4" name="Slide Number Placeholder 3">
             <a:extLst>
               <a:ext uri="{FF2B5EF4-FFF2-40B4-BE49-F238E27FC236}">
-                <a16:creationId xmlns:a16="http://schemas.microsoft.com/office/drawing/2014/main" id="{9CE96E86-76CD-492C-BDC2-0B211B4A758F}"/>
+                <a16:creationId xmlns:a16="http://schemas.microsoft.com/office/drawing/2014/main" xmlns="" id="{9CE96E86-76CD-492C-BDC2-0B211B4A758F}"/>
               </a:ext>
             </a:extLst>
           </p:cNvPr>
@@ -3275,7 +3282,7 @@
           <p:cNvPr id="2" name="Title 1">
             <a:extLst>
               <a:ext uri="{FF2B5EF4-FFF2-40B4-BE49-F238E27FC236}">
-                <a16:creationId xmlns:a16="http://schemas.microsoft.com/office/drawing/2014/main" id="{7F423E4D-6C40-4DC2-B1DF-B3C0C94E8786}"/>
+                <a16:creationId xmlns:a16="http://schemas.microsoft.com/office/drawing/2014/main" xmlns="" id="{7F423E4D-6C40-4DC2-B1DF-B3C0C94E8786}"/>
               </a:ext>
             </a:extLst>
           </p:cNvPr>
@@ -3312,7 +3319,7 @@
           <p:cNvPr id="3" name="Content Placeholder 2">
             <a:extLst>
               <a:ext uri="{FF2B5EF4-FFF2-40B4-BE49-F238E27FC236}">
-                <a16:creationId xmlns:a16="http://schemas.microsoft.com/office/drawing/2014/main" id="{5548D7BC-A06F-4A7E-AF6A-AEF48F162ACE}"/>
+                <a16:creationId xmlns:a16="http://schemas.microsoft.com/office/drawing/2014/main" xmlns="" id="{5548D7BC-A06F-4A7E-AF6A-AEF48F162ACE}"/>
               </a:ext>
             </a:extLst>
           </p:cNvPr>
@@ -3402,7 +3409,7 @@
           <p:cNvPr id="4" name="Text Placeholder 3">
             <a:extLst>
               <a:ext uri="{FF2B5EF4-FFF2-40B4-BE49-F238E27FC236}">
-                <a16:creationId xmlns:a16="http://schemas.microsoft.com/office/drawing/2014/main" id="{365731FF-334D-4CE5-9EC6-DD57EFD0CE6C}"/>
+                <a16:creationId xmlns:a16="http://schemas.microsoft.com/office/drawing/2014/main" xmlns="" id="{365731FF-334D-4CE5-9EC6-DD57EFD0CE6C}"/>
               </a:ext>
             </a:extLst>
           </p:cNvPr>
@@ -3473,7 +3480,7 @@
           <p:cNvPr id="5" name="Date Placeholder 4">
             <a:extLst>
               <a:ext uri="{FF2B5EF4-FFF2-40B4-BE49-F238E27FC236}">
-                <a16:creationId xmlns:a16="http://schemas.microsoft.com/office/drawing/2014/main" id="{941E5FD8-3FAA-42DC-B8EB-F27BE66BD2AF}"/>
+                <a16:creationId xmlns:a16="http://schemas.microsoft.com/office/drawing/2014/main" xmlns="" id="{941E5FD8-3FAA-42DC-B8EB-F27BE66BD2AF}"/>
               </a:ext>
             </a:extLst>
           </p:cNvPr>
@@ -3491,7 +3498,7 @@
           <a:p>
             <a:fld id="{38D4318C-2CF8-4E6B-ADD8-B5FDE2DDEB84}" type="datetimeFigureOut">
               <a:rPr lang="en-US" smtClean="0"/>
-              <a:t>9/16/2018</a:t>
+              <a:t>9/25/18</a:t>
             </a:fld>
             <a:endParaRPr lang="en-US"/>
           </a:p>
@@ -3502,7 +3509,7 @@
           <p:cNvPr id="6" name="Footer Placeholder 5">
             <a:extLst>
               <a:ext uri="{FF2B5EF4-FFF2-40B4-BE49-F238E27FC236}">
-                <a16:creationId xmlns:a16="http://schemas.microsoft.com/office/drawing/2014/main" id="{63C37809-3388-4A1D-B1D2-743B93135834}"/>
+                <a16:creationId xmlns:a16="http://schemas.microsoft.com/office/drawing/2014/main" xmlns="" id="{63C37809-3388-4A1D-B1D2-743B93135834}"/>
               </a:ext>
             </a:extLst>
           </p:cNvPr>
@@ -3527,7 +3534,7 @@
           <p:cNvPr id="7" name="Slide Number Placeholder 6">
             <a:extLst>
               <a:ext uri="{FF2B5EF4-FFF2-40B4-BE49-F238E27FC236}">
-                <a16:creationId xmlns:a16="http://schemas.microsoft.com/office/drawing/2014/main" id="{5E5C9D74-8181-4410-BBA3-7261D943FAFC}"/>
+                <a16:creationId xmlns:a16="http://schemas.microsoft.com/office/drawing/2014/main" xmlns="" id="{5E5C9D74-8181-4410-BBA3-7261D943FAFC}"/>
               </a:ext>
             </a:extLst>
           </p:cNvPr>
@@ -3586,7 +3593,7 @@
           <p:cNvPr id="2" name="Title 1">
             <a:extLst>
               <a:ext uri="{FF2B5EF4-FFF2-40B4-BE49-F238E27FC236}">
-                <a16:creationId xmlns:a16="http://schemas.microsoft.com/office/drawing/2014/main" id="{B661A0EF-4640-4EF6-A916-A1C1D59C7345}"/>
+                <a16:creationId xmlns:a16="http://schemas.microsoft.com/office/drawing/2014/main" xmlns="" id="{B661A0EF-4640-4EF6-A916-A1C1D59C7345}"/>
               </a:ext>
             </a:extLst>
           </p:cNvPr>
@@ -3623,7 +3630,7 @@
           <p:cNvPr id="3" name="Picture Placeholder 2">
             <a:extLst>
               <a:ext uri="{FF2B5EF4-FFF2-40B4-BE49-F238E27FC236}">
-                <a16:creationId xmlns:a16="http://schemas.microsoft.com/office/drawing/2014/main" id="{81CA8A45-1AAC-49D1-9E71-D973BEB1A220}"/>
+                <a16:creationId xmlns:a16="http://schemas.microsoft.com/office/drawing/2014/main" xmlns="" id="{81CA8A45-1AAC-49D1-9E71-D973BEB1A220}"/>
               </a:ext>
             </a:extLst>
           </p:cNvPr>
@@ -3690,7 +3697,7 @@
           <p:cNvPr id="4" name="Text Placeholder 3">
             <a:extLst>
               <a:ext uri="{FF2B5EF4-FFF2-40B4-BE49-F238E27FC236}">
-                <a16:creationId xmlns:a16="http://schemas.microsoft.com/office/drawing/2014/main" id="{1BBED5FC-EAD8-4BBB-AFD6-F031672AE133}"/>
+                <a16:creationId xmlns:a16="http://schemas.microsoft.com/office/drawing/2014/main" xmlns="" id="{1BBED5FC-EAD8-4BBB-AFD6-F031672AE133}"/>
               </a:ext>
             </a:extLst>
           </p:cNvPr>
@@ -3761,7 +3768,7 @@
           <p:cNvPr id="5" name="Date Placeholder 4">
             <a:extLst>
               <a:ext uri="{FF2B5EF4-FFF2-40B4-BE49-F238E27FC236}">
-                <a16:creationId xmlns:a16="http://schemas.microsoft.com/office/drawing/2014/main" id="{E89FBE54-B46E-4C19-8C0D-267CD05DB014}"/>
+                <a16:creationId xmlns:a16="http://schemas.microsoft.com/office/drawing/2014/main" xmlns="" id="{E89FBE54-B46E-4C19-8C0D-267CD05DB014}"/>
               </a:ext>
             </a:extLst>
           </p:cNvPr>
@@ -3779,7 +3786,7 @@
           <a:p>
             <a:fld id="{38D4318C-2CF8-4E6B-ADD8-B5FDE2DDEB84}" type="datetimeFigureOut">
               <a:rPr lang="en-US" smtClean="0"/>
-              <a:t>9/16/2018</a:t>
+              <a:t>9/25/18</a:t>
             </a:fld>
             <a:endParaRPr lang="en-US"/>
           </a:p>
@@ -3790,7 +3797,7 @@
           <p:cNvPr id="6" name="Footer Placeholder 5">
             <a:extLst>
               <a:ext uri="{FF2B5EF4-FFF2-40B4-BE49-F238E27FC236}">
-                <a16:creationId xmlns:a16="http://schemas.microsoft.com/office/drawing/2014/main" id="{B6E0C9C3-4DB8-4258-97FC-8416E1E5474F}"/>
+                <a16:creationId xmlns:a16="http://schemas.microsoft.com/office/drawing/2014/main" xmlns="" id="{B6E0C9C3-4DB8-4258-97FC-8416E1E5474F}"/>
               </a:ext>
             </a:extLst>
           </p:cNvPr>
@@ -3815,7 +3822,7 @@
           <p:cNvPr id="7" name="Slide Number Placeholder 6">
             <a:extLst>
               <a:ext uri="{FF2B5EF4-FFF2-40B4-BE49-F238E27FC236}">
-                <a16:creationId xmlns:a16="http://schemas.microsoft.com/office/drawing/2014/main" id="{593932B1-FCA9-4C15-A951-EA0A956F20CB}"/>
+                <a16:creationId xmlns:a16="http://schemas.microsoft.com/office/drawing/2014/main" xmlns="" id="{593932B1-FCA9-4C15-A951-EA0A956F20CB}"/>
               </a:ext>
             </a:extLst>
           </p:cNvPr>
@@ -3879,7 +3886,7 @@
           <p:cNvPr id="2" name="Title Placeholder 1">
             <a:extLst>
               <a:ext uri="{FF2B5EF4-FFF2-40B4-BE49-F238E27FC236}">
-                <a16:creationId xmlns:a16="http://schemas.microsoft.com/office/drawing/2014/main" id="{7C0C664C-58A9-46A0-9CC1-0EEDE6285BFF}"/>
+                <a16:creationId xmlns:a16="http://schemas.microsoft.com/office/drawing/2014/main" xmlns="" id="{7C0C664C-58A9-46A0-9CC1-0EEDE6285BFF}"/>
               </a:ext>
             </a:extLst>
           </p:cNvPr>
@@ -3917,7 +3924,7 @@
           <p:cNvPr id="3" name="Text Placeholder 2">
             <a:extLst>
               <a:ext uri="{FF2B5EF4-FFF2-40B4-BE49-F238E27FC236}">
-                <a16:creationId xmlns:a16="http://schemas.microsoft.com/office/drawing/2014/main" id="{65562DF5-BE86-4DB8-9E27-E4F718173D1B}"/>
+                <a16:creationId xmlns:a16="http://schemas.microsoft.com/office/drawing/2014/main" xmlns="" id="{65562DF5-BE86-4DB8-9E27-E4F718173D1B}"/>
               </a:ext>
             </a:extLst>
           </p:cNvPr>
@@ -3984,7 +3991,7 @@
           <p:cNvPr id="4" name="Date Placeholder 3">
             <a:extLst>
               <a:ext uri="{FF2B5EF4-FFF2-40B4-BE49-F238E27FC236}">
-                <a16:creationId xmlns:a16="http://schemas.microsoft.com/office/drawing/2014/main" id="{DDA4EFC7-3387-4CAF-889C-4C468A0A1E5B}"/>
+                <a16:creationId xmlns:a16="http://schemas.microsoft.com/office/drawing/2014/main" xmlns="" id="{DDA4EFC7-3387-4CAF-889C-4C468A0A1E5B}"/>
               </a:ext>
             </a:extLst>
           </p:cNvPr>
@@ -4020,7 +4027,7 @@
           <a:p>
             <a:fld id="{38D4318C-2CF8-4E6B-ADD8-B5FDE2DDEB84}" type="datetimeFigureOut">
               <a:rPr lang="en-US" smtClean="0"/>
-              <a:t>9/16/2018</a:t>
+              <a:t>9/25/18</a:t>
             </a:fld>
             <a:endParaRPr lang="en-US"/>
           </a:p>
@@ -4031,7 +4038,7 @@
           <p:cNvPr id="5" name="Footer Placeholder 4">
             <a:extLst>
               <a:ext uri="{FF2B5EF4-FFF2-40B4-BE49-F238E27FC236}">
-                <a16:creationId xmlns:a16="http://schemas.microsoft.com/office/drawing/2014/main" id="{37275286-A5F9-4A85-B019-61F07876BEAF}"/>
+                <a16:creationId xmlns:a16="http://schemas.microsoft.com/office/drawing/2014/main" xmlns="" id="{37275286-A5F9-4A85-B019-61F07876BEAF}"/>
               </a:ext>
             </a:extLst>
           </p:cNvPr>
@@ -4074,7 +4081,7 @@
           <p:cNvPr id="6" name="Slide Number Placeholder 5">
             <a:extLst>
               <a:ext uri="{FF2B5EF4-FFF2-40B4-BE49-F238E27FC236}">
-                <a16:creationId xmlns:a16="http://schemas.microsoft.com/office/drawing/2014/main" id="{AF635EAA-95A3-4DE3-A775-A7F3B84FB9B8}"/>
+                <a16:creationId xmlns:a16="http://schemas.microsoft.com/office/drawing/2014/main" xmlns="" id="{AF635EAA-95A3-4DE3-A775-A7F3B84FB9B8}"/>
               </a:ext>
             </a:extLst>
           </p:cNvPr>
@@ -4450,7 +4457,7 @@
           <p:cNvPr id="4" name="Rectangle 3">
             <a:extLst>
               <a:ext uri="{FF2B5EF4-FFF2-40B4-BE49-F238E27FC236}">
-                <a16:creationId xmlns:a16="http://schemas.microsoft.com/office/drawing/2014/main" id="{3263A579-F937-472F-BAC8-0F6DBD133059}"/>
+                <a16:creationId xmlns:a16="http://schemas.microsoft.com/office/drawing/2014/main" xmlns="" id="{3263A579-F937-472F-BAC8-0F6DBD133059}"/>
               </a:ext>
             </a:extLst>
           </p:cNvPr>
@@ -4828,7 +4835,7 @@
           <p:cNvPr id="6" name="Flowchart: Terminator 5">
             <a:extLst>
               <a:ext uri="{FF2B5EF4-FFF2-40B4-BE49-F238E27FC236}">
-                <a16:creationId xmlns:a16="http://schemas.microsoft.com/office/drawing/2014/main" id="{BC26BFB4-0829-4EF7-B551-E33F9117E645}"/>
+                <a16:creationId xmlns:a16="http://schemas.microsoft.com/office/drawing/2014/main" xmlns="" id="{BC26BFB4-0829-4EF7-B551-E33F9117E645}"/>
               </a:ext>
             </a:extLst>
           </p:cNvPr>
@@ -4886,7 +4893,7 @@
           <p:cNvPr id="45" name="Rectangle: Rounded Corners 44">
             <a:extLst>
               <a:ext uri="{FF2B5EF4-FFF2-40B4-BE49-F238E27FC236}">
-                <a16:creationId xmlns:a16="http://schemas.microsoft.com/office/drawing/2014/main" id="{382337C1-3DAB-4E1C-A8B6-4AA16C3410CE}"/>
+                <a16:creationId xmlns:a16="http://schemas.microsoft.com/office/drawing/2014/main" xmlns="" id="{382337C1-3DAB-4E1C-A8B6-4AA16C3410CE}"/>
               </a:ext>
             </a:extLst>
           </p:cNvPr>
@@ -5038,7 +5045,7 @@
           <p:cNvPr id="46" name="Rectangle: Rounded Corners 45">
             <a:extLst>
               <a:ext uri="{FF2B5EF4-FFF2-40B4-BE49-F238E27FC236}">
-                <a16:creationId xmlns:a16="http://schemas.microsoft.com/office/drawing/2014/main" id="{4369A102-1733-46FB-85EB-77C0CAB96BEB}"/>
+                <a16:creationId xmlns:a16="http://schemas.microsoft.com/office/drawing/2014/main" xmlns="" id="{4369A102-1733-46FB-85EB-77C0CAB96BEB}"/>
               </a:ext>
             </a:extLst>
           </p:cNvPr>
@@ -5288,7 +5295,7 @@
           <p:cNvPr id="70" name="Group 69">
             <a:extLst>
               <a:ext uri="{FF2B5EF4-FFF2-40B4-BE49-F238E27FC236}">
-                <a16:creationId xmlns:a16="http://schemas.microsoft.com/office/drawing/2014/main" id="{03E82210-D12A-4472-8E82-5C642547A5AD}"/>
+                <a16:creationId xmlns:a16="http://schemas.microsoft.com/office/drawing/2014/main" xmlns="" id="{03E82210-D12A-4472-8E82-5C642547A5AD}"/>
               </a:ext>
             </a:extLst>
           </p:cNvPr>
@@ -5308,7 +5315,7 @@
             <p:cNvPr id="49" name="Arrow: Down 48">
               <a:extLst>
                 <a:ext uri="{FF2B5EF4-FFF2-40B4-BE49-F238E27FC236}">
-                  <a16:creationId xmlns:a16="http://schemas.microsoft.com/office/drawing/2014/main" id="{3B31D1CB-EE12-4C30-9755-0315B7051AAC}"/>
+                  <a16:creationId xmlns:a16="http://schemas.microsoft.com/office/drawing/2014/main" xmlns="" id="{3B31D1CB-EE12-4C30-9755-0315B7051AAC}"/>
                 </a:ext>
               </a:extLst>
             </p:cNvPr>
@@ -5354,7 +5361,7 @@
             <p:cNvPr id="50" name="Arrow: Down 49">
               <a:extLst>
                 <a:ext uri="{FF2B5EF4-FFF2-40B4-BE49-F238E27FC236}">
-                  <a16:creationId xmlns:a16="http://schemas.microsoft.com/office/drawing/2014/main" id="{4CC7C068-0CD8-48B4-8CCB-6BAC503024B1}"/>
+                  <a16:creationId xmlns:a16="http://schemas.microsoft.com/office/drawing/2014/main" xmlns="" id="{4CC7C068-0CD8-48B4-8CCB-6BAC503024B1}"/>
                 </a:ext>
               </a:extLst>
             </p:cNvPr>
@@ -5400,7 +5407,7 @@
             <p:cNvPr id="56" name="Arrow: Down 55">
               <a:extLst>
                 <a:ext uri="{FF2B5EF4-FFF2-40B4-BE49-F238E27FC236}">
-                  <a16:creationId xmlns:a16="http://schemas.microsoft.com/office/drawing/2014/main" id="{08705A44-8E76-40A6-9AEF-3E38498993A3}"/>
+                  <a16:creationId xmlns:a16="http://schemas.microsoft.com/office/drawing/2014/main" xmlns="" id="{08705A44-8E76-40A6-9AEF-3E38498993A3}"/>
                 </a:ext>
               </a:extLst>
             </p:cNvPr>
@@ -5446,7 +5453,7 @@
             <p:cNvPr id="58" name="Arrow: Down 57">
               <a:extLst>
                 <a:ext uri="{FF2B5EF4-FFF2-40B4-BE49-F238E27FC236}">
-                  <a16:creationId xmlns:a16="http://schemas.microsoft.com/office/drawing/2014/main" id="{6F9F05EB-A54D-4318-88A2-04FBDC868428}"/>
+                  <a16:creationId xmlns:a16="http://schemas.microsoft.com/office/drawing/2014/main" xmlns="" id="{6F9F05EB-A54D-4318-88A2-04FBDC868428}"/>
                 </a:ext>
               </a:extLst>
             </p:cNvPr>
@@ -5492,7 +5499,7 @@
             <p:cNvPr id="60" name="Arrow: Down 59">
               <a:extLst>
                 <a:ext uri="{FF2B5EF4-FFF2-40B4-BE49-F238E27FC236}">
-                  <a16:creationId xmlns:a16="http://schemas.microsoft.com/office/drawing/2014/main" id="{A048F72C-C2B7-4E3D-AE7F-6909FE6D260C}"/>
+                  <a16:creationId xmlns:a16="http://schemas.microsoft.com/office/drawing/2014/main" xmlns="" id="{A048F72C-C2B7-4E3D-AE7F-6909FE6D260C}"/>
                 </a:ext>
               </a:extLst>
             </p:cNvPr>
@@ -5538,7 +5545,7 @@
             <p:cNvPr id="61" name="Arrow: Down 60">
               <a:extLst>
                 <a:ext uri="{FF2B5EF4-FFF2-40B4-BE49-F238E27FC236}">
-                  <a16:creationId xmlns:a16="http://schemas.microsoft.com/office/drawing/2014/main" id="{A7694F96-6FA9-4070-811F-859DE3C6C575}"/>
+                  <a16:creationId xmlns:a16="http://schemas.microsoft.com/office/drawing/2014/main" xmlns="" id="{A7694F96-6FA9-4070-811F-859DE3C6C575}"/>
                 </a:ext>
               </a:extLst>
             </p:cNvPr>
@@ -5585,7 +5592,7 @@
           <p:cNvPr id="69" name="Group 68">
             <a:extLst>
               <a:ext uri="{FF2B5EF4-FFF2-40B4-BE49-F238E27FC236}">
-                <a16:creationId xmlns:a16="http://schemas.microsoft.com/office/drawing/2014/main" id="{3065794C-32D8-4296-9C9A-EFC920F7B83A}"/>
+                <a16:creationId xmlns:a16="http://schemas.microsoft.com/office/drawing/2014/main" xmlns="" id="{3065794C-32D8-4296-9C9A-EFC920F7B83A}"/>
               </a:ext>
             </a:extLst>
           </p:cNvPr>
@@ -5605,7 +5612,7 @@
             <p:cNvPr id="51" name="Arrow: Down 50">
               <a:extLst>
                 <a:ext uri="{FF2B5EF4-FFF2-40B4-BE49-F238E27FC236}">
-                  <a16:creationId xmlns:a16="http://schemas.microsoft.com/office/drawing/2014/main" id="{B06F4C8A-27C8-401F-9C7F-ACE6014CB994}"/>
+                  <a16:creationId xmlns:a16="http://schemas.microsoft.com/office/drawing/2014/main" xmlns="" id="{B06F4C8A-27C8-401F-9C7F-ACE6014CB994}"/>
                 </a:ext>
               </a:extLst>
             </p:cNvPr>
@@ -5651,7 +5658,7 @@
             <p:cNvPr id="52" name="Arrow: Down 51">
               <a:extLst>
                 <a:ext uri="{FF2B5EF4-FFF2-40B4-BE49-F238E27FC236}">
-                  <a16:creationId xmlns:a16="http://schemas.microsoft.com/office/drawing/2014/main" id="{3F6578B2-F999-412C-9C07-3C6816BF840C}"/>
+                  <a16:creationId xmlns:a16="http://schemas.microsoft.com/office/drawing/2014/main" xmlns="" id="{3F6578B2-F999-412C-9C07-3C6816BF840C}"/>
                 </a:ext>
               </a:extLst>
             </p:cNvPr>
@@ -5697,7 +5704,7 @@
             <p:cNvPr id="53" name="Arrow: Down 52">
               <a:extLst>
                 <a:ext uri="{FF2B5EF4-FFF2-40B4-BE49-F238E27FC236}">
-                  <a16:creationId xmlns:a16="http://schemas.microsoft.com/office/drawing/2014/main" id="{450EE119-954E-44FE-B4A3-B3DB96644AB9}"/>
+                  <a16:creationId xmlns:a16="http://schemas.microsoft.com/office/drawing/2014/main" xmlns="" id="{450EE119-954E-44FE-B4A3-B3DB96644AB9}"/>
                 </a:ext>
               </a:extLst>
             </p:cNvPr>
@@ -5743,7 +5750,7 @@
             <p:cNvPr id="54" name="Arrow: Down 53">
               <a:extLst>
                 <a:ext uri="{FF2B5EF4-FFF2-40B4-BE49-F238E27FC236}">
-                  <a16:creationId xmlns:a16="http://schemas.microsoft.com/office/drawing/2014/main" id="{A185CF80-D658-411D-BF04-97A9C0FDCFD4}"/>
+                  <a16:creationId xmlns:a16="http://schemas.microsoft.com/office/drawing/2014/main" xmlns="" id="{A185CF80-D658-411D-BF04-97A9C0FDCFD4}"/>
                 </a:ext>
               </a:extLst>
             </p:cNvPr>
@@ -5789,7 +5796,7 @@
             <p:cNvPr id="55" name="Arrow: Down 54">
               <a:extLst>
                 <a:ext uri="{FF2B5EF4-FFF2-40B4-BE49-F238E27FC236}">
-                  <a16:creationId xmlns:a16="http://schemas.microsoft.com/office/drawing/2014/main" id="{305D5E87-D088-4E16-9AAA-9B61A0231F86}"/>
+                  <a16:creationId xmlns:a16="http://schemas.microsoft.com/office/drawing/2014/main" xmlns="" id="{305D5E87-D088-4E16-9AAA-9B61A0231F86}"/>
                 </a:ext>
               </a:extLst>
             </p:cNvPr>
@@ -5835,7 +5842,7 @@
             <p:cNvPr id="57" name="Arrow: Down 56">
               <a:extLst>
                 <a:ext uri="{FF2B5EF4-FFF2-40B4-BE49-F238E27FC236}">
-                  <a16:creationId xmlns:a16="http://schemas.microsoft.com/office/drawing/2014/main" id="{BB4A2EA1-8C7C-4D6C-BC70-96B197B76702}"/>
+                  <a16:creationId xmlns:a16="http://schemas.microsoft.com/office/drawing/2014/main" xmlns="" id="{BB4A2EA1-8C7C-4D6C-BC70-96B197B76702}"/>
                 </a:ext>
               </a:extLst>
             </p:cNvPr>
@@ -5881,7 +5888,7 @@
             <p:cNvPr id="62" name="Arrow: Down 61">
               <a:extLst>
                 <a:ext uri="{FF2B5EF4-FFF2-40B4-BE49-F238E27FC236}">
-                  <a16:creationId xmlns:a16="http://schemas.microsoft.com/office/drawing/2014/main" id="{21AE7CA0-F8AF-4ECD-8916-5286110EECC3}"/>
+                  <a16:creationId xmlns:a16="http://schemas.microsoft.com/office/drawing/2014/main" xmlns="" id="{21AE7CA0-F8AF-4ECD-8916-5286110EECC3}"/>
                 </a:ext>
               </a:extLst>
             </p:cNvPr>
@@ -5927,7 +5934,7 @@
             <p:cNvPr id="63" name="Arrow: Down 62">
               <a:extLst>
                 <a:ext uri="{FF2B5EF4-FFF2-40B4-BE49-F238E27FC236}">
-                  <a16:creationId xmlns:a16="http://schemas.microsoft.com/office/drawing/2014/main" id="{751F3152-1F2D-4A6E-A117-0416A26B03AA}"/>
+                  <a16:creationId xmlns:a16="http://schemas.microsoft.com/office/drawing/2014/main" xmlns="" id="{751F3152-1F2D-4A6E-A117-0416A26B03AA}"/>
                 </a:ext>
               </a:extLst>
             </p:cNvPr>
@@ -5973,7 +5980,7 @@
             <p:cNvPr id="64" name="Arrow: Down 63">
               <a:extLst>
                 <a:ext uri="{FF2B5EF4-FFF2-40B4-BE49-F238E27FC236}">
-                  <a16:creationId xmlns:a16="http://schemas.microsoft.com/office/drawing/2014/main" id="{807E50BC-DEF8-4CE2-A25C-A4DFC88D14A0}"/>
+                  <a16:creationId xmlns:a16="http://schemas.microsoft.com/office/drawing/2014/main" xmlns="" id="{807E50BC-DEF8-4CE2-A25C-A4DFC88D14A0}"/>
                 </a:ext>
               </a:extLst>
             </p:cNvPr>
@@ -6019,7 +6026,7 @@
             <p:cNvPr id="65" name="Arrow: Down 64">
               <a:extLst>
                 <a:ext uri="{FF2B5EF4-FFF2-40B4-BE49-F238E27FC236}">
-                  <a16:creationId xmlns:a16="http://schemas.microsoft.com/office/drawing/2014/main" id="{5569AB8E-DA9B-4319-BB74-F7B35ED9C963}"/>
+                  <a16:creationId xmlns:a16="http://schemas.microsoft.com/office/drawing/2014/main" xmlns="" id="{5569AB8E-DA9B-4319-BB74-F7B35ED9C963}"/>
                 </a:ext>
               </a:extLst>
             </p:cNvPr>
@@ -6065,7 +6072,7 @@
             <p:cNvPr id="66" name="Arrow: Down 65">
               <a:extLst>
                 <a:ext uri="{FF2B5EF4-FFF2-40B4-BE49-F238E27FC236}">
-                  <a16:creationId xmlns:a16="http://schemas.microsoft.com/office/drawing/2014/main" id="{4FF32172-E710-4741-8DB4-EB4A9F2D3C59}"/>
+                  <a16:creationId xmlns:a16="http://schemas.microsoft.com/office/drawing/2014/main" xmlns="" id="{4FF32172-E710-4741-8DB4-EB4A9F2D3C59}"/>
                 </a:ext>
               </a:extLst>
             </p:cNvPr>
@@ -6111,7 +6118,7 @@
             <p:cNvPr id="67" name="Arrow: Down 66">
               <a:extLst>
                 <a:ext uri="{FF2B5EF4-FFF2-40B4-BE49-F238E27FC236}">
-                  <a16:creationId xmlns:a16="http://schemas.microsoft.com/office/drawing/2014/main" id="{3AFFA1E1-8DAA-4BA0-88A8-91731D3A12CC}"/>
+                  <a16:creationId xmlns:a16="http://schemas.microsoft.com/office/drawing/2014/main" xmlns="" id="{3AFFA1E1-8DAA-4BA0-88A8-91731D3A12CC}"/>
                 </a:ext>
               </a:extLst>
             </p:cNvPr>
@@ -6157,7 +6164,7 @@
             <p:cNvPr id="68" name="Arrow: Down 67">
               <a:extLst>
                 <a:ext uri="{FF2B5EF4-FFF2-40B4-BE49-F238E27FC236}">
-                  <a16:creationId xmlns:a16="http://schemas.microsoft.com/office/drawing/2014/main" id="{4AF4710B-7AD0-4B1D-8526-591AB2625845}"/>
+                  <a16:creationId xmlns:a16="http://schemas.microsoft.com/office/drawing/2014/main" xmlns="" id="{4AF4710B-7AD0-4B1D-8526-591AB2625845}"/>
                 </a:ext>
               </a:extLst>
             </p:cNvPr>
@@ -6204,7 +6211,7 @@
           <p:cNvPr id="71" name="Rectangle: Rounded Corners 70">
             <a:extLst>
               <a:ext uri="{FF2B5EF4-FFF2-40B4-BE49-F238E27FC236}">
-                <a16:creationId xmlns:a16="http://schemas.microsoft.com/office/drawing/2014/main" id="{5F7A2BB6-CE87-4F3B-A640-9373397F480A}"/>
+                <a16:creationId xmlns:a16="http://schemas.microsoft.com/office/drawing/2014/main" xmlns="" id="{5F7A2BB6-CE87-4F3B-A640-9373397F480A}"/>
               </a:ext>
             </a:extLst>
           </p:cNvPr>
@@ -6384,7 +6391,7 @@
           <p:cNvPr id="80" name="Group 79">
             <a:extLst>
               <a:ext uri="{FF2B5EF4-FFF2-40B4-BE49-F238E27FC236}">
-                <a16:creationId xmlns:a16="http://schemas.microsoft.com/office/drawing/2014/main" id="{9C240103-050A-4695-BF9F-5537C248F66A}"/>
+                <a16:creationId xmlns:a16="http://schemas.microsoft.com/office/drawing/2014/main" xmlns="" id="{9C240103-050A-4695-BF9F-5537C248F66A}"/>
               </a:ext>
             </a:extLst>
           </p:cNvPr>
@@ -6404,7 +6411,7 @@
             <p:cNvPr id="72" name="Oval 71">
               <a:extLst>
                 <a:ext uri="{FF2B5EF4-FFF2-40B4-BE49-F238E27FC236}">
-                  <a16:creationId xmlns:a16="http://schemas.microsoft.com/office/drawing/2014/main" id="{72173DFC-7F98-4DB4-B138-D097FF7B3FD7}"/>
+                  <a16:creationId xmlns:a16="http://schemas.microsoft.com/office/drawing/2014/main" xmlns="" id="{72173DFC-7F98-4DB4-B138-D097FF7B3FD7}"/>
                 </a:ext>
               </a:extLst>
             </p:cNvPr>
@@ -6450,7 +6457,7 @@
             <p:cNvPr id="73" name="Oval 72">
               <a:extLst>
                 <a:ext uri="{FF2B5EF4-FFF2-40B4-BE49-F238E27FC236}">
-                  <a16:creationId xmlns:a16="http://schemas.microsoft.com/office/drawing/2014/main" id="{5EAF5F0D-D560-4D91-87F0-B88A371197A7}"/>
+                  <a16:creationId xmlns:a16="http://schemas.microsoft.com/office/drawing/2014/main" xmlns="" id="{5EAF5F0D-D560-4D91-87F0-B88A371197A7}"/>
                 </a:ext>
               </a:extLst>
             </p:cNvPr>
@@ -6496,7 +6503,7 @@
             <p:cNvPr id="74" name="Oval 73">
               <a:extLst>
                 <a:ext uri="{FF2B5EF4-FFF2-40B4-BE49-F238E27FC236}">
-                  <a16:creationId xmlns:a16="http://schemas.microsoft.com/office/drawing/2014/main" id="{6E325FF1-3D01-4062-A828-C83B2E9C2E01}"/>
+                  <a16:creationId xmlns:a16="http://schemas.microsoft.com/office/drawing/2014/main" xmlns="" id="{6E325FF1-3D01-4062-A828-C83B2E9C2E01}"/>
                 </a:ext>
               </a:extLst>
             </p:cNvPr>
@@ -6542,7 +6549,7 @@
             <p:cNvPr id="75" name="Oval 74">
               <a:extLst>
                 <a:ext uri="{FF2B5EF4-FFF2-40B4-BE49-F238E27FC236}">
-                  <a16:creationId xmlns:a16="http://schemas.microsoft.com/office/drawing/2014/main" id="{041CAB99-80D9-49CB-961D-7B48F675860D}"/>
+                  <a16:creationId xmlns:a16="http://schemas.microsoft.com/office/drawing/2014/main" xmlns="" id="{041CAB99-80D9-49CB-961D-7B48F675860D}"/>
                 </a:ext>
               </a:extLst>
             </p:cNvPr>
@@ -6588,7 +6595,7 @@
             <p:cNvPr id="76" name="Oval 75">
               <a:extLst>
                 <a:ext uri="{FF2B5EF4-FFF2-40B4-BE49-F238E27FC236}">
-                  <a16:creationId xmlns:a16="http://schemas.microsoft.com/office/drawing/2014/main" id="{0831FE5F-41A6-4901-A63B-4B4D462CBFF8}"/>
+                  <a16:creationId xmlns:a16="http://schemas.microsoft.com/office/drawing/2014/main" xmlns="" id="{0831FE5F-41A6-4901-A63B-4B4D462CBFF8}"/>
                 </a:ext>
               </a:extLst>
             </p:cNvPr>
@@ -6634,7 +6641,7 @@
             <p:cNvPr id="77" name="Oval 76">
               <a:extLst>
                 <a:ext uri="{FF2B5EF4-FFF2-40B4-BE49-F238E27FC236}">
-                  <a16:creationId xmlns:a16="http://schemas.microsoft.com/office/drawing/2014/main" id="{20E7703C-2A7D-4793-9329-B009C393EF66}"/>
+                  <a16:creationId xmlns:a16="http://schemas.microsoft.com/office/drawing/2014/main" xmlns="" id="{20E7703C-2A7D-4793-9329-B009C393EF66}"/>
                 </a:ext>
               </a:extLst>
             </p:cNvPr>
@@ -6680,7 +6687,7 @@
             <p:cNvPr id="78" name="Oval 77">
               <a:extLst>
                 <a:ext uri="{FF2B5EF4-FFF2-40B4-BE49-F238E27FC236}">
-                  <a16:creationId xmlns:a16="http://schemas.microsoft.com/office/drawing/2014/main" id="{D5806448-D69B-446D-AB6C-3D9967150298}"/>
+                  <a16:creationId xmlns:a16="http://schemas.microsoft.com/office/drawing/2014/main" xmlns="" id="{D5806448-D69B-446D-AB6C-3D9967150298}"/>
                 </a:ext>
               </a:extLst>
             </p:cNvPr>
@@ -6726,7 +6733,7 @@
             <p:cNvPr id="79" name="Oval 78">
               <a:extLst>
                 <a:ext uri="{FF2B5EF4-FFF2-40B4-BE49-F238E27FC236}">
-                  <a16:creationId xmlns:a16="http://schemas.microsoft.com/office/drawing/2014/main" id="{80035BDB-E69C-4D0D-9A50-0249359E0168}"/>
+                  <a16:creationId xmlns:a16="http://schemas.microsoft.com/office/drawing/2014/main" xmlns="" id="{80035BDB-E69C-4D0D-9A50-0249359E0168}"/>
                 </a:ext>
               </a:extLst>
             </p:cNvPr>
@@ -6811,7 +6818,7 @@
           <p:cNvPr id="4" name="Rectangle 3">
             <a:extLst>
               <a:ext uri="{FF2B5EF4-FFF2-40B4-BE49-F238E27FC236}">
-                <a16:creationId xmlns:a16="http://schemas.microsoft.com/office/drawing/2014/main" id="{3263A579-F937-472F-BAC8-0F6DBD133059}"/>
+                <a16:creationId xmlns:a16="http://schemas.microsoft.com/office/drawing/2014/main" xmlns="" id="{3263A579-F937-472F-BAC8-0F6DBD133059}"/>
               </a:ext>
             </a:extLst>
           </p:cNvPr>
@@ -7197,7 +7204,7 @@
           <p:cNvPr id="6" name="Flowchart: Terminator 5">
             <a:extLst>
               <a:ext uri="{FF2B5EF4-FFF2-40B4-BE49-F238E27FC236}">
-                <a16:creationId xmlns:a16="http://schemas.microsoft.com/office/drawing/2014/main" id="{BC26BFB4-0829-4EF7-B551-E33F9117E645}"/>
+                <a16:creationId xmlns:a16="http://schemas.microsoft.com/office/drawing/2014/main" xmlns="" id="{BC26BFB4-0829-4EF7-B551-E33F9117E645}"/>
               </a:ext>
             </a:extLst>
           </p:cNvPr>
@@ -7255,7 +7262,7 @@
           <p:cNvPr id="12" name="Rectangle: Rounded Corners 11">
             <a:extLst>
               <a:ext uri="{FF2B5EF4-FFF2-40B4-BE49-F238E27FC236}">
-                <a16:creationId xmlns:a16="http://schemas.microsoft.com/office/drawing/2014/main" id="{C9F7093C-C50F-438A-839F-B4C8765447D9}"/>
+                <a16:creationId xmlns:a16="http://schemas.microsoft.com/office/drawing/2014/main" xmlns="" id="{C9F7093C-C50F-438A-839F-B4C8765447D9}"/>
               </a:ext>
             </a:extLst>
           </p:cNvPr>
@@ -7305,7 +7312,7 @@
           <p:cNvPr id="16" name="Rectangle: Rounded Corners 15">
             <a:extLst>
               <a:ext uri="{FF2B5EF4-FFF2-40B4-BE49-F238E27FC236}">
-                <a16:creationId xmlns:a16="http://schemas.microsoft.com/office/drawing/2014/main" id="{D7EEB2C4-B890-4392-A7C8-E0EC180B599F}"/>
+                <a16:creationId xmlns:a16="http://schemas.microsoft.com/office/drawing/2014/main" xmlns="" id="{D7EEB2C4-B890-4392-A7C8-E0EC180B599F}"/>
               </a:ext>
             </a:extLst>
           </p:cNvPr>
@@ -7362,7 +7369,7 @@
           <p:cNvPr id="17" name="Rectangle: Rounded Corners 16">
             <a:extLst>
               <a:ext uri="{FF2B5EF4-FFF2-40B4-BE49-F238E27FC236}">
-                <a16:creationId xmlns:a16="http://schemas.microsoft.com/office/drawing/2014/main" id="{8D71A6A2-5002-4E07-8233-8FECD70213FF}"/>
+                <a16:creationId xmlns:a16="http://schemas.microsoft.com/office/drawing/2014/main" xmlns="" id="{8D71A6A2-5002-4E07-8233-8FECD70213FF}"/>
               </a:ext>
             </a:extLst>
           </p:cNvPr>
@@ -7424,7 +7431,7 @@
           <p:cNvPr id="18" name="Rectangle: Rounded Corners 17">
             <a:extLst>
               <a:ext uri="{FF2B5EF4-FFF2-40B4-BE49-F238E27FC236}">
-                <a16:creationId xmlns:a16="http://schemas.microsoft.com/office/drawing/2014/main" id="{D86FA6EC-8703-4B04-A6F7-1E04207D8415}"/>
+                <a16:creationId xmlns:a16="http://schemas.microsoft.com/office/drawing/2014/main" xmlns="" id="{D86FA6EC-8703-4B04-A6F7-1E04207D8415}"/>
               </a:ext>
             </a:extLst>
           </p:cNvPr>
@@ -7486,7 +7493,7 @@
           <p:cNvPr id="22" name="Rectangle: Rounded Corners 21">
             <a:extLst>
               <a:ext uri="{FF2B5EF4-FFF2-40B4-BE49-F238E27FC236}">
-                <a16:creationId xmlns:a16="http://schemas.microsoft.com/office/drawing/2014/main" id="{A6AEB402-3F5C-4753-BA98-17D23F1489EC}"/>
+                <a16:creationId xmlns:a16="http://schemas.microsoft.com/office/drawing/2014/main" xmlns="" id="{A6AEB402-3F5C-4753-BA98-17D23F1489EC}"/>
               </a:ext>
             </a:extLst>
           </p:cNvPr>
@@ -7548,7 +7555,7 @@
           <p:cNvPr id="23" name="Rectangle: Rounded Corners 22">
             <a:extLst>
               <a:ext uri="{FF2B5EF4-FFF2-40B4-BE49-F238E27FC236}">
-                <a16:creationId xmlns:a16="http://schemas.microsoft.com/office/drawing/2014/main" id="{56F285B2-2513-4C85-99BA-0A54326A4B7D}"/>
+                <a16:creationId xmlns:a16="http://schemas.microsoft.com/office/drawing/2014/main" xmlns="" id="{56F285B2-2513-4C85-99BA-0A54326A4B7D}"/>
               </a:ext>
             </a:extLst>
           </p:cNvPr>
@@ -7610,7 +7617,7 @@
           <p:cNvPr id="24" name="Rectangle: Rounded Corners 23">
             <a:extLst>
               <a:ext uri="{FF2B5EF4-FFF2-40B4-BE49-F238E27FC236}">
-                <a16:creationId xmlns:a16="http://schemas.microsoft.com/office/drawing/2014/main" id="{F597A463-A8FF-4FF5-BC0F-153123683A10}"/>
+                <a16:creationId xmlns:a16="http://schemas.microsoft.com/office/drawing/2014/main" xmlns="" id="{F597A463-A8FF-4FF5-BC0F-153123683A10}"/>
               </a:ext>
             </a:extLst>
           </p:cNvPr>
@@ -7669,7 +7676,7 @@
           <p:cNvPr id="25" name="Rectangle: Rounded Corners 24">
             <a:extLst>
               <a:ext uri="{FF2B5EF4-FFF2-40B4-BE49-F238E27FC236}">
-                <a16:creationId xmlns:a16="http://schemas.microsoft.com/office/drawing/2014/main" id="{19DB7B19-D874-405C-A27B-8A5D038EA782}"/>
+                <a16:creationId xmlns:a16="http://schemas.microsoft.com/office/drawing/2014/main" xmlns="" id="{19DB7B19-D874-405C-A27B-8A5D038EA782}"/>
               </a:ext>
             </a:extLst>
           </p:cNvPr>
@@ -7731,7 +7738,7 @@
           <p:cNvPr id="26" name="Rectangle: Rounded Corners 25">
             <a:extLst>
               <a:ext uri="{FF2B5EF4-FFF2-40B4-BE49-F238E27FC236}">
-                <a16:creationId xmlns:a16="http://schemas.microsoft.com/office/drawing/2014/main" id="{2B5C6BA9-D2AF-486B-8361-ED0C4EEDD119}"/>
+                <a16:creationId xmlns:a16="http://schemas.microsoft.com/office/drawing/2014/main" xmlns="" id="{2B5C6BA9-D2AF-486B-8361-ED0C4EEDD119}"/>
               </a:ext>
             </a:extLst>
           </p:cNvPr>
@@ -7793,7 +7800,7 @@
           <p:cNvPr id="27" name="Rectangle: Rounded Corners 26">
             <a:extLst>
               <a:ext uri="{FF2B5EF4-FFF2-40B4-BE49-F238E27FC236}">
-                <a16:creationId xmlns:a16="http://schemas.microsoft.com/office/drawing/2014/main" id="{54C5C5E1-A442-4CFB-8B18-10B68FD458C5}"/>
+                <a16:creationId xmlns:a16="http://schemas.microsoft.com/office/drawing/2014/main" xmlns="" id="{54C5C5E1-A442-4CFB-8B18-10B68FD458C5}"/>
               </a:ext>
             </a:extLst>
           </p:cNvPr>
@@ -7852,7 +7859,7 @@
           <p:cNvPr id="29" name="Flowchart: Terminator 28">
             <a:extLst>
               <a:ext uri="{FF2B5EF4-FFF2-40B4-BE49-F238E27FC236}">
-                <a16:creationId xmlns:a16="http://schemas.microsoft.com/office/drawing/2014/main" id="{ADF703A3-E58C-49CA-86A6-62D3D4DB9A13}"/>
+                <a16:creationId xmlns:a16="http://schemas.microsoft.com/office/drawing/2014/main" xmlns="" id="{ADF703A3-E58C-49CA-86A6-62D3D4DB9A13}"/>
               </a:ext>
             </a:extLst>
           </p:cNvPr>
@@ -7912,7 +7919,7 @@
           <p:cNvPr id="30" name="Rectangle: Rounded Corners 29">
             <a:extLst>
               <a:ext uri="{FF2B5EF4-FFF2-40B4-BE49-F238E27FC236}">
-                <a16:creationId xmlns:a16="http://schemas.microsoft.com/office/drawing/2014/main" id="{92C05959-AC73-403C-A95A-568E2827F8D0}"/>
+                <a16:creationId xmlns:a16="http://schemas.microsoft.com/office/drawing/2014/main" xmlns="" id="{92C05959-AC73-403C-A95A-568E2827F8D0}"/>
               </a:ext>
             </a:extLst>
           </p:cNvPr>
@@ -7971,7 +7978,7 @@
           <p:cNvPr id="31" name="Rectangle: Rounded Corners 30">
             <a:extLst>
               <a:ext uri="{FF2B5EF4-FFF2-40B4-BE49-F238E27FC236}">
-                <a16:creationId xmlns:a16="http://schemas.microsoft.com/office/drawing/2014/main" id="{43AF902B-C890-4D65-9F93-738A95F259B5}"/>
+                <a16:creationId xmlns:a16="http://schemas.microsoft.com/office/drawing/2014/main" xmlns="" id="{43AF902B-C890-4D65-9F93-738A95F259B5}"/>
               </a:ext>
             </a:extLst>
           </p:cNvPr>
@@ -8030,7 +8037,7 @@
           <p:cNvPr id="32" name="Rectangle: Rounded Corners 31">
             <a:extLst>
               <a:ext uri="{FF2B5EF4-FFF2-40B4-BE49-F238E27FC236}">
-                <a16:creationId xmlns:a16="http://schemas.microsoft.com/office/drawing/2014/main" id="{1854DCE2-341D-4C82-9567-30AF7CE5C5B6}"/>
+                <a16:creationId xmlns:a16="http://schemas.microsoft.com/office/drawing/2014/main" xmlns="" id="{1854DCE2-341D-4C82-9567-30AF7CE5C5B6}"/>
               </a:ext>
             </a:extLst>
           </p:cNvPr>
@@ -8089,7 +8096,7 @@
           <p:cNvPr id="37" name="Group 36">
             <a:extLst>
               <a:ext uri="{FF2B5EF4-FFF2-40B4-BE49-F238E27FC236}">
-                <a16:creationId xmlns:a16="http://schemas.microsoft.com/office/drawing/2014/main" id="{95307ECB-14EA-44E0-8191-47990F854CBD}"/>
+                <a16:creationId xmlns:a16="http://schemas.microsoft.com/office/drawing/2014/main" xmlns="" id="{95307ECB-14EA-44E0-8191-47990F854CBD}"/>
               </a:ext>
             </a:extLst>
           </p:cNvPr>
@@ -8109,7 +8116,7 @@
             <p:cNvPr id="34" name="Straight Connector 33">
               <a:extLst>
                 <a:ext uri="{FF2B5EF4-FFF2-40B4-BE49-F238E27FC236}">
-                  <a16:creationId xmlns:a16="http://schemas.microsoft.com/office/drawing/2014/main" id="{2025FCE6-7418-45FE-B895-69BA30956D65}"/>
+                  <a16:creationId xmlns:a16="http://schemas.microsoft.com/office/drawing/2014/main" xmlns="" id="{2025FCE6-7418-45FE-B895-69BA30956D65}"/>
                 </a:ext>
               </a:extLst>
             </p:cNvPr>
@@ -8150,7 +8157,7 @@
             <p:cNvPr id="36" name="Straight Connector 35">
               <a:extLst>
                 <a:ext uri="{FF2B5EF4-FFF2-40B4-BE49-F238E27FC236}">
-                  <a16:creationId xmlns:a16="http://schemas.microsoft.com/office/drawing/2014/main" id="{92FF3B5C-04C1-426B-B996-38950C257456}"/>
+                  <a16:creationId xmlns:a16="http://schemas.microsoft.com/office/drawing/2014/main" xmlns="" id="{92FF3B5C-04C1-426B-B996-38950C257456}"/>
                 </a:ext>
               </a:extLst>
             </p:cNvPr>
@@ -8192,7 +8199,7 @@
           <p:cNvPr id="38" name="Freeform: Shape 37">
             <a:extLst>
               <a:ext uri="{FF2B5EF4-FFF2-40B4-BE49-F238E27FC236}">
-                <a16:creationId xmlns:a16="http://schemas.microsoft.com/office/drawing/2014/main" id="{F0626870-8373-43C4-B3D8-1925FCF6898B}"/>
+                <a16:creationId xmlns:a16="http://schemas.microsoft.com/office/drawing/2014/main" xmlns="" id="{F0626870-8373-43C4-B3D8-1925FCF6898B}"/>
               </a:ext>
             </a:extLst>
           </p:cNvPr>
@@ -8321,7 +8328,7 @@
           <p:cNvPr id="42" name="Straight Connector 41">
             <a:extLst>
               <a:ext uri="{FF2B5EF4-FFF2-40B4-BE49-F238E27FC236}">
-                <a16:creationId xmlns:a16="http://schemas.microsoft.com/office/drawing/2014/main" id="{027B55EC-0664-42E0-B88D-690128D86096}"/>
+                <a16:creationId xmlns:a16="http://schemas.microsoft.com/office/drawing/2014/main" xmlns="" id="{027B55EC-0664-42E0-B88D-690128D86096}"/>
               </a:ext>
             </a:extLst>
           </p:cNvPr>
@@ -8364,6 +8371,742 @@
     <p:extLst>
       <p:ext uri="{BB962C8B-B14F-4D97-AF65-F5344CB8AC3E}">
         <p14:creationId xmlns:p14="http://schemas.microsoft.com/office/powerpoint/2010/main" val="1596422424"/>
+      </p:ext>
+    </p:extLst>
+  </p:cSld>
+  <p:clrMapOvr>
+    <a:masterClrMapping/>
+  </p:clrMapOvr>
+</p:sld>
+</file>
+
+<file path=ppt/slides/slide3.xml><?xml version="1.0" encoding="utf-8"?>
+<p:sld xmlns:a="http://schemas.openxmlformats.org/drawingml/2006/main" xmlns:r="http://schemas.openxmlformats.org/officeDocument/2006/relationships" xmlns:p="http://schemas.openxmlformats.org/presentationml/2006/main">
+  <p:cSld>
+    <p:spTree>
+      <p:nvGrpSpPr>
+        <p:cNvPr id="1" name=""/>
+        <p:cNvGrpSpPr/>
+        <p:nvPr/>
+      </p:nvGrpSpPr>
+      <p:grpSpPr>
+        <a:xfrm>
+          <a:off x="0" y="0"/>
+          <a:ext cx="0" cy="0"/>
+          <a:chOff x="0" y="0"/>
+          <a:chExt cx="0" cy="0"/>
+        </a:xfrm>
+      </p:grpSpPr>
+      <p:sp>
+        <p:nvSpPr>
+          <p:cNvPr id="4" name="Rounded Rectangle 3"/>
+          <p:cNvSpPr/>
+          <p:nvPr/>
+        </p:nvSpPr>
+        <p:spPr>
+          <a:xfrm>
+            <a:off x="130629" y="142504"/>
+            <a:ext cx="11739638" cy="6461496"/>
+          </a:xfrm>
+          <a:prstGeom prst="roundRect">
+            <a:avLst/>
+          </a:prstGeom>
+        </p:spPr>
+        <p:style>
+          <a:lnRef idx="2">
+            <a:schemeClr val="dk1"/>
+          </a:lnRef>
+          <a:fillRef idx="1">
+            <a:schemeClr val="lt1"/>
+          </a:fillRef>
+          <a:effectRef idx="0">
+            <a:schemeClr val="dk1"/>
+          </a:effectRef>
+          <a:fontRef idx="minor">
+            <a:schemeClr val="dk1"/>
+          </a:fontRef>
+        </p:style>
+        <p:txBody>
+          <a:bodyPr rIns="2834640" rtlCol="0" anchor="ctr"/>
+          <a:lstStyle/>
+          <a:p>
+            <a:pPr algn="ctr"/>
+            <a:r>
+              <a:rPr lang="en-US" dirty="0" smtClean="0"/>
+              <a:t>Home View</a:t>
+            </a:r>
+            <a:endParaRPr lang="en-US" dirty="0"/>
+          </a:p>
+        </p:txBody>
+      </p:sp>
+      <p:sp>
+        <p:nvSpPr>
+          <p:cNvPr id="2" name="Rounded Rectangle 1"/>
+          <p:cNvSpPr/>
+          <p:nvPr/>
+        </p:nvSpPr>
+        <p:spPr>
+          <a:xfrm>
+            <a:off x="130629" y="142504"/>
+            <a:ext cx="3028207" cy="1294410"/>
+          </a:xfrm>
+          <a:prstGeom prst="roundRect">
+            <a:avLst/>
+          </a:prstGeom>
+        </p:spPr>
+        <p:style>
+          <a:lnRef idx="2">
+            <a:schemeClr val="dk1"/>
+          </a:lnRef>
+          <a:fillRef idx="1">
+            <a:schemeClr val="lt1"/>
+          </a:fillRef>
+          <a:effectRef idx="0">
+            <a:schemeClr val="dk1"/>
+          </a:effectRef>
+          <a:fontRef idx="minor">
+            <a:schemeClr val="dk1"/>
+          </a:fontRef>
+        </p:style>
+        <p:txBody>
+          <a:bodyPr rtlCol="0" anchor="ctr"/>
+          <a:lstStyle/>
+          <a:p>
+            <a:pPr algn="ctr"/>
+            <a:r>
+              <a:rPr lang="en-US" dirty="0" smtClean="0"/>
+              <a:t>Search element</a:t>
+            </a:r>
+            <a:endParaRPr lang="en-US" dirty="0"/>
+          </a:p>
+        </p:txBody>
+      </p:sp>
+      <p:sp>
+        <p:nvSpPr>
+          <p:cNvPr id="6" name="Rounded Rectangle 5"/>
+          <p:cNvSpPr/>
+          <p:nvPr/>
+        </p:nvSpPr>
+        <p:spPr>
+          <a:xfrm>
+            <a:off x="130629" y="1608667"/>
+            <a:ext cx="3028207" cy="4995334"/>
+          </a:xfrm>
+          <a:prstGeom prst="roundRect">
+            <a:avLst/>
+          </a:prstGeom>
+        </p:spPr>
+        <p:style>
+          <a:lnRef idx="2">
+            <a:schemeClr val="dk1"/>
+          </a:lnRef>
+          <a:fillRef idx="1">
+            <a:schemeClr val="lt1"/>
+          </a:fillRef>
+          <a:effectRef idx="0">
+            <a:schemeClr val="dk1"/>
+          </a:effectRef>
+          <a:fontRef idx="minor">
+            <a:schemeClr val="dk1"/>
+          </a:fontRef>
+        </p:style>
+        <p:txBody>
+          <a:bodyPr rtlCol="0" anchor="ctr"/>
+          <a:lstStyle/>
+          <a:p>
+            <a:pPr algn="ctr"/>
+            <a:r>
+              <a:rPr lang="en-US" dirty="0" smtClean="0"/>
+              <a:t>Searchable list of tickers element</a:t>
+            </a:r>
+            <a:endParaRPr lang="en-US" dirty="0"/>
+          </a:p>
+        </p:txBody>
+      </p:sp>
+      <p:sp>
+        <p:nvSpPr>
+          <p:cNvPr id="7" name="Rounded Rectangle 6"/>
+          <p:cNvSpPr/>
+          <p:nvPr/>
+        </p:nvSpPr>
+        <p:spPr>
+          <a:xfrm>
+            <a:off x="8842060" y="142502"/>
+            <a:ext cx="3028207" cy="4574859"/>
+          </a:xfrm>
+          <a:prstGeom prst="roundRect">
+            <a:avLst/>
+          </a:prstGeom>
+        </p:spPr>
+        <p:style>
+          <a:lnRef idx="2">
+            <a:schemeClr val="dk1"/>
+          </a:lnRef>
+          <a:fillRef idx="1">
+            <a:schemeClr val="lt1"/>
+          </a:fillRef>
+          <a:effectRef idx="0">
+            <a:schemeClr val="dk1"/>
+          </a:effectRef>
+          <a:fontRef idx="minor">
+            <a:schemeClr val="dk1"/>
+          </a:fontRef>
+        </p:style>
+        <p:txBody>
+          <a:bodyPr rtlCol="0" anchor="ctr"/>
+          <a:lstStyle/>
+          <a:p>
+            <a:pPr algn="ctr"/>
+            <a:r>
+              <a:rPr lang="en-US" dirty="0" smtClean="0"/>
+              <a:t>To </a:t>
+            </a:r>
+            <a:r>
+              <a:rPr lang="en-US" smtClean="0"/>
+              <a:t>Buy element</a:t>
+            </a:r>
+            <a:endParaRPr lang="en-US" dirty="0"/>
+          </a:p>
+        </p:txBody>
+      </p:sp>
+      <p:sp>
+        <p:nvSpPr>
+          <p:cNvPr id="8" name="Rounded Rectangle 7"/>
+          <p:cNvSpPr/>
+          <p:nvPr/>
+        </p:nvSpPr>
+        <p:spPr>
+          <a:xfrm>
+            <a:off x="5813853" y="142503"/>
+            <a:ext cx="3028207" cy="4574860"/>
+          </a:xfrm>
+          <a:prstGeom prst="roundRect">
+            <a:avLst/>
+          </a:prstGeom>
+        </p:spPr>
+        <p:style>
+          <a:lnRef idx="2">
+            <a:schemeClr val="dk1"/>
+          </a:lnRef>
+          <a:fillRef idx="1">
+            <a:schemeClr val="lt1"/>
+          </a:fillRef>
+          <a:effectRef idx="0">
+            <a:schemeClr val="dk1"/>
+          </a:effectRef>
+          <a:fontRef idx="minor">
+            <a:schemeClr val="dk1"/>
+          </a:fontRef>
+        </p:style>
+        <p:txBody>
+          <a:bodyPr rtlCol="0" anchor="ctr"/>
+          <a:lstStyle/>
+          <a:p>
+            <a:pPr algn="ctr"/>
+            <a:r>
+              <a:rPr lang="en-US" dirty="0" smtClean="0"/>
+              <a:t>To Sell element</a:t>
+            </a:r>
+            <a:endParaRPr lang="en-US" dirty="0"/>
+          </a:p>
+        </p:txBody>
+      </p:sp>
+      <p:sp>
+        <p:nvSpPr>
+          <p:cNvPr id="9" name="Rounded Rectangle 8"/>
+          <p:cNvSpPr/>
+          <p:nvPr/>
+        </p:nvSpPr>
+        <p:spPr>
+          <a:xfrm>
+            <a:off x="5813854" y="4717363"/>
+            <a:ext cx="6056414" cy="1886637"/>
+          </a:xfrm>
+          <a:prstGeom prst="roundRect">
+            <a:avLst/>
+          </a:prstGeom>
+        </p:spPr>
+        <p:style>
+          <a:lnRef idx="2">
+            <a:schemeClr val="dk1"/>
+          </a:lnRef>
+          <a:fillRef idx="1">
+            <a:schemeClr val="lt1"/>
+          </a:fillRef>
+          <a:effectRef idx="0">
+            <a:schemeClr val="dk1"/>
+          </a:effectRef>
+          <a:fontRef idx="minor">
+            <a:schemeClr val="dk1"/>
+          </a:fontRef>
+        </p:style>
+        <p:txBody>
+          <a:bodyPr rtlCol="0" anchor="ctr"/>
+          <a:lstStyle/>
+          <a:p>
+            <a:pPr algn="ctr"/>
+            <a:r>
+              <a:rPr lang="en-US" dirty="0" smtClean="0"/>
+              <a:t>Model Health element</a:t>
+            </a:r>
+            <a:endParaRPr lang="en-US" dirty="0"/>
+          </a:p>
+        </p:txBody>
+      </p:sp>
+    </p:spTree>
+    <p:extLst>
+      <p:ext uri="{BB962C8B-B14F-4D97-AF65-F5344CB8AC3E}">
+        <p14:creationId xmlns:p14="http://schemas.microsoft.com/office/powerpoint/2010/main" val="1448095311"/>
+      </p:ext>
+    </p:extLst>
+  </p:cSld>
+  <p:clrMapOvr>
+    <a:masterClrMapping/>
+  </p:clrMapOvr>
+</p:sld>
+</file>
+
+<file path=ppt/slides/slide4.xml><?xml version="1.0" encoding="utf-8"?>
+<p:sld xmlns:a="http://schemas.openxmlformats.org/drawingml/2006/main" xmlns:r="http://schemas.openxmlformats.org/officeDocument/2006/relationships" xmlns:p="http://schemas.openxmlformats.org/presentationml/2006/main">
+  <p:cSld>
+    <p:spTree>
+      <p:nvGrpSpPr>
+        <p:cNvPr id="1" name=""/>
+        <p:cNvGrpSpPr/>
+        <p:nvPr/>
+      </p:nvGrpSpPr>
+      <p:grpSpPr>
+        <a:xfrm>
+          <a:off x="0" y="0"/>
+          <a:ext cx="0" cy="0"/>
+          <a:chOff x="0" y="0"/>
+          <a:chExt cx="0" cy="0"/>
+        </a:xfrm>
+      </p:grpSpPr>
+      <p:sp>
+        <p:nvSpPr>
+          <p:cNvPr id="2" name="Rounded Rectangle 1"/>
+          <p:cNvSpPr/>
+          <p:nvPr/>
+        </p:nvSpPr>
+        <p:spPr>
+          <a:xfrm>
+            <a:off x="130629" y="142504"/>
+            <a:ext cx="11739638" cy="6461496"/>
+          </a:xfrm>
+          <a:prstGeom prst="roundRect">
+            <a:avLst/>
+          </a:prstGeom>
+        </p:spPr>
+        <p:style>
+          <a:lnRef idx="2">
+            <a:schemeClr val="dk1"/>
+          </a:lnRef>
+          <a:fillRef idx="1">
+            <a:schemeClr val="lt1"/>
+          </a:fillRef>
+          <a:effectRef idx="0">
+            <a:schemeClr val="dk1"/>
+          </a:effectRef>
+          <a:fontRef idx="minor">
+            <a:schemeClr val="dk1"/>
+          </a:fontRef>
+        </p:style>
+        <p:txBody>
+          <a:bodyPr vert="horz" rIns="3291840" rtlCol="0" anchor="ctr" anchorCtr="0"/>
+          <a:lstStyle/>
+          <a:p>
+            <a:pPr algn="ctr"/>
+            <a:r>
+              <a:rPr lang="en-US" dirty="0" smtClean="0"/>
+              <a:t>Individual Ticker View</a:t>
+            </a:r>
+            <a:endParaRPr lang="en-US" dirty="0"/>
+          </a:p>
+        </p:txBody>
+      </p:sp>
+      <p:sp>
+        <p:nvSpPr>
+          <p:cNvPr id="7" name="Rounded Rectangle 6"/>
+          <p:cNvSpPr/>
+          <p:nvPr/>
+        </p:nvSpPr>
+        <p:spPr>
+          <a:xfrm>
+            <a:off x="5604933" y="2935430"/>
+            <a:ext cx="2878662" cy="1721227"/>
+          </a:xfrm>
+          <a:prstGeom prst="roundRect">
+            <a:avLst/>
+          </a:prstGeom>
+        </p:spPr>
+        <p:style>
+          <a:lnRef idx="2">
+            <a:schemeClr val="dk1"/>
+          </a:lnRef>
+          <a:fillRef idx="1">
+            <a:schemeClr val="lt1"/>
+          </a:fillRef>
+          <a:effectRef idx="0">
+            <a:schemeClr val="dk1"/>
+          </a:effectRef>
+          <a:fontRef idx="minor">
+            <a:schemeClr val="dk1"/>
+          </a:fontRef>
+        </p:style>
+        <p:txBody>
+          <a:bodyPr rtlCol="0" anchor="ctr"/>
+          <a:lstStyle/>
+          <a:p>
+            <a:pPr algn="ctr"/>
+            <a:r>
+              <a:rPr lang="en-US" dirty="0" smtClean="0"/>
+              <a:t>Model element</a:t>
+            </a:r>
+            <a:endParaRPr lang="en-US" dirty="0"/>
+          </a:p>
+        </p:txBody>
+      </p:sp>
+      <p:sp>
+        <p:nvSpPr>
+          <p:cNvPr id="3" name="Rounded Rectangle 2"/>
+          <p:cNvSpPr/>
+          <p:nvPr/>
+        </p:nvSpPr>
+        <p:spPr>
+          <a:xfrm>
+            <a:off x="8890000" y="1131997"/>
+            <a:ext cx="2980266" cy="1611194"/>
+          </a:xfrm>
+          <a:prstGeom prst="roundRect">
+            <a:avLst/>
+          </a:prstGeom>
+        </p:spPr>
+        <p:style>
+          <a:lnRef idx="2">
+            <a:schemeClr val="dk1"/>
+          </a:lnRef>
+          <a:fillRef idx="1">
+            <a:schemeClr val="lt1"/>
+          </a:fillRef>
+          <a:effectRef idx="0">
+            <a:schemeClr val="dk1"/>
+          </a:effectRef>
+          <a:fontRef idx="minor">
+            <a:schemeClr val="dk1"/>
+          </a:fontRef>
+        </p:style>
+        <p:txBody>
+          <a:bodyPr rtlCol="0" anchor="ctr"/>
+          <a:lstStyle/>
+          <a:p>
+            <a:pPr algn="ctr"/>
+            <a:r>
+              <a:rPr lang="en-US" dirty="0" smtClean="0"/>
+              <a:t>Model element</a:t>
+            </a:r>
+            <a:endParaRPr lang="en-US" dirty="0"/>
+          </a:p>
+        </p:txBody>
+      </p:sp>
+      <p:sp>
+        <p:nvSpPr>
+          <p:cNvPr id="4" name="Rounded Rectangle 3"/>
+          <p:cNvSpPr/>
+          <p:nvPr/>
+        </p:nvSpPr>
+        <p:spPr>
+          <a:xfrm>
+            <a:off x="8890000" y="2935429"/>
+            <a:ext cx="2980265" cy="1721227"/>
+          </a:xfrm>
+          <a:prstGeom prst="roundRect">
+            <a:avLst/>
+          </a:prstGeom>
+        </p:spPr>
+        <p:style>
+          <a:lnRef idx="2">
+            <a:schemeClr val="dk1"/>
+          </a:lnRef>
+          <a:fillRef idx="1">
+            <a:schemeClr val="lt1"/>
+          </a:fillRef>
+          <a:effectRef idx="0">
+            <a:schemeClr val="dk1"/>
+          </a:effectRef>
+          <a:fontRef idx="minor">
+            <a:schemeClr val="dk1"/>
+          </a:fontRef>
+        </p:style>
+        <p:txBody>
+          <a:bodyPr rtlCol="0" anchor="ctr"/>
+          <a:lstStyle/>
+          <a:p>
+            <a:pPr algn="ctr"/>
+            <a:r>
+              <a:rPr lang="en-US" dirty="0" smtClean="0"/>
+              <a:t>Model element</a:t>
+            </a:r>
+            <a:endParaRPr lang="en-US" dirty="0"/>
+          </a:p>
+        </p:txBody>
+      </p:sp>
+      <p:sp>
+        <p:nvSpPr>
+          <p:cNvPr id="5" name="Rounded Rectangle 4"/>
+          <p:cNvSpPr/>
+          <p:nvPr/>
+        </p:nvSpPr>
+        <p:spPr>
+          <a:xfrm>
+            <a:off x="8890000" y="4808580"/>
+            <a:ext cx="2980265" cy="1795419"/>
+          </a:xfrm>
+          <a:prstGeom prst="roundRect">
+            <a:avLst/>
+          </a:prstGeom>
+        </p:spPr>
+        <p:style>
+          <a:lnRef idx="2">
+            <a:schemeClr val="dk1"/>
+          </a:lnRef>
+          <a:fillRef idx="1">
+            <a:schemeClr val="lt1"/>
+          </a:fillRef>
+          <a:effectRef idx="0">
+            <a:schemeClr val="dk1"/>
+          </a:effectRef>
+          <a:fontRef idx="minor">
+            <a:schemeClr val="dk1"/>
+          </a:fontRef>
+        </p:style>
+        <p:txBody>
+          <a:bodyPr rtlCol="0" anchor="ctr"/>
+          <a:lstStyle/>
+          <a:p>
+            <a:pPr algn="ctr"/>
+            <a:r>
+              <a:rPr lang="en-US" dirty="0" smtClean="0"/>
+              <a:t>Model element</a:t>
+            </a:r>
+            <a:endParaRPr lang="en-US" dirty="0"/>
+          </a:p>
+        </p:txBody>
+      </p:sp>
+      <p:sp>
+        <p:nvSpPr>
+          <p:cNvPr id="6" name="Rounded Rectangle 5"/>
+          <p:cNvSpPr/>
+          <p:nvPr/>
+        </p:nvSpPr>
+        <p:spPr>
+          <a:xfrm>
+            <a:off x="5604932" y="1131997"/>
+            <a:ext cx="2878663" cy="1611194"/>
+          </a:xfrm>
+          <a:prstGeom prst="roundRect">
+            <a:avLst/>
+          </a:prstGeom>
+        </p:spPr>
+        <p:style>
+          <a:lnRef idx="2">
+            <a:schemeClr val="dk1"/>
+          </a:lnRef>
+          <a:fillRef idx="1">
+            <a:schemeClr val="lt1"/>
+          </a:fillRef>
+          <a:effectRef idx="0">
+            <a:schemeClr val="dk1"/>
+          </a:effectRef>
+          <a:fontRef idx="minor">
+            <a:schemeClr val="dk1"/>
+          </a:fontRef>
+        </p:style>
+        <p:txBody>
+          <a:bodyPr rtlCol="0" anchor="ctr"/>
+          <a:lstStyle/>
+          <a:p>
+            <a:pPr algn="ctr"/>
+            <a:r>
+              <a:rPr lang="en-US" dirty="0" smtClean="0"/>
+              <a:t>Model element</a:t>
+            </a:r>
+            <a:endParaRPr lang="en-US" dirty="0"/>
+          </a:p>
+        </p:txBody>
+      </p:sp>
+      <p:sp>
+        <p:nvSpPr>
+          <p:cNvPr id="8" name="Rounded Rectangle 7"/>
+          <p:cNvSpPr/>
+          <p:nvPr/>
+        </p:nvSpPr>
+        <p:spPr>
+          <a:xfrm>
+            <a:off x="5604933" y="4808581"/>
+            <a:ext cx="2878662" cy="1795418"/>
+          </a:xfrm>
+          <a:prstGeom prst="roundRect">
+            <a:avLst/>
+          </a:prstGeom>
+        </p:spPr>
+        <p:style>
+          <a:lnRef idx="2">
+            <a:schemeClr val="dk1"/>
+          </a:lnRef>
+          <a:fillRef idx="1">
+            <a:schemeClr val="lt1"/>
+          </a:fillRef>
+          <a:effectRef idx="0">
+            <a:schemeClr val="dk1"/>
+          </a:effectRef>
+          <a:fontRef idx="minor">
+            <a:schemeClr val="dk1"/>
+          </a:fontRef>
+        </p:style>
+        <p:txBody>
+          <a:bodyPr rtlCol="0" anchor="ctr"/>
+          <a:lstStyle/>
+          <a:p>
+            <a:pPr algn="ctr"/>
+            <a:r>
+              <a:rPr lang="en-US" dirty="0" smtClean="0"/>
+              <a:t>Model element</a:t>
+            </a:r>
+            <a:endParaRPr lang="en-US" dirty="0"/>
+          </a:p>
+        </p:txBody>
+      </p:sp>
+      <p:sp>
+        <p:nvSpPr>
+          <p:cNvPr id="9" name="Rounded Rectangle 8"/>
+          <p:cNvSpPr/>
+          <p:nvPr/>
+        </p:nvSpPr>
+        <p:spPr>
+          <a:xfrm>
+            <a:off x="130629" y="142504"/>
+            <a:ext cx="3028207" cy="1294410"/>
+          </a:xfrm>
+          <a:prstGeom prst="roundRect">
+            <a:avLst/>
+          </a:prstGeom>
+        </p:spPr>
+        <p:style>
+          <a:lnRef idx="2">
+            <a:schemeClr val="dk1"/>
+          </a:lnRef>
+          <a:fillRef idx="1">
+            <a:schemeClr val="lt1"/>
+          </a:fillRef>
+          <a:effectRef idx="0">
+            <a:schemeClr val="dk1"/>
+          </a:effectRef>
+          <a:fontRef idx="minor">
+            <a:schemeClr val="dk1"/>
+          </a:fontRef>
+        </p:style>
+        <p:txBody>
+          <a:bodyPr rtlCol="0" anchor="ctr"/>
+          <a:lstStyle/>
+          <a:p>
+            <a:pPr algn="ctr"/>
+            <a:r>
+              <a:rPr lang="en-US" dirty="0" smtClean="0"/>
+              <a:t>Search element</a:t>
+            </a:r>
+            <a:endParaRPr lang="en-US" dirty="0"/>
+          </a:p>
+        </p:txBody>
+      </p:sp>
+      <p:sp>
+        <p:nvSpPr>
+          <p:cNvPr id="10" name="Rounded Rectangle 9"/>
+          <p:cNvSpPr/>
+          <p:nvPr/>
+        </p:nvSpPr>
+        <p:spPr>
+          <a:xfrm>
+            <a:off x="130629" y="1608667"/>
+            <a:ext cx="3028207" cy="4995334"/>
+          </a:xfrm>
+          <a:prstGeom prst="roundRect">
+            <a:avLst/>
+          </a:prstGeom>
+        </p:spPr>
+        <p:style>
+          <a:lnRef idx="2">
+            <a:schemeClr val="dk1"/>
+          </a:lnRef>
+          <a:fillRef idx="1">
+            <a:schemeClr val="lt1"/>
+          </a:fillRef>
+          <a:effectRef idx="0">
+            <a:schemeClr val="dk1"/>
+          </a:effectRef>
+          <a:fontRef idx="minor">
+            <a:schemeClr val="dk1"/>
+          </a:fontRef>
+        </p:style>
+        <p:txBody>
+          <a:bodyPr rtlCol="0" anchor="ctr"/>
+          <a:lstStyle/>
+          <a:p>
+            <a:pPr algn="ctr"/>
+            <a:r>
+              <a:rPr lang="en-US" dirty="0" smtClean="0"/>
+              <a:t>Searchable list of tickers element</a:t>
+            </a:r>
+            <a:endParaRPr lang="en-US" dirty="0"/>
+          </a:p>
+        </p:txBody>
+      </p:sp>
+      <p:sp>
+        <p:nvSpPr>
+          <p:cNvPr id="11" name="Rounded Rectangle 10"/>
+          <p:cNvSpPr/>
+          <p:nvPr/>
+        </p:nvSpPr>
+        <p:spPr>
+          <a:xfrm>
+            <a:off x="3369732" y="142504"/>
+            <a:ext cx="7061201" cy="805597"/>
+          </a:xfrm>
+          <a:prstGeom prst="roundRect">
+            <a:avLst/>
+          </a:prstGeom>
+        </p:spPr>
+        <p:style>
+          <a:lnRef idx="2">
+            <a:schemeClr val="dk1"/>
+          </a:lnRef>
+          <a:fillRef idx="1">
+            <a:schemeClr val="lt1"/>
+          </a:fillRef>
+          <a:effectRef idx="0">
+            <a:schemeClr val="dk1"/>
+          </a:effectRef>
+          <a:fontRef idx="minor">
+            <a:schemeClr val="dk1"/>
+          </a:fontRef>
+        </p:style>
+        <p:txBody>
+          <a:bodyPr rtlCol="0" anchor="ctr"/>
+          <a:lstStyle/>
+          <a:p>
+            <a:pPr algn="ctr"/>
+            <a:r>
+              <a:rPr lang="en-US" dirty="0" smtClean="0"/>
+              <a:t>Ticker Title element</a:t>
+            </a:r>
+            <a:endParaRPr lang="en-US" dirty="0"/>
+          </a:p>
+        </p:txBody>
+      </p:sp>
+    </p:spTree>
+    <p:extLst>
+      <p:ext uri="{BB962C8B-B14F-4D97-AF65-F5344CB8AC3E}">
+        <p14:creationId xmlns:p14="http://schemas.microsoft.com/office/powerpoint/2010/main" val="747454550"/>
       </p:ext>
     </p:extLst>
   </p:cSld>

</xml_diff>

<commit_message>
updating mockup and web app with more layout details
</commit_message>
<xml_diff>
--- a/Visualizer/Mockup.pptx
+++ b/Visualizer/Mockup.pptx
@@ -772,7 +772,7 @@
           <a:p>
             <a:fld id="{673963D5-4371-401D-8498-500035853EE3}" type="datetimeFigureOut">
               <a:rPr lang="en-US" smtClean="0"/>
-              <a:t>9/25/18</a:t>
+              <a:t>9/28/18</a:t>
             </a:fld>
             <a:endParaRPr lang="en-US"/>
           </a:p>
@@ -1252,7 +1252,7 @@
           <p:cNvPr id="2" name="Title 1">
             <a:extLst>
               <a:ext uri="{FF2B5EF4-FFF2-40B4-BE49-F238E27FC236}">
-                <a16:creationId xmlns:a16="http://schemas.microsoft.com/office/drawing/2014/main" xmlns="" id="{553B6E79-7DCD-4ED3-91A4-44DC27CFA9B1}"/>
+                <a16:creationId xmlns="" xmlns:a16="http://schemas.microsoft.com/office/drawing/2014/main" id="{553B6E79-7DCD-4ED3-91A4-44DC27CFA9B1}"/>
               </a:ext>
             </a:extLst>
           </p:cNvPr>
@@ -1289,7 +1289,7 @@
           <p:cNvPr id="3" name="Subtitle 2">
             <a:extLst>
               <a:ext uri="{FF2B5EF4-FFF2-40B4-BE49-F238E27FC236}">
-                <a16:creationId xmlns:a16="http://schemas.microsoft.com/office/drawing/2014/main" xmlns="" id="{FF133992-35FF-48F9-8BCD-585C3D1BC692}"/>
+                <a16:creationId xmlns="" xmlns:a16="http://schemas.microsoft.com/office/drawing/2014/main" id="{FF133992-35FF-48F9-8BCD-585C3D1BC692}"/>
               </a:ext>
             </a:extLst>
           </p:cNvPr>
@@ -1359,7 +1359,7 @@
           <p:cNvPr id="4" name="Date Placeholder 3">
             <a:extLst>
               <a:ext uri="{FF2B5EF4-FFF2-40B4-BE49-F238E27FC236}">
-                <a16:creationId xmlns:a16="http://schemas.microsoft.com/office/drawing/2014/main" xmlns="" id="{E742DDB7-2C91-4453-B629-95462A7CA797}"/>
+                <a16:creationId xmlns="" xmlns:a16="http://schemas.microsoft.com/office/drawing/2014/main" id="{E742DDB7-2C91-4453-B629-95462A7CA797}"/>
               </a:ext>
             </a:extLst>
           </p:cNvPr>
@@ -1377,7 +1377,7 @@
           <a:p>
             <a:fld id="{38D4318C-2CF8-4E6B-ADD8-B5FDE2DDEB84}" type="datetimeFigureOut">
               <a:rPr lang="en-US" smtClean="0"/>
-              <a:t>9/25/18</a:t>
+              <a:t>9/28/18</a:t>
             </a:fld>
             <a:endParaRPr lang="en-US"/>
           </a:p>
@@ -1388,7 +1388,7 @@
           <p:cNvPr id="5" name="Footer Placeholder 4">
             <a:extLst>
               <a:ext uri="{FF2B5EF4-FFF2-40B4-BE49-F238E27FC236}">
-                <a16:creationId xmlns:a16="http://schemas.microsoft.com/office/drawing/2014/main" xmlns="" id="{9B37D394-7771-4D7B-90C1-CD3BA89AB53B}"/>
+                <a16:creationId xmlns="" xmlns:a16="http://schemas.microsoft.com/office/drawing/2014/main" id="{9B37D394-7771-4D7B-90C1-CD3BA89AB53B}"/>
               </a:ext>
             </a:extLst>
           </p:cNvPr>
@@ -1413,7 +1413,7 @@
           <p:cNvPr id="6" name="Slide Number Placeholder 5">
             <a:extLst>
               <a:ext uri="{FF2B5EF4-FFF2-40B4-BE49-F238E27FC236}">
-                <a16:creationId xmlns:a16="http://schemas.microsoft.com/office/drawing/2014/main" xmlns="" id="{FBF6A34E-6E0D-4342-AFE6-776CAFFAE5EA}"/>
+                <a16:creationId xmlns="" xmlns:a16="http://schemas.microsoft.com/office/drawing/2014/main" id="{FBF6A34E-6E0D-4342-AFE6-776CAFFAE5EA}"/>
               </a:ext>
             </a:extLst>
           </p:cNvPr>
@@ -1472,7 +1472,7 @@
           <p:cNvPr id="2" name="Title 1">
             <a:extLst>
               <a:ext uri="{FF2B5EF4-FFF2-40B4-BE49-F238E27FC236}">
-                <a16:creationId xmlns:a16="http://schemas.microsoft.com/office/drawing/2014/main" xmlns="" id="{E2F3AC27-2B2B-4DD2-A3B2-A7B83B858C11}"/>
+                <a16:creationId xmlns="" xmlns:a16="http://schemas.microsoft.com/office/drawing/2014/main" id="{E2F3AC27-2B2B-4DD2-A3B2-A7B83B858C11}"/>
               </a:ext>
             </a:extLst>
           </p:cNvPr>
@@ -1500,7 +1500,7 @@
           <p:cNvPr id="3" name="Vertical Text Placeholder 2">
             <a:extLst>
               <a:ext uri="{FF2B5EF4-FFF2-40B4-BE49-F238E27FC236}">
-                <a16:creationId xmlns:a16="http://schemas.microsoft.com/office/drawing/2014/main" xmlns="" id="{DACBB971-8C51-4F13-82B5-F8DDA8043A5A}"/>
+                <a16:creationId xmlns="" xmlns:a16="http://schemas.microsoft.com/office/drawing/2014/main" id="{DACBB971-8C51-4F13-82B5-F8DDA8043A5A}"/>
               </a:ext>
             </a:extLst>
           </p:cNvPr>
@@ -1557,7 +1557,7 @@
           <p:cNvPr id="4" name="Date Placeholder 3">
             <a:extLst>
               <a:ext uri="{FF2B5EF4-FFF2-40B4-BE49-F238E27FC236}">
-                <a16:creationId xmlns:a16="http://schemas.microsoft.com/office/drawing/2014/main" xmlns="" id="{A4A1802B-7ADB-4AFC-96BC-CA634765E059}"/>
+                <a16:creationId xmlns="" xmlns:a16="http://schemas.microsoft.com/office/drawing/2014/main" id="{A4A1802B-7ADB-4AFC-96BC-CA634765E059}"/>
               </a:ext>
             </a:extLst>
           </p:cNvPr>
@@ -1575,7 +1575,7 @@
           <a:p>
             <a:fld id="{38D4318C-2CF8-4E6B-ADD8-B5FDE2DDEB84}" type="datetimeFigureOut">
               <a:rPr lang="en-US" smtClean="0"/>
-              <a:t>9/25/18</a:t>
+              <a:t>9/28/18</a:t>
             </a:fld>
             <a:endParaRPr lang="en-US"/>
           </a:p>
@@ -1586,7 +1586,7 @@
           <p:cNvPr id="5" name="Footer Placeholder 4">
             <a:extLst>
               <a:ext uri="{FF2B5EF4-FFF2-40B4-BE49-F238E27FC236}">
-                <a16:creationId xmlns:a16="http://schemas.microsoft.com/office/drawing/2014/main" xmlns="" id="{8B4B1FF8-F774-42CE-BE8D-13A68CFEE4E1}"/>
+                <a16:creationId xmlns="" xmlns:a16="http://schemas.microsoft.com/office/drawing/2014/main" id="{8B4B1FF8-F774-42CE-BE8D-13A68CFEE4E1}"/>
               </a:ext>
             </a:extLst>
           </p:cNvPr>
@@ -1611,7 +1611,7 @@
           <p:cNvPr id="6" name="Slide Number Placeholder 5">
             <a:extLst>
               <a:ext uri="{FF2B5EF4-FFF2-40B4-BE49-F238E27FC236}">
-                <a16:creationId xmlns:a16="http://schemas.microsoft.com/office/drawing/2014/main" xmlns="" id="{CCB3DBFA-E232-45E2-8543-0D9D4BFA8466}"/>
+                <a16:creationId xmlns="" xmlns:a16="http://schemas.microsoft.com/office/drawing/2014/main" id="{CCB3DBFA-E232-45E2-8543-0D9D4BFA8466}"/>
               </a:ext>
             </a:extLst>
           </p:cNvPr>
@@ -1670,7 +1670,7 @@
           <p:cNvPr id="2" name="Vertical Title 1">
             <a:extLst>
               <a:ext uri="{FF2B5EF4-FFF2-40B4-BE49-F238E27FC236}">
-                <a16:creationId xmlns:a16="http://schemas.microsoft.com/office/drawing/2014/main" xmlns="" id="{ED1F32F3-BD63-4C18-8416-13192109A1A6}"/>
+                <a16:creationId xmlns="" xmlns:a16="http://schemas.microsoft.com/office/drawing/2014/main" id="{ED1F32F3-BD63-4C18-8416-13192109A1A6}"/>
               </a:ext>
             </a:extLst>
           </p:cNvPr>
@@ -1703,7 +1703,7 @@
           <p:cNvPr id="3" name="Vertical Text Placeholder 2">
             <a:extLst>
               <a:ext uri="{FF2B5EF4-FFF2-40B4-BE49-F238E27FC236}">
-                <a16:creationId xmlns:a16="http://schemas.microsoft.com/office/drawing/2014/main" xmlns="" id="{79AFEDA7-9D3C-4ED1-A72C-A6ED03095E6A}"/>
+                <a16:creationId xmlns="" xmlns:a16="http://schemas.microsoft.com/office/drawing/2014/main" id="{79AFEDA7-9D3C-4ED1-A72C-A6ED03095E6A}"/>
               </a:ext>
             </a:extLst>
           </p:cNvPr>
@@ -1765,7 +1765,7 @@
           <p:cNvPr id="4" name="Date Placeholder 3">
             <a:extLst>
               <a:ext uri="{FF2B5EF4-FFF2-40B4-BE49-F238E27FC236}">
-                <a16:creationId xmlns:a16="http://schemas.microsoft.com/office/drawing/2014/main" xmlns="" id="{250749DE-3DAA-49A4-A253-00A197FBE495}"/>
+                <a16:creationId xmlns="" xmlns:a16="http://schemas.microsoft.com/office/drawing/2014/main" id="{250749DE-3DAA-49A4-A253-00A197FBE495}"/>
               </a:ext>
             </a:extLst>
           </p:cNvPr>
@@ -1783,7 +1783,7 @@
           <a:p>
             <a:fld id="{38D4318C-2CF8-4E6B-ADD8-B5FDE2DDEB84}" type="datetimeFigureOut">
               <a:rPr lang="en-US" smtClean="0"/>
-              <a:t>9/25/18</a:t>
+              <a:t>9/28/18</a:t>
             </a:fld>
             <a:endParaRPr lang="en-US"/>
           </a:p>
@@ -1794,7 +1794,7 @@
           <p:cNvPr id="5" name="Footer Placeholder 4">
             <a:extLst>
               <a:ext uri="{FF2B5EF4-FFF2-40B4-BE49-F238E27FC236}">
-                <a16:creationId xmlns:a16="http://schemas.microsoft.com/office/drawing/2014/main" xmlns="" id="{78233EA4-7F3B-423C-8FFC-D15CE8DED2FC}"/>
+                <a16:creationId xmlns="" xmlns:a16="http://schemas.microsoft.com/office/drawing/2014/main" id="{78233EA4-7F3B-423C-8FFC-D15CE8DED2FC}"/>
               </a:ext>
             </a:extLst>
           </p:cNvPr>
@@ -1819,7 +1819,7 @@
           <p:cNvPr id="6" name="Slide Number Placeholder 5">
             <a:extLst>
               <a:ext uri="{FF2B5EF4-FFF2-40B4-BE49-F238E27FC236}">
-                <a16:creationId xmlns:a16="http://schemas.microsoft.com/office/drawing/2014/main" xmlns="" id="{AAF9BF6B-2EE0-40E0-8B28-2D4EF7E56C0F}"/>
+                <a16:creationId xmlns="" xmlns:a16="http://schemas.microsoft.com/office/drawing/2014/main" id="{AAF9BF6B-2EE0-40E0-8B28-2D4EF7E56C0F}"/>
               </a:ext>
             </a:extLst>
           </p:cNvPr>
@@ -1878,7 +1878,7 @@
           <p:cNvPr id="2" name="Title 1">
             <a:extLst>
               <a:ext uri="{FF2B5EF4-FFF2-40B4-BE49-F238E27FC236}">
-                <a16:creationId xmlns:a16="http://schemas.microsoft.com/office/drawing/2014/main" xmlns="" id="{08F4761C-DFDF-4BED-B6DA-B12B84123C85}"/>
+                <a16:creationId xmlns="" xmlns:a16="http://schemas.microsoft.com/office/drawing/2014/main" id="{08F4761C-DFDF-4BED-B6DA-B12B84123C85}"/>
               </a:ext>
             </a:extLst>
           </p:cNvPr>
@@ -1906,7 +1906,7 @@
           <p:cNvPr id="3" name="Content Placeholder 2">
             <a:extLst>
               <a:ext uri="{FF2B5EF4-FFF2-40B4-BE49-F238E27FC236}">
-                <a16:creationId xmlns:a16="http://schemas.microsoft.com/office/drawing/2014/main" xmlns="" id="{79F31278-087B-4BEB-9BE3-0F8DC19F4A57}"/>
+                <a16:creationId xmlns="" xmlns:a16="http://schemas.microsoft.com/office/drawing/2014/main" id="{79F31278-087B-4BEB-9BE3-0F8DC19F4A57}"/>
               </a:ext>
             </a:extLst>
           </p:cNvPr>
@@ -1963,7 +1963,7 @@
           <p:cNvPr id="4" name="Date Placeholder 3">
             <a:extLst>
               <a:ext uri="{FF2B5EF4-FFF2-40B4-BE49-F238E27FC236}">
-                <a16:creationId xmlns:a16="http://schemas.microsoft.com/office/drawing/2014/main" xmlns="" id="{37E6CAAD-9100-4A5F-9A47-5E37CEE46E2E}"/>
+                <a16:creationId xmlns="" xmlns:a16="http://schemas.microsoft.com/office/drawing/2014/main" id="{37E6CAAD-9100-4A5F-9A47-5E37CEE46E2E}"/>
               </a:ext>
             </a:extLst>
           </p:cNvPr>
@@ -1981,7 +1981,7 @@
           <a:p>
             <a:fld id="{38D4318C-2CF8-4E6B-ADD8-B5FDE2DDEB84}" type="datetimeFigureOut">
               <a:rPr lang="en-US" smtClean="0"/>
-              <a:t>9/25/18</a:t>
+              <a:t>9/28/18</a:t>
             </a:fld>
             <a:endParaRPr lang="en-US"/>
           </a:p>
@@ -1992,7 +1992,7 @@
           <p:cNvPr id="5" name="Footer Placeholder 4">
             <a:extLst>
               <a:ext uri="{FF2B5EF4-FFF2-40B4-BE49-F238E27FC236}">
-                <a16:creationId xmlns:a16="http://schemas.microsoft.com/office/drawing/2014/main" xmlns="" id="{A6346B6E-6081-4251-85B4-0F5F4EC66056}"/>
+                <a16:creationId xmlns="" xmlns:a16="http://schemas.microsoft.com/office/drawing/2014/main" id="{A6346B6E-6081-4251-85B4-0F5F4EC66056}"/>
               </a:ext>
             </a:extLst>
           </p:cNvPr>
@@ -2017,7 +2017,7 @@
           <p:cNvPr id="6" name="Slide Number Placeholder 5">
             <a:extLst>
               <a:ext uri="{FF2B5EF4-FFF2-40B4-BE49-F238E27FC236}">
-                <a16:creationId xmlns:a16="http://schemas.microsoft.com/office/drawing/2014/main" xmlns="" id="{A08ADCFC-1628-46AF-8D8B-11BF134F6FFB}"/>
+                <a16:creationId xmlns="" xmlns:a16="http://schemas.microsoft.com/office/drawing/2014/main" id="{A08ADCFC-1628-46AF-8D8B-11BF134F6FFB}"/>
               </a:ext>
             </a:extLst>
           </p:cNvPr>
@@ -2076,7 +2076,7 @@
           <p:cNvPr id="2" name="Title 1">
             <a:extLst>
               <a:ext uri="{FF2B5EF4-FFF2-40B4-BE49-F238E27FC236}">
-                <a16:creationId xmlns:a16="http://schemas.microsoft.com/office/drawing/2014/main" xmlns="" id="{20A06FCD-43B2-4062-ADE9-5196C80E947B}"/>
+                <a16:creationId xmlns="" xmlns:a16="http://schemas.microsoft.com/office/drawing/2014/main" id="{20A06FCD-43B2-4062-ADE9-5196C80E947B}"/>
               </a:ext>
             </a:extLst>
           </p:cNvPr>
@@ -2113,7 +2113,7 @@
           <p:cNvPr id="3" name="Text Placeholder 2">
             <a:extLst>
               <a:ext uri="{FF2B5EF4-FFF2-40B4-BE49-F238E27FC236}">
-                <a16:creationId xmlns:a16="http://schemas.microsoft.com/office/drawing/2014/main" xmlns="" id="{9689C800-F457-4EAA-8B68-FDB9E698C04A}"/>
+                <a16:creationId xmlns="" xmlns:a16="http://schemas.microsoft.com/office/drawing/2014/main" id="{9689C800-F457-4EAA-8B68-FDB9E698C04A}"/>
               </a:ext>
             </a:extLst>
           </p:cNvPr>
@@ -2238,7 +2238,7 @@
           <p:cNvPr id="4" name="Date Placeholder 3">
             <a:extLst>
               <a:ext uri="{FF2B5EF4-FFF2-40B4-BE49-F238E27FC236}">
-                <a16:creationId xmlns:a16="http://schemas.microsoft.com/office/drawing/2014/main" xmlns="" id="{DEEE74FC-0F00-42EC-9DA8-6938CA580240}"/>
+                <a16:creationId xmlns="" xmlns:a16="http://schemas.microsoft.com/office/drawing/2014/main" id="{DEEE74FC-0F00-42EC-9DA8-6938CA580240}"/>
               </a:ext>
             </a:extLst>
           </p:cNvPr>
@@ -2256,7 +2256,7 @@
           <a:p>
             <a:fld id="{38D4318C-2CF8-4E6B-ADD8-B5FDE2DDEB84}" type="datetimeFigureOut">
               <a:rPr lang="en-US" smtClean="0"/>
-              <a:t>9/25/18</a:t>
+              <a:t>9/28/18</a:t>
             </a:fld>
             <a:endParaRPr lang="en-US"/>
           </a:p>
@@ -2267,7 +2267,7 @@
           <p:cNvPr id="5" name="Footer Placeholder 4">
             <a:extLst>
               <a:ext uri="{FF2B5EF4-FFF2-40B4-BE49-F238E27FC236}">
-                <a16:creationId xmlns:a16="http://schemas.microsoft.com/office/drawing/2014/main" xmlns="" id="{741D09C9-5481-4587-9C28-A3ED2A914B01}"/>
+                <a16:creationId xmlns="" xmlns:a16="http://schemas.microsoft.com/office/drawing/2014/main" id="{741D09C9-5481-4587-9C28-A3ED2A914B01}"/>
               </a:ext>
             </a:extLst>
           </p:cNvPr>
@@ -2292,7 +2292,7 @@
           <p:cNvPr id="6" name="Slide Number Placeholder 5">
             <a:extLst>
               <a:ext uri="{FF2B5EF4-FFF2-40B4-BE49-F238E27FC236}">
-                <a16:creationId xmlns:a16="http://schemas.microsoft.com/office/drawing/2014/main" xmlns="" id="{1AC83BC7-E8A4-486F-9C06-B334B53F37B9}"/>
+                <a16:creationId xmlns="" xmlns:a16="http://schemas.microsoft.com/office/drawing/2014/main" id="{1AC83BC7-E8A4-486F-9C06-B334B53F37B9}"/>
               </a:ext>
             </a:extLst>
           </p:cNvPr>
@@ -2351,7 +2351,7 @@
           <p:cNvPr id="2" name="Title 1">
             <a:extLst>
               <a:ext uri="{FF2B5EF4-FFF2-40B4-BE49-F238E27FC236}">
-                <a16:creationId xmlns:a16="http://schemas.microsoft.com/office/drawing/2014/main" xmlns="" id="{E81E36C7-0816-4A92-853C-ED3B09023EDB}"/>
+                <a16:creationId xmlns="" xmlns:a16="http://schemas.microsoft.com/office/drawing/2014/main" id="{E81E36C7-0816-4A92-853C-ED3B09023EDB}"/>
               </a:ext>
             </a:extLst>
           </p:cNvPr>
@@ -2379,7 +2379,7 @@
           <p:cNvPr id="3" name="Content Placeholder 2">
             <a:extLst>
               <a:ext uri="{FF2B5EF4-FFF2-40B4-BE49-F238E27FC236}">
-                <a16:creationId xmlns:a16="http://schemas.microsoft.com/office/drawing/2014/main" xmlns="" id="{7F707701-A54F-45E1-8A6C-2C8B8867BC9D}"/>
+                <a16:creationId xmlns="" xmlns:a16="http://schemas.microsoft.com/office/drawing/2014/main" id="{7F707701-A54F-45E1-8A6C-2C8B8867BC9D}"/>
               </a:ext>
             </a:extLst>
           </p:cNvPr>
@@ -2441,7 +2441,7 @@
           <p:cNvPr id="4" name="Content Placeholder 3">
             <a:extLst>
               <a:ext uri="{FF2B5EF4-FFF2-40B4-BE49-F238E27FC236}">
-                <a16:creationId xmlns:a16="http://schemas.microsoft.com/office/drawing/2014/main" xmlns="" id="{4B5786FD-7A65-4D8C-B15D-DA773068698C}"/>
+                <a16:creationId xmlns="" xmlns:a16="http://schemas.microsoft.com/office/drawing/2014/main" id="{4B5786FD-7A65-4D8C-B15D-DA773068698C}"/>
               </a:ext>
             </a:extLst>
           </p:cNvPr>
@@ -2503,7 +2503,7 @@
           <p:cNvPr id="5" name="Date Placeholder 4">
             <a:extLst>
               <a:ext uri="{FF2B5EF4-FFF2-40B4-BE49-F238E27FC236}">
-                <a16:creationId xmlns:a16="http://schemas.microsoft.com/office/drawing/2014/main" xmlns="" id="{CEAE3A29-2487-420C-866B-57CD44BF44A3}"/>
+                <a16:creationId xmlns="" xmlns:a16="http://schemas.microsoft.com/office/drawing/2014/main" id="{CEAE3A29-2487-420C-866B-57CD44BF44A3}"/>
               </a:ext>
             </a:extLst>
           </p:cNvPr>
@@ -2521,7 +2521,7 @@
           <a:p>
             <a:fld id="{38D4318C-2CF8-4E6B-ADD8-B5FDE2DDEB84}" type="datetimeFigureOut">
               <a:rPr lang="en-US" smtClean="0"/>
-              <a:t>9/25/18</a:t>
+              <a:t>9/28/18</a:t>
             </a:fld>
             <a:endParaRPr lang="en-US"/>
           </a:p>
@@ -2532,7 +2532,7 @@
           <p:cNvPr id="6" name="Footer Placeholder 5">
             <a:extLst>
               <a:ext uri="{FF2B5EF4-FFF2-40B4-BE49-F238E27FC236}">
-                <a16:creationId xmlns:a16="http://schemas.microsoft.com/office/drawing/2014/main" xmlns="" id="{377443B9-9470-4D6A-AE0A-C326BCCBE642}"/>
+                <a16:creationId xmlns="" xmlns:a16="http://schemas.microsoft.com/office/drawing/2014/main" id="{377443B9-9470-4D6A-AE0A-C326BCCBE642}"/>
               </a:ext>
             </a:extLst>
           </p:cNvPr>
@@ -2557,7 +2557,7 @@
           <p:cNvPr id="7" name="Slide Number Placeholder 6">
             <a:extLst>
               <a:ext uri="{FF2B5EF4-FFF2-40B4-BE49-F238E27FC236}">
-                <a16:creationId xmlns:a16="http://schemas.microsoft.com/office/drawing/2014/main" xmlns="" id="{F90CCD6F-1F56-4850-98DF-5DD0EEE3738E}"/>
+                <a16:creationId xmlns="" xmlns:a16="http://schemas.microsoft.com/office/drawing/2014/main" id="{F90CCD6F-1F56-4850-98DF-5DD0EEE3738E}"/>
               </a:ext>
             </a:extLst>
           </p:cNvPr>
@@ -2616,7 +2616,7 @@
           <p:cNvPr id="2" name="Title 1">
             <a:extLst>
               <a:ext uri="{FF2B5EF4-FFF2-40B4-BE49-F238E27FC236}">
-                <a16:creationId xmlns:a16="http://schemas.microsoft.com/office/drawing/2014/main" xmlns="" id="{C3C414C3-8278-4588-933C-78CE8DB9A1BC}"/>
+                <a16:creationId xmlns="" xmlns:a16="http://schemas.microsoft.com/office/drawing/2014/main" id="{C3C414C3-8278-4588-933C-78CE8DB9A1BC}"/>
               </a:ext>
             </a:extLst>
           </p:cNvPr>
@@ -2649,7 +2649,7 @@
           <p:cNvPr id="3" name="Text Placeholder 2">
             <a:extLst>
               <a:ext uri="{FF2B5EF4-FFF2-40B4-BE49-F238E27FC236}">
-                <a16:creationId xmlns:a16="http://schemas.microsoft.com/office/drawing/2014/main" xmlns="" id="{71A200F1-57DD-46A6-A4EE-96E99875E1A2}"/>
+                <a16:creationId xmlns="" xmlns:a16="http://schemas.microsoft.com/office/drawing/2014/main" id="{71A200F1-57DD-46A6-A4EE-96E99875E1A2}"/>
               </a:ext>
             </a:extLst>
           </p:cNvPr>
@@ -2720,7 +2720,7 @@
           <p:cNvPr id="4" name="Content Placeholder 3">
             <a:extLst>
               <a:ext uri="{FF2B5EF4-FFF2-40B4-BE49-F238E27FC236}">
-                <a16:creationId xmlns:a16="http://schemas.microsoft.com/office/drawing/2014/main" xmlns="" id="{75083360-E32C-4B35-9766-9BA6CE824D44}"/>
+                <a16:creationId xmlns="" xmlns:a16="http://schemas.microsoft.com/office/drawing/2014/main" id="{75083360-E32C-4B35-9766-9BA6CE824D44}"/>
               </a:ext>
             </a:extLst>
           </p:cNvPr>
@@ -2782,7 +2782,7 @@
           <p:cNvPr id="5" name="Text Placeholder 4">
             <a:extLst>
               <a:ext uri="{FF2B5EF4-FFF2-40B4-BE49-F238E27FC236}">
-                <a16:creationId xmlns:a16="http://schemas.microsoft.com/office/drawing/2014/main" xmlns="" id="{9C302DCE-0AE3-4442-B76D-919B39B34647}"/>
+                <a16:creationId xmlns="" xmlns:a16="http://schemas.microsoft.com/office/drawing/2014/main" id="{9C302DCE-0AE3-4442-B76D-919B39B34647}"/>
               </a:ext>
             </a:extLst>
           </p:cNvPr>
@@ -2853,7 +2853,7 @@
           <p:cNvPr id="6" name="Content Placeholder 5">
             <a:extLst>
               <a:ext uri="{FF2B5EF4-FFF2-40B4-BE49-F238E27FC236}">
-                <a16:creationId xmlns:a16="http://schemas.microsoft.com/office/drawing/2014/main" xmlns="" id="{860A80C0-6965-48FB-B6A7-3D0F192940A6}"/>
+                <a16:creationId xmlns="" xmlns:a16="http://schemas.microsoft.com/office/drawing/2014/main" id="{860A80C0-6965-48FB-B6A7-3D0F192940A6}"/>
               </a:ext>
             </a:extLst>
           </p:cNvPr>
@@ -2915,7 +2915,7 @@
           <p:cNvPr id="7" name="Date Placeholder 6">
             <a:extLst>
               <a:ext uri="{FF2B5EF4-FFF2-40B4-BE49-F238E27FC236}">
-                <a16:creationId xmlns:a16="http://schemas.microsoft.com/office/drawing/2014/main" xmlns="" id="{FAA6129C-58F2-44B7-A8EB-4F5D1F1A7E66}"/>
+                <a16:creationId xmlns="" xmlns:a16="http://schemas.microsoft.com/office/drawing/2014/main" id="{FAA6129C-58F2-44B7-A8EB-4F5D1F1A7E66}"/>
               </a:ext>
             </a:extLst>
           </p:cNvPr>
@@ -2933,7 +2933,7 @@
           <a:p>
             <a:fld id="{38D4318C-2CF8-4E6B-ADD8-B5FDE2DDEB84}" type="datetimeFigureOut">
               <a:rPr lang="en-US" smtClean="0"/>
-              <a:t>9/25/18</a:t>
+              <a:t>9/28/18</a:t>
             </a:fld>
             <a:endParaRPr lang="en-US"/>
           </a:p>
@@ -2944,7 +2944,7 @@
           <p:cNvPr id="8" name="Footer Placeholder 7">
             <a:extLst>
               <a:ext uri="{FF2B5EF4-FFF2-40B4-BE49-F238E27FC236}">
-                <a16:creationId xmlns:a16="http://schemas.microsoft.com/office/drawing/2014/main" xmlns="" id="{A6F5F6FD-2BE8-4B93-89BA-8F9D8CF99BB5}"/>
+                <a16:creationId xmlns="" xmlns:a16="http://schemas.microsoft.com/office/drawing/2014/main" id="{A6F5F6FD-2BE8-4B93-89BA-8F9D8CF99BB5}"/>
               </a:ext>
             </a:extLst>
           </p:cNvPr>
@@ -2969,7 +2969,7 @@
           <p:cNvPr id="9" name="Slide Number Placeholder 8">
             <a:extLst>
               <a:ext uri="{FF2B5EF4-FFF2-40B4-BE49-F238E27FC236}">
-                <a16:creationId xmlns:a16="http://schemas.microsoft.com/office/drawing/2014/main" xmlns="" id="{1F59AA36-72EF-4232-BC09-0155524D0938}"/>
+                <a16:creationId xmlns="" xmlns:a16="http://schemas.microsoft.com/office/drawing/2014/main" id="{1F59AA36-72EF-4232-BC09-0155524D0938}"/>
               </a:ext>
             </a:extLst>
           </p:cNvPr>
@@ -3028,7 +3028,7 @@
           <p:cNvPr id="2" name="Title 1">
             <a:extLst>
               <a:ext uri="{FF2B5EF4-FFF2-40B4-BE49-F238E27FC236}">
-                <a16:creationId xmlns:a16="http://schemas.microsoft.com/office/drawing/2014/main" xmlns="" id="{E81D2CF1-816D-48C2-ABCE-F0D1287A86EE}"/>
+                <a16:creationId xmlns="" xmlns:a16="http://schemas.microsoft.com/office/drawing/2014/main" id="{E81D2CF1-816D-48C2-ABCE-F0D1287A86EE}"/>
               </a:ext>
             </a:extLst>
           </p:cNvPr>
@@ -3056,7 +3056,7 @@
           <p:cNvPr id="3" name="Date Placeholder 2">
             <a:extLst>
               <a:ext uri="{FF2B5EF4-FFF2-40B4-BE49-F238E27FC236}">
-                <a16:creationId xmlns:a16="http://schemas.microsoft.com/office/drawing/2014/main" xmlns="" id="{AC9624E7-366F-48BC-B811-C38D8D34F6EF}"/>
+                <a16:creationId xmlns="" xmlns:a16="http://schemas.microsoft.com/office/drawing/2014/main" id="{AC9624E7-366F-48BC-B811-C38D8D34F6EF}"/>
               </a:ext>
             </a:extLst>
           </p:cNvPr>
@@ -3074,7 +3074,7 @@
           <a:p>
             <a:fld id="{38D4318C-2CF8-4E6B-ADD8-B5FDE2DDEB84}" type="datetimeFigureOut">
               <a:rPr lang="en-US" smtClean="0"/>
-              <a:t>9/25/18</a:t>
+              <a:t>9/28/18</a:t>
             </a:fld>
             <a:endParaRPr lang="en-US"/>
           </a:p>
@@ -3085,7 +3085,7 @@
           <p:cNvPr id="4" name="Footer Placeholder 3">
             <a:extLst>
               <a:ext uri="{FF2B5EF4-FFF2-40B4-BE49-F238E27FC236}">
-                <a16:creationId xmlns:a16="http://schemas.microsoft.com/office/drawing/2014/main" xmlns="" id="{4BC120F3-5F3C-4B89-98B6-984CF95D89C8}"/>
+                <a16:creationId xmlns="" xmlns:a16="http://schemas.microsoft.com/office/drawing/2014/main" id="{4BC120F3-5F3C-4B89-98B6-984CF95D89C8}"/>
               </a:ext>
             </a:extLst>
           </p:cNvPr>
@@ -3110,7 +3110,7 @@
           <p:cNvPr id="5" name="Slide Number Placeholder 4">
             <a:extLst>
               <a:ext uri="{FF2B5EF4-FFF2-40B4-BE49-F238E27FC236}">
-                <a16:creationId xmlns:a16="http://schemas.microsoft.com/office/drawing/2014/main" xmlns="" id="{05D47124-544E-4C80-A43C-2E9B6C999EA9}"/>
+                <a16:creationId xmlns="" xmlns:a16="http://schemas.microsoft.com/office/drawing/2014/main" id="{05D47124-544E-4C80-A43C-2E9B6C999EA9}"/>
               </a:ext>
             </a:extLst>
           </p:cNvPr>
@@ -3169,7 +3169,7 @@
           <p:cNvPr id="2" name="Date Placeholder 1">
             <a:extLst>
               <a:ext uri="{FF2B5EF4-FFF2-40B4-BE49-F238E27FC236}">
-                <a16:creationId xmlns:a16="http://schemas.microsoft.com/office/drawing/2014/main" xmlns="" id="{641D9391-9D60-4076-8F79-DF77CFB04523}"/>
+                <a16:creationId xmlns="" xmlns:a16="http://schemas.microsoft.com/office/drawing/2014/main" id="{641D9391-9D60-4076-8F79-DF77CFB04523}"/>
               </a:ext>
             </a:extLst>
           </p:cNvPr>
@@ -3187,7 +3187,7 @@
           <a:p>
             <a:fld id="{38D4318C-2CF8-4E6B-ADD8-B5FDE2DDEB84}" type="datetimeFigureOut">
               <a:rPr lang="en-US" smtClean="0"/>
-              <a:t>9/25/18</a:t>
+              <a:t>9/28/18</a:t>
             </a:fld>
             <a:endParaRPr lang="en-US"/>
           </a:p>
@@ -3198,7 +3198,7 @@
           <p:cNvPr id="3" name="Footer Placeholder 2">
             <a:extLst>
               <a:ext uri="{FF2B5EF4-FFF2-40B4-BE49-F238E27FC236}">
-                <a16:creationId xmlns:a16="http://schemas.microsoft.com/office/drawing/2014/main" xmlns="" id="{0E3F688F-5CA7-432F-B591-328DA41C4640}"/>
+                <a16:creationId xmlns="" xmlns:a16="http://schemas.microsoft.com/office/drawing/2014/main" id="{0E3F688F-5CA7-432F-B591-328DA41C4640}"/>
               </a:ext>
             </a:extLst>
           </p:cNvPr>
@@ -3223,7 +3223,7 @@
           <p:cNvPr id="4" name="Slide Number Placeholder 3">
             <a:extLst>
               <a:ext uri="{FF2B5EF4-FFF2-40B4-BE49-F238E27FC236}">
-                <a16:creationId xmlns:a16="http://schemas.microsoft.com/office/drawing/2014/main" xmlns="" id="{9CE96E86-76CD-492C-BDC2-0B211B4A758F}"/>
+                <a16:creationId xmlns="" xmlns:a16="http://schemas.microsoft.com/office/drawing/2014/main" id="{9CE96E86-76CD-492C-BDC2-0B211B4A758F}"/>
               </a:ext>
             </a:extLst>
           </p:cNvPr>
@@ -3282,7 +3282,7 @@
           <p:cNvPr id="2" name="Title 1">
             <a:extLst>
               <a:ext uri="{FF2B5EF4-FFF2-40B4-BE49-F238E27FC236}">
-                <a16:creationId xmlns:a16="http://schemas.microsoft.com/office/drawing/2014/main" xmlns="" id="{7F423E4D-6C40-4DC2-B1DF-B3C0C94E8786}"/>
+                <a16:creationId xmlns="" xmlns:a16="http://schemas.microsoft.com/office/drawing/2014/main" id="{7F423E4D-6C40-4DC2-B1DF-B3C0C94E8786}"/>
               </a:ext>
             </a:extLst>
           </p:cNvPr>
@@ -3319,7 +3319,7 @@
           <p:cNvPr id="3" name="Content Placeholder 2">
             <a:extLst>
               <a:ext uri="{FF2B5EF4-FFF2-40B4-BE49-F238E27FC236}">
-                <a16:creationId xmlns:a16="http://schemas.microsoft.com/office/drawing/2014/main" xmlns="" id="{5548D7BC-A06F-4A7E-AF6A-AEF48F162ACE}"/>
+                <a16:creationId xmlns="" xmlns:a16="http://schemas.microsoft.com/office/drawing/2014/main" id="{5548D7BC-A06F-4A7E-AF6A-AEF48F162ACE}"/>
               </a:ext>
             </a:extLst>
           </p:cNvPr>
@@ -3409,7 +3409,7 @@
           <p:cNvPr id="4" name="Text Placeholder 3">
             <a:extLst>
               <a:ext uri="{FF2B5EF4-FFF2-40B4-BE49-F238E27FC236}">
-                <a16:creationId xmlns:a16="http://schemas.microsoft.com/office/drawing/2014/main" xmlns="" id="{365731FF-334D-4CE5-9EC6-DD57EFD0CE6C}"/>
+                <a16:creationId xmlns="" xmlns:a16="http://schemas.microsoft.com/office/drawing/2014/main" id="{365731FF-334D-4CE5-9EC6-DD57EFD0CE6C}"/>
               </a:ext>
             </a:extLst>
           </p:cNvPr>
@@ -3480,7 +3480,7 @@
           <p:cNvPr id="5" name="Date Placeholder 4">
             <a:extLst>
               <a:ext uri="{FF2B5EF4-FFF2-40B4-BE49-F238E27FC236}">
-                <a16:creationId xmlns:a16="http://schemas.microsoft.com/office/drawing/2014/main" xmlns="" id="{941E5FD8-3FAA-42DC-B8EB-F27BE66BD2AF}"/>
+                <a16:creationId xmlns="" xmlns:a16="http://schemas.microsoft.com/office/drawing/2014/main" id="{941E5FD8-3FAA-42DC-B8EB-F27BE66BD2AF}"/>
               </a:ext>
             </a:extLst>
           </p:cNvPr>
@@ -3498,7 +3498,7 @@
           <a:p>
             <a:fld id="{38D4318C-2CF8-4E6B-ADD8-B5FDE2DDEB84}" type="datetimeFigureOut">
               <a:rPr lang="en-US" smtClean="0"/>
-              <a:t>9/25/18</a:t>
+              <a:t>9/28/18</a:t>
             </a:fld>
             <a:endParaRPr lang="en-US"/>
           </a:p>
@@ -3509,7 +3509,7 @@
           <p:cNvPr id="6" name="Footer Placeholder 5">
             <a:extLst>
               <a:ext uri="{FF2B5EF4-FFF2-40B4-BE49-F238E27FC236}">
-                <a16:creationId xmlns:a16="http://schemas.microsoft.com/office/drawing/2014/main" xmlns="" id="{63C37809-3388-4A1D-B1D2-743B93135834}"/>
+                <a16:creationId xmlns="" xmlns:a16="http://schemas.microsoft.com/office/drawing/2014/main" id="{63C37809-3388-4A1D-B1D2-743B93135834}"/>
               </a:ext>
             </a:extLst>
           </p:cNvPr>
@@ -3534,7 +3534,7 @@
           <p:cNvPr id="7" name="Slide Number Placeholder 6">
             <a:extLst>
               <a:ext uri="{FF2B5EF4-FFF2-40B4-BE49-F238E27FC236}">
-                <a16:creationId xmlns:a16="http://schemas.microsoft.com/office/drawing/2014/main" xmlns="" id="{5E5C9D74-8181-4410-BBA3-7261D943FAFC}"/>
+                <a16:creationId xmlns="" xmlns:a16="http://schemas.microsoft.com/office/drawing/2014/main" id="{5E5C9D74-8181-4410-BBA3-7261D943FAFC}"/>
               </a:ext>
             </a:extLst>
           </p:cNvPr>
@@ -3593,7 +3593,7 @@
           <p:cNvPr id="2" name="Title 1">
             <a:extLst>
               <a:ext uri="{FF2B5EF4-FFF2-40B4-BE49-F238E27FC236}">
-                <a16:creationId xmlns:a16="http://schemas.microsoft.com/office/drawing/2014/main" xmlns="" id="{B661A0EF-4640-4EF6-A916-A1C1D59C7345}"/>
+                <a16:creationId xmlns="" xmlns:a16="http://schemas.microsoft.com/office/drawing/2014/main" id="{B661A0EF-4640-4EF6-A916-A1C1D59C7345}"/>
               </a:ext>
             </a:extLst>
           </p:cNvPr>
@@ -3630,7 +3630,7 @@
           <p:cNvPr id="3" name="Picture Placeholder 2">
             <a:extLst>
               <a:ext uri="{FF2B5EF4-FFF2-40B4-BE49-F238E27FC236}">
-                <a16:creationId xmlns:a16="http://schemas.microsoft.com/office/drawing/2014/main" xmlns="" id="{81CA8A45-1AAC-49D1-9E71-D973BEB1A220}"/>
+                <a16:creationId xmlns="" xmlns:a16="http://schemas.microsoft.com/office/drawing/2014/main" id="{81CA8A45-1AAC-49D1-9E71-D973BEB1A220}"/>
               </a:ext>
             </a:extLst>
           </p:cNvPr>
@@ -3697,7 +3697,7 @@
           <p:cNvPr id="4" name="Text Placeholder 3">
             <a:extLst>
               <a:ext uri="{FF2B5EF4-FFF2-40B4-BE49-F238E27FC236}">
-                <a16:creationId xmlns:a16="http://schemas.microsoft.com/office/drawing/2014/main" xmlns="" id="{1BBED5FC-EAD8-4BBB-AFD6-F031672AE133}"/>
+                <a16:creationId xmlns="" xmlns:a16="http://schemas.microsoft.com/office/drawing/2014/main" id="{1BBED5FC-EAD8-4BBB-AFD6-F031672AE133}"/>
               </a:ext>
             </a:extLst>
           </p:cNvPr>
@@ -3768,7 +3768,7 @@
           <p:cNvPr id="5" name="Date Placeholder 4">
             <a:extLst>
               <a:ext uri="{FF2B5EF4-FFF2-40B4-BE49-F238E27FC236}">
-                <a16:creationId xmlns:a16="http://schemas.microsoft.com/office/drawing/2014/main" xmlns="" id="{E89FBE54-B46E-4C19-8C0D-267CD05DB014}"/>
+                <a16:creationId xmlns="" xmlns:a16="http://schemas.microsoft.com/office/drawing/2014/main" id="{E89FBE54-B46E-4C19-8C0D-267CD05DB014}"/>
               </a:ext>
             </a:extLst>
           </p:cNvPr>
@@ -3786,7 +3786,7 @@
           <a:p>
             <a:fld id="{38D4318C-2CF8-4E6B-ADD8-B5FDE2DDEB84}" type="datetimeFigureOut">
               <a:rPr lang="en-US" smtClean="0"/>
-              <a:t>9/25/18</a:t>
+              <a:t>9/28/18</a:t>
             </a:fld>
             <a:endParaRPr lang="en-US"/>
           </a:p>
@@ -3797,7 +3797,7 @@
           <p:cNvPr id="6" name="Footer Placeholder 5">
             <a:extLst>
               <a:ext uri="{FF2B5EF4-FFF2-40B4-BE49-F238E27FC236}">
-                <a16:creationId xmlns:a16="http://schemas.microsoft.com/office/drawing/2014/main" xmlns="" id="{B6E0C9C3-4DB8-4258-97FC-8416E1E5474F}"/>
+                <a16:creationId xmlns="" xmlns:a16="http://schemas.microsoft.com/office/drawing/2014/main" id="{B6E0C9C3-4DB8-4258-97FC-8416E1E5474F}"/>
               </a:ext>
             </a:extLst>
           </p:cNvPr>
@@ -3822,7 +3822,7 @@
           <p:cNvPr id="7" name="Slide Number Placeholder 6">
             <a:extLst>
               <a:ext uri="{FF2B5EF4-FFF2-40B4-BE49-F238E27FC236}">
-                <a16:creationId xmlns:a16="http://schemas.microsoft.com/office/drawing/2014/main" xmlns="" id="{593932B1-FCA9-4C15-A951-EA0A956F20CB}"/>
+                <a16:creationId xmlns="" xmlns:a16="http://schemas.microsoft.com/office/drawing/2014/main" id="{593932B1-FCA9-4C15-A951-EA0A956F20CB}"/>
               </a:ext>
             </a:extLst>
           </p:cNvPr>
@@ -3886,7 +3886,7 @@
           <p:cNvPr id="2" name="Title Placeholder 1">
             <a:extLst>
               <a:ext uri="{FF2B5EF4-FFF2-40B4-BE49-F238E27FC236}">
-                <a16:creationId xmlns:a16="http://schemas.microsoft.com/office/drawing/2014/main" xmlns="" id="{7C0C664C-58A9-46A0-9CC1-0EEDE6285BFF}"/>
+                <a16:creationId xmlns="" xmlns:a16="http://schemas.microsoft.com/office/drawing/2014/main" id="{7C0C664C-58A9-46A0-9CC1-0EEDE6285BFF}"/>
               </a:ext>
             </a:extLst>
           </p:cNvPr>
@@ -3924,7 +3924,7 @@
           <p:cNvPr id="3" name="Text Placeholder 2">
             <a:extLst>
               <a:ext uri="{FF2B5EF4-FFF2-40B4-BE49-F238E27FC236}">
-                <a16:creationId xmlns:a16="http://schemas.microsoft.com/office/drawing/2014/main" xmlns="" id="{65562DF5-BE86-4DB8-9E27-E4F718173D1B}"/>
+                <a16:creationId xmlns="" xmlns:a16="http://schemas.microsoft.com/office/drawing/2014/main" id="{65562DF5-BE86-4DB8-9E27-E4F718173D1B}"/>
               </a:ext>
             </a:extLst>
           </p:cNvPr>
@@ -3991,7 +3991,7 @@
           <p:cNvPr id="4" name="Date Placeholder 3">
             <a:extLst>
               <a:ext uri="{FF2B5EF4-FFF2-40B4-BE49-F238E27FC236}">
-                <a16:creationId xmlns:a16="http://schemas.microsoft.com/office/drawing/2014/main" xmlns="" id="{DDA4EFC7-3387-4CAF-889C-4C468A0A1E5B}"/>
+                <a16:creationId xmlns="" xmlns:a16="http://schemas.microsoft.com/office/drawing/2014/main" id="{DDA4EFC7-3387-4CAF-889C-4C468A0A1E5B}"/>
               </a:ext>
             </a:extLst>
           </p:cNvPr>
@@ -4027,7 +4027,7 @@
           <a:p>
             <a:fld id="{38D4318C-2CF8-4E6B-ADD8-B5FDE2DDEB84}" type="datetimeFigureOut">
               <a:rPr lang="en-US" smtClean="0"/>
-              <a:t>9/25/18</a:t>
+              <a:t>9/28/18</a:t>
             </a:fld>
             <a:endParaRPr lang="en-US"/>
           </a:p>
@@ -4038,7 +4038,7 @@
           <p:cNvPr id="5" name="Footer Placeholder 4">
             <a:extLst>
               <a:ext uri="{FF2B5EF4-FFF2-40B4-BE49-F238E27FC236}">
-                <a16:creationId xmlns:a16="http://schemas.microsoft.com/office/drawing/2014/main" xmlns="" id="{37275286-A5F9-4A85-B019-61F07876BEAF}"/>
+                <a16:creationId xmlns="" xmlns:a16="http://schemas.microsoft.com/office/drawing/2014/main" id="{37275286-A5F9-4A85-B019-61F07876BEAF}"/>
               </a:ext>
             </a:extLst>
           </p:cNvPr>
@@ -4081,7 +4081,7 @@
           <p:cNvPr id="6" name="Slide Number Placeholder 5">
             <a:extLst>
               <a:ext uri="{FF2B5EF4-FFF2-40B4-BE49-F238E27FC236}">
-                <a16:creationId xmlns:a16="http://schemas.microsoft.com/office/drawing/2014/main" xmlns="" id="{AF635EAA-95A3-4DE3-A775-A7F3B84FB9B8}"/>
+                <a16:creationId xmlns="" xmlns:a16="http://schemas.microsoft.com/office/drawing/2014/main" id="{AF635EAA-95A3-4DE3-A775-A7F3B84FB9B8}"/>
               </a:ext>
             </a:extLst>
           </p:cNvPr>
@@ -4457,7 +4457,7 @@
           <p:cNvPr id="4" name="Rectangle 3">
             <a:extLst>
               <a:ext uri="{FF2B5EF4-FFF2-40B4-BE49-F238E27FC236}">
-                <a16:creationId xmlns:a16="http://schemas.microsoft.com/office/drawing/2014/main" xmlns="" id="{3263A579-F937-472F-BAC8-0F6DBD133059}"/>
+                <a16:creationId xmlns="" xmlns:a16="http://schemas.microsoft.com/office/drawing/2014/main" id="{3263A579-F937-472F-BAC8-0F6DBD133059}"/>
               </a:ext>
             </a:extLst>
           </p:cNvPr>
@@ -4835,7 +4835,7 @@
           <p:cNvPr id="6" name="Flowchart: Terminator 5">
             <a:extLst>
               <a:ext uri="{FF2B5EF4-FFF2-40B4-BE49-F238E27FC236}">
-                <a16:creationId xmlns:a16="http://schemas.microsoft.com/office/drawing/2014/main" xmlns="" id="{BC26BFB4-0829-4EF7-B551-E33F9117E645}"/>
+                <a16:creationId xmlns="" xmlns:a16="http://schemas.microsoft.com/office/drawing/2014/main" id="{BC26BFB4-0829-4EF7-B551-E33F9117E645}"/>
               </a:ext>
             </a:extLst>
           </p:cNvPr>
@@ -4893,7 +4893,7 @@
           <p:cNvPr id="45" name="Rectangle: Rounded Corners 44">
             <a:extLst>
               <a:ext uri="{FF2B5EF4-FFF2-40B4-BE49-F238E27FC236}">
-                <a16:creationId xmlns:a16="http://schemas.microsoft.com/office/drawing/2014/main" xmlns="" id="{382337C1-3DAB-4E1C-A8B6-4AA16C3410CE}"/>
+                <a16:creationId xmlns="" xmlns:a16="http://schemas.microsoft.com/office/drawing/2014/main" id="{382337C1-3DAB-4E1C-A8B6-4AA16C3410CE}"/>
               </a:ext>
             </a:extLst>
           </p:cNvPr>
@@ -5045,7 +5045,7 @@
           <p:cNvPr id="46" name="Rectangle: Rounded Corners 45">
             <a:extLst>
               <a:ext uri="{FF2B5EF4-FFF2-40B4-BE49-F238E27FC236}">
-                <a16:creationId xmlns:a16="http://schemas.microsoft.com/office/drawing/2014/main" xmlns="" id="{4369A102-1733-46FB-85EB-77C0CAB96BEB}"/>
+                <a16:creationId xmlns="" xmlns:a16="http://schemas.microsoft.com/office/drawing/2014/main" id="{4369A102-1733-46FB-85EB-77C0CAB96BEB}"/>
               </a:ext>
             </a:extLst>
           </p:cNvPr>
@@ -5295,7 +5295,7 @@
           <p:cNvPr id="70" name="Group 69">
             <a:extLst>
               <a:ext uri="{FF2B5EF4-FFF2-40B4-BE49-F238E27FC236}">
-                <a16:creationId xmlns:a16="http://schemas.microsoft.com/office/drawing/2014/main" xmlns="" id="{03E82210-D12A-4472-8E82-5C642547A5AD}"/>
+                <a16:creationId xmlns="" xmlns:a16="http://schemas.microsoft.com/office/drawing/2014/main" id="{03E82210-D12A-4472-8E82-5C642547A5AD}"/>
               </a:ext>
             </a:extLst>
           </p:cNvPr>
@@ -5315,7 +5315,7 @@
             <p:cNvPr id="49" name="Arrow: Down 48">
               <a:extLst>
                 <a:ext uri="{FF2B5EF4-FFF2-40B4-BE49-F238E27FC236}">
-                  <a16:creationId xmlns:a16="http://schemas.microsoft.com/office/drawing/2014/main" xmlns="" id="{3B31D1CB-EE12-4C30-9755-0315B7051AAC}"/>
+                  <a16:creationId xmlns="" xmlns:a16="http://schemas.microsoft.com/office/drawing/2014/main" id="{3B31D1CB-EE12-4C30-9755-0315B7051AAC}"/>
                 </a:ext>
               </a:extLst>
             </p:cNvPr>
@@ -5361,7 +5361,7 @@
             <p:cNvPr id="50" name="Arrow: Down 49">
               <a:extLst>
                 <a:ext uri="{FF2B5EF4-FFF2-40B4-BE49-F238E27FC236}">
-                  <a16:creationId xmlns:a16="http://schemas.microsoft.com/office/drawing/2014/main" xmlns="" id="{4CC7C068-0CD8-48B4-8CCB-6BAC503024B1}"/>
+                  <a16:creationId xmlns="" xmlns:a16="http://schemas.microsoft.com/office/drawing/2014/main" id="{4CC7C068-0CD8-48B4-8CCB-6BAC503024B1}"/>
                 </a:ext>
               </a:extLst>
             </p:cNvPr>
@@ -5407,7 +5407,7 @@
             <p:cNvPr id="56" name="Arrow: Down 55">
               <a:extLst>
                 <a:ext uri="{FF2B5EF4-FFF2-40B4-BE49-F238E27FC236}">
-                  <a16:creationId xmlns:a16="http://schemas.microsoft.com/office/drawing/2014/main" xmlns="" id="{08705A44-8E76-40A6-9AEF-3E38498993A3}"/>
+                  <a16:creationId xmlns="" xmlns:a16="http://schemas.microsoft.com/office/drawing/2014/main" id="{08705A44-8E76-40A6-9AEF-3E38498993A3}"/>
                 </a:ext>
               </a:extLst>
             </p:cNvPr>
@@ -5453,7 +5453,7 @@
             <p:cNvPr id="58" name="Arrow: Down 57">
               <a:extLst>
                 <a:ext uri="{FF2B5EF4-FFF2-40B4-BE49-F238E27FC236}">
-                  <a16:creationId xmlns:a16="http://schemas.microsoft.com/office/drawing/2014/main" xmlns="" id="{6F9F05EB-A54D-4318-88A2-04FBDC868428}"/>
+                  <a16:creationId xmlns="" xmlns:a16="http://schemas.microsoft.com/office/drawing/2014/main" id="{6F9F05EB-A54D-4318-88A2-04FBDC868428}"/>
                 </a:ext>
               </a:extLst>
             </p:cNvPr>
@@ -5499,7 +5499,7 @@
             <p:cNvPr id="60" name="Arrow: Down 59">
               <a:extLst>
                 <a:ext uri="{FF2B5EF4-FFF2-40B4-BE49-F238E27FC236}">
-                  <a16:creationId xmlns:a16="http://schemas.microsoft.com/office/drawing/2014/main" xmlns="" id="{A048F72C-C2B7-4E3D-AE7F-6909FE6D260C}"/>
+                  <a16:creationId xmlns="" xmlns:a16="http://schemas.microsoft.com/office/drawing/2014/main" id="{A048F72C-C2B7-4E3D-AE7F-6909FE6D260C}"/>
                 </a:ext>
               </a:extLst>
             </p:cNvPr>
@@ -5545,7 +5545,7 @@
             <p:cNvPr id="61" name="Arrow: Down 60">
               <a:extLst>
                 <a:ext uri="{FF2B5EF4-FFF2-40B4-BE49-F238E27FC236}">
-                  <a16:creationId xmlns:a16="http://schemas.microsoft.com/office/drawing/2014/main" xmlns="" id="{A7694F96-6FA9-4070-811F-859DE3C6C575}"/>
+                  <a16:creationId xmlns="" xmlns:a16="http://schemas.microsoft.com/office/drawing/2014/main" id="{A7694F96-6FA9-4070-811F-859DE3C6C575}"/>
                 </a:ext>
               </a:extLst>
             </p:cNvPr>
@@ -5592,7 +5592,7 @@
           <p:cNvPr id="69" name="Group 68">
             <a:extLst>
               <a:ext uri="{FF2B5EF4-FFF2-40B4-BE49-F238E27FC236}">
-                <a16:creationId xmlns:a16="http://schemas.microsoft.com/office/drawing/2014/main" xmlns="" id="{3065794C-32D8-4296-9C9A-EFC920F7B83A}"/>
+                <a16:creationId xmlns="" xmlns:a16="http://schemas.microsoft.com/office/drawing/2014/main" id="{3065794C-32D8-4296-9C9A-EFC920F7B83A}"/>
               </a:ext>
             </a:extLst>
           </p:cNvPr>
@@ -5612,7 +5612,7 @@
             <p:cNvPr id="51" name="Arrow: Down 50">
               <a:extLst>
                 <a:ext uri="{FF2B5EF4-FFF2-40B4-BE49-F238E27FC236}">
-                  <a16:creationId xmlns:a16="http://schemas.microsoft.com/office/drawing/2014/main" xmlns="" id="{B06F4C8A-27C8-401F-9C7F-ACE6014CB994}"/>
+                  <a16:creationId xmlns="" xmlns:a16="http://schemas.microsoft.com/office/drawing/2014/main" id="{B06F4C8A-27C8-401F-9C7F-ACE6014CB994}"/>
                 </a:ext>
               </a:extLst>
             </p:cNvPr>
@@ -5658,7 +5658,7 @@
             <p:cNvPr id="52" name="Arrow: Down 51">
               <a:extLst>
                 <a:ext uri="{FF2B5EF4-FFF2-40B4-BE49-F238E27FC236}">
-                  <a16:creationId xmlns:a16="http://schemas.microsoft.com/office/drawing/2014/main" xmlns="" id="{3F6578B2-F999-412C-9C07-3C6816BF840C}"/>
+                  <a16:creationId xmlns="" xmlns:a16="http://schemas.microsoft.com/office/drawing/2014/main" id="{3F6578B2-F999-412C-9C07-3C6816BF840C}"/>
                 </a:ext>
               </a:extLst>
             </p:cNvPr>
@@ -5704,7 +5704,7 @@
             <p:cNvPr id="53" name="Arrow: Down 52">
               <a:extLst>
                 <a:ext uri="{FF2B5EF4-FFF2-40B4-BE49-F238E27FC236}">
-                  <a16:creationId xmlns:a16="http://schemas.microsoft.com/office/drawing/2014/main" xmlns="" id="{450EE119-954E-44FE-B4A3-B3DB96644AB9}"/>
+                  <a16:creationId xmlns="" xmlns:a16="http://schemas.microsoft.com/office/drawing/2014/main" id="{450EE119-954E-44FE-B4A3-B3DB96644AB9}"/>
                 </a:ext>
               </a:extLst>
             </p:cNvPr>
@@ -5750,7 +5750,7 @@
             <p:cNvPr id="54" name="Arrow: Down 53">
               <a:extLst>
                 <a:ext uri="{FF2B5EF4-FFF2-40B4-BE49-F238E27FC236}">
-                  <a16:creationId xmlns:a16="http://schemas.microsoft.com/office/drawing/2014/main" xmlns="" id="{A185CF80-D658-411D-BF04-97A9C0FDCFD4}"/>
+                  <a16:creationId xmlns="" xmlns:a16="http://schemas.microsoft.com/office/drawing/2014/main" id="{A185CF80-D658-411D-BF04-97A9C0FDCFD4}"/>
                 </a:ext>
               </a:extLst>
             </p:cNvPr>
@@ -5796,7 +5796,7 @@
             <p:cNvPr id="55" name="Arrow: Down 54">
               <a:extLst>
                 <a:ext uri="{FF2B5EF4-FFF2-40B4-BE49-F238E27FC236}">
-                  <a16:creationId xmlns:a16="http://schemas.microsoft.com/office/drawing/2014/main" xmlns="" id="{305D5E87-D088-4E16-9AAA-9B61A0231F86}"/>
+                  <a16:creationId xmlns="" xmlns:a16="http://schemas.microsoft.com/office/drawing/2014/main" id="{305D5E87-D088-4E16-9AAA-9B61A0231F86}"/>
                 </a:ext>
               </a:extLst>
             </p:cNvPr>
@@ -5842,7 +5842,7 @@
             <p:cNvPr id="57" name="Arrow: Down 56">
               <a:extLst>
                 <a:ext uri="{FF2B5EF4-FFF2-40B4-BE49-F238E27FC236}">
-                  <a16:creationId xmlns:a16="http://schemas.microsoft.com/office/drawing/2014/main" xmlns="" id="{BB4A2EA1-8C7C-4D6C-BC70-96B197B76702}"/>
+                  <a16:creationId xmlns="" xmlns:a16="http://schemas.microsoft.com/office/drawing/2014/main" id="{BB4A2EA1-8C7C-4D6C-BC70-96B197B76702}"/>
                 </a:ext>
               </a:extLst>
             </p:cNvPr>
@@ -5888,7 +5888,7 @@
             <p:cNvPr id="62" name="Arrow: Down 61">
               <a:extLst>
                 <a:ext uri="{FF2B5EF4-FFF2-40B4-BE49-F238E27FC236}">
-                  <a16:creationId xmlns:a16="http://schemas.microsoft.com/office/drawing/2014/main" xmlns="" id="{21AE7CA0-F8AF-4ECD-8916-5286110EECC3}"/>
+                  <a16:creationId xmlns="" xmlns:a16="http://schemas.microsoft.com/office/drawing/2014/main" id="{21AE7CA0-F8AF-4ECD-8916-5286110EECC3}"/>
                 </a:ext>
               </a:extLst>
             </p:cNvPr>
@@ -5934,7 +5934,7 @@
             <p:cNvPr id="63" name="Arrow: Down 62">
               <a:extLst>
                 <a:ext uri="{FF2B5EF4-FFF2-40B4-BE49-F238E27FC236}">
-                  <a16:creationId xmlns:a16="http://schemas.microsoft.com/office/drawing/2014/main" xmlns="" id="{751F3152-1F2D-4A6E-A117-0416A26B03AA}"/>
+                  <a16:creationId xmlns="" xmlns:a16="http://schemas.microsoft.com/office/drawing/2014/main" id="{751F3152-1F2D-4A6E-A117-0416A26B03AA}"/>
                 </a:ext>
               </a:extLst>
             </p:cNvPr>
@@ -5980,7 +5980,7 @@
             <p:cNvPr id="64" name="Arrow: Down 63">
               <a:extLst>
                 <a:ext uri="{FF2B5EF4-FFF2-40B4-BE49-F238E27FC236}">
-                  <a16:creationId xmlns:a16="http://schemas.microsoft.com/office/drawing/2014/main" xmlns="" id="{807E50BC-DEF8-4CE2-A25C-A4DFC88D14A0}"/>
+                  <a16:creationId xmlns="" xmlns:a16="http://schemas.microsoft.com/office/drawing/2014/main" id="{807E50BC-DEF8-4CE2-A25C-A4DFC88D14A0}"/>
                 </a:ext>
               </a:extLst>
             </p:cNvPr>
@@ -6026,7 +6026,7 @@
             <p:cNvPr id="65" name="Arrow: Down 64">
               <a:extLst>
                 <a:ext uri="{FF2B5EF4-FFF2-40B4-BE49-F238E27FC236}">
-                  <a16:creationId xmlns:a16="http://schemas.microsoft.com/office/drawing/2014/main" xmlns="" id="{5569AB8E-DA9B-4319-BB74-F7B35ED9C963}"/>
+                  <a16:creationId xmlns="" xmlns:a16="http://schemas.microsoft.com/office/drawing/2014/main" id="{5569AB8E-DA9B-4319-BB74-F7B35ED9C963}"/>
                 </a:ext>
               </a:extLst>
             </p:cNvPr>
@@ -6072,7 +6072,7 @@
             <p:cNvPr id="66" name="Arrow: Down 65">
               <a:extLst>
                 <a:ext uri="{FF2B5EF4-FFF2-40B4-BE49-F238E27FC236}">
-                  <a16:creationId xmlns:a16="http://schemas.microsoft.com/office/drawing/2014/main" xmlns="" id="{4FF32172-E710-4741-8DB4-EB4A9F2D3C59}"/>
+                  <a16:creationId xmlns="" xmlns:a16="http://schemas.microsoft.com/office/drawing/2014/main" id="{4FF32172-E710-4741-8DB4-EB4A9F2D3C59}"/>
                 </a:ext>
               </a:extLst>
             </p:cNvPr>
@@ -6118,7 +6118,7 @@
             <p:cNvPr id="67" name="Arrow: Down 66">
               <a:extLst>
                 <a:ext uri="{FF2B5EF4-FFF2-40B4-BE49-F238E27FC236}">
-                  <a16:creationId xmlns:a16="http://schemas.microsoft.com/office/drawing/2014/main" xmlns="" id="{3AFFA1E1-8DAA-4BA0-88A8-91731D3A12CC}"/>
+                  <a16:creationId xmlns="" xmlns:a16="http://schemas.microsoft.com/office/drawing/2014/main" id="{3AFFA1E1-8DAA-4BA0-88A8-91731D3A12CC}"/>
                 </a:ext>
               </a:extLst>
             </p:cNvPr>
@@ -6164,7 +6164,7 @@
             <p:cNvPr id="68" name="Arrow: Down 67">
               <a:extLst>
                 <a:ext uri="{FF2B5EF4-FFF2-40B4-BE49-F238E27FC236}">
-                  <a16:creationId xmlns:a16="http://schemas.microsoft.com/office/drawing/2014/main" xmlns="" id="{4AF4710B-7AD0-4B1D-8526-591AB2625845}"/>
+                  <a16:creationId xmlns="" xmlns:a16="http://schemas.microsoft.com/office/drawing/2014/main" id="{4AF4710B-7AD0-4B1D-8526-591AB2625845}"/>
                 </a:ext>
               </a:extLst>
             </p:cNvPr>
@@ -6211,7 +6211,7 @@
           <p:cNvPr id="71" name="Rectangle: Rounded Corners 70">
             <a:extLst>
               <a:ext uri="{FF2B5EF4-FFF2-40B4-BE49-F238E27FC236}">
-                <a16:creationId xmlns:a16="http://schemas.microsoft.com/office/drawing/2014/main" xmlns="" id="{5F7A2BB6-CE87-4F3B-A640-9373397F480A}"/>
+                <a16:creationId xmlns="" xmlns:a16="http://schemas.microsoft.com/office/drawing/2014/main" id="{5F7A2BB6-CE87-4F3B-A640-9373397F480A}"/>
               </a:ext>
             </a:extLst>
           </p:cNvPr>
@@ -6391,7 +6391,7 @@
           <p:cNvPr id="80" name="Group 79">
             <a:extLst>
               <a:ext uri="{FF2B5EF4-FFF2-40B4-BE49-F238E27FC236}">
-                <a16:creationId xmlns:a16="http://schemas.microsoft.com/office/drawing/2014/main" xmlns="" id="{9C240103-050A-4695-BF9F-5537C248F66A}"/>
+                <a16:creationId xmlns="" xmlns:a16="http://schemas.microsoft.com/office/drawing/2014/main" id="{9C240103-050A-4695-BF9F-5537C248F66A}"/>
               </a:ext>
             </a:extLst>
           </p:cNvPr>
@@ -6411,7 +6411,7 @@
             <p:cNvPr id="72" name="Oval 71">
               <a:extLst>
                 <a:ext uri="{FF2B5EF4-FFF2-40B4-BE49-F238E27FC236}">
-                  <a16:creationId xmlns:a16="http://schemas.microsoft.com/office/drawing/2014/main" xmlns="" id="{72173DFC-7F98-4DB4-B138-D097FF7B3FD7}"/>
+                  <a16:creationId xmlns="" xmlns:a16="http://schemas.microsoft.com/office/drawing/2014/main" id="{72173DFC-7F98-4DB4-B138-D097FF7B3FD7}"/>
                 </a:ext>
               </a:extLst>
             </p:cNvPr>
@@ -6457,7 +6457,7 @@
             <p:cNvPr id="73" name="Oval 72">
               <a:extLst>
                 <a:ext uri="{FF2B5EF4-FFF2-40B4-BE49-F238E27FC236}">
-                  <a16:creationId xmlns:a16="http://schemas.microsoft.com/office/drawing/2014/main" xmlns="" id="{5EAF5F0D-D560-4D91-87F0-B88A371197A7}"/>
+                  <a16:creationId xmlns="" xmlns:a16="http://schemas.microsoft.com/office/drawing/2014/main" id="{5EAF5F0D-D560-4D91-87F0-B88A371197A7}"/>
                 </a:ext>
               </a:extLst>
             </p:cNvPr>
@@ -6503,7 +6503,7 @@
             <p:cNvPr id="74" name="Oval 73">
               <a:extLst>
                 <a:ext uri="{FF2B5EF4-FFF2-40B4-BE49-F238E27FC236}">
-                  <a16:creationId xmlns:a16="http://schemas.microsoft.com/office/drawing/2014/main" xmlns="" id="{6E325FF1-3D01-4062-A828-C83B2E9C2E01}"/>
+                  <a16:creationId xmlns="" xmlns:a16="http://schemas.microsoft.com/office/drawing/2014/main" id="{6E325FF1-3D01-4062-A828-C83B2E9C2E01}"/>
                 </a:ext>
               </a:extLst>
             </p:cNvPr>
@@ -6549,7 +6549,7 @@
             <p:cNvPr id="75" name="Oval 74">
               <a:extLst>
                 <a:ext uri="{FF2B5EF4-FFF2-40B4-BE49-F238E27FC236}">
-                  <a16:creationId xmlns:a16="http://schemas.microsoft.com/office/drawing/2014/main" xmlns="" id="{041CAB99-80D9-49CB-961D-7B48F675860D}"/>
+                  <a16:creationId xmlns="" xmlns:a16="http://schemas.microsoft.com/office/drawing/2014/main" id="{041CAB99-80D9-49CB-961D-7B48F675860D}"/>
                 </a:ext>
               </a:extLst>
             </p:cNvPr>
@@ -6595,7 +6595,7 @@
             <p:cNvPr id="76" name="Oval 75">
               <a:extLst>
                 <a:ext uri="{FF2B5EF4-FFF2-40B4-BE49-F238E27FC236}">
-                  <a16:creationId xmlns:a16="http://schemas.microsoft.com/office/drawing/2014/main" xmlns="" id="{0831FE5F-41A6-4901-A63B-4B4D462CBFF8}"/>
+                  <a16:creationId xmlns="" xmlns:a16="http://schemas.microsoft.com/office/drawing/2014/main" id="{0831FE5F-41A6-4901-A63B-4B4D462CBFF8}"/>
                 </a:ext>
               </a:extLst>
             </p:cNvPr>
@@ -6641,7 +6641,7 @@
             <p:cNvPr id="77" name="Oval 76">
               <a:extLst>
                 <a:ext uri="{FF2B5EF4-FFF2-40B4-BE49-F238E27FC236}">
-                  <a16:creationId xmlns:a16="http://schemas.microsoft.com/office/drawing/2014/main" xmlns="" id="{20E7703C-2A7D-4793-9329-B009C393EF66}"/>
+                  <a16:creationId xmlns="" xmlns:a16="http://schemas.microsoft.com/office/drawing/2014/main" id="{20E7703C-2A7D-4793-9329-B009C393EF66}"/>
                 </a:ext>
               </a:extLst>
             </p:cNvPr>
@@ -6687,7 +6687,7 @@
             <p:cNvPr id="78" name="Oval 77">
               <a:extLst>
                 <a:ext uri="{FF2B5EF4-FFF2-40B4-BE49-F238E27FC236}">
-                  <a16:creationId xmlns:a16="http://schemas.microsoft.com/office/drawing/2014/main" xmlns="" id="{D5806448-D69B-446D-AB6C-3D9967150298}"/>
+                  <a16:creationId xmlns="" xmlns:a16="http://schemas.microsoft.com/office/drawing/2014/main" id="{D5806448-D69B-446D-AB6C-3D9967150298}"/>
                 </a:ext>
               </a:extLst>
             </p:cNvPr>
@@ -6733,7 +6733,7 @@
             <p:cNvPr id="79" name="Oval 78">
               <a:extLst>
                 <a:ext uri="{FF2B5EF4-FFF2-40B4-BE49-F238E27FC236}">
-                  <a16:creationId xmlns:a16="http://schemas.microsoft.com/office/drawing/2014/main" xmlns="" id="{80035BDB-E69C-4D0D-9A50-0249359E0168}"/>
+                  <a16:creationId xmlns="" xmlns:a16="http://schemas.microsoft.com/office/drawing/2014/main" id="{80035BDB-E69C-4D0D-9A50-0249359E0168}"/>
                 </a:ext>
               </a:extLst>
             </p:cNvPr>
@@ -6818,7 +6818,7 @@
           <p:cNvPr id="4" name="Rectangle 3">
             <a:extLst>
               <a:ext uri="{FF2B5EF4-FFF2-40B4-BE49-F238E27FC236}">
-                <a16:creationId xmlns:a16="http://schemas.microsoft.com/office/drawing/2014/main" xmlns="" id="{3263A579-F937-472F-BAC8-0F6DBD133059}"/>
+                <a16:creationId xmlns="" xmlns:a16="http://schemas.microsoft.com/office/drawing/2014/main" id="{3263A579-F937-472F-BAC8-0F6DBD133059}"/>
               </a:ext>
             </a:extLst>
           </p:cNvPr>
@@ -7204,7 +7204,7 @@
           <p:cNvPr id="6" name="Flowchart: Terminator 5">
             <a:extLst>
               <a:ext uri="{FF2B5EF4-FFF2-40B4-BE49-F238E27FC236}">
-                <a16:creationId xmlns:a16="http://schemas.microsoft.com/office/drawing/2014/main" xmlns="" id="{BC26BFB4-0829-4EF7-B551-E33F9117E645}"/>
+                <a16:creationId xmlns="" xmlns:a16="http://schemas.microsoft.com/office/drawing/2014/main" id="{BC26BFB4-0829-4EF7-B551-E33F9117E645}"/>
               </a:ext>
             </a:extLst>
           </p:cNvPr>
@@ -7262,7 +7262,7 @@
           <p:cNvPr id="12" name="Rectangle: Rounded Corners 11">
             <a:extLst>
               <a:ext uri="{FF2B5EF4-FFF2-40B4-BE49-F238E27FC236}">
-                <a16:creationId xmlns:a16="http://schemas.microsoft.com/office/drawing/2014/main" xmlns="" id="{C9F7093C-C50F-438A-839F-B4C8765447D9}"/>
+                <a16:creationId xmlns="" xmlns:a16="http://schemas.microsoft.com/office/drawing/2014/main" id="{C9F7093C-C50F-438A-839F-B4C8765447D9}"/>
               </a:ext>
             </a:extLst>
           </p:cNvPr>
@@ -7312,7 +7312,7 @@
           <p:cNvPr id="16" name="Rectangle: Rounded Corners 15">
             <a:extLst>
               <a:ext uri="{FF2B5EF4-FFF2-40B4-BE49-F238E27FC236}">
-                <a16:creationId xmlns:a16="http://schemas.microsoft.com/office/drawing/2014/main" xmlns="" id="{D7EEB2C4-B890-4392-A7C8-E0EC180B599F}"/>
+                <a16:creationId xmlns="" xmlns:a16="http://schemas.microsoft.com/office/drawing/2014/main" id="{D7EEB2C4-B890-4392-A7C8-E0EC180B599F}"/>
               </a:ext>
             </a:extLst>
           </p:cNvPr>
@@ -7369,7 +7369,7 @@
           <p:cNvPr id="17" name="Rectangle: Rounded Corners 16">
             <a:extLst>
               <a:ext uri="{FF2B5EF4-FFF2-40B4-BE49-F238E27FC236}">
-                <a16:creationId xmlns:a16="http://schemas.microsoft.com/office/drawing/2014/main" xmlns="" id="{8D71A6A2-5002-4E07-8233-8FECD70213FF}"/>
+                <a16:creationId xmlns="" xmlns:a16="http://schemas.microsoft.com/office/drawing/2014/main" id="{8D71A6A2-5002-4E07-8233-8FECD70213FF}"/>
               </a:ext>
             </a:extLst>
           </p:cNvPr>
@@ -7431,7 +7431,7 @@
           <p:cNvPr id="18" name="Rectangle: Rounded Corners 17">
             <a:extLst>
               <a:ext uri="{FF2B5EF4-FFF2-40B4-BE49-F238E27FC236}">
-                <a16:creationId xmlns:a16="http://schemas.microsoft.com/office/drawing/2014/main" xmlns="" id="{D86FA6EC-8703-4B04-A6F7-1E04207D8415}"/>
+                <a16:creationId xmlns="" xmlns:a16="http://schemas.microsoft.com/office/drawing/2014/main" id="{D86FA6EC-8703-4B04-A6F7-1E04207D8415}"/>
               </a:ext>
             </a:extLst>
           </p:cNvPr>
@@ -7493,7 +7493,7 @@
           <p:cNvPr id="22" name="Rectangle: Rounded Corners 21">
             <a:extLst>
               <a:ext uri="{FF2B5EF4-FFF2-40B4-BE49-F238E27FC236}">
-                <a16:creationId xmlns:a16="http://schemas.microsoft.com/office/drawing/2014/main" xmlns="" id="{A6AEB402-3F5C-4753-BA98-17D23F1489EC}"/>
+                <a16:creationId xmlns="" xmlns:a16="http://schemas.microsoft.com/office/drawing/2014/main" id="{A6AEB402-3F5C-4753-BA98-17D23F1489EC}"/>
               </a:ext>
             </a:extLst>
           </p:cNvPr>
@@ -7555,7 +7555,7 @@
           <p:cNvPr id="23" name="Rectangle: Rounded Corners 22">
             <a:extLst>
               <a:ext uri="{FF2B5EF4-FFF2-40B4-BE49-F238E27FC236}">
-                <a16:creationId xmlns:a16="http://schemas.microsoft.com/office/drawing/2014/main" xmlns="" id="{56F285B2-2513-4C85-99BA-0A54326A4B7D}"/>
+                <a16:creationId xmlns="" xmlns:a16="http://schemas.microsoft.com/office/drawing/2014/main" id="{56F285B2-2513-4C85-99BA-0A54326A4B7D}"/>
               </a:ext>
             </a:extLst>
           </p:cNvPr>
@@ -7617,7 +7617,7 @@
           <p:cNvPr id="24" name="Rectangle: Rounded Corners 23">
             <a:extLst>
               <a:ext uri="{FF2B5EF4-FFF2-40B4-BE49-F238E27FC236}">
-                <a16:creationId xmlns:a16="http://schemas.microsoft.com/office/drawing/2014/main" xmlns="" id="{F597A463-A8FF-4FF5-BC0F-153123683A10}"/>
+                <a16:creationId xmlns="" xmlns:a16="http://schemas.microsoft.com/office/drawing/2014/main" id="{F597A463-A8FF-4FF5-BC0F-153123683A10}"/>
               </a:ext>
             </a:extLst>
           </p:cNvPr>
@@ -7676,7 +7676,7 @@
           <p:cNvPr id="25" name="Rectangle: Rounded Corners 24">
             <a:extLst>
               <a:ext uri="{FF2B5EF4-FFF2-40B4-BE49-F238E27FC236}">
-                <a16:creationId xmlns:a16="http://schemas.microsoft.com/office/drawing/2014/main" xmlns="" id="{19DB7B19-D874-405C-A27B-8A5D038EA782}"/>
+                <a16:creationId xmlns="" xmlns:a16="http://schemas.microsoft.com/office/drawing/2014/main" id="{19DB7B19-D874-405C-A27B-8A5D038EA782}"/>
               </a:ext>
             </a:extLst>
           </p:cNvPr>
@@ -7738,7 +7738,7 @@
           <p:cNvPr id="26" name="Rectangle: Rounded Corners 25">
             <a:extLst>
               <a:ext uri="{FF2B5EF4-FFF2-40B4-BE49-F238E27FC236}">
-                <a16:creationId xmlns:a16="http://schemas.microsoft.com/office/drawing/2014/main" xmlns="" id="{2B5C6BA9-D2AF-486B-8361-ED0C4EEDD119}"/>
+                <a16:creationId xmlns="" xmlns:a16="http://schemas.microsoft.com/office/drawing/2014/main" id="{2B5C6BA9-D2AF-486B-8361-ED0C4EEDD119}"/>
               </a:ext>
             </a:extLst>
           </p:cNvPr>
@@ -7800,7 +7800,7 @@
           <p:cNvPr id="27" name="Rectangle: Rounded Corners 26">
             <a:extLst>
               <a:ext uri="{FF2B5EF4-FFF2-40B4-BE49-F238E27FC236}">
-                <a16:creationId xmlns:a16="http://schemas.microsoft.com/office/drawing/2014/main" xmlns="" id="{54C5C5E1-A442-4CFB-8B18-10B68FD458C5}"/>
+                <a16:creationId xmlns="" xmlns:a16="http://schemas.microsoft.com/office/drawing/2014/main" id="{54C5C5E1-A442-4CFB-8B18-10B68FD458C5}"/>
               </a:ext>
             </a:extLst>
           </p:cNvPr>
@@ -7859,7 +7859,7 @@
           <p:cNvPr id="29" name="Flowchart: Terminator 28">
             <a:extLst>
               <a:ext uri="{FF2B5EF4-FFF2-40B4-BE49-F238E27FC236}">
-                <a16:creationId xmlns:a16="http://schemas.microsoft.com/office/drawing/2014/main" xmlns="" id="{ADF703A3-E58C-49CA-86A6-62D3D4DB9A13}"/>
+                <a16:creationId xmlns="" xmlns:a16="http://schemas.microsoft.com/office/drawing/2014/main" id="{ADF703A3-E58C-49CA-86A6-62D3D4DB9A13}"/>
               </a:ext>
             </a:extLst>
           </p:cNvPr>
@@ -7919,7 +7919,7 @@
           <p:cNvPr id="30" name="Rectangle: Rounded Corners 29">
             <a:extLst>
               <a:ext uri="{FF2B5EF4-FFF2-40B4-BE49-F238E27FC236}">
-                <a16:creationId xmlns:a16="http://schemas.microsoft.com/office/drawing/2014/main" xmlns="" id="{92C05959-AC73-403C-A95A-568E2827F8D0}"/>
+                <a16:creationId xmlns="" xmlns:a16="http://schemas.microsoft.com/office/drawing/2014/main" id="{92C05959-AC73-403C-A95A-568E2827F8D0}"/>
               </a:ext>
             </a:extLst>
           </p:cNvPr>
@@ -7978,7 +7978,7 @@
           <p:cNvPr id="31" name="Rectangle: Rounded Corners 30">
             <a:extLst>
               <a:ext uri="{FF2B5EF4-FFF2-40B4-BE49-F238E27FC236}">
-                <a16:creationId xmlns:a16="http://schemas.microsoft.com/office/drawing/2014/main" xmlns="" id="{43AF902B-C890-4D65-9F93-738A95F259B5}"/>
+                <a16:creationId xmlns="" xmlns:a16="http://schemas.microsoft.com/office/drawing/2014/main" id="{43AF902B-C890-4D65-9F93-738A95F259B5}"/>
               </a:ext>
             </a:extLst>
           </p:cNvPr>
@@ -8037,7 +8037,7 @@
           <p:cNvPr id="32" name="Rectangle: Rounded Corners 31">
             <a:extLst>
               <a:ext uri="{FF2B5EF4-FFF2-40B4-BE49-F238E27FC236}">
-                <a16:creationId xmlns:a16="http://schemas.microsoft.com/office/drawing/2014/main" xmlns="" id="{1854DCE2-341D-4C82-9567-30AF7CE5C5B6}"/>
+                <a16:creationId xmlns="" xmlns:a16="http://schemas.microsoft.com/office/drawing/2014/main" id="{1854DCE2-341D-4C82-9567-30AF7CE5C5B6}"/>
               </a:ext>
             </a:extLst>
           </p:cNvPr>
@@ -8096,7 +8096,7 @@
           <p:cNvPr id="37" name="Group 36">
             <a:extLst>
               <a:ext uri="{FF2B5EF4-FFF2-40B4-BE49-F238E27FC236}">
-                <a16:creationId xmlns:a16="http://schemas.microsoft.com/office/drawing/2014/main" xmlns="" id="{95307ECB-14EA-44E0-8191-47990F854CBD}"/>
+                <a16:creationId xmlns="" xmlns:a16="http://schemas.microsoft.com/office/drawing/2014/main" id="{95307ECB-14EA-44E0-8191-47990F854CBD}"/>
               </a:ext>
             </a:extLst>
           </p:cNvPr>
@@ -8116,7 +8116,7 @@
             <p:cNvPr id="34" name="Straight Connector 33">
               <a:extLst>
                 <a:ext uri="{FF2B5EF4-FFF2-40B4-BE49-F238E27FC236}">
-                  <a16:creationId xmlns:a16="http://schemas.microsoft.com/office/drawing/2014/main" xmlns="" id="{2025FCE6-7418-45FE-B895-69BA30956D65}"/>
+                  <a16:creationId xmlns="" xmlns:a16="http://schemas.microsoft.com/office/drawing/2014/main" id="{2025FCE6-7418-45FE-B895-69BA30956D65}"/>
                 </a:ext>
               </a:extLst>
             </p:cNvPr>
@@ -8157,7 +8157,7 @@
             <p:cNvPr id="36" name="Straight Connector 35">
               <a:extLst>
                 <a:ext uri="{FF2B5EF4-FFF2-40B4-BE49-F238E27FC236}">
-                  <a16:creationId xmlns:a16="http://schemas.microsoft.com/office/drawing/2014/main" xmlns="" id="{92FF3B5C-04C1-426B-B996-38950C257456}"/>
+                  <a16:creationId xmlns="" xmlns:a16="http://schemas.microsoft.com/office/drawing/2014/main" id="{92FF3B5C-04C1-426B-B996-38950C257456}"/>
                 </a:ext>
               </a:extLst>
             </p:cNvPr>
@@ -8199,7 +8199,7 @@
           <p:cNvPr id="38" name="Freeform: Shape 37">
             <a:extLst>
               <a:ext uri="{FF2B5EF4-FFF2-40B4-BE49-F238E27FC236}">
-                <a16:creationId xmlns:a16="http://schemas.microsoft.com/office/drawing/2014/main" xmlns="" id="{F0626870-8373-43C4-B3D8-1925FCF6898B}"/>
+                <a16:creationId xmlns="" xmlns:a16="http://schemas.microsoft.com/office/drawing/2014/main" id="{F0626870-8373-43C4-B3D8-1925FCF6898B}"/>
               </a:ext>
             </a:extLst>
           </p:cNvPr>
@@ -8328,7 +8328,7 @@
           <p:cNvPr id="42" name="Straight Connector 41">
             <a:extLst>
               <a:ext uri="{FF2B5EF4-FFF2-40B4-BE49-F238E27FC236}">
-                <a16:creationId xmlns:a16="http://schemas.microsoft.com/office/drawing/2014/main" xmlns="" id="{027B55EC-0664-42E0-B88D-690128D86096}"/>
+                <a16:creationId xmlns="" xmlns:a16="http://schemas.microsoft.com/office/drawing/2014/main" id="{027B55EC-0664-42E0-B88D-690128D86096}"/>
               </a:ext>
             </a:extLst>
           </p:cNvPr>
@@ -8489,8 +8489,8 @@
         </p:nvSpPr>
         <p:spPr>
           <a:xfrm>
-            <a:off x="130629" y="1608667"/>
-            <a:ext cx="3028207" cy="4995334"/>
+            <a:off x="130629" y="1436914"/>
+            <a:ext cx="3028207" cy="5167086"/>
           </a:xfrm>
           <a:prstGeom prst="roundRect">
             <a:avLst/>
@@ -8532,7 +8532,7 @@
         <p:spPr>
           <a:xfrm>
             <a:off x="8842060" y="142502"/>
-            <a:ext cx="3028207" cy="4574859"/>
+            <a:ext cx="3028207" cy="4327897"/>
           </a:xfrm>
           <a:prstGeom prst="roundRect">
             <a:avLst/>
@@ -8553,7 +8553,7 @@
           </a:fontRef>
         </p:style>
         <p:txBody>
-          <a:bodyPr rtlCol="0" anchor="ctr"/>
+          <a:bodyPr rtlCol="0" anchor="t" anchorCtr="0"/>
           <a:lstStyle/>
           <a:p>
             <a:pPr algn="ctr"/>
@@ -8578,7 +8578,7 @@
         <p:spPr>
           <a:xfrm>
             <a:off x="5813853" y="142503"/>
-            <a:ext cx="3028207" cy="4574860"/>
+            <a:ext cx="3028207" cy="4327897"/>
           </a:xfrm>
           <a:prstGeom prst="roundRect">
             <a:avLst/>
@@ -8599,7 +8599,7 @@
           </a:fontRef>
         </p:style>
         <p:txBody>
-          <a:bodyPr rtlCol="0" anchor="ctr"/>
+          <a:bodyPr rtlCol="0" anchor="t" anchorCtr="0"/>
           <a:lstStyle/>
           <a:p>
             <a:pPr algn="ctr"/>
@@ -8619,8 +8619,8 @@
         </p:nvSpPr>
         <p:spPr>
           <a:xfrm>
-            <a:off x="5813854" y="4717363"/>
-            <a:ext cx="6056414" cy="1886637"/>
+            <a:off x="5813850" y="4470401"/>
+            <a:ext cx="6056414" cy="2133600"/>
           </a:xfrm>
           <a:prstGeom prst="roundRect">
             <a:avLst/>
@@ -8641,15 +8641,146 @@
           </a:fontRef>
         </p:style>
         <p:txBody>
+          <a:bodyPr rtlCol="0" anchor="t" anchorCtr="0"/>
+          <a:lstStyle/>
+          <a:p>
+            <a:pPr algn="ctr"/>
+            <a:r>
+              <a:rPr lang="en-US" dirty="0" smtClean="0"/>
+              <a:t>Model Health element</a:t>
+            </a:r>
+            <a:endParaRPr lang="en-US" dirty="0"/>
+          </a:p>
+        </p:txBody>
+      </p:sp>
+      <p:sp>
+        <p:nvSpPr>
+          <p:cNvPr id="10" name="Rounded Rectangle 9"/>
+          <p:cNvSpPr/>
+          <p:nvPr/>
+        </p:nvSpPr>
+        <p:spPr>
+          <a:xfrm>
+            <a:off x="5813853" y="1769423"/>
+            <a:ext cx="3028207" cy="2700977"/>
+          </a:xfrm>
+          <a:prstGeom prst="roundRect">
+            <a:avLst/>
+          </a:prstGeom>
+        </p:spPr>
+        <p:style>
+          <a:lnRef idx="2">
+            <a:schemeClr val="dk1"/>
+          </a:lnRef>
+          <a:fillRef idx="1">
+            <a:schemeClr val="lt1"/>
+          </a:fillRef>
+          <a:effectRef idx="0">
+            <a:schemeClr val="dk1"/>
+          </a:effectRef>
+          <a:fontRef idx="minor">
+            <a:schemeClr val="dk1"/>
+          </a:fontRef>
+        </p:style>
+        <p:txBody>
           <a:bodyPr rtlCol="0" anchor="ctr"/>
           <a:lstStyle/>
           <a:p>
             <a:pPr algn="ctr"/>
             <a:r>
               <a:rPr lang="en-US" dirty="0" smtClean="0"/>
-              <a:t>Model Health element</a:t>
-            </a:r>
-            <a:endParaRPr lang="en-US" dirty="0"/>
+              <a:t>List of tickers </a:t>
+            </a:r>
+            <a:r>
+              <a:rPr lang="en-US" smtClean="0"/>
+              <a:t>and sell </a:t>
+            </a:r>
+            <a:r>
+              <a:rPr lang="en-US" dirty="0" smtClean="0"/>
+              <a:t>signal %</a:t>
+            </a:r>
+          </a:p>
+        </p:txBody>
+      </p:sp>
+      <p:sp>
+        <p:nvSpPr>
+          <p:cNvPr id="11" name="Rounded Rectangle 10"/>
+          <p:cNvSpPr/>
+          <p:nvPr/>
+        </p:nvSpPr>
+        <p:spPr>
+          <a:xfrm>
+            <a:off x="8842059" y="1769423"/>
+            <a:ext cx="3028207" cy="2700977"/>
+          </a:xfrm>
+          <a:prstGeom prst="roundRect">
+            <a:avLst/>
+          </a:prstGeom>
+        </p:spPr>
+        <p:style>
+          <a:lnRef idx="2">
+            <a:schemeClr val="dk1"/>
+          </a:lnRef>
+          <a:fillRef idx="1">
+            <a:schemeClr val="lt1"/>
+          </a:fillRef>
+          <a:effectRef idx="0">
+            <a:schemeClr val="dk1"/>
+          </a:effectRef>
+          <a:fontRef idx="minor">
+            <a:schemeClr val="dk1"/>
+          </a:fontRef>
+        </p:style>
+        <p:txBody>
+          <a:bodyPr rtlCol="0" anchor="ctr"/>
+          <a:lstStyle/>
+          <a:p>
+            <a:pPr algn="ctr"/>
+            <a:r>
+              <a:rPr lang="en-US" dirty="0" smtClean="0"/>
+              <a:t>List of tickers and buy signal %</a:t>
+            </a:r>
+          </a:p>
+        </p:txBody>
+      </p:sp>
+      <p:sp>
+        <p:nvSpPr>
+          <p:cNvPr id="12" name="Rounded Rectangle 11"/>
+          <p:cNvSpPr/>
+          <p:nvPr/>
+        </p:nvSpPr>
+        <p:spPr>
+          <a:xfrm>
+            <a:off x="5813849" y="5198533"/>
+            <a:ext cx="6056415" cy="1405467"/>
+          </a:xfrm>
+          <a:prstGeom prst="roundRect">
+            <a:avLst/>
+          </a:prstGeom>
+        </p:spPr>
+        <p:style>
+          <a:lnRef idx="2">
+            <a:schemeClr val="dk1"/>
+          </a:lnRef>
+          <a:fillRef idx="1">
+            <a:schemeClr val="lt1"/>
+          </a:fillRef>
+          <a:effectRef idx="0">
+            <a:schemeClr val="dk1"/>
+          </a:effectRef>
+          <a:fontRef idx="minor">
+            <a:schemeClr val="dk1"/>
+          </a:fontRef>
+        </p:style>
+        <p:txBody>
+          <a:bodyPr rtlCol="0" anchor="ctr"/>
+          <a:lstStyle/>
+          <a:p>
+            <a:pPr algn="ctr"/>
+            <a:r>
+              <a:rPr lang="en-US" dirty="0" smtClean="0"/>
+              <a:t>List of Models and health color</a:t>
+            </a:r>
           </a:p>
         </p:txBody>
       </p:sp>
@@ -9027,8 +9158,8 @@
         </p:nvSpPr>
         <p:spPr>
           <a:xfrm>
-            <a:off x="130629" y="1608667"/>
-            <a:ext cx="3028207" cy="4995334"/>
+            <a:off x="130629" y="1436914"/>
+            <a:ext cx="3028207" cy="5167087"/>
           </a:xfrm>
           <a:prstGeom prst="roundRect">
             <a:avLst/>

</xml_diff>

<commit_message>
finished home layout, styling can be improved; not interactive
</commit_message>
<xml_diff>
--- a/Visualizer/Mockup.pptx
+++ b/Visualizer/Mockup.pptx
@@ -1252,7 +1252,7 @@
           <p:cNvPr id="2" name="Title 1">
             <a:extLst>
               <a:ext uri="{FF2B5EF4-FFF2-40B4-BE49-F238E27FC236}">
-                <a16:creationId xmlns="" xmlns:a16="http://schemas.microsoft.com/office/drawing/2014/main" id="{553B6E79-7DCD-4ED3-91A4-44DC27CFA9B1}"/>
+                <a16:creationId xmlns:a16="http://schemas.microsoft.com/office/drawing/2014/main" xmlns="" id="{553B6E79-7DCD-4ED3-91A4-44DC27CFA9B1}"/>
               </a:ext>
             </a:extLst>
           </p:cNvPr>
@@ -1289,7 +1289,7 @@
           <p:cNvPr id="3" name="Subtitle 2">
             <a:extLst>
               <a:ext uri="{FF2B5EF4-FFF2-40B4-BE49-F238E27FC236}">
-                <a16:creationId xmlns="" xmlns:a16="http://schemas.microsoft.com/office/drawing/2014/main" id="{FF133992-35FF-48F9-8BCD-585C3D1BC692}"/>
+                <a16:creationId xmlns:a16="http://schemas.microsoft.com/office/drawing/2014/main" xmlns="" id="{FF133992-35FF-48F9-8BCD-585C3D1BC692}"/>
               </a:ext>
             </a:extLst>
           </p:cNvPr>
@@ -1359,7 +1359,7 @@
           <p:cNvPr id="4" name="Date Placeholder 3">
             <a:extLst>
               <a:ext uri="{FF2B5EF4-FFF2-40B4-BE49-F238E27FC236}">
-                <a16:creationId xmlns="" xmlns:a16="http://schemas.microsoft.com/office/drawing/2014/main" id="{E742DDB7-2C91-4453-B629-95462A7CA797}"/>
+                <a16:creationId xmlns:a16="http://schemas.microsoft.com/office/drawing/2014/main" xmlns="" id="{E742DDB7-2C91-4453-B629-95462A7CA797}"/>
               </a:ext>
             </a:extLst>
           </p:cNvPr>
@@ -1388,7 +1388,7 @@
           <p:cNvPr id="5" name="Footer Placeholder 4">
             <a:extLst>
               <a:ext uri="{FF2B5EF4-FFF2-40B4-BE49-F238E27FC236}">
-                <a16:creationId xmlns="" xmlns:a16="http://schemas.microsoft.com/office/drawing/2014/main" id="{9B37D394-7771-4D7B-90C1-CD3BA89AB53B}"/>
+                <a16:creationId xmlns:a16="http://schemas.microsoft.com/office/drawing/2014/main" xmlns="" id="{9B37D394-7771-4D7B-90C1-CD3BA89AB53B}"/>
               </a:ext>
             </a:extLst>
           </p:cNvPr>
@@ -1413,7 +1413,7 @@
           <p:cNvPr id="6" name="Slide Number Placeholder 5">
             <a:extLst>
               <a:ext uri="{FF2B5EF4-FFF2-40B4-BE49-F238E27FC236}">
-                <a16:creationId xmlns="" xmlns:a16="http://schemas.microsoft.com/office/drawing/2014/main" id="{FBF6A34E-6E0D-4342-AFE6-776CAFFAE5EA}"/>
+                <a16:creationId xmlns:a16="http://schemas.microsoft.com/office/drawing/2014/main" xmlns="" id="{FBF6A34E-6E0D-4342-AFE6-776CAFFAE5EA}"/>
               </a:ext>
             </a:extLst>
           </p:cNvPr>
@@ -1472,7 +1472,7 @@
           <p:cNvPr id="2" name="Title 1">
             <a:extLst>
               <a:ext uri="{FF2B5EF4-FFF2-40B4-BE49-F238E27FC236}">
-                <a16:creationId xmlns="" xmlns:a16="http://schemas.microsoft.com/office/drawing/2014/main" id="{E2F3AC27-2B2B-4DD2-A3B2-A7B83B858C11}"/>
+                <a16:creationId xmlns:a16="http://schemas.microsoft.com/office/drawing/2014/main" xmlns="" id="{E2F3AC27-2B2B-4DD2-A3B2-A7B83B858C11}"/>
               </a:ext>
             </a:extLst>
           </p:cNvPr>
@@ -1500,7 +1500,7 @@
           <p:cNvPr id="3" name="Vertical Text Placeholder 2">
             <a:extLst>
               <a:ext uri="{FF2B5EF4-FFF2-40B4-BE49-F238E27FC236}">
-                <a16:creationId xmlns="" xmlns:a16="http://schemas.microsoft.com/office/drawing/2014/main" id="{DACBB971-8C51-4F13-82B5-F8DDA8043A5A}"/>
+                <a16:creationId xmlns:a16="http://schemas.microsoft.com/office/drawing/2014/main" xmlns="" id="{DACBB971-8C51-4F13-82B5-F8DDA8043A5A}"/>
               </a:ext>
             </a:extLst>
           </p:cNvPr>
@@ -1557,7 +1557,7 @@
           <p:cNvPr id="4" name="Date Placeholder 3">
             <a:extLst>
               <a:ext uri="{FF2B5EF4-FFF2-40B4-BE49-F238E27FC236}">
-                <a16:creationId xmlns="" xmlns:a16="http://schemas.microsoft.com/office/drawing/2014/main" id="{A4A1802B-7ADB-4AFC-96BC-CA634765E059}"/>
+                <a16:creationId xmlns:a16="http://schemas.microsoft.com/office/drawing/2014/main" xmlns="" id="{A4A1802B-7ADB-4AFC-96BC-CA634765E059}"/>
               </a:ext>
             </a:extLst>
           </p:cNvPr>
@@ -1586,7 +1586,7 @@
           <p:cNvPr id="5" name="Footer Placeholder 4">
             <a:extLst>
               <a:ext uri="{FF2B5EF4-FFF2-40B4-BE49-F238E27FC236}">
-                <a16:creationId xmlns="" xmlns:a16="http://schemas.microsoft.com/office/drawing/2014/main" id="{8B4B1FF8-F774-42CE-BE8D-13A68CFEE4E1}"/>
+                <a16:creationId xmlns:a16="http://schemas.microsoft.com/office/drawing/2014/main" xmlns="" id="{8B4B1FF8-F774-42CE-BE8D-13A68CFEE4E1}"/>
               </a:ext>
             </a:extLst>
           </p:cNvPr>
@@ -1611,7 +1611,7 @@
           <p:cNvPr id="6" name="Slide Number Placeholder 5">
             <a:extLst>
               <a:ext uri="{FF2B5EF4-FFF2-40B4-BE49-F238E27FC236}">
-                <a16:creationId xmlns="" xmlns:a16="http://schemas.microsoft.com/office/drawing/2014/main" id="{CCB3DBFA-E232-45E2-8543-0D9D4BFA8466}"/>
+                <a16:creationId xmlns:a16="http://schemas.microsoft.com/office/drawing/2014/main" xmlns="" id="{CCB3DBFA-E232-45E2-8543-0D9D4BFA8466}"/>
               </a:ext>
             </a:extLst>
           </p:cNvPr>
@@ -1670,7 +1670,7 @@
           <p:cNvPr id="2" name="Vertical Title 1">
             <a:extLst>
               <a:ext uri="{FF2B5EF4-FFF2-40B4-BE49-F238E27FC236}">
-                <a16:creationId xmlns="" xmlns:a16="http://schemas.microsoft.com/office/drawing/2014/main" id="{ED1F32F3-BD63-4C18-8416-13192109A1A6}"/>
+                <a16:creationId xmlns:a16="http://schemas.microsoft.com/office/drawing/2014/main" xmlns="" id="{ED1F32F3-BD63-4C18-8416-13192109A1A6}"/>
               </a:ext>
             </a:extLst>
           </p:cNvPr>
@@ -1703,7 +1703,7 @@
           <p:cNvPr id="3" name="Vertical Text Placeholder 2">
             <a:extLst>
               <a:ext uri="{FF2B5EF4-FFF2-40B4-BE49-F238E27FC236}">
-                <a16:creationId xmlns="" xmlns:a16="http://schemas.microsoft.com/office/drawing/2014/main" id="{79AFEDA7-9D3C-4ED1-A72C-A6ED03095E6A}"/>
+                <a16:creationId xmlns:a16="http://schemas.microsoft.com/office/drawing/2014/main" xmlns="" id="{79AFEDA7-9D3C-4ED1-A72C-A6ED03095E6A}"/>
               </a:ext>
             </a:extLst>
           </p:cNvPr>
@@ -1765,7 +1765,7 @@
           <p:cNvPr id="4" name="Date Placeholder 3">
             <a:extLst>
               <a:ext uri="{FF2B5EF4-FFF2-40B4-BE49-F238E27FC236}">
-                <a16:creationId xmlns="" xmlns:a16="http://schemas.microsoft.com/office/drawing/2014/main" id="{250749DE-3DAA-49A4-A253-00A197FBE495}"/>
+                <a16:creationId xmlns:a16="http://schemas.microsoft.com/office/drawing/2014/main" xmlns="" id="{250749DE-3DAA-49A4-A253-00A197FBE495}"/>
               </a:ext>
             </a:extLst>
           </p:cNvPr>
@@ -1794,7 +1794,7 @@
           <p:cNvPr id="5" name="Footer Placeholder 4">
             <a:extLst>
               <a:ext uri="{FF2B5EF4-FFF2-40B4-BE49-F238E27FC236}">
-                <a16:creationId xmlns="" xmlns:a16="http://schemas.microsoft.com/office/drawing/2014/main" id="{78233EA4-7F3B-423C-8FFC-D15CE8DED2FC}"/>
+                <a16:creationId xmlns:a16="http://schemas.microsoft.com/office/drawing/2014/main" xmlns="" id="{78233EA4-7F3B-423C-8FFC-D15CE8DED2FC}"/>
               </a:ext>
             </a:extLst>
           </p:cNvPr>
@@ -1819,7 +1819,7 @@
           <p:cNvPr id="6" name="Slide Number Placeholder 5">
             <a:extLst>
               <a:ext uri="{FF2B5EF4-FFF2-40B4-BE49-F238E27FC236}">
-                <a16:creationId xmlns="" xmlns:a16="http://schemas.microsoft.com/office/drawing/2014/main" id="{AAF9BF6B-2EE0-40E0-8B28-2D4EF7E56C0F}"/>
+                <a16:creationId xmlns:a16="http://schemas.microsoft.com/office/drawing/2014/main" xmlns="" id="{AAF9BF6B-2EE0-40E0-8B28-2D4EF7E56C0F}"/>
               </a:ext>
             </a:extLst>
           </p:cNvPr>
@@ -1878,7 +1878,7 @@
           <p:cNvPr id="2" name="Title 1">
             <a:extLst>
               <a:ext uri="{FF2B5EF4-FFF2-40B4-BE49-F238E27FC236}">
-                <a16:creationId xmlns="" xmlns:a16="http://schemas.microsoft.com/office/drawing/2014/main" id="{08F4761C-DFDF-4BED-B6DA-B12B84123C85}"/>
+                <a16:creationId xmlns:a16="http://schemas.microsoft.com/office/drawing/2014/main" xmlns="" id="{08F4761C-DFDF-4BED-B6DA-B12B84123C85}"/>
               </a:ext>
             </a:extLst>
           </p:cNvPr>
@@ -1906,7 +1906,7 @@
           <p:cNvPr id="3" name="Content Placeholder 2">
             <a:extLst>
               <a:ext uri="{FF2B5EF4-FFF2-40B4-BE49-F238E27FC236}">
-                <a16:creationId xmlns="" xmlns:a16="http://schemas.microsoft.com/office/drawing/2014/main" id="{79F31278-087B-4BEB-9BE3-0F8DC19F4A57}"/>
+                <a16:creationId xmlns:a16="http://schemas.microsoft.com/office/drawing/2014/main" xmlns="" id="{79F31278-087B-4BEB-9BE3-0F8DC19F4A57}"/>
               </a:ext>
             </a:extLst>
           </p:cNvPr>
@@ -1963,7 +1963,7 @@
           <p:cNvPr id="4" name="Date Placeholder 3">
             <a:extLst>
               <a:ext uri="{FF2B5EF4-FFF2-40B4-BE49-F238E27FC236}">
-                <a16:creationId xmlns="" xmlns:a16="http://schemas.microsoft.com/office/drawing/2014/main" id="{37E6CAAD-9100-4A5F-9A47-5E37CEE46E2E}"/>
+                <a16:creationId xmlns:a16="http://schemas.microsoft.com/office/drawing/2014/main" xmlns="" id="{37E6CAAD-9100-4A5F-9A47-5E37CEE46E2E}"/>
               </a:ext>
             </a:extLst>
           </p:cNvPr>
@@ -1992,7 +1992,7 @@
           <p:cNvPr id="5" name="Footer Placeholder 4">
             <a:extLst>
               <a:ext uri="{FF2B5EF4-FFF2-40B4-BE49-F238E27FC236}">
-                <a16:creationId xmlns="" xmlns:a16="http://schemas.microsoft.com/office/drawing/2014/main" id="{A6346B6E-6081-4251-85B4-0F5F4EC66056}"/>
+                <a16:creationId xmlns:a16="http://schemas.microsoft.com/office/drawing/2014/main" xmlns="" id="{A6346B6E-6081-4251-85B4-0F5F4EC66056}"/>
               </a:ext>
             </a:extLst>
           </p:cNvPr>
@@ -2017,7 +2017,7 @@
           <p:cNvPr id="6" name="Slide Number Placeholder 5">
             <a:extLst>
               <a:ext uri="{FF2B5EF4-FFF2-40B4-BE49-F238E27FC236}">
-                <a16:creationId xmlns="" xmlns:a16="http://schemas.microsoft.com/office/drawing/2014/main" id="{A08ADCFC-1628-46AF-8D8B-11BF134F6FFB}"/>
+                <a16:creationId xmlns:a16="http://schemas.microsoft.com/office/drawing/2014/main" xmlns="" id="{A08ADCFC-1628-46AF-8D8B-11BF134F6FFB}"/>
               </a:ext>
             </a:extLst>
           </p:cNvPr>
@@ -2076,7 +2076,7 @@
           <p:cNvPr id="2" name="Title 1">
             <a:extLst>
               <a:ext uri="{FF2B5EF4-FFF2-40B4-BE49-F238E27FC236}">
-                <a16:creationId xmlns="" xmlns:a16="http://schemas.microsoft.com/office/drawing/2014/main" id="{20A06FCD-43B2-4062-ADE9-5196C80E947B}"/>
+                <a16:creationId xmlns:a16="http://schemas.microsoft.com/office/drawing/2014/main" xmlns="" id="{20A06FCD-43B2-4062-ADE9-5196C80E947B}"/>
               </a:ext>
             </a:extLst>
           </p:cNvPr>
@@ -2113,7 +2113,7 @@
           <p:cNvPr id="3" name="Text Placeholder 2">
             <a:extLst>
               <a:ext uri="{FF2B5EF4-FFF2-40B4-BE49-F238E27FC236}">
-                <a16:creationId xmlns="" xmlns:a16="http://schemas.microsoft.com/office/drawing/2014/main" id="{9689C800-F457-4EAA-8B68-FDB9E698C04A}"/>
+                <a16:creationId xmlns:a16="http://schemas.microsoft.com/office/drawing/2014/main" xmlns="" id="{9689C800-F457-4EAA-8B68-FDB9E698C04A}"/>
               </a:ext>
             </a:extLst>
           </p:cNvPr>
@@ -2238,7 +2238,7 @@
           <p:cNvPr id="4" name="Date Placeholder 3">
             <a:extLst>
               <a:ext uri="{FF2B5EF4-FFF2-40B4-BE49-F238E27FC236}">
-                <a16:creationId xmlns="" xmlns:a16="http://schemas.microsoft.com/office/drawing/2014/main" id="{DEEE74FC-0F00-42EC-9DA8-6938CA580240}"/>
+                <a16:creationId xmlns:a16="http://schemas.microsoft.com/office/drawing/2014/main" xmlns="" id="{DEEE74FC-0F00-42EC-9DA8-6938CA580240}"/>
               </a:ext>
             </a:extLst>
           </p:cNvPr>
@@ -2267,7 +2267,7 @@
           <p:cNvPr id="5" name="Footer Placeholder 4">
             <a:extLst>
               <a:ext uri="{FF2B5EF4-FFF2-40B4-BE49-F238E27FC236}">
-                <a16:creationId xmlns="" xmlns:a16="http://schemas.microsoft.com/office/drawing/2014/main" id="{741D09C9-5481-4587-9C28-A3ED2A914B01}"/>
+                <a16:creationId xmlns:a16="http://schemas.microsoft.com/office/drawing/2014/main" xmlns="" id="{741D09C9-5481-4587-9C28-A3ED2A914B01}"/>
               </a:ext>
             </a:extLst>
           </p:cNvPr>
@@ -2292,7 +2292,7 @@
           <p:cNvPr id="6" name="Slide Number Placeholder 5">
             <a:extLst>
               <a:ext uri="{FF2B5EF4-FFF2-40B4-BE49-F238E27FC236}">
-                <a16:creationId xmlns="" xmlns:a16="http://schemas.microsoft.com/office/drawing/2014/main" id="{1AC83BC7-E8A4-486F-9C06-B334B53F37B9}"/>
+                <a16:creationId xmlns:a16="http://schemas.microsoft.com/office/drawing/2014/main" xmlns="" id="{1AC83BC7-E8A4-486F-9C06-B334B53F37B9}"/>
               </a:ext>
             </a:extLst>
           </p:cNvPr>
@@ -2351,7 +2351,7 @@
           <p:cNvPr id="2" name="Title 1">
             <a:extLst>
               <a:ext uri="{FF2B5EF4-FFF2-40B4-BE49-F238E27FC236}">
-                <a16:creationId xmlns="" xmlns:a16="http://schemas.microsoft.com/office/drawing/2014/main" id="{E81E36C7-0816-4A92-853C-ED3B09023EDB}"/>
+                <a16:creationId xmlns:a16="http://schemas.microsoft.com/office/drawing/2014/main" xmlns="" id="{E81E36C7-0816-4A92-853C-ED3B09023EDB}"/>
               </a:ext>
             </a:extLst>
           </p:cNvPr>
@@ -2379,7 +2379,7 @@
           <p:cNvPr id="3" name="Content Placeholder 2">
             <a:extLst>
               <a:ext uri="{FF2B5EF4-FFF2-40B4-BE49-F238E27FC236}">
-                <a16:creationId xmlns="" xmlns:a16="http://schemas.microsoft.com/office/drawing/2014/main" id="{7F707701-A54F-45E1-8A6C-2C8B8867BC9D}"/>
+                <a16:creationId xmlns:a16="http://schemas.microsoft.com/office/drawing/2014/main" xmlns="" id="{7F707701-A54F-45E1-8A6C-2C8B8867BC9D}"/>
               </a:ext>
             </a:extLst>
           </p:cNvPr>
@@ -2441,7 +2441,7 @@
           <p:cNvPr id="4" name="Content Placeholder 3">
             <a:extLst>
               <a:ext uri="{FF2B5EF4-FFF2-40B4-BE49-F238E27FC236}">
-                <a16:creationId xmlns="" xmlns:a16="http://schemas.microsoft.com/office/drawing/2014/main" id="{4B5786FD-7A65-4D8C-B15D-DA773068698C}"/>
+                <a16:creationId xmlns:a16="http://schemas.microsoft.com/office/drawing/2014/main" xmlns="" id="{4B5786FD-7A65-4D8C-B15D-DA773068698C}"/>
               </a:ext>
             </a:extLst>
           </p:cNvPr>
@@ -2503,7 +2503,7 @@
           <p:cNvPr id="5" name="Date Placeholder 4">
             <a:extLst>
               <a:ext uri="{FF2B5EF4-FFF2-40B4-BE49-F238E27FC236}">
-                <a16:creationId xmlns="" xmlns:a16="http://schemas.microsoft.com/office/drawing/2014/main" id="{CEAE3A29-2487-420C-866B-57CD44BF44A3}"/>
+                <a16:creationId xmlns:a16="http://schemas.microsoft.com/office/drawing/2014/main" xmlns="" id="{CEAE3A29-2487-420C-866B-57CD44BF44A3}"/>
               </a:ext>
             </a:extLst>
           </p:cNvPr>
@@ -2532,7 +2532,7 @@
           <p:cNvPr id="6" name="Footer Placeholder 5">
             <a:extLst>
               <a:ext uri="{FF2B5EF4-FFF2-40B4-BE49-F238E27FC236}">
-                <a16:creationId xmlns="" xmlns:a16="http://schemas.microsoft.com/office/drawing/2014/main" id="{377443B9-9470-4D6A-AE0A-C326BCCBE642}"/>
+                <a16:creationId xmlns:a16="http://schemas.microsoft.com/office/drawing/2014/main" xmlns="" id="{377443B9-9470-4D6A-AE0A-C326BCCBE642}"/>
               </a:ext>
             </a:extLst>
           </p:cNvPr>
@@ -2557,7 +2557,7 @@
           <p:cNvPr id="7" name="Slide Number Placeholder 6">
             <a:extLst>
               <a:ext uri="{FF2B5EF4-FFF2-40B4-BE49-F238E27FC236}">
-                <a16:creationId xmlns="" xmlns:a16="http://schemas.microsoft.com/office/drawing/2014/main" id="{F90CCD6F-1F56-4850-98DF-5DD0EEE3738E}"/>
+                <a16:creationId xmlns:a16="http://schemas.microsoft.com/office/drawing/2014/main" xmlns="" id="{F90CCD6F-1F56-4850-98DF-5DD0EEE3738E}"/>
               </a:ext>
             </a:extLst>
           </p:cNvPr>
@@ -2616,7 +2616,7 @@
           <p:cNvPr id="2" name="Title 1">
             <a:extLst>
               <a:ext uri="{FF2B5EF4-FFF2-40B4-BE49-F238E27FC236}">
-                <a16:creationId xmlns="" xmlns:a16="http://schemas.microsoft.com/office/drawing/2014/main" id="{C3C414C3-8278-4588-933C-78CE8DB9A1BC}"/>
+                <a16:creationId xmlns:a16="http://schemas.microsoft.com/office/drawing/2014/main" xmlns="" id="{C3C414C3-8278-4588-933C-78CE8DB9A1BC}"/>
               </a:ext>
             </a:extLst>
           </p:cNvPr>
@@ -2649,7 +2649,7 @@
           <p:cNvPr id="3" name="Text Placeholder 2">
             <a:extLst>
               <a:ext uri="{FF2B5EF4-FFF2-40B4-BE49-F238E27FC236}">
-                <a16:creationId xmlns="" xmlns:a16="http://schemas.microsoft.com/office/drawing/2014/main" id="{71A200F1-57DD-46A6-A4EE-96E99875E1A2}"/>
+                <a16:creationId xmlns:a16="http://schemas.microsoft.com/office/drawing/2014/main" xmlns="" id="{71A200F1-57DD-46A6-A4EE-96E99875E1A2}"/>
               </a:ext>
             </a:extLst>
           </p:cNvPr>
@@ -2720,7 +2720,7 @@
           <p:cNvPr id="4" name="Content Placeholder 3">
             <a:extLst>
               <a:ext uri="{FF2B5EF4-FFF2-40B4-BE49-F238E27FC236}">
-                <a16:creationId xmlns="" xmlns:a16="http://schemas.microsoft.com/office/drawing/2014/main" id="{75083360-E32C-4B35-9766-9BA6CE824D44}"/>
+                <a16:creationId xmlns:a16="http://schemas.microsoft.com/office/drawing/2014/main" xmlns="" id="{75083360-E32C-4B35-9766-9BA6CE824D44}"/>
               </a:ext>
             </a:extLst>
           </p:cNvPr>
@@ -2782,7 +2782,7 @@
           <p:cNvPr id="5" name="Text Placeholder 4">
             <a:extLst>
               <a:ext uri="{FF2B5EF4-FFF2-40B4-BE49-F238E27FC236}">
-                <a16:creationId xmlns="" xmlns:a16="http://schemas.microsoft.com/office/drawing/2014/main" id="{9C302DCE-0AE3-4442-B76D-919B39B34647}"/>
+                <a16:creationId xmlns:a16="http://schemas.microsoft.com/office/drawing/2014/main" xmlns="" id="{9C302DCE-0AE3-4442-B76D-919B39B34647}"/>
               </a:ext>
             </a:extLst>
           </p:cNvPr>
@@ -2853,7 +2853,7 @@
           <p:cNvPr id="6" name="Content Placeholder 5">
             <a:extLst>
               <a:ext uri="{FF2B5EF4-FFF2-40B4-BE49-F238E27FC236}">
-                <a16:creationId xmlns="" xmlns:a16="http://schemas.microsoft.com/office/drawing/2014/main" id="{860A80C0-6965-48FB-B6A7-3D0F192940A6}"/>
+                <a16:creationId xmlns:a16="http://schemas.microsoft.com/office/drawing/2014/main" xmlns="" id="{860A80C0-6965-48FB-B6A7-3D0F192940A6}"/>
               </a:ext>
             </a:extLst>
           </p:cNvPr>
@@ -2915,7 +2915,7 @@
           <p:cNvPr id="7" name="Date Placeholder 6">
             <a:extLst>
               <a:ext uri="{FF2B5EF4-FFF2-40B4-BE49-F238E27FC236}">
-                <a16:creationId xmlns="" xmlns:a16="http://schemas.microsoft.com/office/drawing/2014/main" id="{FAA6129C-58F2-44B7-A8EB-4F5D1F1A7E66}"/>
+                <a16:creationId xmlns:a16="http://schemas.microsoft.com/office/drawing/2014/main" xmlns="" id="{FAA6129C-58F2-44B7-A8EB-4F5D1F1A7E66}"/>
               </a:ext>
             </a:extLst>
           </p:cNvPr>
@@ -2944,7 +2944,7 @@
           <p:cNvPr id="8" name="Footer Placeholder 7">
             <a:extLst>
               <a:ext uri="{FF2B5EF4-FFF2-40B4-BE49-F238E27FC236}">
-                <a16:creationId xmlns="" xmlns:a16="http://schemas.microsoft.com/office/drawing/2014/main" id="{A6F5F6FD-2BE8-4B93-89BA-8F9D8CF99BB5}"/>
+                <a16:creationId xmlns:a16="http://schemas.microsoft.com/office/drawing/2014/main" xmlns="" id="{A6F5F6FD-2BE8-4B93-89BA-8F9D8CF99BB5}"/>
               </a:ext>
             </a:extLst>
           </p:cNvPr>
@@ -2969,7 +2969,7 @@
           <p:cNvPr id="9" name="Slide Number Placeholder 8">
             <a:extLst>
               <a:ext uri="{FF2B5EF4-FFF2-40B4-BE49-F238E27FC236}">
-                <a16:creationId xmlns="" xmlns:a16="http://schemas.microsoft.com/office/drawing/2014/main" id="{1F59AA36-72EF-4232-BC09-0155524D0938}"/>
+                <a16:creationId xmlns:a16="http://schemas.microsoft.com/office/drawing/2014/main" xmlns="" id="{1F59AA36-72EF-4232-BC09-0155524D0938}"/>
               </a:ext>
             </a:extLst>
           </p:cNvPr>
@@ -3028,7 +3028,7 @@
           <p:cNvPr id="2" name="Title 1">
             <a:extLst>
               <a:ext uri="{FF2B5EF4-FFF2-40B4-BE49-F238E27FC236}">
-                <a16:creationId xmlns="" xmlns:a16="http://schemas.microsoft.com/office/drawing/2014/main" id="{E81D2CF1-816D-48C2-ABCE-F0D1287A86EE}"/>
+                <a16:creationId xmlns:a16="http://schemas.microsoft.com/office/drawing/2014/main" xmlns="" id="{E81D2CF1-816D-48C2-ABCE-F0D1287A86EE}"/>
               </a:ext>
             </a:extLst>
           </p:cNvPr>
@@ -3056,7 +3056,7 @@
           <p:cNvPr id="3" name="Date Placeholder 2">
             <a:extLst>
               <a:ext uri="{FF2B5EF4-FFF2-40B4-BE49-F238E27FC236}">
-                <a16:creationId xmlns="" xmlns:a16="http://schemas.microsoft.com/office/drawing/2014/main" id="{AC9624E7-366F-48BC-B811-C38D8D34F6EF}"/>
+                <a16:creationId xmlns:a16="http://schemas.microsoft.com/office/drawing/2014/main" xmlns="" id="{AC9624E7-366F-48BC-B811-C38D8D34F6EF}"/>
               </a:ext>
             </a:extLst>
           </p:cNvPr>
@@ -3085,7 +3085,7 @@
           <p:cNvPr id="4" name="Footer Placeholder 3">
             <a:extLst>
               <a:ext uri="{FF2B5EF4-FFF2-40B4-BE49-F238E27FC236}">
-                <a16:creationId xmlns="" xmlns:a16="http://schemas.microsoft.com/office/drawing/2014/main" id="{4BC120F3-5F3C-4B89-98B6-984CF95D89C8}"/>
+                <a16:creationId xmlns:a16="http://schemas.microsoft.com/office/drawing/2014/main" xmlns="" id="{4BC120F3-5F3C-4B89-98B6-984CF95D89C8}"/>
               </a:ext>
             </a:extLst>
           </p:cNvPr>
@@ -3110,7 +3110,7 @@
           <p:cNvPr id="5" name="Slide Number Placeholder 4">
             <a:extLst>
               <a:ext uri="{FF2B5EF4-FFF2-40B4-BE49-F238E27FC236}">
-                <a16:creationId xmlns="" xmlns:a16="http://schemas.microsoft.com/office/drawing/2014/main" id="{05D47124-544E-4C80-A43C-2E9B6C999EA9}"/>
+                <a16:creationId xmlns:a16="http://schemas.microsoft.com/office/drawing/2014/main" xmlns="" id="{05D47124-544E-4C80-A43C-2E9B6C999EA9}"/>
               </a:ext>
             </a:extLst>
           </p:cNvPr>
@@ -3169,7 +3169,7 @@
           <p:cNvPr id="2" name="Date Placeholder 1">
             <a:extLst>
               <a:ext uri="{FF2B5EF4-FFF2-40B4-BE49-F238E27FC236}">
-                <a16:creationId xmlns="" xmlns:a16="http://schemas.microsoft.com/office/drawing/2014/main" id="{641D9391-9D60-4076-8F79-DF77CFB04523}"/>
+                <a16:creationId xmlns:a16="http://schemas.microsoft.com/office/drawing/2014/main" xmlns="" id="{641D9391-9D60-4076-8F79-DF77CFB04523}"/>
               </a:ext>
             </a:extLst>
           </p:cNvPr>
@@ -3198,7 +3198,7 @@
           <p:cNvPr id="3" name="Footer Placeholder 2">
             <a:extLst>
               <a:ext uri="{FF2B5EF4-FFF2-40B4-BE49-F238E27FC236}">
-                <a16:creationId xmlns="" xmlns:a16="http://schemas.microsoft.com/office/drawing/2014/main" id="{0E3F688F-5CA7-432F-B591-328DA41C4640}"/>
+                <a16:creationId xmlns:a16="http://schemas.microsoft.com/office/drawing/2014/main" xmlns="" id="{0E3F688F-5CA7-432F-B591-328DA41C4640}"/>
               </a:ext>
             </a:extLst>
           </p:cNvPr>
@@ -3223,7 +3223,7 @@
           <p:cNvPr id="4" name="Slide Number Placeholder 3">
             <a:extLst>
               <a:ext uri="{FF2B5EF4-FFF2-40B4-BE49-F238E27FC236}">
-                <a16:creationId xmlns="" xmlns:a16="http://schemas.microsoft.com/office/drawing/2014/main" id="{9CE96E86-76CD-492C-BDC2-0B211B4A758F}"/>
+                <a16:creationId xmlns:a16="http://schemas.microsoft.com/office/drawing/2014/main" xmlns="" id="{9CE96E86-76CD-492C-BDC2-0B211B4A758F}"/>
               </a:ext>
             </a:extLst>
           </p:cNvPr>
@@ -3282,7 +3282,7 @@
           <p:cNvPr id="2" name="Title 1">
             <a:extLst>
               <a:ext uri="{FF2B5EF4-FFF2-40B4-BE49-F238E27FC236}">
-                <a16:creationId xmlns="" xmlns:a16="http://schemas.microsoft.com/office/drawing/2014/main" id="{7F423E4D-6C40-4DC2-B1DF-B3C0C94E8786}"/>
+                <a16:creationId xmlns:a16="http://schemas.microsoft.com/office/drawing/2014/main" xmlns="" id="{7F423E4D-6C40-4DC2-B1DF-B3C0C94E8786}"/>
               </a:ext>
             </a:extLst>
           </p:cNvPr>
@@ -3319,7 +3319,7 @@
           <p:cNvPr id="3" name="Content Placeholder 2">
             <a:extLst>
               <a:ext uri="{FF2B5EF4-FFF2-40B4-BE49-F238E27FC236}">
-                <a16:creationId xmlns="" xmlns:a16="http://schemas.microsoft.com/office/drawing/2014/main" id="{5548D7BC-A06F-4A7E-AF6A-AEF48F162ACE}"/>
+                <a16:creationId xmlns:a16="http://schemas.microsoft.com/office/drawing/2014/main" xmlns="" id="{5548D7BC-A06F-4A7E-AF6A-AEF48F162ACE}"/>
               </a:ext>
             </a:extLst>
           </p:cNvPr>
@@ -3409,7 +3409,7 @@
           <p:cNvPr id="4" name="Text Placeholder 3">
             <a:extLst>
               <a:ext uri="{FF2B5EF4-FFF2-40B4-BE49-F238E27FC236}">
-                <a16:creationId xmlns="" xmlns:a16="http://schemas.microsoft.com/office/drawing/2014/main" id="{365731FF-334D-4CE5-9EC6-DD57EFD0CE6C}"/>
+                <a16:creationId xmlns:a16="http://schemas.microsoft.com/office/drawing/2014/main" xmlns="" id="{365731FF-334D-4CE5-9EC6-DD57EFD0CE6C}"/>
               </a:ext>
             </a:extLst>
           </p:cNvPr>
@@ -3480,7 +3480,7 @@
           <p:cNvPr id="5" name="Date Placeholder 4">
             <a:extLst>
               <a:ext uri="{FF2B5EF4-FFF2-40B4-BE49-F238E27FC236}">
-                <a16:creationId xmlns="" xmlns:a16="http://schemas.microsoft.com/office/drawing/2014/main" id="{941E5FD8-3FAA-42DC-B8EB-F27BE66BD2AF}"/>
+                <a16:creationId xmlns:a16="http://schemas.microsoft.com/office/drawing/2014/main" xmlns="" id="{941E5FD8-3FAA-42DC-B8EB-F27BE66BD2AF}"/>
               </a:ext>
             </a:extLst>
           </p:cNvPr>
@@ -3509,7 +3509,7 @@
           <p:cNvPr id="6" name="Footer Placeholder 5">
             <a:extLst>
               <a:ext uri="{FF2B5EF4-FFF2-40B4-BE49-F238E27FC236}">
-                <a16:creationId xmlns="" xmlns:a16="http://schemas.microsoft.com/office/drawing/2014/main" id="{63C37809-3388-4A1D-B1D2-743B93135834}"/>
+                <a16:creationId xmlns:a16="http://schemas.microsoft.com/office/drawing/2014/main" xmlns="" id="{63C37809-3388-4A1D-B1D2-743B93135834}"/>
               </a:ext>
             </a:extLst>
           </p:cNvPr>
@@ -3534,7 +3534,7 @@
           <p:cNvPr id="7" name="Slide Number Placeholder 6">
             <a:extLst>
               <a:ext uri="{FF2B5EF4-FFF2-40B4-BE49-F238E27FC236}">
-                <a16:creationId xmlns="" xmlns:a16="http://schemas.microsoft.com/office/drawing/2014/main" id="{5E5C9D74-8181-4410-BBA3-7261D943FAFC}"/>
+                <a16:creationId xmlns:a16="http://schemas.microsoft.com/office/drawing/2014/main" xmlns="" id="{5E5C9D74-8181-4410-BBA3-7261D943FAFC}"/>
               </a:ext>
             </a:extLst>
           </p:cNvPr>
@@ -3593,7 +3593,7 @@
           <p:cNvPr id="2" name="Title 1">
             <a:extLst>
               <a:ext uri="{FF2B5EF4-FFF2-40B4-BE49-F238E27FC236}">
-                <a16:creationId xmlns="" xmlns:a16="http://schemas.microsoft.com/office/drawing/2014/main" id="{B661A0EF-4640-4EF6-A916-A1C1D59C7345}"/>
+                <a16:creationId xmlns:a16="http://schemas.microsoft.com/office/drawing/2014/main" xmlns="" id="{B661A0EF-4640-4EF6-A916-A1C1D59C7345}"/>
               </a:ext>
             </a:extLst>
           </p:cNvPr>
@@ -3630,7 +3630,7 @@
           <p:cNvPr id="3" name="Picture Placeholder 2">
             <a:extLst>
               <a:ext uri="{FF2B5EF4-FFF2-40B4-BE49-F238E27FC236}">
-                <a16:creationId xmlns="" xmlns:a16="http://schemas.microsoft.com/office/drawing/2014/main" id="{81CA8A45-1AAC-49D1-9E71-D973BEB1A220}"/>
+                <a16:creationId xmlns:a16="http://schemas.microsoft.com/office/drawing/2014/main" xmlns="" id="{81CA8A45-1AAC-49D1-9E71-D973BEB1A220}"/>
               </a:ext>
             </a:extLst>
           </p:cNvPr>
@@ -3697,7 +3697,7 @@
           <p:cNvPr id="4" name="Text Placeholder 3">
             <a:extLst>
               <a:ext uri="{FF2B5EF4-FFF2-40B4-BE49-F238E27FC236}">
-                <a16:creationId xmlns="" xmlns:a16="http://schemas.microsoft.com/office/drawing/2014/main" id="{1BBED5FC-EAD8-4BBB-AFD6-F031672AE133}"/>
+                <a16:creationId xmlns:a16="http://schemas.microsoft.com/office/drawing/2014/main" xmlns="" id="{1BBED5FC-EAD8-4BBB-AFD6-F031672AE133}"/>
               </a:ext>
             </a:extLst>
           </p:cNvPr>
@@ -3768,7 +3768,7 @@
           <p:cNvPr id="5" name="Date Placeholder 4">
             <a:extLst>
               <a:ext uri="{FF2B5EF4-FFF2-40B4-BE49-F238E27FC236}">
-                <a16:creationId xmlns="" xmlns:a16="http://schemas.microsoft.com/office/drawing/2014/main" id="{E89FBE54-B46E-4C19-8C0D-267CD05DB014}"/>
+                <a16:creationId xmlns:a16="http://schemas.microsoft.com/office/drawing/2014/main" xmlns="" id="{E89FBE54-B46E-4C19-8C0D-267CD05DB014}"/>
               </a:ext>
             </a:extLst>
           </p:cNvPr>
@@ -3797,7 +3797,7 @@
           <p:cNvPr id="6" name="Footer Placeholder 5">
             <a:extLst>
               <a:ext uri="{FF2B5EF4-FFF2-40B4-BE49-F238E27FC236}">
-                <a16:creationId xmlns="" xmlns:a16="http://schemas.microsoft.com/office/drawing/2014/main" id="{B6E0C9C3-4DB8-4258-97FC-8416E1E5474F}"/>
+                <a16:creationId xmlns:a16="http://schemas.microsoft.com/office/drawing/2014/main" xmlns="" id="{B6E0C9C3-4DB8-4258-97FC-8416E1E5474F}"/>
               </a:ext>
             </a:extLst>
           </p:cNvPr>
@@ -3822,7 +3822,7 @@
           <p:cNvPr id="7" name="Slide Number Placeholder 6">
             <a:extLst>
               <a:ext uri="{FF2B5EF4-FFF2-40B4-BE49-F238E27FC236}">
-                <a16:creationId xmlns="" xmlns:a16="http://schemas.microsoft.com/office/drawing/2014/main" id="{593932B1-FCA9-4C15-A951-EA0A956F20CB}"/>
+                <a16:creationId xmlns:a16="http://schemas.microsoft.com/office/drawing/2014/main" xmlns="" id="{593932B1-FCA9-4C15-A951-EA0A956F20CB}"/>
               </a:ext>
             </a:extLst>
           </p:cNvPr>
@@ -3886,7 +3886,7 @@
           <p:cNvPr id="2" name="Title Placeholder 1">
             <a:extLst>
               <a:ext uri="{FF2B5EF4-FFF2-40B4-BE49-F238E27FC236}">
-                <a16:creationId xmlns="" xmlns:a16="http://schemas.microsoft.com/office/drawing/2014/main" id="{7C0C664C-58A9-46A0-9CC1-0EEDE6285BFF}"/>
+                <a16:creationId xmlns:a16="http://schemas.microsoft.com/office/drawing/2014/main" xmlns="" id="{7C0C664C-58A9-46A0-9CC1-0EEDE6285BFF}"/>
               </a:ext>
             </a:extLst>
           </p:cNvPr>
@@ -3924,7 +3924,7 @@
           <p:cNvPr id="3" name="Text Placeholder 2">
             <a:extLst>
               <a:ext uri="{FF2B5EF4-FFF2-40B4-BE49-F238E27FC236}">
-                <a16:creationId xmlns="" xmlns:a16="http://schemas.microsoft.com/office/drawing/2014/main" id="{65562DF5-BE86-4DB8-9E27-E4F718173D1B}"/>
+                <a16:creationId xmlns:a16="http://schemas.microsoft.com/office/drawing/2014/main" xmlns="" id="{65562DF5-BE86-4DB8-9E27-E4F718173D1B}"/>
               </a:ext>
             </a:extLst>
           </p:cNvPr>
@@ -3991,7 +3991,7 @@
           <p:cNvPr id="4" name="Date Placeholder 3">
             <a:extLst>
               <a:ext uri="{FF2B5EF4-FFF2-40B4-BE49-F238E27FC236}">
-                <a16:creationId xmlns="" xmlns:a16="http://schemas.microsoft.com/office/drawing/2014/main" id="{DDA4EFC7-3387-4CAF-889C-4C468A0A1E5B}"/>
+                <a16:creationId xmlns:a16="http://schemas.microsoft.com/office/drawing/2014/main" xmlns="" id="{DDA4EFC7-3387-4CAF-889C-4C468A0A1E5B}"/>
               </a:ext>
             </a:extLst>
           </p:cNvPr>
@@ -4038,7 +4038,7 @@
           <p:cNvPr id="5" name="Footer Placeholder 4">
             <a:extLst>
               <a:ext uri="{FF2B5EF4-FFF2-40B4-BE49-F238E27FC236}">
-                <a16:creationId xmlns="" xmlns:a16="http://schemas.microsoft.com/office/drawing/2014/main" id="{37275286-A5F9-4A85-B019-61F07876BEAF}"/>
+                <a16:creationId xmlns:a16="http://schemas.microsoft.com/office/drawing/2014/main" xmlns="" id="{37275286-A5F9-4A85-B019-61F07876BEAF}"/>
               </a:ext>
             </a:extLst>
           </p:cNvPr>
@@ -4081,7 +4081,7 @@
           <p:cNvPr id="6" name="Slide Number Placeholder 5">
             <a:extLst>
               <a:ext uri="{FF2B5EF4-FFF2-40B4-BE49-F238E27FC236}">
-                <a16:creationId xmlns="" xmlns:a16="http://schemas.microsoft.com/office/drawing/2014/main" id="{AF635EAA-95A3-4DE3-A775-A7F3B84FB9B8}"/>
+                <a16:creationId xmlns:a16="http://schemas.microsoft.com/office/drawing/2014/main" xmlns="" id="{AF635EAA-95A3-4DE3-A775-A7F3B84FB9B8}"/>
               </a:ext>
             </a:extLst>
           </p:cNvPr>
@@ -4457,7 +4457,7 @@
           <p:cNvPr id="4" name="Rectangle 3">
             <a:extLst>
               <a:ext uri="{FF2B5EF4-FFF2-40B4-BE49-F238E27FC236}">
-                <a16:creationId xmlns="" xmlns:a16="http://schemas.microsoft.com/office/drawing/2014/main" id="{3263A579-F937-472F-BAC8-0F6DBD133059}"/>
+                <a16:creationId xmlns:a16="http://schemas.microsoft.com/office/drawing/2014/main" xmlns="" id="{3263A579-F937-472F-BAC8-0F6DBD133059}"/>
               </a:ext>
             </a:extLst>
           </p:cNvPr>
@@ -4835,7 +4835,7 @@
           <p:cNvPr id="6" name="Flowchart: Terminator 5">
             <a:extLst>
               <a:ext uri="{FF2B5EF4-FFF2-40B4-BE49-F238E27FC236}">
-                <a16:creationId xmlns="" xmlns:a16="http://schemas.microsoft.com/office/drawing/2014/main" id="{BC26BFB4-0829-4EF7-B551-E33F9117E645}"/>
+                <a16:creationId xmlns:a16="http://schemas.microsoft.com/office/drawing/2014/main" xmlns="" id="{BC26BFB4-0829-4EF7-B551-E33F9117E645}"/>
               </a:ext>
             </a:extLst>
           </p:cNvPr>
@@ -4893,7 +4893,7 @@
           <p:cNvPr id="45" name="Rectangle: Rounded Corners 44">
             <a:extLst>
               <a:ext uri="{FF2B5EF4-FFF2-40B4-BE49-F238E27FC236}">
-                <a16:creationId xmlns="" xmlns:a16="http://schemas.microsoft.com/office/drawing/2014/main" id="{382337C1-3DAB-4E1C-A8B6-4AA16C3410CE}"/>
+                <a16:creationId xmlns:a16="http://schemas.microsoft.com/office/drawing/2014/main" xmlns="" id="{382337C1-3DAB-4E1C-A8B6-4AA16C3410CE}"/>
               </a:ext>
             </a:extLst>
           </p:cNvPr>
@@ -5045,7 +5045,7 @@
           <p:cNvPr id="46" name="Rectangle: Rounded Corners 45">
             <a:extLst>
               <a:ext uri="{FF2B5EF4-FFF2-40B4-BE49-F238E27FC236}">
-                <a16:creationId xmlns="" xmlns:a16="http://schemas.microsoft.com/office/drawing/2014/main" id="{4369A102-1733-46FB-85EB-77C0CAB96BEB}"/>
+                <a16:creationId xmlns:a16="http://schemas.microsoft.com/office/drawing/2014/main" xmlns="" id="{4369A102-1733-46FB-85EB-77C0CAB96BEB}"/>
               </a:ext>
             </a:extLst>
           </p:cNvPr>
@@ -5295,7 +5295,7 @@
           <p:cNvPr id="70" name="Group 69">
             <a:extLst>
               <a:ext uri="{FF2B5EF4-FFF2-40B4-BE49-F238E27FC236}">
-                <a16:creationId xmlns="" xmlns:a16="http://schemas.microsoft.com/office/drawing/2014/main" id="{03E82210-D12A-4472-8E82-5C642547A5AD}"/>
+                <a16:creationId xmlns:a16="http://schemas.microsoft.com/office/drawing/2014/main" xmlns="" id="{03E82210-D12A-4472-8E82-5C642547A5AD}"/>
               </a:ext>
             </a:extLst>
           </p:cNvPr>
@@ -5315,7 +5315,7 @@
             <p:cNvPr id="49" name="Arrow: Down 48">
               <a:extLst>
                 <a:ext uri="{FF2B5EF4-FFF2-40B4-BE49-F238E27FC236}">
-                  <a16:creationId xmlns="" xmlns:a16="http://schemas.microsoft.com/office/drawing/2014/main" id="{3B31D1CB-EE12-4C30-9755-0315B7051AAC}"/>
+                  <a16:creationId xmlns:a16="http://schemas.microsoft.com/office/drawing/2014/main" xmlns="" id="{3B31D1CB-EE12-4C30-9755-0315B7051AAC}"/>
                 </a:ext>
               </a:extLst>
             </p:cNvPr>
@@ -5361,7 +5361,7 @@
             <p:cNvPr id="50" name="Arrow: Down 49">
               <a:extLst>
                 <a:ext uri="{FF2B5EF4-FFF2-40B4-BE49-F238E27FC236}">
-                  <a16:creationId xmlns="" xmlns:a16="http://schemas.microsoft.com/office/drawing/2014/main" id="{4CC7C068-0CD8-48B4-8CCB-6BAC503024B1}"/>
+                  <a16:creationId xmlns:a16="http://schemas.microsoft.com/office/drawing/2014/main" xmlns="" id="{4CC7C068-0CD8-48B4-8CCB-6BAC503024B1}"/>
                 </a:ext>
               </a:extLst>
             </p:cNvPr>
@@ -5407,7 +5407,7 @@
             <p:cNvPr id="56" name="Arrow: Down 55">
               <a:extLst>
                 <a:ext uri="{FF2B5EF4-FFF2-40B4-BE49-F238E27FC236}">
-                  <a16:creationId xmlns="" xmlns:a16="http://schemas.microsoft.com/office/drawing/2014/main" id="{08705A44-8E76-40A6-9AEF-3E38498993A3}"/>
+                  <a16:creationId xmlns:a16="http://schemas.microsoft.com/office/drawing/2014/main" xmlns="" id="{08705A44-8E76-40A6-9AEF-3E38498993A3}"/>
                 </a:ext>
               </a:extLst>
             </p:cNvPr>
@@ -5453,7 +5453,7 @@
             <p:cNvPr id="58" name="Arrow: Down 57">
               <a:extLst>
                 <a:ext uri="{FF2B5EF4-FFF2-40B4-BE49-F238E27FC236}">
-                  <a16:creationId xmlns="" xmlns:a16="http://schemas.microsoft.com/office/drawing/2014/main" id="{6F9F05EB-A54D-4318-88A2-04FBDC868428}"/>
+                  <a16:creationId xmlns:a16="http://schemas.microsoft.com/office/drawing/2014/main" xmlns="" id="{6F9F05EB-A54D-4318-88A2-04FBDC868428}"/>
                 </a:ext>
               </a:extLst>
             </p:cNvPr>
@@ -5499,7 +5499,7 @@
             <p:cNvPr id="60" name="Arrow: Down 59">
               <a:extLst>
                 <a:ext uri="{FF2B5EF4-FFF2-40B4-BE49-F238E27FC236}">
-                  <a16:creationId xmlns="" xmlns:a16="http://schemas.microsoft.com/office/drawing/2014/main" id="{A048F72C-C2B7-4E3D-AE7F-6909FE6D260C}"/>
+                  <a16:creationId xmlns:a16="http://schemas.microsoft.com/office/drawing/2014/main" xmlns="" id="{A048F72C-C2B7-4E3D-AE7F-6909FE6D260C}"/>
                 </a:ext>
               </a:extLst>
             </p:cNvPr>
@@ -5545,7 +5545,7 @@
             <p:cNvPr id="61" name="Arrow: Down 60">
               <a:extLst>
                 <a:ext uri="{FF2B5EF4-FFF2-40B4-BE49-F238E27FC236}">
-                  <a16:creationId xmlns="" xmlns:a16="http://schemas.microsoft.com/office/drawing/2014/main" id="{A7694F96-6FA9-4070-811F-859DE3C6C575}"/>
+                  <a16:creationId xmlns:a16="http://schemas.microsoft.com/office/drawing/2014/main" xmlns="" id="{A7694F96-6FA9-4070-811F-859DE3C6C575}"/>
                 </a:ext>
               </a:extLst>
             </p:cNvPr>
@@ -5592,7 +5592,7 @@
           <p:cNvPr id="69" name="Group 68">
             <a:extLst>
               <a:ext uri="{FF2B5EF4-FFF2-40B4-BE49-F238E27FC236}">
-                <a16:creationId xmlns="" xmlns:a16="http://schemas.microsoft.com/office/drawing/2014/main" id="{3065794C-32D8-4296-9C9A-EFC920F7B83A}"/>
+                <a16:creationId xmlns:a16="http://schemas.microsoft.com/office/drawing/2014/main" xmlns="" id="{3065794C-32D8-4296-9C9A-EFC920F7B83A}"/>
               </a:ext>
             </a:extLst>
           </p:cNvPr>
@@ -5612,7 +5612,7 @@
             <p:cNvPr id="51" name="Arrow: Down 50">
               <a:extLst>
                 <a:ext uri="{FF2B5EF4-FFF2-40B4-BE49-F238E27FC236}">
-                  <a16:creationId xmlns="" xmlns:a16="http://schemas.microsoft.com/office/drawing/2014/main" id="{B06F4C8A-27C8-401F-9C7F-ACE6014CB994}"/>
+                  <a16:creationId xmlns:a16="http://schemas.microsoft.com/office/drawing/2014/main" xmlns="" id="{B06F4C8A-27C8-401F-9C7F-ACE6014CB994}"/>
                 </a:ext>
               </a:extLst>
             </p:cNvPr>
@@ -5658,7 +5658,7 @@
             <p:cNvPr id="52" name="Arrow: Down 51">
               <a:extLst>
                 <a:ext uri="{FF2B5EF4-FFF2-40B4-BE49-F238E27FC236}">
-                  <a16:creationId xmlns="" xmlns:a16="http://schemas.microsoft.com/office/drawing/2014/main" id="{3F6578B2-F999-412C-9C07-3C6816BF840C}"/>
+                  <a16:creationId xmlns:a16="http://schemas.microsoft.com/office/drawing/2014/main" xmlns="" id="{3F6578B2-F999-412C-9C07-3C6816BF840C}"/>
                 </a:ext>
               </a:extLst>
             </p:cNvPr>
@@ -5704,7 +5704,7 @@
             <p:cNvPr id="53" name="Arrow: Down 52">
               <a:extLst>
                 <a:ext uri="{FF2B5EF4-FFF2-40B4-BE49-F238E27FC236}">
-                  <a16:creationId xmlns="" xmlns:a16="http://schemas.microsoft.com/office/drawing/2014/main" id="{450EE119-954E-44FE-B4A3-B3DB96644AB9}"/>
+                  <a16:creationId xmlns:a16="http://schemas.microsoft.com/office/drawing/2014/main" xmlns="" id="{450EE119-954E-44FE-B4A3-B3DB96644AB9}"/>
                 </a:ext>
               </a:extLst>
             </p:cNvPr>
@@ -5750,7 +5750,7 @@
             <p:cNvPr id="54" name="Arrow: Down 53">
               <a:extLst>
                 <a:ext uri="{FF2B5EF4-FFF2-40B4-BE49-F238E27FC236}">
-                  <a16:creationId xmlns="" xmlns:a16="http://schemas.microsoft.com/office/drawing/2014/main" id="{A185CF80-D658-411D-BF04-97A9C0FDCFD4}"/>
+                  <a16:creationId xmlns:a16="http://schemas.microsoft.com/office/drawing/2014/main" xmlns="" id="{A185CF80-D658-411D-BF04-97A9C0FDCFD4}"/>
                 </a:ext>
               </a:extLst>
             </p:cNvPr>
@@ -5796,7 +5796,7 @@
             <p:cNvPr id="55" name="Arrow: Down 54">
               <a:extLst>
                 <a:ext uri="{FF2B5EF4-FFF2-40B4-BE49-F238E27FC236}">
-                  <a16:creationId xmlns="" xmlns:a16="http://schemas.microsoft.com/office/drawing/2014/main" id="{305D5E87-D088-4E16-9AAA-9B61A0231F86}"/>
+                  <a16:creationId xmlns:a16="http://schemas.microsoft.com/office/drawing/2014/main" xmlns="" id="{305D5E87-D088-4E16-9AAA-9B61A0231F86}"/>
                 </a:ext>
               </a:extLst>
             </p:cNvPr>
@@ -5842,7 +5842,7 @@
             <p:cNvPr id="57" name="Arrow: Down 56">
               <a:extLst>
                 <a:ext uri="{FF2B5EF4-FFF2-40B4-BE49-F238E27FC236}">
-                  <a16:creationId xmlns="" xmlns:a16="http://schemas.microsoft.com/office/drawing/2014/main" id="{BB4A2EA1-8C7C-4D6C-BC70-96B197B76702}"/>
+                  <a16:creationId xmlns:a16="http://schemas.microsoft.com/office/drawing/2014/main" xmlns="" id="{BB4A2EA1-8C7C-4D6C-BC70-96B197B76702}"/>
                 </a:ext>
               </a:extLst>
             </p:cNvPr>
@@ -5888,7 +5888,7 @@
             <p:cNvPr id="62" name="Arrow: Down 61">
               <a:extLst>
                 <a:ext uri="{FF2B5EF4-FFF2-40B4-BE49-F238E27FC236}">
-                  <a16:creationId xmlns="" xmlns:a16="http://schemas.microsoft.com/office/drawing/2014/main" id="{21AE7CA0-F8AF-4ECD-8916-5286110EECC3}"/>
+                  <a16:creationId xmlns:a16="http://schemas.microsoft.com/office/drawing/2014/main" xmlns="" id="{21AE7CA0-F8AF-4ECD-8916-5286110EECC3}"/>
                 </a:ext>
               </a:extLst>
             </p:cNvPr>
@@ -5934,7 +5934,7 @@
             <p:cNvPr id="63" name="Arrow: Down 62">
               <a:extLst>
                 <a:ext uri="{FF2B5EF4-FFF2-40B4-BE49-F238E27FC236}">
-                  <a16:creationId xmlns="" xmlns:a16="http://schemas.microsoft.com/office/drawing/2014/main" id="{751F3152-1F2D-4A6E-A117-0416A26B03AA}"/>
+                  <a16:creationId xmlns:a16="http://schemas.microsoft.com/office/drawing/2014/main" xmlns="" id="{751F3152-1F2D-4A6E-A117-0416A26B03AA}"/>
                 </a:ext>
               </a:extLst>
             </p:cNvPr>
@@ -5980,7 +5980,7 @@
             <p:cNvPr id="64" name="Arrow: Down 63">
               <a:extLst>
                 <a:ext uri="{FF2B5EF4-FFF2-40B4-BE49-F238E27FC236}">
-                  <a16:creationId xmlns="" xmlns:a16="http://schemas.microsoft.com/office/drawing/2014/main" id="{807E50BC-DEF8-4CE2-A25C-A4DFC88D14A0}"/>
+                  <a16:creationId xmlns:a16="http://schemas.microsoft.com/office/drawing/2014/main" xmlns="" id="{807E50BC-DEF8-4CE2-A25C-A4DFC88D14A0}"/>
                 </a:ext>
               </a:extLst>
             </p:cNvPr>
@@ -6026,7 +6026,7 @@
             <p:cNvPr id="65" name="Arrow: Down 64">
               <a:extLst>
                 <a:ext uri="{FF2B5EF4-FFF2-40B4-BE49-F238E27FC236}">
-                  <a16:creationId xmlns="" xmlns:a16="http://schemas.microsoft.com/office/drawing/2014/main" id="{5569AB8E-DA9B-4319-BB74-F7B35ED9C963}"/>
+                  <a16:creationId xmlns:a16="http://schemas.microsoft.com/office/drawing/2014/main" xmlns="" id="{5569AB8E-DA9B-4319-BB74-F7B35ED9C963}"/>
                 </a:ext>
               </a:extLst>
             </p:cNvPr>
@@ -6072,7 +6072,7 @@
             <p:cNvPr id="66" name="Arrow: Down 65">
               <a:extLst>
                 <a:ext uri="{FF2B5EF4-FFF2-40B4-BE49-F238E27FC236}">
-                  <a16:creationId xmlns="" xmlns:a16="http://schemas.microsoft.com/office/drawing/2014/main" id="{4FF32172-E710-4741-8DB4-EB4A9F2D3C59}"/>
+                  <a16:creationId xmlns:a16="http://schemas.microsoft.com/office/drawing/2014/main" xmlns="" id="{4FF32172-E710-4741-8DB4-EB4A9F2D3C59}"/>
                 </a:ext>
               </a:extLst>
             </p:cNvPr>
@@ -6118,7 +6118,7 @@
             <p:cNvPr id="67" name="Arrow: Down 66">
               <a:extLst>
                 <a:ext uri="{FF2B5EF4-FFF2-40B4-BE49-F238E27FC236}">
-                  <a16:creationId xmlns="" xmlns:a16="http://schemas.microsoft.com/office/drawing/2014/main" id="{3AFFA1E1-8DAA-4BA0-88A8-91731D3A12CC}"/>
+                  <a16:creationId xmlns:a16="http://schemas.microsoft.com/office/drawing/2014/main" xmlns="" id="{3AFFA1E1-8DAA-4BA0-88A8-91731D3A12CC}"/>
                 </a:ext>
               </a:extLst>
             </p:cNvPr>
@@ -6164,7 +6164,7 @@
             <p:cNvPr id="68" name="Arrow: Down 67">
               <a:extLst>
                 <a:ext uri="{FF2B5EF4-FFF2-40B4-BE49-F238E27FC236}">
-                  <a16:creationId xmlns="" xmlns:a16="http://schemas.microsoft.com/office/drawing/2014/main" id="{4AF4710B-7AD0-4B1D-8526-591AB2625845}"/>
+                  <a16:creationId xmlns:a16="http://schemas.microsoft.com/office/drawing/2014/main" xmlns="" id="{4AF4710B-7AD0-4B1D-8526-591AB2625845}"/>
                 </a:ext>
               </a:extLst>
             </p:cNvPr>
@@ -6211,7 +6211,7 @@
           <p:cNvPr id="71" name="Rectangle: Rounded Corners 70">
             <a:extLst>
               <a:ext uri="{FF2B5EF4-FFF2-40B4-BE49-F238E27FC236}">
-                <a16:creationId xmlns="" xmlns:a16="http://schemas.microsoft.com/office/drawing/2014/main" id="{5F7A2BB6-CE87-4F3B-A640-9373397F480A}"/>
+                <a16:creationId xmlns:a16="http://schemas.microsoft.com/office/drawing/2014/main" xmlns="" id="{5F7A2BB6-CE87-4F3B-A640-9373397F480A}"/>
               </a:ext>
             </a:extLst>
           </p:cNvPr>
@@ -6391,7 +6391,7 @@
           <p:cNvPr id="80" name="Group 79">
             <a:extLst>
               <a:ext uri="{FF2B5EF4-FFF2-40B4-BE49-F238E27FC236}">
-                <a16:creationId xmlns="" xmlns:a16="http://schemas.microsoft.com/office/drawing/2014/main" id="{9C240103-050A-4695-BF9F-5537C248F66A}"/>
+                <a16:creationId xmlns:a16="http://schemas.microsoft.com/office/drawing/2014/main" xmlns="" id="{9C240103-050A-4695-BF9F-5537C248F66A}"/>
               </a:ext>
             </a:extLst>
           </p:cNvPr>
@@ -6411,7 +6411,7 @@
             <p:cNvPr id="72" name="Oval 71">
               <a:extLst>
                 <a:ext uri="{FF2B5EF4-FFF2-40B4-BE49-F238E27FC236}">
-                  <a16:creationId xmlns="" xmlns:a16="http://schemas.microsoft.com/office/drawing/2014/main" id="{72173DFC-7F98-4DB4-B138-D097FF7B3FD7}"/>
+                  <a16:creationId xmlns:a16="http://schemas.microsoft.com/office/drawing/2014/main" xmlns="" id="{72173DFC-7F98-4DB4-B138-D097FF7B3FD7}"/>
                 </a:ext>
               </a:extLst>
             </p:cNvPr>
@@ -6457,7 +6457,7 @@
             <p:cNvPr id="73" name="Oval 72">
               <a:extLst>
                 <a:ext uri="{FF2B5EF4-FFF2-40B4-BE49-F238E27FC236}">
-                  <a16:creationId xmlns="" xmlns:a16="http://schemas.microsoft.com/office/drawing/2014/main" id="{5EAF5F0D-D560-4D91-87F0-B88A371197A7}"/>
+                  <a16:creationId xmlns:a16="http://schemas.microsoft.com/office/drawing/2014/main" xmlns="" id="{5EAF5F0D-D560-4D91-87F0-B88A371197A7}"/>
                 </a:ext>
               </a:extLst>
             </p:cNvPr>
@@ -6503,7 +6503,7 @@
             <p:cNvPr id="74" name="Oval 73">
               <a:extLst>
                 <a:ext uri="{FF2B5EF4-FFF2-40B4-BE49-F238E27FC236}">
-                  <a16:creationId xmlns="" xmlns:a16="http://schemas.microsoft.com/office/drawing/2014/main" id="{6E325FF1-3D01-4062-A828-C83B2E9C2E01}"/>
+                  <a16:creationId xmlns:a16="http://schemas.microsoft.com/office/drawing/2014/main" xmlns="" id="{6E325FF1-3D01-4062-A828-C83B2E9C2E01}"/>
                 </a:ext>
               </a:extLst>
             </p:cNvPr>
@@ -6549,7 +6549,7 @@
             <p:cNvPr id="75" name="Oval 74">
               <a:extLst>
                 <a:ext uri="{FF2B5EF4-FFF2-40B4-BE49-F238E27FC236}">
-                  <a16:creationId xmlns="" xmlns:a16="http://schemas.microsoft.com/office/drawing/2014/main" id="{041CAB99-80D9-49CB-961D-7B48F675860D}"/>
+                  <a16:creationId xmlns:a16="http://schemas.microsoft.com/office/drawing/2014/main" xmlns="" id="{041CAB99-80D9-49CB-961D-7B48F675860D}"/>
                 </a:ext>
               </a:extLst>
             </p:cNvPr>
@@ -6595,7 +6595,7 @@
             <p:cNvPr id="76" name="Oval 75">
               <a:extLst>
                 <a:ext uri="{FF2B5EF4-FFF2-40B4-BE49-F238E27FC236}">
-                  <a16:creationId xmlns="" xmlns:a16="http://schemas.microsoft.com/office/drawing/2014/main" id="{0831FE5F-41A6-4901-A63B-4B4D462CBFF8}"/>
+                  <a16:creationId xmlns:a16="http://schemas.microsoft.com/office/drawing/2014/main" xmlns="" id="{0831FE5F-41A6-4901-A63B-4B4D462CBFF8}"/>
                 </a:ext>
               </a:extLst>
             </p:cNvPr>
@@ -6641,7 +6641,7 @@
             <p:cNvPr id="77" name="Oval 76">
               <a:extLst>
                 <a:ext uri="{FF2B5EF4-FFF2-40B4-BE49-F238E27FC236}">
-                  <a16:creationId xmlns="" xmlns:a16="http://schemas.microsoft.com/office/drawing/2014/main" id="{20E7703C-2A7D-4793-9329-B009C393EF66}"/>
+                  <a16:creationId xmlns:a16="http://schemas.microsoft.com/office/drawing/2014/main" xmlns="" id="{20E7703C-2A7D-4793-9329-B009C393EF66}"/>
                 </a:ext>
               </a:extLst>
             </p:cNvPr>
@@ -6687,7 +6687,7 @@
             <p:cNvPr id="78" name="Oval 77">
               <a:extLst>
                 <a:ext uri="{FF2B5EF4-FFF2-40B4-BE49-F238E27FC236}">
-                  <a16:creationId xmlns="" xmlns:a16="http://schemas.microsoft.com/office/drawing/2014/main" id="{D5806448-D69B-446D-AB6C-3D9967150298}"/>
+                  <a16:creationId xmlns:a16="http://schemas.microsoft.com/office/drawing/2014/main" xmlns="" id="{D5806448-D69B-446D-AB6C-3D9967150298}"/>
                 </a:ext>
               </a:extLst>
             </p:cNvPr>
@@ -6733,7 +6733,7 @@
             <p:cNvPr id="79" name="Oval 78">
               <a:extLst>
                 <a:ext uri="{FF2B5EF4-FFF2-40B4-BE49-F238E27FC236}">
-                  <a16:creationId xmlns="" xmlns:a16="http://schemas.microsoft.com/office/drawing/2014/main" id="{80035BDB-E69C-4D0D-9A50-0249359E0168}"/>
+                  <a16:creationId xmlns:a16="http://schemas.microsoft.com/office/drawing/2014/main" xmlns="" id="{80035BDB-E69C-4D0D-9A50-0249359E0168}"/>
                 </a:ext>
               </a:extLst>
             </p:cNvPr>
@@ -6818,7 +6818,7 @@
           <p:cNvPr id="4" name="Rectangle 3">
             <a:extLst>
               <a:ext uri="{FF2B5EF4-FFF2-40B4-BE49-F238E27FC236}">
-                <a16:creationId xmlns="" xmlns:a16="http://schemas.microsoft.com/office/drawing/2014/main" id="{3263A579-F937-472F-BAC8-0F6DBD133059}"/>
+                <a16:creationId xmlns:a16="http://schemas.microsoft.com/office/drawing/2014/main" xmlns="" id="{3263A579-F937-472F-BAC8-0F6DBD133059}"/>
               </a:ext>
             </a:extLst>
           </p:cNvPr>
@@ -7204,7 +7204,7 @@
           <p:cNvPr id="6" name="Flowchart: Terminator 5">
             <a:extLst>
               <a:ext uri="{FF2B5EF4-FFF2-40B4-BE49-F238E27FC236}">
-                <a16:creationId xmlns="" xmlns:a16="http://schemas.microsoft.com/office/drawing/2014/main" id="{BC26BFB4-0829-4EF7-B551-E33F9117E645}"/>
+                <a16:creationId xmlns:a16="http://schemas.microsoft.com/office/drawing/2014/main" xmlns="" id="{BC26BFB4-0829-4EF7-B551-E33F9117E645}"/>
               </a:ext>
             </a:extLst>
           </p:cNvPr>
@@ -7262,7 +7262,7 @@
           <p:cNvPr id="12" name="Rectangle: Rounded Corners 11">
             <a:extLst>
               <a:ext uri="{FF2B5EF4-FFF2-40B4-BE49-F238E27FC236}">
-                <a16:creationId xmlns="" xmlns:a16="http://schemas.microsoft.com/office/drawing/2014/main" id="{C9F7093C-C50F-438A-839F-B4C8765447D9}"/>
+                <a16:creationId xmlns:a16="http://schemas.microsoft.com/office/drawing/2014/main" xmlns="" id="{C9F7093C-C50F-438A-839F-B4C8765447D9}"/>
               </a:ext>
             </a:extLst>
           </p:cNvPr>
@@ -7312,7 +7312,7 @@
           <p:cNvPr id="16" name="Rectangle: Rounded Corners 15">
             <a:extLst>
               <a:ext uri="{FF2B5EF4-FFF2-40B4-BE49-F238E27FC236}">
-                <a16:creationId xmlns="" xmlns:a16="http://schemas.microsoft.com/office/drawing/2014/main" id="{D7EEB2C4-B890-4392-A7C8-E0EC180B599F}"/>
+                <a16:creationId xmlns:a16="http://schemas.microsoft.com/office/drawing/2014/main" xmlns="" id="{D7EEB2C4-B890-4392-A7C8-E0EC180B599F}"/>
               </a:ext>
             </a:extLst>
           </p:cNvPr>
@@ -7369,7 +7369,7 @@
           <p:cNvPr id="17" name="Rectangle: Rounded Corners 16">
             <a:extLst>
               <a:ext uri="{FF2B5EF4-FFF2-40B4-BE49-F238E27FC236}">
-                <a16:creationId xmlns="" xmlns:a16="http://schemas.microsoft.com/office/drawing/2014/main" id="{8D71A6A2-5002-4E07-8233-8FECD70213FF}"/>
+                <a16:creationId xmlns:a16="http://schemas.microsoft.com/office/drawing/2014/main" xmlns="" id="{8D71A6A2-5002-4E07-8233-8FECD70213FF}"/>
               </a:ext>
             </a:extLst>
           </p:cNvPr>
@@ -7431,7 +7431,7 @@
           <p:cNvPr id="18" name="Rectangle: Rounded Corners 17">
             <a:extLst>
               <a:ext uri="{FF2B5EF4-FFF2-40B4-BE49-F238E27FC236}">
-                <a16:creationId xmlns="" xmlns:a16="http://schemas.microsoft.com/office/drawing/2014/main" id="{D86FA6EC-8703-4B04-A6F7-1E04207D8415}"/>
+                <a16:creationId xmlns:a16="http://schemas.microsoft.com/office/drawing/2014/main" xmlns="" id="{D86FA6EC-8703-4B04-A6F7-1E04207D8415}"/>
               </a:ext>
             </a:extLst>
           </p:cNvPr>
@@ -7493,7 +7493,7 @@
           <p:cNvPr id="22" name="Rectangle: Rounded Corners 21">
             <a:extLst>
               <a:ext uri="{FF2B5EF4-FFF2-40B4-BE49-F238E27FC236}">
-                <a16:creationId xmlns="" xmlns:a16="http://schemas.microsoft.com/office/drawing/2014/main" id="{A6AEB402-3F5C-4753-BA98-17D23F1489EC}"/>
+                <a16:creationId xmlns:a16="http://schemas.microsoft.com/office/drawing/2014/main" xmlns="" id="{A6AEB402-3F5C-4753-BA98-17D23F1489EC}"/>
               </a:ext>
             </a:extLst>
           </p:cNvPr>
@@ -7555,7 +7555,7 @@
           <p:cNvPr id="23" name="Rectangle: Rounded Corners 22">
             <a:extLst>
               <a:ext uri="{FF2B5EF4-FFF2-40B4-BE49-F238E27FC236}">
-                <a16:creationId xmlns="" xmlns:a16="http://schemas.microsoft.com/office/drawing/2014/main" id="{56F285B2-2513-4C85-99BA-0A54326A4B7D}"/>
+                <a16:creationId xmlns:a16="http://schemas.microsoft.com/office/drawing/2014/main" xmlns="" id="{56F285B2-2513-4C85-99BA-0A54326A4B7D}"/>
               </a:ext>
             </a:extLst>
           </p:cNvPr>
@@ -7617,7 +7617,7 @@
           <p:cNvPr id="24" name="Rectangle: Rounded Corners 23">
             <a:extLst>
               <a:ext uri="{FF2B5EF4-FFF2-40B4-BE49-F238E27FC236}">
-                <a16:creationId xmlns="" xmlns:a16="http://schemas.microsoft.com/office/drawing/2014/main" id="{F597A463-A8FF-4FF5-BC0F-153123683A10}"/>
+                <a16:creationId xmlns:a16="http://schemas.microsoft.com/office/drawing/2014/main" xmlns="" id="{F597A463-A8FF-4FF5-BC0F-153123683A10}"/>
               </a:ext>
             </a:extLst>
           </p:cNvPr>
@@ -7676,7 +7676,7 @@
           <p:cNvPr id="25" name="Rectangle: Rounded Corners 24">
             <a:extLst>
               <a:ext uri="{FF2B5EF4-FFF2-40B4-BE49-F238E27FC236}">
-                <a16:creationId xmlns="" xmlns:a16="http://schemas.microsoft.com/office/drawing/2014/main" id="{19DB7B19-D874-405C-A27B-8A5D038EA782}"/>
+                <a16:creationId xmlns:a16="http://schemas.microsoft.com/office/drawing/2014/main" xmlns="" id="{19DB7B19-D874-405C-A27B-8A5D038EA782}"/>
               </a:ext>
             </a:extLst>
           </p:cNvPr>
@@ -7738,7 +7738,7 @@
           <p:cNvPr id="26" name="Rectangle: Rounded Corners 25">
             <a:extLst>
               <a:ext uri="{FF2B5EF4-FFF2-40B4-BE49-F238E27FC236}">
-                <a16:creationId xmlns="" xmlns:a16="http://schemas.microsoft.com/office/drawing/2014/main" id="{2B5C6BA9-D2AF-486B-8361-ED0C4EEDD119}"/>
+                <a16:creationId xmlns:a16="http://schemas.microsoft.com/office/drawing/2014/main" xmlns="" id="{2B5C6BA9-D2AF-486B-8361-ED0C4EEDD119}"/>
               </a:ext>
             </a:extLst>
           </p:cNvPr>
@@ -7800,7 +7800,7 @@
           <p:cNvPr id="27" name="Rectangle: Rounded Corners 26">
             <a:extLst>
               <a:ext uri="{FF2B5EF4-FFF2-40B4-BE49-F238E27FC236}">
-                <a16:creationId xmlns="" xmlns:a16="http://schemas.microsoft.com/office/drawing/2014/main" id="{54C5C5E1-A442-4CFB-8B18-10B68FD458C5}"/>
+                <a16:creationId xmlns:a16="http://schemas.microsoft.com/office/drawing/2014/main" xmlns="" id="{54C5C5E1-A442-4CFB-8B18-10B68FD458C5}"/>
               </a:ext>
             </a:extLst>
           </p:cNvPr>
@@ -7859,7 +7859,7 @@
           <p:cNvPr id="29" name="Flowchart: Terminator 28">
             <a:extLst>
               <a:ext uri="{FF2B5EF4-FFF2-40B4-BE49-F238E27FC236}">
-                <a16:creationId xmlns="" xmlns:a16="http://schemas.microsoft.com/office/drawing/2014/main" id="{ADF703A3-E58C-49CA-86A6-62D3D4DB9A13}"/>
+                <a16:creationId xmlns:a16="http://schemas.microsoft.com/office/drawing/2014/main" xmlns="" id="{ADF703A3-E58C-49CA-86A6-62D3D4DB9A13}"/>
               </a:ext>
             </a:extLst>
           </p:cNvPr>
@@ -7919,7 +7919,7 @@
           <p:cNvPr id="30" name="Rectangle: Rounded Corners 29">
             <a:extLst>
               <a:ext uri="{FF2B5EF4-FFF2-40B4-BE49-F238E27FC236}">
-                <a16:creationId xmlns="" xmlns:a16="http://schemas.microsoft.com/office/drawing/2014/main" id="{92C05959-AC73-403C-A95A-568E2827F8D0}"/>
+                <a16:creationId xmlns:a16="http://schemas.microsoft.com/office/drawing/2014/main" xmlns="" id="{92C05959-AC73-403C-A95A-568E2827F8D0}"/>
               </a:ext>
             </a:extLst>
           </p:cNvPr>
@@ -7978,7 +7978,7 @@
           <p:cNvPr id="31" name="Rectangle: Rounded Corners 30">
             <a:extLst>
               <a:ext uri="{FF2B5EF4-FFF2-40B4-BE49-F238E27FC236}">
-                <a16:creationId xmlns="" xmlns:a16="http://schemas.microsoft.com/office/drawing/2014/main" id="{43AF902B-C890-4D65-9F93-738A95F259B5}"/>
+                <a16:creationId xmlns:a16="http://schemas.microsoft.com/office/drawing/2014/main" xmlns="" id="{43AF902B-C890-4D65-9F93-738A95F259B5}"/>
               </a:ext>
             </a:extLst>
           </p:cNvPr>
@@ -8037,7 +8037,7 @@
           <p:cNvPr id="32" name="Rectangle: Rounded Corners 31">
             <a:extLst>
               <a:ext uri="{FF2B5EF4-FFF2-40B4-BE49-F238E27FC236}">
-                <a16:creationId xmlns="" xmlns:a16="http://schemas.microsoft.com/office/drawing/2014/main" id="{1854DCE2-341D-4C82-9567-30AF7CE5C5B6}"/>
+                <a16:creationId xmlns:a16="http://schemas.microsoft.com/office/drawing/2014/main" xmlns="" id="{1854DCE2-341D-4C82-9567-30AF7CE5C5B6}"/>
               </a:ext>
             </a:extLst>
           </p:cNvPr>
@@ -8096,7 +8096,7 @@
           <p:cNvPr id="37" name="Group 36">
             <a:extLst>
               <a:ext uri="{FF2B5EF4-FFF2-40B4-BE49-F238E27FC236}">
-                <a16:creationId xmlns="" xmlns:a16="http://schemas.microsoft.com/office/drawing/2014/main" id="{95307ECB-14EA-44E0-8191-47990F854CBD}"/>
+                <a16:creationId xmlns:a16="http://schemas.microsoft.com/office/drawing/2014/main" xmlns="" id="{95307ECB-14EA-44E0-8191-47990F854CBD}"/>
               </a:ext>
             </a:extLst>
           </p:cNvPr>
@@ -8116,7 +8116,7 @@
             <p:cNvPr id="34" name="Straight Connector 33">
               <a:extLst>
                 <a:ext uri="{FF2B5EF4-FFF2-40B4-BE49-F238E27FC236}">
-                  <a16:creationId xmlns="" xmlns:a16="http://schemas.microsoft.com/office/drawing/2014/main" id="{2025FCE6-7418-45FE-B895-69BA30956D65}"/>
+                  <a16:creationId xmlns:a16="http://schemas.microsoft.com/office/drawing/2014/main" xmlns="" id="{2025FCE6-7418-45FE-B895-69BA30956D65}"/>
                 </a:ext>
               </a:extLst>
             </p:cNvPr>
@@ -8157,7 +8157,7 @@
             <p:cNvPr id="36" name="Straight Connector 35">
               <a:extLst>
                 <a:ext uri="{FF2B5EF4-FFF2-40B4-BE49-F238E27FC236}">
-                  <a16:creationId xmlns="" xmlns:a16="http://schemas.microsoft.com/office/drawing/2014/main" id="{92FF3B5C-04C1-426B-B996-38950C257456}"/>
+                  <a16:creationId xmlns:a16="http://schemas.microsoft.com/office/drawing/2014/main" xmlns="" id="{92FF3B5C-04C1-426B-B996-38950C257456}"/>
                 </a:ext>
               </a:extLst>
             </p:cNvPr>
@@ -8199,7 +8199,7 @@
           <p:cNvPr id="38" name="Freeform: Shape 37">
             <a:extLst>
               <a:ext uri="{FF2B5EF4-FFF2-40B4-BE49-F238E27FC236}">
-                <a16:creationId xmlns="" xmlns:a16="http://schemas.microsoft.com/office/drawing/2014/main" id="{F0626870-8373-43C4-B3D8-1925FCF6898B}"/>
+                <a16:creationId xmlns:a16="http://schemas.microsoft.com/office/drawing/2014/main" xmlns="" id="{F0626870-8373-43C4-B3D8-1925FCF6898B}"/>
               </a:ext>
             </a:extLst>
           </p:cNvPr>
@@ -8328,7 +8328,7 @@
           <p:cNvPr id="42" name="Straight Connector 41">
             <a:extLst>
               <a:ext uri="{FF2B5EF4-FFF2-40B4-BE49-F238E27FC236}">
-                <a16:creationId xmlns="" xmlns:a16="http://schemas.microsoft.com/office/drawing/2014/main" id="{027B55EC-0664-42E0-B88D-690128D86096}"/>
+                <a16:creationId xmlns:a16="http://schemas.microsoft.com/office/drawing/2014/main" xmlns="" id="{027B55EC-0664-42E0-B88D-690128D86096}"/>
               </a:ext>
             </a:extLst>
           </p:cNvPr>
@@ -8441,7 +8441,268 @@
       </p:sp>
       <p:sp>
         <p:nvSpPr>
-          <p:cNvPr id="2" name="Rounded Rectangle 1"/>
+          <p:cNvPr id="7" name="Rounded Rectangle 6"/>
+          <p:cNvSpPr/>
+          <p:nvPr/>
+        </p:nvSpPr>
+        <p:spPr>
+          <a:xfrm>
+            <a:off x="5201390" y="2435192"/>
+            <a:ext cx="6668878" cy="2035207"/>
+          </a:xfrm>
+          <a:prstGeom prst="roundRect">
+            <a:avLst/>
+          </a:prstGeom>
+        </p:spPr>
+        <p:style>
+          <a:lnRef idx="2">
+            <a:schemeClr val="dk1"/>
+          </a:lnRef>
+          <a:fillRef idx="1">
+            <a:schemeClr val="lt1"/>
+          </a:fillRef>
+          <a:effectRef idx="0">
+            <a:schemeClr val="dk1"/>
+          </a:effectRef>
+          <a:fontRef idx="minor">
+            <a:schemeClr val="dk1"/>
+          </a:fontRef>
+        </p:style>
+        <p:txBody>
+          <a:bodyPr rtlCol="0" anchor="t" anchorCtr="0"/>
+          <a:lstStyle/>
+          <a:p>
+            <a:pPr algn="ctr"/>
+            <a:r>
+              <a:rPr lang="en-US" dirty="0" smtClean="0"/>
+              <a:t>To Buy </a:t>
+            </a:r>
+            <a:r>
+              <a:rPr lang="en-US" dirty="0"/>
+              <a:t>container</a:t>
+            </a:r>
+            <a:endParaRPr lang="en-US" dirty="0"/>
+          </a:p>
+        </p:txBody>
+      </p:sp>
+      <p:sp>
+        <p:nvSpPr>
+          <p:cNvPr id="8" name="Rounded Rectangle 7"/>
+          <p:cNvSpPr/>
+          <p:nvPr/>
+        </p:nvSpPr>
+        <p:spPr>
+          <a:xfrm>
+            <a:off x="5201397" y="156562"/>
+            <a:ext cx="6668867" cy="2266005"/>
+          </a:xfrm>
+          <a:prstGeom prst="roundRect">
+            <a:avLst/>
+          </a:prstGeom>
+        </p:spPr>
+        <p:style>
+          <a:lnRef idx="2">
+            <a:schemeClr val="dk1"/>
+          </a:lnRef>
+          <a:fillRef idx="1">
+            <a:schemeClr val="lt1"/>
+          </a:fillRef>
+          <a:effectRef idx="0">
+            <a:schemeClr val="dk1"/>
+          </a:effectRef>
+          <a:fontRef idx="minor">
+            <a:schemeClr val="dk1"/>
+          </a:fontRef>
+        </p:style>
+        <p:txBody>
+          <a:bodyPr rtlCol="0" anchor="t" anchorCtr="0"/>
+          <a:lstStyle/>
+          <a:p>
+            <a:pPr algn="ctr"/>
+            <a:r>
+              <a:rPr lang="en-US" dirty="0" smtClean="0"/>
+              <a:t>To Sell </a:t>
+            </a:r>
+            <a:r>
+              <a:rPr lang="en-US" dirty="0" smtClean="0"/>
+              <a:t>container</a:t>
+            </a:r>
+            <a:endParaRPr lang="en-US" dirty="0"/>
+          </a:p>
+        </p:txBody>
+      </p:sp>
+      <p:sp>
+        <p:nvSpPr>
+          <p:cNvPr id="9" name="Rounded Rectangle 8"/>
+          <p:cNvSpPr/>
+          <p:nvPr/>
+        </p:nvSpPr>
+        <p:spPr>
+          <a:xfrm>
+            <a:off x="5201393" y="4483556"/>
+            <a:ext cx="6668871" cy="2120445"/>
+          </a:xfrm>
+          <a:prstGeom prst="roundRect">
+            <a:avLst/>
+          </a:prstGeom>
+        </p:spPr>
+        <p:style>
+          <a:lnRef idx="2">
+            <a:schemeClr val="dk1"/>
+          </a:lnRef>
+          <a:fillRef idx="1">
+            <a:schemeClr val="lt1"/>
+          </a:fillRef>
+          <a:effectRef idx="0">
+            <a:schemeClr val="dk1"/>
+          </a:effectRef>
+          <a:fontRef idx="minor">
+            <a:schemeClr val="dk1"/>
+          </a:fontRef>
+        </p:style>
+        <p:txBody>
+          <a:bodyPr rtlCol="0" anchor="t" anchorCtr="0"/>
+          <a:lstStyle/>
+          <a:p>
+            <a:pPr algn="ctr"/>
+            <a:r>
+              <a:rPr lang="en-US" dirty="0" smtClean="0"/>
+              <a:t>Model Health </a:t>
+            </a:r>
+            <a:r>
+              <a:rPr lang="en-US" dirty="0"/>
+              <a:t>container</a:t>
+            </a:r>
+            <a:endParaRPr lang="en-US" dirty="0"/>
+          </a:p>
+        </p:txBody>
+      </p:sp>
+      <p:sp>
+        <p:nvSpPr>
+          <p:cNvPr id="10" name="Rounded Rectangle 9"/>
+          <p:cNvSpPr/>
+          <p:nvPr/>
+        </p:nvSpPr>
+        <p:spPr>
+          <a:xfrm>
+            <a:off x="5201393" y="1001073"/>
+            <a:ext cx="6668872" cy="1421494"/>
+          </a:xfrm>
+          <a:prstGeom prst="roundRect">
+            <a:avLst/>
+          </a:prstGeom>
+        </p:spPr>
+        <p:style>
+          <a:lnRef idx="2">
+            <a:schemeClr val="dk1"/>
+          </a:lnRef>
+          <a:fillRef idx="1">
+            <a:schemeClr val="lt1"/>
+          </a:fillRef>
+          <a:effectRef idx="0">
+            <a:schemeClr val="dk1"/>
+          </a:effectRef>
+          <a:fontRef idx="minor">
+            <a:schemeClr val="dk1"/>
+          </a:fontRef>
+        </p:style>
+        <p:txBody>
+          <a:bodyPr rtlCol="0" anchor="ctr"/>
+          <a:lstStyle/>
+          <a:p>
+            <a:pPr algn="ctr"/>
+            <a:r>
+              <a:rPr lang="en-US" dirty="0" smtClean="0"/>
+              <a:t>List of tickers and sell signal %</a:t>
+            </a:r>
+          </a:p>
+        </p:txBody>
+      </p:sp>
+      <p:sp>
+        <p:nvSpPr>
+          <p:cNvPr id="11" name="Rounded Rectangle 10"/>
+          <p:cNvSpPr/>
+          <p:nvPr/>
+        </p:nvSpPr>
+        <p:spPr>
+          <a:xfrm>
+            <a:off x="5201393" y="3158835"/>
+            <a:ext cx="6668874" cy="1311565"/>
+          </a:xfrm>
+          <a:prstGeom prst="roundRect">
+            <a:avLst/>
+          </a:prstGeom>
+        </p:spPr>
+        <p:style>
+          <a:lnRef idx="2">
+            <a:schemeClr val="dk1"/>
+          </a:lnRef>
+          <a:fillRef idx="1">
+            <a:schemeClr val="lt1"/>
+          </a:fillRef>
+          <a:effectRef idx="0">
+            <a:schemeClr val="dk1"/>
+          </a:effectRef>
+          <a:fontRef idx="minor">
+            <a:schemeClr val="dk1"/>
+          </a:fontRef>
+        </p:style>
+        <p:txBody>
+          <a:bodyPr rtlCol="0" anchor="ctr"/>
+          <a:lstStyle/>
+          <a:p>
+            <a:pPr algn="ctr"/>
+            <a:r>
+              <a:rPr lang="en-US" dirty="0" smtClean="0"/>
+              <a:t>List of tickers and buy signal %</a:t>
+            </a:r>
+          </a:p>
+        </p:txBody>
+      </p:sp>
+      <p:sp>
+        <p:nvSpPr>
+          <p:cNvPr id="12" name="Rounded Rectangle 11"/>
+          <p:cNvSpPr/>
+          <p:nvPr/>
+        </p:nvSpPr>
+        <p:spPr>
+          <a:xfrm>
+            <a:off x="5201393" y="5207200"/>
+            <a:ext cx="6668872" cy="1396801"/>
+          </a:xfrm>
+          <a:prstGeom prst="roundRect">
+            <a:avLst/>
+          </a:prstGeom>
+        </p:spPr>
+        <p:style>
+          <a:lnRef idx="2">
+            <a:schemeClr val="dk1"/>
+          </a:lnRef>
+          <a:fillRef idx="1">
+            <a:schemeClr val="lt1"/>
+          </a:fillRef>
+          <a:effectRef idx="0">
+            <a:schemeClr val="dk1"/>
+          </a:effectRef>
+          <a:fontRef idx="minor">
+            <a:schemeClr val="dk1"/>
+          </a:fontRef>
+        </p:style>
+        <p:txBody>
+          <a:bodyPr rtlCol="0" anchor="ctr"/>
+          <a:lstStyle/>
+          <a:p>
+            <a:pPr algn="ctr"/>
+            <a:r>
+              <a:rPr lang="en-US" dirty="0" smtClean="0"/>
+              <a:t>List of Models and health color</a:t>
+            </a:r>
+          </a:p>
+        </p:txBody>
+      </p:sp>
+      <p:sp>
+        <p:nvSpPr>
+          <p:cNvPr id="13" name="Rounded Rectangle 12"/>
           <p:cNvSpPr/>
           <p:nvPr/>
         </p:nvSpPr>
@@ -8483,14 +8744,14 @@
       </p:sp>
       <p:sp>
         <p:nvSpPr>
-          <p:cNvPr id="6" name="Rounded Rectangle 5"/>
+          <p:cNvPr id="14" name="Rounded Rectangle 13"/>
           <p:cNvSpPr/>
           <p:nvPr/>
         </p:nvSpPr>
         <p:spPr>
           <a:xfrm>
             <a:off x="130629" y="1436914"/>
-            <a:ext cx="3028207" cy="5167086"/>
+            <a:ext cx="3028207" cy="5167087"/>
           </a:xfrm>
           <a:prstGeom prst="roundRect">
             <a:avLst/>
@@ -8517,270 +8778,17 @@
             <a:pPr algn="ctr"/>
             <a:r>
               <a:rPr lang="en-US" dirty="0" smtClean="0"/>
-              <a:t>Searchable list of tickers element</a:t>
+              <a:t>Searchable list of </a:t>
+            </a:r>
+            <a:r>
+              <a:rPr lang="en-US" smtClean="0"/>
+              <a:t>tickers </a:t>
+            </a:r>
+            <a:r>
+              <a:rPr lang="en-US" smtClean="0"/>
+              <a:t>container</a:t>
             </a:r>
             <a:endParaRPr lang="en-US" dirty="0"/>
-          </a:p>
-        </p:txBody>
-      </p:sp>
-      <p:sp>
-        <p:nvSpPr>
-          <p:cNvPr id="7" name="Rounded Rectangle 6"/>
-          <p:cNvSpPr/>
-          <p:nvPr/>
-        </p:nvSpPr>
-        <p:spPr>
-          <a:xfrm>
-            <a:off x="8842060" y="142502"/>
-            <a:ext cx="3028207" cy="4327897"/>
-          </a:xfrm>
-          <a:prstGeom prst="roundRect">
-            <a:avLst/>
-          </a:prstGeom>
-        </p:spPr>
-        <p:style>
-          <a:lnRef idx="2">
-            <a:schemeClr val="dk1"/>
-          </a:lnRef>
-          <a:fillRef idx="1">
-            <a:schemeClr val="lt1"/>
-          </a:fillRef>
-          <a:effectRef idx="0">
-            <a:schemeClr val="dk1"/>
-          </a:effectRef>
-          <a:fontRef idx="minor">
-            <a:schemeClr val="dk1"/>
-          </a:fontRef>
-        </p:style>
-        <p:txBody>
-          <a:bodyPr rtlCol="0" anchor="t" anchorCtr="0"/>
-          <a:lstStyle/>
-          <a:p>
-            <a:pPr algn="ctr"/>
-            <a:r>
-              <a:rPr lang="en-US" dirty="0" smtClean="0"/>
-              <a:t>To </a:t>
-            </a:r>
-            <a:r>
-              <a:rPr lang="en-US" smtClean="0"/>
-              <a:t>Buy element</a:t>
-            </a:r>
-            <a:endParaRPr lang="en-US" dirty="0"/>
-          </a:p>
-        </p:txBody>
-      </p:sp>
-      <p:sp>
-        <p:nvSpPr>
-          <p:cNvPr id="8" name="Rounded Rectangle 7"/>
-          <p:cNvSpPr/>
-          <p:nvPr/>
-        </p:nvSpPr>
-        <p:spPr>
-          <a:xfrm>
-            <a:off x="5813853" y="142503"/>
-            <a:ext cx="3028207" cy="4327897"/>
-          </a:xfrm>
-          <a:prstGeom prst="roundRect">
-            <a:avLst/>
-          </a:prstGeom>
-        </p:spPr>
-        <p:style>
-          <a:lnRef idx="2">
-            <a:schemeClr val="dk1"/>
-          </a:lnRef>
-          <a:fillRef idx="1">
-            <a:schemeClr val="lt1"/>
-          </a:fillRef>
-          <a:effectRef idx="0">
-            <a:schemeClr val="dk1"/>
-          </a:effectRef>
-          <a:fontRef idx="minor">
-            <a:schemeClr val="dk1"/>
-          </a:fontRef>
-        </p:style>
-        <p:txBody>
-          <a:bodyPr rtlCol="0" anchor="t" anchorCtr="0"/>
-          <a:lstStyle/>
-          <a:p>
-            <a:pPr algn="ctr"/>
-            <a:r>
-              <a:rPr lang="en-US" dirty="0" smtClean="0"/>
-              <a:t>To Sell element</a:t>
-            </a:r>
-            <a:endParaRPr lang="en-US" dirty="0"/>
-          </a:p>
-        </p:txBody>
-      </p:sp>
-      <p:sp>
-        <p:nvSpPr>
-          <p:cNvPr id="9" name="Rounded Rectangle 8"/>
-          <p:cNvSpPr/>
-          <p:nvPr/>
-        </p:nvSpPr>
-        <p:spPr>
-          <a:xfrm>
-            <a:off x="5813850" y="4470401"/>
-            <a:ext cx="6056414" cy="2133600"/>
-          </a:xfrm>
-          <a:prstGeom prst="roundRect">
-            <a:avLst/>
-          </a:prstGeom>
-        </p:spPr>
-        <p:style>
-          <a:lnRef idx="2">
-            <a:schemeClr val="dk1"/>
-          </a:lnRef>
-          <a:fillRef idx="1">
-            <a:schemeClr val="lt1"/>
-          </a:fillRef>
-          <a:effectRef idx="0">
-            <a:schemeClr val="dk1"/>
-          </a:effectRef>
-          <a:fontRef idx="minor">
-            <a:schemeClr val="dk1"/>
-          </a:fontRef>
-        </p:style>
-        <p:txBody>
-          <a:bodyPr rtlCol="0" anchor="t" anchorCtr="0"/>
-          <a:lstStyle/>
-          <a:p>
-            <a:pPr algn="ctr"/>
-            <a:r>
-              <a:rPr lang="en-US" dirty="0" smtClean="0"/>
-              <a:t>Model Health element</a:t>
-            </a:r>
-            <a:endParaRPr lang="en-US" dirty="0"/>
-          </a:p>
-        </p:txBody>
-      </p:sp>
-      <p:sp>
-        <p:nvSpPr>
-          <p:cNvPr id="10" name="Rounded Rectangle 9"/>
-          <p:cNvSpPr/>
-          <p:nvPr/>
-        </p:nvSpPr>
-        <p:spPr>
-          <a:xfrm>
-            <a:off x="5813853" y="1769423"/>
-            <a:ext cx="3028207" cy="2700977"/>
-          </a:xfrm>
-          <a:prstGeom prst="roundRect">
-            <a:avLst/>
-          </a:prstGeom>
-        </p:spPr>
-        <p:style>
-          <a:lnRef idx="2">
-            <a:schemeClr val="dk1"/>
-          </a:lnRef>
-          <a:fillRef idx="1">
-            <a:schemeClr val="lt1"/>
-          </a:fillRef>
-          <a:effectRef idx="0">
-            <a:schemeClr val="dk1"/>
-          </a:effectRef>
-          <a:fontRef idx="minor">
-            <a:schemeClr val="dk1"/>
-          </a:fontRef>
-        </p:style>
-        <p:txBody>
-          <a:bodyPr rtlCol="0" anchor="ctr"/>
-          <a:lstStyle/>
-          <a:p>
-            <a:pPr algn="ctr"/>
-            <a:r>
-              <a:rPr lang="en-US" dirty="0" smtClean="0"/>
-              <a:t>List of tickers </a:t>
-            </a:r>
-            <a:r>
-              <a:rPr lang="en-US" smtClean="0"/>
-              <a:t>and sell </a:t>
-            </a:r>
-            <a:r>
-              <a:rPr lang="en-US" dirty="0" smtClean="0"/>
-              <a:t>signal %</a:t>
-            </a:r>
-          </a:p>
-        </p:txBody>
-      </p:sp>
-      <p:sp>
-        <p:nvSpPr>
-          <p:cNvPr id="11" name="Rounded Rectangle 10"/>
-          <p:cNvSpPr/>
-          <p:nvPr/>
-        </p:nvSpPr>
-        <p:spPr>
-          <a:xfrm>
-            <a:off x="8842059" y="1769423"/>
-            <a:ext cx="3028207" cy="2700977"/>
-          </a:xfrm>
-          <a:prstGeom prst="roundRect">
-            <a:avLst/>
-          </a:prstGeom>
-        </p:spPr>
-        <p:style>
-          <a:lnRef idx="2">
-            <a:schemeClr val="dk1"/>
-          </a:lnRef>
-          <a:fillRef idx="1">
-            <a:schemeClr val="lt1"/>
-          </a:fillRef>
-          <a:effectRef idx="0">
-            <a:schemeClr val="dk1"/>
-          </a:effectRef>
-          <a:fontRef idx="minor">
-            <a:schemeClr val="dk1"/>
-          </a:fontRef>
-        </p:style>
-        <p:txBody>
-          <a:bodyPr rtlCol="0" anchor="ctr"/>
-          <a:lstStyle/>
-          <a:p>
-            <a:pPr algn="ctr"/>
-            <a:r>
-              <a:rPr lang="en-US" dirty="0" smtClean="0"/>
-              <a:t>List of tickers and buy signal %</a:t>
-            </a:r>
-          </a:p>
-        </p:txBody>
-      </p:sp>
-      <p:sp>
-        <p:nvSpPr>
-          <p:cNvPr id="12" name="Rounded Rectangle 11"/>
-          <p:cNvSpPr/>
-          <p:nvPr/>
-        </p:nvSpPr>
-        <p:spPr>
-          <a:xfrm>
-            <a:off x="5813849" y="5198533"/>
-            <a:ext cx="6056415" cy="1405467"/>
-          </a:xfrm>
-          <a:prstGeom prst="roundRect">
-            <a:avLst/>
-          </a:prstGeom>
-        </p:spPr>
-        <p:style>
-          <a:lnRef idx="2">
-            <a:schemeClr val="dk1"/>
-          </a:lnRef>
-          <a:fillRef idx="1">
-            <a:schemeClr val="lt1"/>
-          </a:fillRef>
-          <a:effectRef idx="0">
-            <a:schemeClr val="dk1"/>
-          </a:effectRef>
-          <a:fontRef idx="minor">
-            <a:schemeClr val="dk1"/>
-          </a:fontRef>
-        </p:style>
-        <p:txBody>
-          <a:bodyPr rtlCol="0" anchor="ctr"/>
-          <a:lstStyle/>
-          <a:p>
-            <a:pPr algn="ctr"/>
-            <a:r>
-              <a:rPr lang="en-US" dirty="0" smtClean="0"/>
-              <a:t>List of Models and health color</a:t>
-            </a:r>
           </a:p>
         </p:txBody>
       </p:sp>
@@ -8858,6 +8866,52 @@
       </p:sp>
       <p:sp>
         <p:nvSpPr>
+          <p:cNvPr id="12" name="Rounded Rectangle 11"/>
+          <p:cNvSpPr/>
+          <p:nvPr/>
+        </p:nvSpPr>
+        <p:spPr>
+          <a:xfrm>
+            <a:off x="5604931" y="1131995"/>
+            <a:ext cx="6265334" cy="5472003"/>
+          </a:xfrm>
+          <a:prstGeom prst="roundRect">
+            <a:avLst/>
+          </a:prstGeom>
+        </p:spPr>
+        <p:style>
+          <a:lnRef idx="2">
+            <a:schemeClr val="dk1"/>
+          </a:lnRef>
+          <a:fillRef idx="1">
+            <a:schemeClr val="lt1"/>
+          </a:fillRef>
+          <a:effectRef idx="0">
+            <a:schemeClr val="dk1"/>
+          </a:effectRef>
+          <a:fontRef idx="minor">
+            <a:schemeClr val="dk1"/>
+          </a:fontRef>
+        </p:style>
+        <p:txBody>
+          <a:bodyPr vert="vert270" lIns="0" rIns="91440" rtlCol="0" anchor="ctr"/>
+          <a:lstStyle/>
+          <a:p>
+            <a:pPr algn="ctr"/>
+            <a:r>
+              <a:rPr lang="en-US" dirty="0" smtClean="0"/>
+              <a:t>Model </a:t>
+            </a:r>
+            <a:r>
+              <a:rPr lang="en-US" dirty="0" smtClean="0"/>
+              <a:t>container</a:t>
+            </a:r>
+            <a:endParaRPr lang="en-US" dirty="0"/>
+          </a:p>
+        </p:txBody>
+      </p:sp>
+      <p:sp>
+        <p:nvSpPr>
           <p:cNvPr id="7" name="Rounded Rectangle 6"/>
           <p:cNvSpPr/>
           <p:nvPr/>
@@ -9186,7 +9240,11 @@
             <a:pPr algn="ctr"/>
             <a:r>
               <a:rPr lang="en-US" dirty="0" smtClean="0"/>
-              <a:t>Searchable list of tickers element</a:t>
+              <a:t>Searchable list of tickers </a:t>
+            </a:r>
+            <a:r>
+              <a:rPr lang="en-US" dirty="0" smtClean="0"/>
+              <a:t>container</a:t>
             </a:r>
             <a:endParaRPr lang="en-US" dirty="0"/>
           </a:p>

</xml_diff>

<commit_message>
updated view layout structures
</commit_message>
<xml_diff>
--- a/Visualizer/Mockup.pptx
+++ b/Visualizer/Mockup.pptx
@@ -1252,7 +1252,7 @@
           <p:cNvPr id="2" name="Title 1">
             <a:extLst>
               <a:ext uri="{FF2B5EF4-FFF2-40B4-BE49-F238E27FC236}">
-                <a16:creationId xmlns:a16="http://schemas.microsoft.com/office/drawing/2014/main" xmlns="" id="{553B6E79-7DCD-4ED3-91A4-44DC27CFA9B1}"/>
+                <a16:creationId xmlns="" xmlns:a16="http://schemas.microsoft.com/office/drawing/2014/main" id="{553B6E79-7DCD-4ED3-91A4-44DC27CFA9B1}"/>
               </a:ext>
             </a:extLst>
           </p:cNvPr>
@@ -1289,7 +1289,7 @@
           <p:cNvPr id="3" name="Subtitle 2">
             <a:extLst>
               <a:ext uri="{FF2B5EF4-FFF2-40B4-BE49-F238E27FC236}">
-                <a16:creationId xmlns:a16="http://schemas.microsoft.com/office/drawing/2014/main" xmlns="" id="{FF133992-35FF-48F9-8BCD-585C3D1BC692}"/>
+                <a16:creationId xmlns="" xmlns:a16="http://schemas.microsoft.com/office/drawing/2014/main" id="{FF133992-35FF-48F9-8BCD-585C3D1BC692}"/>
               </a:ext>
             </a:extLst>
           </p:cNvPr>
@@ -1359,7 +1359,7 @@
           <p:cNvPr id="4" name="Date Placeholder 3">
             <a:extLst>
               <a:ext uri="{FF2B5EF4-FFF2-40B4-BE49-F238E27FC236}">
-                <a16:creationId xmlns:a16="http://schemas.microsoft.com/office/drawing/2014/main" xmlns="" id="{E742DDB7-2C91-4453-B629-95462A7CA797}"/>
+                <a16:creationId xmlns="" xmlns:a16="http://schemas.microsoft.com/office/drawing/2014/main" id="{E742DDB7-2C91-4453-B629-95462A7CA797}"/>
               </a:ext>
             </a:extLst>
           </p:cNvPr>
@@ -1388,7 +1388,7 @@
           <p:cNvPr id="5" name="Footer Placeholder 4">
             <a:extLst>
               <a:ext uri="{FF2B5EF4-FFF2-40B4-BE49-F238E27FC236}">
-                <a16:creationId xmlns:a16="http://schemas.microsoft.com/office/drawing/2014/main" xmlns="" id="{9B37D394-7771-4D7B-90C1-CD3BA89AB53B}"/>
+                <a16:creationId xmlns="" xmlns:a16="http://schemas.microsoft.com/office/drawing/2014/main" id="{9B37D394-7771-4D7B-90C1-CD3BA89AB53B}"/>
               </a:ext>
             </a:extLst>
           </p:cNvPr>
@@ -1413,7 +1413,7 @@
           <p:cNvPr id="6" name="Slide Number Placeholder 5">
             <a:extLst>
               <a:ext uri="{FF2B5EF4-FFF2-40B4-BE49-F238E27FC236}">
-                <a16:creationId xmlns:a16="http://schemas.microsoft.com/office/drawing/2014/main" xmlns="" id="{FBF6A34E-6E0D-4342-AFE6-776CAFFAE5EA}"/>
+                <a16:creationId xmlns="" xmlns:a16="http://schemas.microsoft.com/office/drawing/2014/main" id="{FBF6A34E-6E0D-4342-AFE6-776CAFFAE5EA}"/>
               </a:ext>
             </a:extLst>
           </p:cNvPr>
@@ -1472,7 +1472,7 @@
           <p:cNvPr id="2" name="Title 1">
             <a:extLst>
               <a:ext uri="{FF2B5EF4-FFF2-40B4-BE49-F238E27FC236}">
-                <a16:creationId xmlns:a16="http://schemas.microsoft.com/office/drawing/2014/main" xmlns="" id="{E2F3AC27-2B2B-4DD2-A3B2-A7B83B858C11}"/>
+                <a16:creationId xmlns="" xmlns:a16="http://schemas.microsoft.com/office/drawing/2014/main" id="{E2F3AC27-2B2B-4DD2-A3B2-A7B83B858C11}"/>
               </a:ext>
             </a:extLst>
           </p:cNvPr>
@@ -1500,7 +1500,7 @@
           <p:cNvPr id="3" name="Vertical Text Placeholder 2">
             <a:extLst>
               <a:ext uri="{FF2B5EF4-FFF2-40B4-BE49-F238E27FC236}">
-                <a16:creationId xmlns:a16="http://schemas.microsoft.com/office/drawing/2014/main" xmlns="" id="{DACBB971-8C51-4F13-82B5-F8DDA8043A5A}"/>
+                <a16:creationId xmlns="" xmlns:a16="http://schemas.microsoft.com/office/drawing/2014/main" id="{DACBB971-8C51-4F13-82B5-F8DDA8043A5A}"/>
               </a:ext>
             </a:extLst>
           </p:cNvPr>
@@ -1557,7 +1557,7 @@
           <p:cNvPr id="4" name="Date Placeholder 3">
             <a:extLst>
               <a:ext uri="{FF2B5EF4-FFF2-40B4-BE49-F238E27FC236}">
-                <a16:creationId xmlns:a16="http://schemas.microsoft.com/office/drawing/2014/main" xmlns="" id="{A4A1802B-7ADB-4AFC-96BC-CA634765E059}"/>
+                <a16:creationId xmlns="" xmlns:a16="http://schemas.microsoft.com/office/drawing/2014/main" id="{A4A1802B-7ADB-4AFC-96BC-CA634765E059}"/>
               </a:ext>
             </a:extLst>
           </p:cNvPr>
@@ -1586,7 +1586,7 @@
           <p:cNvPr id="5" name="Footer Placeholder 4">
             <a:extLst>
               <a:ext uri="{FF2B5EF4-FFF2-40B4-BE49-F238E27FC236}">
-                <a16:creationId xmlns:a16="http://schemas.microsoft.com/office/drawing/2014/main" xmlns="" id="{8B4B1FF8-F774-42CE-BE8D-13A68CFEE4E1}"/>
+                <a16:creationId xmlns="" xmlns:a16="http://schemas.microsoft.com/office/drawing/2014/main" id="{8B4B1FF8-F774-42CE-BE8D-13A68CFEE4E1}"/>
               </a:ext>
             </a:extLst>
           </p:cNvPr>
@@ -1611,7 +1611,7 @@
           <p:cNvPr id="6" name="Slide Number Placeholder 5">
             <a:extLst>
               <a:ext uri="{FF2B5EF4-FFF2-40B4-BE49-F238E27FC236}">
-                <a16:creationId xmlns:a16="http://schemas.microsoft.com/office/drawing/2014/main" xmlns="" id="{CCB3DBFA-E232-45E2-8543-0D9D4BFA8466}"/>
+                <a16:creationId xmlns="" xmlns:a16="http://schemas.microsoft.com/office/drawing/2014/main" id="{CCB3DBFA-E232-45E2-8543-0D9D4BFA8466}"/>
               </a:ext>
             </a:extLst>
           </p:cNvPr>
@@ -1670,7 +1670,7 @@
           <p:cNvPr id="2" name="Vertical Title 1">
             <a:extLst>
               <a:ext uri="{FF2B5EF4-FFF2-40B4-BE49-F238E27FC236}">
-                <a16:creationId xmlns:a16="http://schemas.microsoft.com/office/drawing/2014/main" xmlns="" id="{ED1F32F3-BD63-4C18-8416-13192109A1A6}"/>
+                <a16:creationId xmlns="" xmlns:a16="http://schemas.microsoft.com/office/drawing/2014/main" id="{ED1F32F3-BD63-4C18-8416-13192109A1A6}"/>
               </a:ext>
             </a:extLst>
           </p:cNvPr>
@@ -1703,7 +1703,7 @@
           <p:cNvPr id="3" name="Vertical Text Placeholder 2">
             <a:extLst>
               <a:ext uri="{FF2B5EF4-FFF2-40B4-BE49-F238E27FC236}">
-                <a16:creationId xmlns:a16="http://schemas.microsoft.com/office/drawing/2014/main" xmlns="" id="{79AFEDA7-9D3C-4ED1-A72C-A6ED03095E6A}"/>
+                <a16:creationId xmlns="" xmlns:a16="http://schemas.microsoft.com/office/drawing/2014/main" id="{79AFEDA7-9D3C-4ED1-A72C-A6ED03095E6A}"/>
               </a:ext>
             </a:extLst>
           </p:cNvPr>
@@ -1765,7 +1765,7 @@
           <p:cNvPr id="4" name="Date Placeholder 3">
             <a:extLst>
               <a:ext uri="{FF2B5EF4-FFF2-40B4-BE49-F238E27FC236}">
-                <a16:creationId xmlns:a16="http://schemas.microsoft.com/office/drawing/2014/main" xmlns="" id="{250749DE-3DAA-49A4-A253-00A197FBE495}"/>
+                <a16:creationId xmlns="" xmlns:a16="http://schemas.microsoft.com/office/drawing/2014/main" id="{250749DE-3DAA-49A4-A253-00A197FBE495}"/>
               </a:ext>
             </a:extLst>
           </p:cNvPr>
@@ -1794,7 +1794,7 @@
           <p:cNvPr id="5" name="Footer Placeholder 4">
             <a:extLst>
               <a:ext uri="{FF2B5EF4-FFF2-40B4-BE49-F238E27FC236}">
-                <a16:creationId xmlns:a16="http://schemas.microsoft.com/office/drawing/2014/main" xmlns="" id="{78233EA4-7F3B-423C-8FFC-D15CE8DED2FC}"/>
+                <a16:creationId xmlns="" xmlns:a16="http://schemas.microsoft.com/office/drawing/2014/main" id="{78233EA4-7F3B-423C-8FFC-D15CE8DED2FC}"/>
               </a:ext>
             </a:extLst>
           </p:cNvPr>
@@ -1819,7 +1819,7 @@
           <p:cNvPr id="6" name="Slide Number Placeholder 5">
             <a:extLst>
               <a:ext uri="{FF2B5EF4-FFF2-40B4-BE49-F238E27FC236}">
-                <a16:creationId xmlns:a16="http://schemas.microsoft.com/office/drawing/2014/main" xmlns="" id="{AAF9BF6B-2EE0-40E0-8B28-2D4EF7E56C0F}"/>
+                <a16:creationId xmlns="" xmlns:a16="http://schemas.microsoft.com/office/drawing/2014/main" id="{AAF9BF6B-2EE0-40E0-8B28-2D4EF7E56C0F}"/>
               </a:ext>
             </a:extLst>
           </p:cNvPr>
@@ -1878,7 +1878,7 @@
           <p:cNvPr id="2" name="Title 1">
             <a:extLst>
               <a:ext uri="{FF2B5EF4-FFF2-40B4-BE49-F238E27FC236}">
-                <a16:creationId xmlns:a16="http://schemas.microsoft.com/office/drawing/2014/main" xmlns="" id="{08F4761C-DFDF-4BED-B6DA-B12B84123C85}"/>
+                <a16:creationId xmlns="" xmlns:a16="http://schemas.microsoft.com/office/drawing/2014/main" id="{08F4761C-DFDF-4BED-B6DA-B12B84123C85}"/>
               </a:ext>
             </a:extLst>
           </p:cNvPr>
@@ -1906,7 +1906,7 @@
           <p:cNvPr id="3" name="Content Placeholder 2">
             <a:extLst>
               <a:ext uri="{FF2B5EF4-FFF2-40B4-BE49-F238E27FC236}">
-                <a16:creationId xmlns:a16="http://schemas.microsoft.com/office/drawing/2014/main" xmlns="" id="{79F31278-087B-4BEB-9BE3-0F8DC19F4A57}"/>
+                <a16:creationId xmlns="" xmlns:a16="http://schemas.microsoft.com/office/drawing/2014/main" id="{79F31278-087B-4BEB-9BE3-0F8DC19F4A57}"/>
               </a:ext>
             </a:extLst>
           </p:cNvPr>
@@ -1963,7 +1963,7 @@
           <p:cNvPr id="4" name="Date Placeholder 3">
             <a:extLst>
               <a:ext uri="{FF2B5EF4-FFF2-40B4-BE49-F238E27FC236}">
-                <a16:creationId xmlns:a16="http://schemas.microsoft.com/office/drawing/2014/main" xmlns="" id="{37E6CAAD-9100-4A5F-9A47-5E37CEE46E2E}"/>
+                <a16:creationId xmlns="" xmlns:a16="http://schemas.microsoft.com/office/drawing/2014/main" id="{37E6CAAD-9100-4A5F-9A47-5E37CEE46E2E}"/>
               </a:ext>
             </a:extLst>
           </p:cNvPr>
@@ -1992,7 +1992,7 @@
           <p:cNvPr id="5" name="Footer Placeholder 4">
             <a:extLst>
               <a:ext uri="{FF2B5EF4-FFF2-40B4-BE49-F238E27FC236}">
-                <a16:creationId xmlns:a16="http://schemas.microsoft.com/office/drawing/2014/main" xmlns="" id="{A6346B6E-6081-4251-85B4-0F5F4EC66056}"/>
+                <a16:creationId xmlns="" xmlns:a16="http://schemas.microsoft.com/office/drawing/2014/main" id="{A6346B6E-6081-4251-85B4-0F5F4EC66056}"/>
               </a:ext>
             </a:extLst>
           </p:cNvPr>
@@ -2017,7 +2017,7 @@
           <p:cNvPr id="6" name="Slide Number Placeholder 5">
             <a:extLst>
               <a:ext uri="{FF2B5EF4-FFF2-40B4-BE49-F238E27FC236}">
-                <a16:creationId xmlns:a16="http://schemas.microsoft.com/office/drawing/2014/main" xmlns="" id="{A08ADCFC-1628-46AF-8D8B-11BF134F6FFB}"/>
+                <a16:creationId xmlns="" xmlns:a16="http://schemas.microsoft.com/office/drawing/2014/main" id="{A08ADCFC-1628-46AF-8D8B-11BF134F6FFB}"/>
               </a:ext>
             </a:extLst>
           </p:cNvPr>
@@ -2076,7 +2076,7 @@
           <p:cNvPr id="2" name="Title 1">
             <a:extLst>
               <a:ext uri="{FF2B5EF4-FFF2-40B4-BE49-F238E27FC236}">
-                <a16:creationId xmlns:a16="http://schemas.microsoft.com/office/drawing/2014/main" xmlns="" id="{20A06FCD-43B2-4062-ADE9-5196C80E947B}"/>
+                <a16:creationId xmlns="" xmlns:a16="http://schemas.microsoft.com/office/drawing/2014/main" id="{20A06FCD-43B2-4062-ADE9-5196C80E947B}"/>
               </a:ext>
             </a:extLst>
           </p:cNvPr>
@@ -2113,7 +2113,7 @@
           <p:cNvPr id="3" name="Text Placeholder 2">
             <a:extLst>
               <a:ext uri="{FF2B5EF4-FFF2-40B4-BE49-F238E27FC236}">
-                <a16:creationId xmlns:a16="http://schemas.microsoft.com/office/drawing/2014/main" xmlns="" id="{9689C800-F457-4EAA-8B68-FDB9E698C04A}"/>
+                <a16:creationId xmlns="" xmlns:a16="http://schemas.microsoft.com/office/drawing/2014/main" id="{9689C800-F457-4EAA-8B68-FDB9E698C04A}"/>
               </a:ext>
             </a:extLst>
           </p:cNvPr>
@@ -2238,7 +2238,7 @@
           <p:cNvPr id="4" name="Date Placeholder 3">
             <a:extLst>
               <a:ext uri="{FF2B5EF4-FFF2-40B4-BE49-F238E27FC236}">
-                <a16:creationId xmlns:a16="http://schemas.microsoft.com/office/drawing/2014/main" xmlns="" id="{DEEE74FC-0F00-42EC-9DA8-6938CA580240}"/>
+                <a16:creationId xmlns="" xmlns:a16="http://schemas.microsoft.com/office/drawing/2014/main" id="{DEEE74FC-0F00-42EC-9DA8-6938CA580240}"/>
               </a:ext>
             </a:extLst>
           </p:cNvPr>
@@ -2267,7 +2267,7 @@
           <p:cNvPr id="5" name="Footer Placeholder 4">
             <a:extLst>
               <a:ext uri="{FF2B5EF4-FFF2-40B4-BE49-F238E27FC236}">
-                <a16:creationId xmlns:a16="http://schemas.microsoft.com/office/drawing/2014/main" xmlns="" id="{741D09C9-5481-4587-9C28-A3ED2A914B01}"/>
+                <a16:creationId xmlns="" xmlns:a16="http://schemas.microsoft.com/office/drawing/2014/main" id="{741D09C9-5481-4587-9C28-A3ED2A914B01}"/>
               </a:ext>
             </a:extLst>
           </p:cNvPr>
@@ -2292,7 +2292,7 @@
           <p:cNvPr id="6" name="Slide Number Placeholder 5">
             <a:extLst>
               <a:ext uri="{FF2B5EF4-FFF2-40B4-BE49-F238E27FC236}">
-                <a16:creationId xmlns:a16="http://schemas.microsoft.com/office/drawing/2014/main" xmlns="" id="{1AC83BC7-E8A4-486F-9C06-B334B53F37B9}"/>
+                <a16:creationId xmlns="" xmlns:a16="http://schemas.microsoft.com/office/drawing/2014/main" id="{1AC83BC7-E8A4-486F-9C06-B334B53F37B9}"/>
               </a:ext>
             </a:extLst>
           </p:cNvPr>
@@ -2351,7 +2351,7 @@
           <p:cNvPr id="2" name="Title 1">
             <a:extLst>
               <a:ext uri="{FF2B5EF4-FFF2-40B4-BE49-F238E27FC236}">
-                <a16:creationId xmlns:a16="http://schemas.microsoft.com/office/drawing/2014/main" xmlns="" id="{E81E36C7-0816-4A92-853C-ED3B09023EDB}"/>
+                <a16:creationId xmlns="" xmlns:a16="http://schemas.microsoft.com/office/drawing/2014/main" id="{E81E36C7-0816-4A92-853C-ED3B09023EDB}"/>
               </a:ext>
             </a:extLst>
           </p:cNvPr>
@@ -2379,7 +2379,7 @@
           <p:cNvPr id="3" name="Content Placeholder 2">
             <a:extLst>
               <a:ext uri="{FF2B5EF4-FFF2-40B4-BE49-F238E27FC236}">
-                <a16:creationId xmlns:a16="http://schemas.microsoft.com/office/drawing/2014/main" xmlns="" id="{7F707701-A54F-45E1-8A6C-2C8B8867BC9D}"/>
+                <a16:creationId xmlns="" xmlns:a16="http://schemas.microsoft.com/office/drawing/2014/main" id="{7F707701-A54F-45E1-8A6C-2C8B8867BC9D}"/>
               </a:ext>
             </a:extLst>
           </p:cNvPr>
@@ -2441,7 +2441,7 @@
           <p:cNvPr id="4" name="Content Placeholder 3">
             <a:extLst>
               <a:ext uri="{FF2B5EF4-FFF2-40B4-BE49-F238E27FC236}">
-                <a16:creationId xmlns:a16="http://schemas.microsoft.com/office/drawing/2014/main" xmlns="" id="{4B5786FD-7A65-4D8C-B15D-DA773068698C}"/>
+                <a16:creationId xmlns="" xmlns:a16="http://schemas.microsoft.com/office/drawing/2014/main" id="{4B5786FD-7A65-4D8C-B15D-DA773068698C}"/>
               </a:ext>
             </a:extLst>
           </p:cNvPr>
@@ -2503,7 +2503,7 @@
           <p:cNvPr id="5" name="Date Placeholder 4">
             <a:extLst>
               <a:ext uri="{FF2B5EF4-FFF2-40B4-BE49-F238E27FC236}">
-                <a16:creationId xmlns:a16="http://schemas.microsoft.com/office/drawing/2014/main" xmlns="" id="{CEAE3A29-2487-420C-866B-57CD44BF44A3}"/>
+                <a16:creationId xmlns="" xmlns:a16="http://schemas.microsoft.com/office/drawing/2014/main" id="{CEAE3A29-2487-420C-866B-57CD44BF44A3}"/>
               </a:ext>
             </a:extLst>
           </p:cNvPr>
@@ -2532,7 +2532,7 @@
           <p:cNvPr id="6" name="Footer Placeholder 5">
             <a:extLst>
               <a:ext uri="{FF2B5EF4-FFF2-40B4-BE49-F238E27FC236}">
-                <a16:creationId xmlns:a16="http://schemas.microsoft.com/office/drawing/2014/main" xmlns="" id="{377443B9-9470-4D6A-AE0A-C326BCCBE642}"/>
+                <a16:creationId xmlns="" xmlns:a16="http://schemas.microsoft.com/office/drawing/2014/main" id="{377443B9-9470-4D6A-AE0A-C326BCCBE642}"/>
               </a:ext>
             </a:extLst>
           </p:cNvPr>
@@ -2557,7 +2557,7 @@
           <p:cNvPr id="7" name="Slide Number Placeholder 6">
             <a:extLst>
               <a:ext uri="{FF2B5EF4-FFF2-40B4-BE49-F238E27FC236}">
-                <a16:creationId xmlns:a16="http://schemas.microsoft.com/office/drawing/2014/main" xmlns="" id="{F90CCD6F-1F56-4850-98DF-5DD0EEE3738E}"/>
+                <a16:creationId xmlns="" xmlns:a16="http://schemas.microsoft.com/office/drawing/2014/main" id="{F90CCD6F-1F56-4850-98DF-5DD0EEE3738E}"/>
               </a:ext>
             </a:extLst>
           </p:cNvPr>
@@ -2616,7 +2616,7 @@
           <p:cNvPr id="2" name="Title 1">
             <a:extLst>
               <a:ext uri="{FF2B5EF4-FFF2-40B4-BE49-F238E27FC236}">
-                <a16:creationId xmlns:a16="http://schemas.microsoft.com/office/drawing/2014/main" xmlns="" id="{C3C414C3-8278-4588-933C-78CE8DB9A1BC}"/>
+                <a16:creationId xmlns="" xmlns:a16="http://schemas.microsoft.com/office/drawing/2014/main" id="{C3C414C3-8278-4588-933C-78CE8DB9A1BC}"/>
               </a:ext>
             </a:extLst>
           </p:cNvPr>
@@ -2649,7 +2649,7 @@
           <p:cNvPr id="3" name="Text Placeholder 2">
             <a:extLst>
               <a:ext uri="{FF2B5EF4-FFF2-40B4-BE49-F238E27FC236}">
-                <a16:creationId xmlns:a16="http://schemas.microsoft.com/office/drawing/2014/main" xmlns="" id="{71A200F1-57DD-46A6-A4EE-96E99875E1A2}"/>
+                <a16:creationId xmlns="" xmlns:a16="http://schemas.microsoft.com/office/drawing/2014/main" id="{71A200F1-57DD-46A6-A4EE-96E99875E1A2}"/>
               </a:ext>
             </a:extLst>
           </p:cNvPr>
@@ -2720,7 +2720,7 @@
           <p:cNvPr id="4" name="Content Placeholder 3">
             <a:extLst>
               <a:ext uri="{FF2B5EF4-FFF2-40B4-BE49-F238E27FC236}">
-                <a16:creationId xmlns:a16="http://schemas.microsoft.com/office/drawing/2014/main" xmlns="" id="{75083360-E32C-4B35-9766-9BA6CE824D44}"/>
+                <a16:creationId xmlns="" xmlns:a16="http://schemas.microsoft.com/office/drawing/2014/main" id="{75083360-E32C-4B35-9766-9BA6CE824D44}"/>
               </a:ext>
             </a:extLst>
           </p:cNvPr>
@@ -2782,7 +2782,7 @@
           <p:cNvPr id="5" name="Text Placeholder 4">
             <a:extLst>
               <a:ext uri="{FF2B5EF4-FFF2-40B4-BE49-F238E27FC236}">
-                <a16:creationId xmlns:a16="http://schemas.microsoft.com/office/drawing/2014/main" xmlns="" id="{9C302DCE-0AE3-4442-B76D-919B39B34647}"/>
+                <a16:creationId xmlns="" xmlns:a16="http://schemas.microsoft.com/office/drawing/2014/main" id="{9C302DCE-0AE3-4442-B76D-919B39B34647}"/>
               </a:ext>
             </a:extLst>
           </p:cNvPr>
@@ -2853,7 +2853,7 @@
           <p:cNvPr id="6" name="Content Placeholder 5">
             <a:extLst>
               <a:ext uri="{FF2B5EF4-FFF2-40B4-BE49-F238E27FC236}">
-                <a16:creationId xmlns:a16="http://schemas.microsoft.com/office/drawing/2014/main" xmlns="" id="{860A80C0-6965-48FB-B6A7-3D0F192940A6}"/>
+                <a16:creationId xmlns="" xmlns:a16="http://schemas.microsoft.com/office/drawing/2014/main" id="{860A80C0-6965-48FB-B6A7-3D0F192940A6}"/>
               </a:ext>
             </a:extLst>
           </p:cNvPr>
@@ -2915,7 +2915,7 @@
           <p:cNvPr id="7" name="Date Placeholder 6">
             <a:extLst>
               <a:ext uri="{FF2B5EF4-FFF2-40B4-BE49-F238E27FC236}">
-                <a16:creationId xmlns:a16="http://schemas.microsoft.com/office/drawing/2014/main" xmlns="" id="{FAA6129C-58F2-44B7-A8EB-4F5D1F1A7E66}"/>
+                <a16:creationId xmlns="" xmlns:a16="http://schemas.microsoft.com/office/drawing/2014/main" id="{FAA6129C-58F2-44B7-A8EB-4F5D1F1A7E66}"/>
               </a:ext>
             </a:extLst>
           </p:cNvPr>
@@ -2944,7 +2944,7 @@
           <p:cNvPr id="8" name="Footer Placeholder 7">
             <a:extLst>
               <a:ext uri="{FF2B5EF4-FFF2-40B4-BE49-F238E27FC236}">
-                <a16:creationId xmlns:a16="http://schemas.microsoft.com/office/drawing/2014/main" xmlns="" id="{A6F5F6FD-2BE8-4B93-89BA-8F9D8CF99BB5}"/>
+                <a16:creationId xmlns="" xmlns:a16="http://schemas.microsoft.com/office/drawing/2014/main" id="{A6F5F6FD-2BE8-4B93-89BA-8F9D8CF99BB5}"/>
               </a:ext>
             </a:extLst>
           </p:cNvPr>
@@ -2969,7 +2969,7 @@
           <p:cNvPr id="9" name="Slide Number Placeholder 8">
             <a:extLst>
               <a:ext uri="{FF2B5EF4-FFF2-40B4-BE49-F238E27FC236}">
-                <a16:creationId xmlns:a16="http://schemas.microsoft.com/office/drawing/2014/main" xmlns="" id="{1F59AA36-72EF-4232-BC09-0155524D0938}"/>
+                <a16:creationId xmlns="" xmlns:a16="http://schemas.microsoft.com/office/drawing/2014/main" id="{1F59AA36-72EF-4232-BC09-0155524D0938}"/>
               </a:ext>
             </a:extLst>
           </p:cNvPr>
@@ -3028,7 +3028,7 @@
           <p:cNvPr id="2" name="Title 1">
             <a:extLst>
               <a:ext uri="{FF2B5EF4-FFF2-40B4-BE49-F238E27FC236}">
-                <a16:creationId xmlns:a16="http://schemas.microsoft.com/office/drawing/2014/main" xmlns="" id="{E81D2CF1-816D-48C2-ABCE-F0D1287A86EE}"/>
+                <a16:creationId xmlns="" xmlns:a16="http://schemas.microsoft.com/office/drawing/2014/main" id="{E81D2CF1-816D-48C2-ABCE-F0D1287A86EE}"/>
               </a:ext>
             </a:extLst>
           </p:cNvPr>
@@ -3056,7 +3056,7 @@
           <p:cNvPr id="3" name="Date Placeholder 2">
             <a:extLst>
               <a:ext uri="{FF2B5EF4-FFF2-40B4-BE49-F238E27FC236}">
-                <a16:creationId xmlns:a16="http://schemas.microsoft.com/office/drawing/2014/main" xmlns="" id="{AC9624E7-366F-48BC-B811-C38D8D34F6EF}"/>
+                <a16:creationId xmlns="" xmlns:a16="http://schemas.microsoft.com/office/drawing/2014/main" id="{AC9624E7-366F-48BC-B811-C38D8D34F6EF}"/>
               </a:ext>
             </a:extLst>
           </p:cNvPr>
@@ -3085,7 +3085,7 @@
           <p:cNvPr id="4" name="Footer Placeholder 3">
             <a:extLst>
               <a:ext uri="{FF2B5EF4-FFF2-40B4-BE49-F238E27FC236}">
-                <a16:creationId xmlns:a16="http://schemas.microsoft.com/office/drawing/2014/main" xmlns="" id="{4BC120F3-5F3C-4B89-98B6-984CF95D89C8}"/>
+                <a16:creationId xmlns="" xmlns:a16="http://schemas.microsoft.com/office/drawing/2014/main" id="{4BC120F3-5F3C-4B89-98B6-984CF95D89C8}"/>
               </a:ext>
             </a:extLst>
           </p:cNvPr>
@@ -3110,7 +3110,7 @@
           <p:cNvPr id="5" name="Slide Number Placeholder 4">
             <a:extLst>
               <a:ext uri="{FF2B5EF4-FFF2-40B4-BE49-F238E27FC236}">
-                <a16:creationId xmlns:a16="http://schemas.microsoft.com/office/drawing/2014/main" xmlns="" id="{05D47124-544E-4C80-A43C-2E9B6C999EA9}"/>
+                <a16:creationId xmlns="" xmlns:a16="http://schemas.microsoft.com/office/drawing/2014/main" id="{05D47124-544E-4C80-A43C-2E9B6C999EA9}"/>
               </a:ext>
             </a:extLst>
           </p:cNvPr>
@@ -3169,7 +3169,7 @@
           <p:cNvPr id="2" name="Date Placeholder 1">
             <a:extLst>
               <a:ext uri="{FF2B5EF4-FFF2-40B4-BE49-F238E27FC236}">
-                <a16:creationId xmlns:a16="http://schemas.microsoft.com/office/drawing/2014/main" xmlns="" id="{641D9391-9D60-4076-8F79-DF77CFB04523}"/>
+                <a16:creationId xmlns="" xmlns:a16="http://schemas.microsoft.com/office/drawing/2014/main" id="{641D9391-9D60-4076-8F79-DF77CFB04523}"/>
               </a:ext>
             </a:extLst>
           </p:cNvPr>
@@ -3198,7 +3198,7 @@
           <p:cNvPr id="3" name="Footer Placeholder 2">
             <a:extLst>
               <a:ext uri="{FF2B5EF4-FFF2-40B4-BE49-F238E27FC236}">
-                <a16:creationId xmlns:a16="http://schemas.microsoft.com/office/drawing/2014/main" xmlns="" id="{0E3F688F-5CA7-432F-B591-328DA41C4640}"/>
+                <a16:creationId xmlns="" xmlns:a16="http://schemas.microsoft.com/office/drawing/2014/main" id="{0E3F688F-5CA7-432F-B591-328DA41C4640}"/>
               </a:ext>
             </a:extLst>
           </p:cNvPr>
@@ -3223,7 +3223,7 @@
           <p:cNvPr id="4" name="Slide Number Placeholder 3">
             <a:extLst>
               <a:ext uri="{FF2B5EF4-FFF2-40B4-BE49-F238E27FC236}">
-                <a16:creationId xmlns:a16="http://schemas.microsoft.com/office/drawing/2014/main" xmlns="" id="{9CE96E86-76CD-492C-BDC2-0B211B4A758F}"/>
+                <a16:creationId xmlns="" xmlns:a16="http://schemas.microsoft.com/office/drawing/2014/main" id="{9CE96E86-76CD-492C-BDC2-0B211B4A758F}"/>
               </a:ext>
             </a:extLst>
           </p:cNvPr>
@@ -3282,7 +3282,7 @@
           <p:cNvPr id="2" name="Title 1">
             <a:extLst>
               <a:ext uri="{FF2B5EF4-FFF2-40B4-BE49-F238E27FC236}">
-                <a16:creationId xmlns:a16="http://schemas.microsoft.com/office/drawing/2014/main" xmlns="" id="{7F423E4D-6C40-4DC2-B1DF-B3C0C94E8786}"/>
+                <a16:creationId xmlns="" xmlns:a16="http://schemas.microsoft.com/office/drawing/2014/main" id="{7F423E4D-6C40-4DC2-B1DF-B3C0C94E8786}"/>
               </a:ext>
             </a:extLst>
           </p:cNvPr>
@@ -3319,7 +3319,7 @@
           <p:cNvPr id="3" name="Content Placeholder 2">
             <a:extLst>
               <a:ext uri="{FF2B5EF4-FFF2-40B4-BE49-F238E27FC236}">
-                <a16:creationId xmlns:a16="http://schemas.microsoft.com/office/drawing/2014/main" xmlns="" id="{5548D7BC-A06F-4A7E-AF6A-AEF48F162ACE}"/>
+                <a16:creationId xmlns="" xmlns:a16="http://schemas.microsoft.com/office/drawing/2014/main" id="{5548D7BC-A06F-4A7E-AF6A-AEF48F162ACE}"/>
               </a:ext>
             </a:extLst>
           </p:cNvPr>
@@ -3409,7 +3409,7 @@
           <p:cNvPr id="4" name="Text Placeholder 3">
             <a:extLst>
               <a:ext uri="{FF2B5EF4-FFF2-40B4-BE49-F238E27FC236}">
-                <a16:creationId xmlns:a16="http://schemas.microsoft.com/office/drawing/2014/main" xmlns="" id="{365731FF-334D-4CE5-9EC6-DD57EFD0CE6C}"/>
+                <a16:creationId xmlns="" xmlns:a16="http://schemas.microsoft.com/office/drawing/2014/main" id="{365731FF-334D-4CE5-9EC6-DD57EFD0CE6C}"/>
               </a:ext>
             </a:extLst>
           </p:cNvPr>
@@ -3480,7 +3480,7 @@
           <p:cNvPr id="5" name="Date Placeholder 4">
             <a:extLst>
               <a:ext uri="{FF2B5EF4-FFF2-40B4-BE49-F238E27FC236}">
-                <a16:creationId xmlns:a16="http://schemas.microsoft.com/office/drawing/2014/main" xmlns="" id="{941E5FD8-3FAA-42DC-B8EB-F27BE66BD2AF}"/>
+                <a16:creationId xmlns="" xmlns:a16="http://schemas.microsoft.com/office/drawing/2014/main" id="{941E5FD8-3FAA-42DC-B8EB-F27BE66BD2AF}"/>
               </a:ext>
             </a:extLst>
           </p:cNvPr>
@@ -3509,7 +3509,7 @@
           <p:cNvPr id="6" name="Footer Placeholder 5">
             <a:extLst>
               <a:ext uri="{FF2B5EF4-FFF2-40B4-BE49-F238E27FC236}">
-                <a16:creationId xmlns:a16="http://schemas.microsoft.com/office/drawing/2014/main" xmlns="" id="{63C37809-3388-4A1D-B1D2-743B93135834}"/>
+                <a16:creationId xmlns="" xmlns:a16="http://schemas.microsoft.com/office/drawing/2014/main" id="{63C37809-3388-4A1D-B1D2-743B93135834}"/>
               </a:ext>
             </a:extLst>
           </p:cNvPr>
@@ -3534,7 +3534,7 @@
           <p:cNvPr id="7" name="Slide Number Placeholder 6">
             <a:extLst>
               <a:ext uri="{FF2B5EF4-FFF2-40B4-BE49-F238E27FC236}">
-                <a16:creationId xmlns:a16="http://schemas.microsoft.com/office/drawing/2014/main" xmlns="" id="{5E5C9D74-8181-4410-BBA3-7261D943FAFC}"/>
+                <a16:creationId xmlns="" xmlns:a16="http://schemas.microsoft.com/office/drawing/2014/main" id="{5E5C9D74-8181-4410-BBA3-7261D943FAFC}"/>
               </a:ext>
             </a:extLst>
           </p:cNvPr>
@@ -3593,7 +3593,7 @@
           <p:cNvPr id="2" name="Title 1">
             <a:extLst>
               <a:ext uri="{FF2B5EF4-FFF2-40B4-BE49-F238E27FC236}">
-                <a16:creationId xmlns:a16="http://schemas.microsoft.com/office/drawing/2014/main" xmlns="" id="{B661A0EF-4640-4EF6-A916-A1C1D59C7345}"/>
+                <a16:creationId xmlns="" xmlns:a16="http://schemas.microsoft.com/office/drawing/2014/main" id="{B661A0EF-4640-4EF6-A916-A1C1D59C7345}"/>
               </a:ext>
             </a:extLst>
           </p:cNvPr>
@@ -3630,7 +3630,7 @@
           <p:cNvPr id="3" name="Picture Placeholder 2">
             <a:extLst>
               <a:ext uri="{FF2B5EF4-FFF2-40B4-BE49-F238E27FC236}">
-                <a16:creationId xmlns:a16="http://schemas.microsoft.com/office/drawing/2014/main" xmlns="" id="{81CA8A45-1AAC-49D1-9E71-D973BEB1A220}"/>
+                <a16:creationId xmlns="" xmlns:a16="http://schemas.microsoft.com/office/drawing/2014/main" id="{81CA8A45-1AAC-49D1-9E71-D973BEB1A220}"/>
               </a:ext>
             </a:extLst>
           </p:cNvPr>
@@ -3697,7 +3697,7 @@
           <p:cNvPr id="4" name="Text Placeholder 3">
             <a:extLst>
               <a:ext uri="{FF2B5EF4-FFF2-40B4-BE49-F238E27FC236}">
-                <a16:creationId xmlns:a16="http://schemas.microsoft.com/office/drawing/2014/main" xmlns="" id="{1BBED5FC-EAD8-4BBB-AFD6-F031672AE133}"/>
+                <a16:creationId xmlns="" xmlns:a16="http://schemas.microsoft.com/office/drawing/2014/main" id="{1BBED5FC-EAD8-4BBB-AFD6-F031672AE133}"/>
               </a:ext>
             </a:extLst>
           </p:cNvPr>
@@ -3768,7 +3768,7 @@
           <p:cNvPr id="5" name="Date Placeholder 4">
             <a:extLst>
               <a:ext uri="{FF2B5EF4-FFF2-40B4-BE49-F238E27FC236}">
-                <a16:creationId xmlns:a16="http://schemas.microsoft.com/office/drawing/2014/main" xmlns="" id="{E89FBE54-B46E-4C19-8C0D-267CD05DB014}"/>
+                <a16:creationId xmlns="" xmlns:a16="http://schemas.microsoft.com/office/drawing/2014/main" id="{E89FBE54-B46E-4C19-8C0D-267CD05DB014}"/>
               </a:ext>
             </a:extLst>
           </p:cNvPr>
@@ -3797,7 +3797,7 @@
           <p:cNvPr id="6" name="Footer Placeholder 5">
             <a:extLst>
               <a:ext uri="{FF2B5EF4-FFF2-40B4-BE49-F238E27FC236}">
-                <a16:creationId xmlns:a16="http://schemas.microsoft.com/office/drawing/2014/main" xmlns="" id="{B6E0C9C3-4DB8-4258-97FC-8416E1E5474F}"/>
+                <a16:creationId xmlns="" xmlns:a16="http://schemas.microsoft.com/office/drawing/2014/main" id="{B6E0C9C3-4DB8-4258-97FC-8416E1E5474F}"/>
               </a:ext>
             </a:extLst>
           </p:cNvPr>
@@ -3822,7 +3822,7 @@
           <p:cNvPr id="7" name="Slide Number Placeholder 6">
             <a:extLst>
               <a:ext uri="{FF2B5EF4-FFF2-40B4-BE49-F238E27FC236}">
-                <a16:creationId xmlns:a16="http://schemas.microsoft.com/office/drawing/2014/main" xmlns="" id="{593932B1-FCA9-4C15-A951-EA0A956F20CB}"/>
+                <a16:creationId xmlns="" xmlns:a16="http://schemas.microsoft.com/office/drawing/2014/main" id="{593932B1-FCA9-4C15-A951-EA0A956F20CB}"/>
               </a:ext>
             </a:extLst>
           </p:cNvPr>
@@ -3886,7 +3886,7 @@
           <p:cNvPr id="2" name="Title Placeholder 1">
             <a:extLst>
               <a:ext uri="{FF2B5EF4-FFF2-40B4-BE49-F238E27FC236}">
-                <a16:creationId xmlns:a16="http://schemas.microsoft.com/office/drawing/2014/main" xmlns="" id="{7C0C664C-58A9-46A0-9CC1-0EEDE6285BFF}"/>
+                <a16:creationId xmlns="" xmlns:a16="http://schemas.microsoft.com/office/drawing/2014/main" id="{7C0C664C-58A9-46A0-9CC1-0EEDE6285BFF}"/>
               </a:ext>
             </a:extLst>
           </p:cNvPr>
@@ -3924,7 +3924,7 @@
           <p:cNvPr id="3" name="Text Placeholder 2">
             <a:extLst>
               <a:ext uri="{FF2B5EF4-FFF2-40B4-BE49-F238E27FC236}">
-                <a16:creationId xmlns:a16="http://schemas.microsoft.com/office/drawing/2014/main" xmlns="" id="{65562DF5-BE86-4DB8-9E27-E4F718173D1B}"/>
+                <a16:creationId xmlns="" xmlns:a16="http://schemas.microsoft.com/office/drawing/2014/main" id="{65562DF5-BE86-4DB8-9E27-E4F718173D1B}"/>
               </a:ext>
             </a:extLst>
           </p:cNvPr>
@@ -3991,7 +3991,7 @@
           <p:cNvPr id="4" name="Date Placeholder 3">
             <a:extLst>
               <a:ext uri="{FF2B5EF4-FFF2-40B4-BE49-F238E27FC236}">
-                <a16:creationId xmlns:a16="http://schemas.microsoft.com/office/drawing/2014/main" xmlns="" id="{DDA4EFC7-3387-4CAF-889C-4C468A0A1E5B}"/>
+                <a16:creationId xmlns="" xmlns:a16="http://schemas.microsoft.com/office/drawing/2014/main" id="{DDA4EFC7-3387-4CAF-889C-4C468A0A1E5B}"/>
               </a:ext>
             </a:extLst>
           </p:cNvPr>
@@ -4038,7 +4038,7 @@
           <p:cNvPr id="5" name="Footer Placeholder 4">
             <a:extLst>
               <a:ext uri="{FF2B5EF4-FFF2-40B4-BE49-F238E27FC236}">
-                <a16:creationId xmlns:a16="http://schemas.microsoft.com/office/drawing/2014/main" xmlns="" id="{37275286-A5F9-4A85-B019-61F07876BEAF}"/>
+                <a16:creationId xmlns="" xmlns:a16="http://schemas.microsoft.com/office/drawing/2014/main" id="{37275286-A5F9-4A85-B019-61F07876BEAF}"/>
               </a:ext>
             </a:extLst>
           </p:cNvPr>
@@ -4081,7 +4081,7 @@
           <p:cNvPr id="6" name="Slide Number Placeholder 5">
             <a:extLst>
               <a:ext uri="{FF2B5EF4-FFF2-40B4-BE49-F238E27FC236}">
-                <a16:creationId xmlns:a16="http://schemas.microsoft.com/office/drawing/2014/main" xmlns="" id="{AF635EAA-95A3-4DE3-A775-A7F3B84FB9B8}"/>
+                <a16:creationId xmlns="" xmlns:a16="http://schemas.microsoft.com/office/drawing/2014/main" id="{AF635EAA-95A3-4DE3-A775-A7F3B84FB9B8}"/>
               </a:ext>
             </a:extLst>
           </p:cNvPr>
@@ -4457,7 +4457,7 @@
           <p:cNvPr id="4" name="Rectangle 3">
             <a:extLst>
               <a:ext uri="{FF2B5EF4-FFF2-40B4-BE49-F238E27FC236}">
-                <a16:creationId xmlns:a16="http://schemas.microsoft.com/office/drawing/2014/main" xmlns="" id="{3263A579-F937-472F-BAC8-0F6DBD133059}"/>
+                <a16:creationId xmlns="" xmlns:a16="http://schemas.microsoft.com/office/drawing/2014/main" id="{3263A579-F937-472F-BAC8-0F6DBD133059}"/>
               </a:ext>
             </a:extLst>
           </p:cNvPr>
@@ -4835,7 +4835,7 @@
           <p:cNvPr id="6" name="Flowchart: Terminator 5">
             <a:extLst>
               <a:ext uri="{FF2B5EF4-FFF2-40B4-BE49-F238E27FC236}">
-                <a16:creationId xmlns:a16="http://schemas.microsoft.com/office/drawing/2014/main" xmlns="" id="{BC26BFB4-0829-4EF7-B551-E33F9117E645}"/>
+                <a16:creationId xmlns="" xmlns:a16="http://schemas.microsoft.com/office/drawing/2014/main" id="{BC26BFB4-0829-4EF7-B551-E33F9117E645}"/>
               </a:ext>
             </a:extLst>
           </p:cNvPr>
@@ -4893,7 +4893,7 @@
           <p:cNvPr id="45" name="Rectangle: Rounded Corners 44">
             <a:extLst>
               <a:ext uri="{FF2B5EF4-FFF2-40B4-BE49-F238E27FC236}">
-                <a16:creationId xmlns:a16="http://schemas.microsoft.com/office/drawing/2014/main" xmlns="" id="{382337C1-3DAB-4E1C-A8B6-4AA16C3410CE}"/>
+                <a16:creationId xmlns="" xmlns:a16="http://schemas.microsoft.com/office/drawing/2014/main" id="{382337C1-3DAB-4E1C-A8B6-4AA16C3410CE}"/>
               </a:ext>
             </a:extLst>
           </p:cNvPr>
@@ -5045,7 +5045,7 @@
           <p:cNvPr id="46" name="Rectangle: Rounded Corners 45">
             <a:extLst>
               <a:ext uri="{FF2B5EF4-FFF2-40B4-BE49-F238E27FC236}">
-                <a16:creationId xmlns:a16="http://schemas.microsoft.com/office/drawing/2014/main" xmlns="" id="{4369A102-1733-46FB-85EB-77C0CAB96BEB}"/>
+                <a16:creationId xmlns="" xmlns:a16="http://schemas.microsoft.com/office/drawing/2014/main" id="{4369A102-1733-46FB-85EB-77C0CAB96BEB}"/>
               </a:ext>
             </a:extLst>
           </p:cNvPr>
@@ -5295,7 +5295,7 @@
           <p:cNvPr id="70" name="Group 69">
             <a:extLst>
               <a:ext uri="{FF2B5EF4-FFF2-40B4-BE49-F238E27FC236}">
-                <a16:creationId xmlns:a16="http://schemas.microsoft.com/office/drawing/2014/main" xmlns="" id="{03E82210-D12A-4472-8E82-5C642547A5AD}"/>
+                <a16:creationId xmlns="" xmlns:a16="http://schemas.microsoft.com/office/drawing/2014/main" id="{03E82210-D12A-4472-8E82-5C642547A5AD}"/>
               </a:ext>
             </a:extLst>
           </p:cNvPr>
@@ -5315,7 +5315,7 @@
             <p:cNvPr id="49" name="Arrow: Down 48">
               <a:extLst>
                 <a:ext uri="{FF2B5EF4-FFF2-40B4-BE49-F238E27FC236}">
-                  <a16:creationId xmlns:a16="http://schemas.microsoft.com/office/drawing/2014/main" xmlns="" id="{3B31D1CB-EE12-4C30-9755-0315B7051AAC}"/>
+                  <a16:creationId xmlns="" xmlns:a16="http://schemas.microsoft.com/office/drawing/2014/main" id="{3B31D1CB-EE12-4C30-9755-0315B7051AAC}"/>
                 </a:ext>
               </a:extLst>
             </p:cNvPr>
@@ -5361,7 +5361,7 @@
             <p:cNvPr id="50" name="Arrow: Down 49">
               <a:extLst>
                 <a:ext uri="{FF2B5EF4-FFF2-40B4-BE49-F238E27FC236}">
-                  <a16:creationId xmlns:a16="http://schemas.microsoft.com/office/drawing/2014/main" xmlns="" id="{4CC7C068-0CD8-48B4-8CCB-6BAC503024B1}"/>
+                  <a16:creationId xmlns="" xmlns:a16="http://schemas.microsoft.com/office/drawing/2014/main" id="{4CC7C068-0CD8-48B4-8CCB-6BAC503024B1}"/>
                 </a:ext>
               </a:extLst>
             </p:cNvPr>
@@ -5407,7 +5407,7 @@
             <p:cNvPr id="56" name="Arrow: Down 55">
               <a:extLst>
                 <a:ext uri="{FF2B5EF4-FFF2-40B4-BE49-F238E27FC236}">
-                  <a16:creationId xmlns:a16="http://schemas.microsoft.com/office/drawing/2014/main" xmlns="" id="{08705A44-8E76-40A6-9AEF-3E38498993A3}"/>
+                  <a16:creationId xmlns="" xmlns:a16="http://schemas.microsoft.com/office/drawing/2014/main" id="{08705A44-8E76-40A6-9AEF-3E38498993A3}"/>
                 </a:ext>
               </a:extLst>
             </p:cNvPr>
@@ -5453,7 +5453,7 @@
             <p:cNvPr id="58" name="Arrow: Down 57">
               <a:extLst>
                 <a:ext uri="{FF2B5EF4-FFF2-40B4-BE49-F238E27FC236}">
-                  <a16:creationId xmlns:a16="http://schemas.microsoft.com/office/drawing/2014/main" xmlns="" id="{6F9F05EB-A54D-4318-88A2-04FBDC868428}"/>
+                  <a16:creationId xmlns="" xmlns:a16="http://schemas.microsoft.com/office/drawing/2014/main" id="{6F9F05EB-A54D-4318-88A2-04FBDC868428}"/>
                 </a:ext>
               </a:extLst>
             </p:cNvPr>
@@ -5499,7 +5499,7 @@
             <p:cNvPr id="60" name="Arrow: Down 59">
               <a:extLst>
                 <a:ext uri="{FF2B5EF4-FFF2-40B4-BE49-F238E27FC236}">
-                  <a16:creationId xmlns:a16="http://schemas.microsoft.com/office/drawing/2014/main" xmlns="" id="{A048F72C-C2B7-4E3D-AE7F-6909FE6D260C}"/>
+                  <a16:creationId xmlns="" xmlns:a16="http://schemas.microsoft.com/office/drawing/2014/main" id="{A048F72C-C2B7-4E3D-AE7F-6909FE6D260C}"/>
                 </a:ext>
               </a:extLst>
             </p:cNvPr>
@@ -5545,7 +5545,7 @@
             <p:cNvPr id="61" name="Arrow: Down 60">
               <a:extLst>
                 <a:ext uri="{FF2B5EF4-FFF2-40B4-BE49-F238E27FC236}">
-                  <a16:creationId xmlns:a16="http://schemas.microsoft.com/office/drawing/2014/main" xmlns="" id="{A7694F96-6FA9-4070-811F-859DE3C6C575}"/>
+                  <a16:creationId xmlns="" xmlns:a16="http://schemas.microsoft.com/office/drawing/2014/main" id="{A7694F96-6FA9-4070-811F-859DE3C6C575}"/>
                 </a:ext>
               </a:extLst>
             </p:cNvPr>
@@ -5592,7 +5592,7 @@
           <p:cNvPr id="69" name="Group 68">
             <a:extLst>
               <a:ext uri="{FF2B5EF4-FFF2-40B4-BE49-F238E27FC236}">
-                <a16:creationId xmlns:a16="http://schemas.microsoft.com/office/drawing/2014/main" xmlns="" id="{3065794C-32D8-4296-9C9A-EFC920F7B83A}"/>
+                <a16:creationId xmlns="" xmlns:a16="http://schemas.microsoft.com/office/drawing/2014/main" id="{3065794C-32D8-4296-9C9A-EFC920F7B83A}"/>
               </a:ext>
             </a:extLst>
           </p:cNvPr>
@@ -5612,7 +5612,7 @@
             <p:cNvPr id="51" name="Arrow: Down 50">
               <a:extLst>
                 <a:ext uri="{FF2B5EF4-FFF2-40B4-BE49-F238E27FC236}">
-                  <a16:creationId xmlns:a16="http://schemas.microsoft.com/office/drawing/2014/main" xmlns="" id="{B06F4C8A-27C8-401F-9C7F-ACE6014CB994}"/>
+                  <a16:creationId xmlns="" xmlns:a16="http://schemas.microsoft.com/office/drawing/2014/main" id="{B06F4C8A-27C8-401F-9C7F-ACE6014CB994}"/>
                 </a:ext>
               </a:extLst>
             </p:cNvPr>
@@ -5658,7 +5658,7 @@
             <p:cNvPr id="52" name="Arrow: Down 51">
               <a:extLst>
                 <a:ext uri="{FF2B5EF4-FFF2-40B4-BE49-F238E27FC236}">
-                  <a16:creationId xmlns:a16="http://schemas.microsoft.com/office/drawing/2014/main" xmlns="" id="{3F6578B2-F999-412C-9C07-3C6816BF840C}"/>
+                  <a16:creationId xmlns="" xmlns:a16="http://schemas.microsoft.com/office/drawing/2014/main" id="{3F6578B2-F999-412C-9C07-3C6816BF840C}"/>
                 </a:ext>
               </a:extLst>
             </p:cNvPr>
@@ -5704,7 +5704,7 @@
             <p:cNvPr id="53" name="Arrow: Down 52">
               <a:extLst>
                 <a:ext uri="{FF2B5EF4-FFF2-40B4-BE49-F238E27FC236}">
-                  <a16:creationId xmlns:a16="http://schemas.microsoft.com/office/drawing/2014/main" xmlns="" id="{450EE119-954E-44FE-B4A3-B3DB96644AB9}"/>
+                  <a16:creationId xmlns="" xmlns:a16="http://schemas.microsoft.com/office/drawing/2014/main" id="{450EE119-954E-44FE-B4A3-B3DB96644AB9}"/>
                 </a:ext>
               </a:extLst>
             </p:cNvPr>
@@ -5750,7 +5750,7 @@
             <p:cNvPr id="54" name="Arrow: Down 53">
               <a:extLst>
                 <a:ext uri="{FF2B5EF4-FFF2-40B4-BE49-F238E27FC236}">
-                  <a16:creationId xmlns:a16="http://schemas.microsoft.com/office/drawing/2014/main" xmlns="" id="{A185CF80-D658-411D-BF04-97A9C0FDCFD4}"/>
+                  <a16:creationId xmlns="" xmlns:a16="http://schemas.microsoft.com/office/drawing/2014/main" id="{A185CF80-D658-411D-BF04-97A9C0FDCFD4}"/>
                 </a:ext>
               </a:extLst>
             </p:cNvPr>
@@ -5796,7 +5796,7 @@
             <p:cNvPr id="55" name="Arrow: Down 54">
               <a:extLst>
                 <a:ext uri="{FF2B5EF4-FFF2-40B4-BE49-F238E27FC236}">
-                  <a16:creationId xmlns:a16="http://schemas.microsoft.com/office/drawing/2014/main" xmlns="" id="{305D5E87-D088-4E16-9AAA-9B61A0231F86}"/>
+                  <a16:creationId xmlns="" xmlns:a16="http://schemas.microsoft.com/office/drawing/2014/main" id="{305D5E87-D088-4E16-9AAA-9B61A0231F86}"/>
                 </a:ext>
               </a:extLst>
             </p:cNvPr>
@@ -5842,7 +5842,7 @@
             <p:cNvPr id="57" name="Arrow: Down 56">
               <a:extLst>
                 <a:ext uri="{FF2B5EF4-FFF2-40B4-BE49-F238E27FC236}">
-                  <a16:creationId xmlns:a16="http://schemas.microsoft.com/office/drawing/2014/main" xmlns="" id="{BB4A2EA1-8C7C-4D6C-BC70-96B197B76702}"/>
+                  <a16:creationId xmlns="" xmlns:a16="http://schemas.microsoft.com/office/drawing/2014/main" id="{BB4A2EA1-8C7C-4D6C-BC70-96B197B76702}"/>
                 </a:ext>
               </a:extLst>
             </p:cNvPr>
@@ -5888,7 +5888,7 @@
             <p:cNvPr id="62" name="Arrow: Down 61">
               <a:extLst>
                 <a:ext uri="{FF2B5EF4-FFF2-40B4-BE49-F238E27FC236}">
-                  <a16:creationId xmlns:a16="http://schemas.microsoft.com/office/drawing/2014/main" xmlns="" id="{21AE7CA0-F8AF-4ECD-8916-5286110EECC3}"/>
+                  <a16:creationId xmlns="" xmlns:a16="http://schemas.microsoft.com/office/drawing/2014/main" id="{21AE7CA0-F8AF-4ECD-8916-5286110EECC3}"/>
                 </a:ext>
               </a:extLst>
             </p:cNvPr>
@@ -5934,7 +5934,7 @@
             <p:cNvPr id="63" name="Arrow: Down 62">
               <a:extLst>
                 <a:ext uri="{FF2B5EF4-FFF2-40B4-BE49-F238E27FC236}">
-                  <a16:creationId xmlns:a16="http://schemas.microsoft.com/office/drawing/2014/main" xmlns="" id="{751F3152-1F2D-4A6E-A117-0416A26B03AA}"/>
+                  <a16:creationId xmlns="" xmlns:a16="http://schemas.microsoft.com/office/drawing/2014/main" id="{751F3152-1F2D-4A6E-A117-0416A26B03AA}"/>
                 </a:ext>
               </a:extLst>
             </p:cNvPr>
@@ -5980,7 +5980,7 @@
             <p:cNvPr id="64" name="Arrow: Down 63">
               <a:extLst>
                 <a:ext uri="{FF2B5EF4-FFF2-40B4-BE49-F238E27FC236}">
-                  <a16:creationId xmlns:a16="http://schemas.microsoft.com/office/drawing/2014/main" xmlns="" id="{807E50BC-DEF8-4CE2-A25C-A4DFC88D14A0}"/>
+                  <a16:creationId xmlns="" xmlns:a16="http://schemas.microsoft.com/office/drawing/2014/main" id="{807E50BC-DEF8-4CE2-A25C-A4DFC88D14A0}"/>
                 </a:ext>
               </a:extLst>
             </p:cNvPr>
@@ -6026,7 +6026,7 @@
             <p:cNvPr id="65" name="Arrow: Down 64">
               <a:extLst>
                 <a:ext uri="{FF2B5EF4-FFF2-40B4-BE49-F238E27FC236}">
-                  <a16:creationId xmlns:a16="http://schemas.microsoft.com/office/drawing/2014/main" xmlns="" id="{5569AB8E-DA9B-4319-BB74-F7B35ED9C963}"/>
+                  <a16:creationId xmlns="" xmlns:a16="http://schemas.microsoft.com/office/drawing/2014/main" id="{5569AB8E-DA9B-4319-BB74-F7B35ED9C963}"/>
                 </a:ext>
               </a:extLst>
             </p:cNvPr>
@@ -6072,7 +6072,7 @@
             <p:cNvPr id="66" name="Arrow: Down 65">
               <a:extLst>
                 <a:ext uri="{FF2B5EF4-FFF2-40B4-BE49-F238E27FC236}">
-                  <a16:creationId xmlns:a16="http://schemas.microsoft.com/office/drawing/2014/main" xmlns="" id="{4FF32172-E710-4741-8DB4-EB4A9F2D3C59}"/>
+                  <a16:creationId xmlns="" xmlns:a16="http://schemas.microsoft.com/office/drawing/2014/main" id="{4FF32172-E710-4741-8DB4-EB4A9F2D3C59}"/>
                 </a:ext>
               </a:extLst>
             </p:cNvPr>
@@ -6118,7 +6118,7 @@
             <p:cNvPr id="67" name="Arrow: Down 66">
               <a:extLst>
                 <a:ext uri="{FF2B5EF4-FFF2-40B4-BE49-F238E27FC236}">
-                  <a16:creationId xmlns:a16="http://schemas.microsoft.com/office/drawing/2014/main" xmlns="" id="{3AFFA1E1-8DAA-4BA0-88A8-91731D3A12CC}"/>
+                  <a16:creationId xmlns="" xmlns:a16="http://schemas.microsoft.com/office/drawing/2014/main" id="{3AFFA1E1-8DAA-4BA0-88A8-91731D3A12CC}"/>
                 </a:ext>
               </a:extLst>
             </p:cNvPr>
@@ -6164,7 +6164,7 @@
             <p:cNvPr id="68" name="Arrow: Down 67">
               <a:extLst>
                 <a:ext uri="{FF2B5EF4-FFF2-40B4-BE49-F238E27FC236}">
-                  <a16:creationId xmlns:a16="http://schemas.microsoft.com/office/drawing/2014/main" xmlns="" id="{4AF4710B-7AD0-4B1D-8526-591AB2625845}"/>
+                  <a16:creationId xmlns="" xmlns:a16="http://schemas.microsoft.com/office/drawing/2014/main" id="{4AF4710B-7AD0-4B1D-8526-591AB2625845}"/>
                 </a:ext>
               </a:extLst>
             </p:cNvPr>
@@ -6211,7 +6211,7 @@
           <p:cNvPr id="71" name="Rectangle: Rounded Corners 70">
             <a:extLst>
               <a:ext uri="{FF2B5EF4-FFF2-40B4-BE49-F238E27FC236}">
-                <a16:creationId xmlns:a16="http://schemas.microsoft.com/office/drawing/2014/main" xmlns="" id="{5F7A2BB6-CE87-4F3B-A640-9373397F480A}"/>
+                <a16:creationId xmlns="" xmlns:a16="http://schemas.microsoft.com/office/drawing/2014/main" id="{5F7A2BB6-CE87-4F3B-A640-9373397F480A}"/>
               </a:ext>
             </a:extLst>
           </p:cNvPr>
@@ -6391,7 +6391,7 @@
           <p:cNvPr id="80" name="Group 79">
             <a:extLst>
               <a:ext uri="{FF2B5EF4-FFF2-40B4-BE49-F238E27FC236}">
-                <a16:creationId xmlns:a16="http://schemas.microsoft.com/office/drawing/2014/main" xmlns="" id="{9C240103-050A-4695-BF9F-5537C248F66A}"/>
+                <a16:creationId xmlns="" xmlns:a16="http://schemas.microsoft.com/office/drawing/2014/main" id="{9C240103-050A-4695-BF9F-5537C248F66A}"/>
               </a:ext>
             </a:extLst>
           </p:cNvPr>
@@ -6411,7 +6411,7 @@
             <p:cNvPr id="72" name="Oval 71">
               <a:extLst>
                 <a:ext uri="{FF2B5EF4-FFF2-40B4-BE49-F238E27FC236}">
-                  <a16:creationId xmlns:a16="http://schemas.microsoft.com/office/drawing/2014/main" xmlns="" id="{72173DFC-7F98-4DB4-B138-D097FF7B3FD7}"/>
+                  <a16:creationId xmlns="" xmlns:a16="http://schemas.microsoft.com/office/drawing/2014/main" id="{72173DFC-7F98-4DB4-B138-D097FF7B3FD7}"/>
                 </a:ext>
               </a:extLst>
             </p:cNvPr>
@@ -6457,7 +6457,7 @@
             <p:cNvPr id="73" name="Oval 72">
               <a:extLst>
                 <a:ext uri="{FF2B5EF4-FFF2-40B4-BE49-F238E27FC236}">
-                  <a16:creationId xmlns:a16="http://schemas.microsoft.com/office/drawing/2014/main" xmlns="" id="{5EAF5F0D-D560-4D91-87F0-B88A371197A7}"/>
+                  <a16:creationId xmlns="" xmlns:a16="http://schemas.microsoft.com/office/drawing/2014/main" id="{5EAF5F0D-D560-4D91-87F0-B88A371197A7}"/>
                 </a:ext>
               </a:extLst>
             </p:cNvPr>
@@ -6503,7 +6503,7 @@
             <p:cNvPr id="74" name="Oval 73">
               <a:extLst>
                 <a:ext uri="{FF2B5EF4-FFF2-40B4-BE49-F238E27FC236}">
-                  <a16:creationId xmlns:a16="http://schemas.microsoft.com/office/drawing/2014/main" xmlns="" id="{6E325FF1-3D01-4062-A828-C83B2E9C2E01}"/>
+                  <a16:creationId xmlns="" xmlns:a16="http://schemas.microsoft.com/office/drawing/2014/main" id="{6E325FF1-3D01-4062-A828-C83B2E9C2E01}"/>
                 </a:ext>
               </a:extLst>
             </p:cNvPr>
@@ -6549,7 +6549,7 @@
             <p:cNvPr id="75" name="Oval 74">
               <a:extLst>
                 <a:ext uri="{FF2B5EF4-FFF2-40B4-BE49-F238E27FC236}">
-                  <a16:creationId xmlns:a16="http://schemas.microsoft.com/office/drawing/2014/main" xmlns="" id="{041CAB99-80D9-49CB-961D-7B48F675860D}"/>
+                  <a16:creationId xmlns="" xmlns:a16="http://schemas.microsoft.com/office/drawing/2014/main" id="{041CAB99-80D9-49CB-961D-7B48F675860D}"/>
                 </a:ext>
               </a:extLst>
             </p:cNvPr>
@@ -6595,7 +6595,7 @@
             <p:cNvPr id="76" name="Oval 75">
               <a:extLst>
                 <a:ext uri="{FF2B5EF4-FFF2-40B4-BE49-F238E27FC236}">
-                  <a16:creationId xmlns:a16="http://schemas.microsoft.com/office/drawing/2014/main" xmlns="" id="{0831FE5F-41A6-4901-A63B-4B4D462CBFF8}"/>
+                  <a16:creationId xmlns="" xmlns:a16="http://schemas.microsoft.com/office/drawing/2014/main" id="{0831FE5F-41A6-4901-A63B-4B4D462CBFF8}"/>
                 </a:ext>
               </a:extLst>
             </p:cNvPr>
@@ -6641,7 +6641,7 @@
             <p:cNvPr id="77" name="Oval 76">
               <a:extLst>
                 <a:ext uri="{FF2B5EF4-FFF2-40B4-BE49-F238E27FC236}">
-                  <a16:creationId xmlns:a16="http://schemas.microsoft.com/office/drawing/2014/main" xmlns="" id="{20E7703C-2A7D-4793-9329-B009C393EF66}"/>
+                  <a16:creationId xmlns="" xmlns:a16="http://schemas.microsoft.com/office/drawing/2014/main" id="{20E7703C-2A7D-4793-9329-B009C393EF66}"/>
                 </a:ext>
               </a:extLst>
             </p:cNvPr>
@@ -6687,7 +6687,7 @@
             <p:cNvPr id="78" name="Oval 77">
               <a:extLst>
                 <a:ext uri="{FF2B5EF4-FFF2-40B4-BE49-F238E27FC236}">
-                  <a16:creationId xmlns:a16="http://schemas.microsoft.com/office/drawing/2014/main" xmlns="" id="{D5806448-D69B-446D-AB6C-3D9967150298}"/>
+                  <a16:creationId xmlns="" xmlns:a16="http://schemas.microsoft.com/office/drawing/2014/main" id="{D5806448-D69B-446D-AB6C-3D9967150298}"/>
                 </a:ext>
               </a:extLst>
             </p:cNvPr>
@@ -6733,7 +6733,7 @@
             <p:cNvPr id="79" name="Oval 78">
               <a:extLst>
                 <a:ext uri="{FF2B5EF4-FFF2-40B4-BE49-F238E27FC236}">
-                  <a16:creationId xmlns:a16="http://schemas.microsoft.com/office/drawing/2014/main" xmlns="" id="{80035BDB-E69C-4D0D-9A50-0249359E0168}"/>
+                  <a16:creationId xmlns="" xmlns:a16="http://schemas.microsoft.com/office/drawing/2014/main" id="{80035BDB-E69C-4D0D-9A50-0249359E0168}"/>
                 </a:ext>
               </a:extLst>
             </p:cNvPr>
@@ -6818,7 +6818,7 @@
           <p:cNvPr id="4" name="Rectangle 3">
             <a:extLst>
               <a:ext uri="{FF2B5EF4-FFF2-40B4-BE49-F238E27FC236}">
-                <a16:creationId xmlns:a16="http://schemas.microsoft.com/office/drawing/2014/main" xmlns="" id="{3263A579-F937-472F-BAC8-0F6DBD133059}"/>
+                <a16:creationId xmlns="" xmlns:a16="http://schemas.microsoft.com/office/drawing/2014/main" id="{3263A579-F937-472F-BAC8-0F6DBD133059}"/>
               </a:ext>
             </a:extLst>
           </p:cNvPr>
@@ -7204,7 +7204,7 @@
           <p:cNvPr id="6" name="Flowchart: Terminator 5">
             <a:extLst>
               <a:ext uri="{FF2B5EF4-FFF2-40B4-BE49-F238E27FC236}">
-                <a16:creationId xmlns:a16="http://schemas.microsoft.com/office/drawing/2014/main" xmlns="" id="{BC26BFB4-0829-4EF7-B551-E33F9117E645}"/>
+                <a16:creationId xmlns="" xmlns:a16="http://schemas.microsoft.com/office/drawing/2014/main" id="{BC26BFB4-0829-4EF7-B551-E33F9117E645}"/>
               </a:ext>
             </a:extLst>
           </p:cNvPr>
@@ -7262,7 +7262,7 @@
           <p:cNvPr id="12" name="Rectangle: Rounded Corners 11">
             <a:extLst>
               <a:ext uri="{FF2B5EF4-FFF2-40B4-BE49-F238E27FC236}">
-                <a16:creationId xmlns:a16="http://schemas.microsoft.com/office/drawing/2014/main" xmlns="" id="{C9F7093C-C50F-438A-839F-B4C8765447D9}"/>
+                <a16:creationId xmlns="" xmlns:a16="http://schemas.microsoft.com/office/drawing/2014/main" id="{C9F7093C-C50F-438A-839F-B4C8765447D9}"/>
               </a:ext>
             </a:extLst>
           </p:cNvPr>
@@ -7312,7 +7312,7 @@
           <p:cNvPr id="16" name="Rectangle: Rounded Corners 15">
             <a:extLst>
               <a:ext uri="{FF2B5EF4-FFF2-40B4-BE49-F238E27FC236}">
-                <a16:creationId xmlns:a16="http://schemas.microsoft.com/office/drawing/2014/main" xmlns="" id="{D7EEB2C4-B890-4392-A7C8-E0EC180B599F}"/>
+                <a16:creationId xmlns="" xmlns:a16="http://schemas.microsoft.com/office/drawing/2014/main" id="{D7EEB2C4-B890-4392-A7C8-E0EC180B599F}"/>
               </a:ext>
             </a:extLst>
           </p:cNvPr>
@@ -7369,7 +7369,7 @@
           <p:cNvPr id="17" name="Rectangle: Rounded Corners 16">
             <a:extLst>
               <a:ext uri="{FF2B5EF4-FFF2-40B4-BE49-F238E27FC236}">
-                <a16:creationId xmlns:a16="http://schemas.microsoft.com/office/drawing/2014/main" xmlns="" id="{8D71A6A2-5002-4E07-8233-8FECD70213FF}"/>
+                <a16:creationId xmlns="" xmlns:a16="http://schemas.microsoft.com/office/drawing/2014/main" id="{8D71A6A2-5002-4E07-8233-8FECD70213FF}"/>
               </a:ext>
             </a:extLst>
           </p:cNvPr>
@@ -7431,7 +7431,7 @@
           <p:cNvPr id="18" name="Rectangle: Rounded Corners 17">
             <a:extLst>
               <a:ext uri="{FF2B5EF4-FFF2-40B4-BE49-F238E27FC236}">
-                <a16:creationId xmlns:a16="http://schemas.microsoft.com/office/drawing/2014/main" xmlns="" id="{D86FA6EC-8703-4B04-A6F7-1E04207D8415}"/>
+                <a16:creationId xmlns="" xmlns:a16="http://schemas.microsoft.com/office/drawing/2014/main" id="{D86FA6EC-8703-4B04-A6F7-1E04207D8415}"/>
               </a:ext>
             </a:extLst>
           </p:cNvPr>
@@ -7493,7 +7493,7 @@
           <p:cNvPr id="22" name="Rectangle: Rounded Corners 21">
             <a:extLst>
               <a:ext uri="{FF2B5EF4-FFF2-40B4-BE49-F238E27FC236}">
-                <a16:creationId xmlns:a16="http://schemas.microsoft.com/office/drawing/2014/main" xmlns="" id="{A6AEB402-3F5C-4753-BA98-17D23F1489EC}"/>
+                <a16:creationId xmlns="" xmlns:a16="http://schemas.microsoft.com/office/drawing/2014/main" id="{A6AEB402-3F5C-4753-BA98-17D23F1489EC}"/>
               </a:ext>
             </a:extLst>
           </p:cNvPr>
@@ -7555,7 +7555,7 @@
           <p:cNvPr id="23" name="Rectangle: Rounded Corners 22">
             <a:extLst>
               <a:ext uri="{FF2B5EF4-FFF2-40B4-BE49-F238E27FC236}">
-                <a16:creationId xmlns:a16="http://schemas.microsoft.com/office/drawing/2014/main" xmlns="" id="{56F285B2-2513-4C85-99BA-0A54326A4B7D}"/>
+                <a16:creationId xmlns="" xmlns:a16="http://schemas.microsoft.com/office/drawing/2014/main" id="{56F285B2-2513-4C85-99BA-0A54326A4B7D}"/>
               </a:ext>
             </a:extLst>
           </p:cNvPr>
@@ -7617,7 +7617,7 @@
           <p:cNvPr id="24" name="Rectangle: Rounded Corners 23">
             <a:extLst>
               <a:ext uri="{FF2B5EF4-FFF2-40B4-BE49-F238E27FC236}">
-                <a16:creationId xmlns:a16="http://schemas.microsoft.com/office/drawing/2014/main" xmlns="" id="{F597A463-A8FF-4FF5-BC0F-153123683A10}"/>
+                <a16:creationId xmlns="" xmlns:a16="http://schemas.microsoft.com/office/drawing/2014/main" id="{F597A463-A8FF-4FF5-BC0F-153123683A10}"/>
               </a:ext>
             </a:extLst>
           </p:cNvPr>
@@ -7676,7 +7676,7 @@
           <p:cNvPr id="25" name="Rectangle: Rounded Corners 24">
             <a:extLst>
               <a:ext uri="{FF2B5EF4-FFF2-40B4-BE49-F238E27FC236}">
-                <a16:creationId xmlns:a16="http://schemas.microsoft.com/office/drawing/2014/main" xmlns="" id="{19DB7B19-D874-405C-A27B-8A5D038EA782}"/>
+                <a16:creationId xmlns="" xmlns:a16="http://schemas.microsoft.com/office/drawing/2014/main" id="{19DB7B19-D874-405C-A27B-8A5D038EA782}"/>
               </a:ext>
             </a:extLst>
           </p:cNvPr>
@@ -7738,7 +7738,7 @@
           <p:cNvPr id="26" name="Rectangle: Rounded Corners 25">
             <a:extLst>
               <a:ext uri="{FF2B5EF4-FFF2-40B4-BE49-F238E27FC236}">
-                <a16:creationId xmlns:a16="http://schemas.microsoft.com/office/drawing/2014/main" xmlns="" id="{2B5C6BA9-D2AF-486B-8361-ED0C4EEDD119}"/>
+                <a16:creationId xmlns="" xmlns:a16="http://schemas.microsoft.com/office/drawing/2014/main" id="{2B5C6BA9-D2AF-486B-8361-ED0C4EEDD119}"/>
               </a:ext>
             </a:extLst>
           </p:cNvPr>
@@ -7800,7 +7800,7 @@
           <p:cNvPr id="27" name="Rectangle: Rounded Corners 26">
             <a:extLst>
               <a:ext uri="{FF2B5EF4-FFF2-40B4-BE49-F238E27FC236}">
-                <a16:creationId xmlns:a16="http://schemas.microsoft.com/office/drawing/2014/main" xmlns="" id="{54C5C5E1-A442-4CFB-8B18-10B68FD458C5}"/>
+                <a16:creationId xmlns="" xmlns:a16="http://schemas.microsoft.com/office/drawing/2014/main" id="{54C5C5E1-A442-4CFB-8B18-10B68FD458C5}"/>
               </a:ext>
             </a:extLst>
           </p:cNvPr>
@@ -7859,7 +7859,7 @@
           <p:cNvPr id="29" name="Flowchart: Terminator 28">
             <a:extLst>
               <a:ext uri="{FF2B5EF4-FFF2-40B4-BE49-F238E27FC236}">
-                <a16:creationId xmlns:a16="http://schemas.microsoft.com/office/drawing/2014/main" xmlns="" id="{ADF703A3-E58C-49CA-86A6-62D3D4DB9A13}"/>
+                <a16:creationId xmlns="" xmlns:a16="http://schemas.microsoft.com/office/drawing/2014/main" id="{ADF703A3-E58C-49CA-86A6-62D3D4DB9A13}"/>
               </a:ext>
             </a:extLst>
           </p:cNvPr>
@@ -7919,7 +7919,7 @@
           <p:cNvPr id="30" name="Rectangle: Rounded Corners 29">
             <a:extLst>
               <a:ext uri="{FF2B5EF4-FFF2-40B4-BE49-F238E27FC236}">
-                <a16:creationId xmlns:a16="http://schemas.microsoft.com/office/drawing/2014/main" xmlns="" id="{92C05959-AC73-403C-A95A-568E2827F8D0}"/>
+                <a16:creationId xmlns="" xmlns:a16="http://schemas.microsoft.com/office/drawing/2014/main" id="{92C05959-AC73-403C-A95A-568E2827F8D0}"/>
               </a:ext>
             </a:extLst>
           </p:cNvPr>
@@ -7978,7 +7978,7 @@
           <p:cNvPr id="31" name="Rectangle: Rounded Corners 30">
             <a:extLst>
               <a:ext uri="{FF2B5EF4-FFF2-40B4-BE49-F238E27FC236}">
-                <a16:creationId xmlns:a16="http://schemas.microsoft.com/office/drawing/2014/main" xmlns="" id="{43AF902B-C890-4D65-9F93-738A95F259B5}"/>
+                <a16:creationId xmlns="" xmlns:a16="http://schemas.microsoft.com/office/drawing/2014/main" id="{43AF902B-C890-4D65-9F93-738A95F259B5}"/>
               </a:ext>
             </a:extLst>
           </p:cNvPr>
@@ -8037,7 +8037,7 @@
           <p:cNvPr id="32" name="Rectangle: Rounded Corners 31">
             <a:extLst>
               <a:ext uri="{FF2B5EF4-FFF2-40B4-BE49-F238E27FC236}">
-                <a16:creationId xmlns:a16="http://schemas.microsoft.com/office/drawing/2014/main" xmlns="" id="{1854DCE2-341D-4C82-9567-30AF7CE5C5B6}"/>
+                <a16:creationId xmlns="" xmlns:a16="http://schemas.microsoft.com/office/drawing/2014/main" id="{1854DCE2-341D-4C82-9567-30AF7CE5C5B6}"/>
               </a:ext>
             </a:extLst>
           </p:cNvPr>
@@ -8096,7 +8096,7 @@
           <p:cNvPr id="37" name="Group 36">
             <a:extLst>
               <a:ext uri="{FF2B5EF4-FFF2-40B4-BE49-F238E27FC236}">
-                <a16:creationId xmlns:a16="http://schemas.microsoft.com/office/drawing/2014/main" xmlns="" id="{95307ECB-14EA-44E0-8191-47990F854CBD}"/>
+                <a16:creationId xmlns="" xmlns:a16="http://schemas.microsoft.com/office/drawing/2014/main" id="{95307ECB-14EA-44E0-8191-47990F854CBD}"/>
               </a:ext>
             </a:extLst>
           </p:cNvPr>
@@ -8116,7 +8116,7 @@
             <p:cNvPr id="34" name="Straight Connector 33">
               <a:extLst>
                 <a:ext uri="{FF2B5EF4-FFF2-40B4-BE49-F238E27FC236}">
-                  <a16:creationId xmlns:a16="http://schemas.microsoft.com/office/drawing/2014/main" xmlns="" id="{2025FCE6-7418-45FE-B895-69BA30956D65}"/>
+                  <a16:creationId xmlns="" xmlns:a16="http://schemas.microsoft.com/office/drawing/2014/main" id="{2025FCE6-7418-45FE-B895-69BA30956D65}"/>
                 </a:ext>
               </a:extLst>
             </p:cNvPr>
@@ -8157,7 +8157,7 @@
             <p:cNvPr id="36" name="Straight Connector 35">
               <a:extLst>
                 <a:ext uri="{FF2B5EF4-FFF2-40B4-BE49-F238E27FC236}">
-                  <a16:creationId xmlns:a16="http://schemas.microsoft.com/office/drawing/2014/main" xmlns="" id="{92FF3B5C-04C1-426B-B996-38950C257456}"/>
+                  <a16:creationId xmlns="" xmlns:a16="http://schemas.microsoft.com/office/drawing/2014/main" id="{92FF3B5C-04C1-426B-B996-38950C257456}"/>
                 </a:ext>
               </a:extLst>
             </p:cNvPr>
@@ -8199,7 +8199,7 @@
           <p:cNvPr id="38" name="Freeform: Shape 37">
             <a:extLst>
               <a:ext uri="{FF2B5EF4-FFF2-40B4-BE49-F238E27FC236}">
-                <a16:creationId xmlns:a16="http://schemas.microsoft.com/office/drawing/2014/main" xmlns="" id="{F0626870-8373-43C4-B3D8-1925FCF6898B}"/>
+                <a16:creationId xmlns="" xmlns:a16="http://schemas.microsoft.com/office/drawing/2014/main" id="{F0626870-8373-43C4-B3D8-1925FCF6898B}"/>
               </a:ext>
             </a:extLst>
           </p:cNvPr>
@@ -8328,7 +8328,7 @@
           <p:cNvPr id="42" name="Straight Connector 41">
             <a:extLst>
               <a:ext uri="{FF2B5EF4-FFF2-40B4-BE49-F238E27FC236}">
-                <a16:creationId xmlns:a16="http://schemas.microsoft.com/office/drawing/2014/main" xmlns="" id="{027B55EC-0664-42E0-B88D-690128D86096}"/>
+                <a16:creationId xmlns="" xmlns:a16="http://schemas.microsoft.com/office/drawing/2014/main" id="{027B55EC-0664-42E0-B88D-690128D86096}"/>
               </a:ext>
             </a:extLst>
           </p:cNvPr>
@@ -8481,7 +8481,6 @@
               <a:rPr lang="en-US" dirty="0"/>
               <a:t>container</a:t>
             </a:r>
-            <a:endParaRPr lang="en-US" dirty="0"/>
           </a:p>
         </p:txBody>
       </p:sp>
@@ -8521,11 +8520,7 @@
             <a:pPr algn="ctr"/>
             <a:r>
               <a:rPr lang="en-US" dirty="0" smtClean="0"/>
-              <a:t>To Sell </a:t>
-            </a:r>
-            <a:r>
-              <a:rPr lang="en-US" dirty="0" smtClean="0"/>
-              <a:t>container</a:t>
+              <a:t>To Sell container</a:t>
             </a:r>
             <a:endParaRPr lang="en-US" dirty="0"/>
           </a:p>
@@ -8573,7 +8568,6 @@
               <a:rPr lang="en-US" dirty="0"/>
               <a:t>container</a:t>
             </a:r>
-            <a:endParaRPr lang="en-US" dirty="0"/>
           </a:p>
         </p:txBody>
       </p:sp>
@@ -8782,11 +8776,7 @@
             </a:r>
             <a:r>
               <a:rPr lang="en-US" smtClean="0"/>
-              <a:t>tickers </a:t>
-            </a:r>
-            <a:r>
-              <a:rPr lang="en-US" smtClean="0"/>
-              <a:t>container</a:t>
+              <a:t>tickers container</a:t>
             </a:r>
             <a:endParaRPr lang="en-US" dirty="0"/>
           </a:p>
@@ -8900,11 +8890,7 @@
             <a:pPr algn="ctr"/>
             <a:r>
               <a:rPr lang="en-US" dirty="0" smtClean="0"/>
-              <a:t>Model </a:t>
-            </a:r>
-            <a:r>
-              <a:rPr lang="en-US" dirty="0" smtClean="0"/>
-              <a:t>container</a:t>
+              <a:t>Model container</a:t>
             </a:r>
             <a:endParaRPr lang="en-US" dirty="0"/>
           </a:p>
@@ -9240,11 +9226,7 @@
             <a:pPr algn="ctr"/>
             <a:r>
               <a:rPr lang="en-US" dirty="0" smtClean="0"/>
-              <a:t>Searchable list of tickers </a:t>
-            </a:r>
-            <a:r>
-              <a:rPr lang="en-US" dirty="0" smtClean="0"/>
-              <a:t>container</a:t>
+              <a:t>Searchable list of tickers container</a:t>
             </a:r>
             <a:endParaRPr lang="en-US" dirty="0"/>
           </a:p>

</xml_diff>

<commit_message>
adjusted Model setup. still needs work to allow for pandas dataframes
</commit_message>
<xml_diff>
--- a/Visualizer/Mockup.pptx
+++ b/Visualizer/Mockup.pptx
@@ -5,13 +5,14 @@
     <p:sldMasterId id="2147483648" r:id="rId1"/>
   </p:sldMasterIdLst>
   <p:notesMasterIdLst>
-    <p:notesMasterId r:id="rId6"/>
+    <p:notesMasterId r:id="rId7"/>
   </p:notesMasterIdLst>
   <p:sldIdLst>
     <p:sldId id="256" r:id="rId2"/>
     <p:sldId id="257" r:id="rId3"/>
     <p:sldId id="258" r:id="rId4"/>
     <p:sldId id="259" r:id="rId5"/>
+    <p:sldId id="260" r:id="rId6"/>
   </p:sldIdLst>
   <p:sldSz cx="12192000" cy="6858000"/>
   <p:notesSz cx="6858000" cy="9144000"/>
@@ -772,7 +773,7 @@
           <a:p>
             <a:fld id="{673963D5-4371-401D-8498-500035853EE3}" type="datetimeFigureOut">
               <a:rPr lang="en-US" smtClean="0"/>
-              <a:t>9/28/18</a:t>
+              <a:t>9/29/18</a:t>
             </a:fld>
             <a:endParaRPr lang="en-US"/>
           </a:p>
@@ -1230,6 +1231,159 @@
 </p:notes>
 </file>
 
+<file path=ppt/notesSlides/notesSlide3.xml><?xml version="1.0" encoding="utf-8"?>
+<p:notes xmlns:a="http://schemas.openxmlformats.org/drawingml/2006/main" xmlns:r="http://schemas.openxmlformats.org/officeDocument/2006/relationships" xmlns:p="http://schemas.openxmlformats.org/presentationml/2006/main">
+  <p:cSld>
+    <p:spTree>
+      <p:nvGrpSpPr>
+        <p:cNvPr id="1" name=""/>
+        <p:cNvGrpSpPr/>
+        <p:nvPr/>
+      </p:nvGrpSpPr>
+      <p:grpSpPr>
+        <a:xfrm>
+          <a:off x="0" y="0"/>
+          <a:ext cx="0" cy="0"/>
+          <a:chOff x="0" y="0"/>
+          <a:chExt cx="0" cy="0"/>
+        </a:xfrm>
+      </p:grpSpPr>
+      <p:sp>
+        <p:nvSpPr>
+          <p:cNvPr id="2" name="Slide Image Placeholder 1"/>
+          <p:cNvSpPr>
+            <a:spLocks noGrp="1" noRot="1" noChangeAspect="1"/>
+          </p:cNvSpPr>
+          <p:nvPr>
+            <p:ph type="sldImg"/>
+          </p:nvPr>
+        </p:nvSpPr>
+        <p:spPr/>
+      </p:sp>
+      <p:sp>
+        <p:nvSpPr>
+          <p:cNvPr id="3" name="Notes Placeholder 2"/>
+          <p:cNvSpPr>
+            <a:spLocks noGrp="1"/>
+          </p:cNvSpPr>
+          <p:nvPr>
+            <p:ph type="body" idx="1"/>
+          </p:nvPr>
+        </p:nvSpPr>
+        <p:spPr/>
+        <p:txBody>
+          <a:bodyPr/>
+          <a:lstStyle/>
+          <a:p>
+            <a:r>
+              <a:rPr lang="en-US" dirty="0" smtClean="0"/>
+              <a:t>Data</a:t>
+            </a:r>
+            <a:r>
+              <a:rPr lang="en-US" baseline="0" dirty="0" smtClean="0"/>
+              <a:t> relationships (called a model in Computer Science)</a:t>
+            </a:r>
+          </a:p>
+          <a:p>
+            <a:r>
+              <a:rPr lang="en-US" baseline="0" dirty="0" smtClean="0"/>
+              <a:t>Option 1: Stocks have </a:t>
+            </a:r>
+            <a:r>
+              <a:rPr lang="en-US" baseline="0" dirty="0" err="1" smtClean="0"/>
+              <a:t>StockModels</a:t>
+            </a:r>
+            <a:endParaRPr lang="en-US" baseline="0" dirty="0" smtClean="0"/>
+          </a:p>
+          <a:p>
+            <a:r>
+              <a:rPr lang="en-US" baseline="0" dirty="0" smtClean="0"/>
+              <a:t>	Cons: Some </a:t>
+            </a:r>
+            <a:r>
+              <a:rPr lang="en-US" baseline="0" dirty="0" err="1" smtClean="0"/>
+              <a:t>StockModels</a:t>
+            </a:r>
+            <a:r>
+              <a:rPr lang="en-US" baseline="0" dirty="0" smtClean="0"/>
+              <a:t> are not unique to a specific stock. We would need to specifically account for those. Such a special case may make our lives harder down the road.</a:t>
+            </a:r>
+          </a:p>
+          <a:p>
+            <a:r>
+              <a:rPr lang="en-US" baseline="0" dirty="0" smtClean="0"/>
+              <a:t>Option 2: </a:t>
+            </a:r>
+            <a:r>
+              <a:rPr lang="en-US" baseline="0" dirty="0" err="1" smtClean="0"/>
+              <a:t>StockModels</a:t>
+            </a:r>
+            <a:r>
+              <a:rPr lang="en-US" baseline="0" dirty="0" smtClean="0"/>
+              <a:t> have Stocks</a:t>
+            </a:r>
+          </a:p>
+          <a:p>
+            <a:r>
+              <a:rPr lang="en-US" baseline="0" dirty="0" smtClean="0"/>
+              <a:t>	Cons: If we add a new stock, we have to add it to every instance of the </a:t>
+            </a:r>
+            <a:r>
+              <a:rPr lang="en-US" baseline="0" dirty="0" err="1" smtClean="0"/>
+              <a:t>StockModel</a:t>
+            </a:r>
+            <a:r>
+              <a:rPr lang="en-US" baseline="0" dirty="0" smtClean="0"/>
+              <a:t> class. Adding and removing stocks is probably more frequent than adding </a:t>
+            </a:r>
+            <a:r>
+              <a:rPr lang="en-US" baseline="0" smtClean="0"/>
+              <a:t>and removing </a:t>
+            </a:r>
+            <a:r>
+              <a:rPr lang="en-US" baseline="0" dirty="0" smtClean="0"/>
+              <a:t>models</a:t>
+            </a:r>
+            <a:endParaRPr lang="en-US" dirty="0"/>
+          </a:p>
+        </p:txBody>
+      </p:sp>
+      <p:sp>
+        <p:nvSpPr>
+          <p:cNvPr id="4" name="Slide Number Placeholder 3"/>
+          <p:cNvSpPr>
+            <a:spLocks noGrp="1"/>
+          </p:cNvSpPr>
+          <p:nvPr>
+            <p:ph type="sldNum" sz="quarter" idx="10"/>
+          </p:nvPr>
+        </p:nvSpPr>
+        <p:spPr/>
+        <p:txBody>
+          <a:bodyPr/>
+          <a:lstStyle/>
+          <a:p>
+            <a:fld id="{D4D4917F-BC4C-4DA5-AD3B-79B914A6C5FA}" type="slidenum">
+              <a:rPr lang="en-US" smtClean="0"/>
+              <a:t>5</a:t>
+            </a:fld>
+            <a:endParaRPr lang="en-US"/>
+          </a:p>
+        </p:txBody>
+      </p:sp>
+    </p:spTree>
+    <p:extLst>
+      <p:ext uri="{BB962C8B-B14F-4D97-AF65-F5344CB8AC3E}">
+        <p14:creationId xmlns:p14="http://schemas.microsoft.com/office/powerpoint/2010/main" val="755739768"/>
+      </p:ext>
+    </p:extLst>
+  </p:cSld>
+  <p:clrMapOvr>
+    <a:masterClrMapping/>
+  </p:clrMapOvr>
+</p:notes>
+</file>
+
 <file path=ppt/slideLayouts/slideLayout1.xml><?xml version="1.0" encoding="utf-8"?>
 <p:sldLayout xmlns:a="http://schemas.openxmlformats.org/drawingml/2006/main" xmlns:r="http://schemas.openxmlformats.org/officeDocument/2006/relationships" xmlns:p="http://schemas.openxmlformats.org/presentationml/2006/main" type="title" preserve="1">
   <p:cSld name="Title Slide">
@@ -1252,7 +1406,7 @@
           <p:cNvPr id="2" name="Title 1">
             <a:extLst>
               <a:ext uri="{FF2B5EF4-FFF2-40B4-BE49-F238E27FC236}">
-                <a16:creationId xmlns="" xmlns:a16="http://schemas.microsoft.com/office/drawing/2014/main" id="{553B6E79-7DCD-4ED3-91A4-44DC27CFA9B1}"/>
+                <a16:creationId xmlns:a16="http://schemas.microsoft.com/office/drawing/2014/main" xmlns="" id="{553B6E79-7DCD-4ED3-91A4-44DC27CFA9B1}"/>
               </a:ext>
             </a:extLst>
           </p:cNvPr>
@@ -1289,7 +1443,7 @@
           <p:cNvPr id="3" name="Subtitle 2">
             <a:extLst>
               <a:ext uri="{FF2B5EF4-FFF2-40B4-BE49-F238E27FC236}">
-                <a16:creationId xmlns="" xmlns:a16="http://schemas.microsoft.com/office/drawing/2014/main" id="{FF133992-35FF-48F9-8BCD-585C3D1BC692}"/>
+                <a16:creationId xmlns:a16="http://schemas.microsoft.com/office/drawing/2014/main" xmlns="" id="{FF133992-35FF-48F9-8BCD-585C3D1BC692}"/>
               </a:ext>
             </a:extLst>
           </p:cNvPr>
@@ -1359,7 +1513,7 @@
           <p:cNvPr id="4" name="Date Placeholder 3">
             <a:extLst>
               <a:ext uri="{FF2B5EF4-FFF2-40B4-BE49-F238E27FC236}">
-                <a16:creationId xmlns="" xmlns:a16="http://schemas.microsoft.com/office/drawing/2014/main" id="{E742DDB7-2C91-4453-B629-95462A7CA797}"/>
+                <a16:creationId xmlns:a16="http://schemas.microsoft.com/office/drawing/2014/main" xmlns="" id="{E742DDB7-2C91-4453-B629-95462A7CA797}"/>
               </a:ext>
             </a:extLst>
           </p:cNvPr>
@@ -1377,7 +1531,7 @@
           <a:p>
             <a:fld id="{38D4318C-2CF8-4E6B-ADD8-B5FDE2DDEB84}" type="datetimeFigureOut">
               <a:rPr lang="en-US" smtClean="0"/>
-              <a:t>9/28/18</a:t>
+              <a:t>9/29/18</a:t>
             </a:fld>
             <a:endParaRPr lang="en-US"/>
           </a:p>
@@ -1388,7 +1542,7 @@
           <p:cNvPr id="5" name="Footer Placeholder 4">
             <a:extLst>
               <a:ext uri="{FF2B5EF4-FFF2-40B4-BE49-F238E27FC236}">
-                <a16:creationId xmlns="" xmlns:a16="http://schemas.microsoft.com/office/drawing/2014/main" id="{9B37D394-7771-4D7B-90C1-CD3BA89AB53B}"/>
+                <a16:creationId xmlns:a16="http://schemas.microsoft.com/office/drawing/2014/main" xmlns="" id="{9B37D394-7771-4D7B-90C1-CD3BA89AB53B}"/>
               </a:ext>
             </a:extLst>
           </p:cNvPr>
@@ -1413,7 +1567,7 @@
           <p:cNvPr id="6" name="Slide Number Placeholder 5">
             <a:extLst>
               <a:ext uri="{FF2B5EF4-FFF2-40B4-BE49-F238E27FC236}">
-                <a16:creationId xmlns="" xmlns:a16="http://schemas.microsoft.com/office/drawing/2014/main" id="{FBF6A34E-6E0D-4342-AFE6-776CAFFAE5EA}"/>
+                <a16:creationId xmlns:a16="http://schemas.microsoft.com/office/drawing/2014/main" xmlns="" id="{FBF6A34E-6E0D-4342-AFE6-776CAFFAE5EA}"/>
               </a:ext>
             </a:extLst>
           </p:cNvPr>
@@ -1472,7 +1626,7 @@
           <p:cNvPr id="2" name="Title 1">
             <a:extLst>
               <a:ext uri="{FF2B5EF4-FFF2-40B4-BE49-F238E27FC236}">
-                <a16:creationId xmlns="" xmlns:a16="http://schemas.microsoft.com/office/drawing/2014/main" id="{E2F3AC27-2B2B-4DD2-A3B2-A7B83B858C11}"/>
+                <a16:creationId xmlns:a16="http://schemas.microsoft.com/office/drawing/2014/main" xmlns="" id="{E2F3AC27-2B2B-4DD2-A3B2-A7B83B858C11}"/>
               </a:ext>
             </a:extLst>
           </p:cNvPr>
@@ -1500,7 +1654,7 @@
           <p:cNvPr id="3" name="Vertical Text Placeholder 2">
             <a:extLst>
               <a:ext uri="{FF2B5EF4-FFF2-40B4-BE49-F238E27FC236}">
-                <a16:creationId xmlns="" xmlns:a16="http://schemas.microsoft.com/office/drawing/2014/main" id="{DACBB971-8C51-4F13-82B5-F8DDA8043A5A}"/>
+                <a16:creationId xmlns:a16="http://schemas.microsoft.com/office/drawing/2014/main" xmlns="" id="{DACBB971-8C51-4F13-82B5-F8DDA8043A5A}"/>
               </a:ext>
             </a:extLst>
           </p:cNvPr>
@@ -1557,7 +1711,7 @@
           <p:cNvPr id="4" name="Date Placeholder 3">
             <a:extLst>
               <a:ext uri="{FF2B5EF4-FFF2-40B4-BE49-F238E27FC236}">
-                <a16:creationId xmlns="" xmlns:a16="http://schemas.microsoft.com/office/drawing/2014/main" id="{A4A1802B-7ADB-4AFC-96BC-CA634765E059}"/>
+                <a16:creationId xmlns:a16="http://schemas.microsoft.com/office/drawing/2014/main" xmlns="" id="{A4A1802B-7ADB-4AFC-96BC-CA634765E059}"/>
               </a:ext>
             </a:extLst>
           </p:cNvPr>
@@ -1575,7 +1729,7 @@
           <a:p>
             <a:fld id="{38D4318C-2CF8-4E6B-ADD8-B5FDE2DDEB84}" type="datetimeFigureOut">
               <a:rPr lang="en-US" smtClean="0"/>
-              <a:t>9/28/18</a:t>
+              <a:t>9/29/18</a:t>
             </a:fld>
             <a:endParaRPr lang="en-US"/>
           </a:p>
@@ -1586,7 +1740,7 @@
           <p:cNvPr id="5" name="Footer Placeholder 4">
             <a:extLst>
               <a:ext uri="{FF2B5EF4-FFF2-40B4-BE49-F238E27FC236}">
-                <a16:creationId xmlns="" xmlns:a16="http://schemas.microsoft.com/office/drawing/2014/main" id="{8B4B1FF8-F774-42CE-BE8D-13A68CFEE4E1}"/>
+                <a16:creationId xmlns:a16="http://schemas.microsoft.com/office/drawing/2014/main" xmlns="" id="{8B4B1FF8-F774-42CE-BE8D-13A68CFEE4E1}"/>
               </a:ext>
             </a:extLst>
           </p:cNvPr>
@@ -1611,7 +1765,7 @@
           <p:cNvPr id="6" name="Slide Number Placeholder 5">
             <a:extLst>
               <a:ext uri="{FF2B5EF4-FFF2-40B4-BE49-F238E27FC236}">
-                <a16:creationId xmlns="" xmlns:a16="http://schemas.microsoft.com/office/drawing/2014/main" id="{CCB3DBFA-E232-45E2-8543-0D9D4BFA8466}"/>
+                <a16:creationId xmlns:a16="http://schemas.microsoft.com/office/drawing/2014/main" xmlns="" id="{CCB3DBFA-E232-45E2-8543-0D9D4BFA8466}"/>
               </a:ext>
             </a:extLst>
           </p:cNvPr>
@@ -1670,7 +1824,7 @@
           <p:cNvPr id="2" name="Vertical Title 1">
             <a:extLst>
               <a:ext uri="{FF2B5EF4-FFF2-40B4-BE49-F238E27FC236}">
-                <a16:creationId xmlns="" xmlns:a16="http://schemas.microsoft.com/office/drawing/2014/main" id="{ED1F32F3-BD63-4C18-8416-13192109A1A6}"/>
+                <a16:creationId xmlns:a16="http://schemas.microsoft.com/office/drawing/2014/main" xmlns="" id="{ED1F32F3-BD63-4C18-8416-13192109A1A6}"/>
               </a:ext>
             </a:extLst>
           </p:cNvPr>
@@ -1703,7 +1857,7 @@
           <p:cNvPr id="3" name="Vertical Text Placeholder 2">
             <a:extLst>
               <a:ext uri="{FF2B5EF4-FFF2-40B4-BE49-F238E27FC236}">
-                <a16:creationId xmlns="" xmlns:a16="http://schemas.microsoft.com/office/drawing/2014/main" id="{79AFEDA7-9D3C-4ED1-A72C-A6ED03095E6A}"/>
+                <a16:creationId xmlns:a16="http://schemas.microsoft.com/office/drawing/2014/main" xmlns="" id="{79AFEDA7-9D3C-4ED1-A72C-A6ED03095E6A}"/>
               </a:ext>
             </a:extLst>
           </p:cNvPr>
@@ -1765,7 +1919,7 @@
           <p:cNvPr id="4" name="Date Placeholder 3">
             <a:extLst>
               <a:ext uri="{FF2B5EF4-FFF2-40B4-BE49-F238E27FC236}">
-                <a16:creationId xmlns="" xmlns:a16="http://schemas.microsoft.com/office/drawing/2014/main" id="{250749DE-3DAA-49A4-A253-00A197FBE495}"/>
+                <a16:creationId xmlns:a16="http://schemas.microsoft.com/office/drawing/2014/main" xmlns="" id="{250749DE-3DAA-49A4-A253-00A197FBE495}"/>
               </a:ext>
             </a:extLst>
           </p:cNvPr>
@@ -1783,7 +1937,7 @@
           <a:p>
             <a:fld id="{38D4318C-2CF8-4E6B-ADD8-B5FDE2DDEB84}" type="datetimeFigureOut">
               <a:rPr lang="en-US" smtClean="0"/>
-              <a:t>9/28/18</a:t>
+              <a:t>9/29/18</a:t>
             </a:fld>
             <a:endParaRPr lang="en-US"/>
           </a:p>
@@ -1794,7 +1948,7 @@
           <p:cNvPr id="5" name="Footer Placeholder 4">
             <a:extLst>
               <a:ext uri="{FF2B5EF4-FFF2-40B4-BE49-F238E27FC236}">
-                <a16:creationId xmlns="" xmlns:a16="http://schemas.microsoft.com/office/drawing/2014/main" id="{78233EA4-7F3B-423C-8FFC-D15CE8DED2FC}"/>
+                <a16:creationId xmlns:a16="http://schemas.microsoft.com/office/drawing/2014/main" xmlns="" id="{78233EA4-7F3B-423C-8FFC-D15CE8DED2FC}"/>
               </a:ext>
             </a:extLst>
           </p:cNvPr>
@@ -1819,7 +1973,7 @@
           <p:cNvPr id="6" name="Slide Number Placeholder 5">
             <a:extLst>
               <a:ext uri="{FF2B5EF4-FFF2-40B4-BE49-F238E27FC236}">
-                <a16:creationId xmlns="" xmlns:a16="http://schemas.microsoft.com/office/drawing/2014/main" id="{AAF9BF6B-2EE0-40E0-8B28-2D4EF7E56C0F}"/>
+                <a16:creationId xmlns:a16="http://schemas.microsoft.com/office/drawing/2014/main" xmlns="" id="{AAF9BF6B-2EE0-40E0-8B28-2D4EF7E56C0F}"/>
               </a:ext>
             </a:extLst>
           </p:cNvPr>
@@ -1878,7 +2032,7 @@
           <p:cNvPr id="2" name="Title 1">
             <a:extLst>
               <a:ext uri="{FF2B5EF4-FFF2-40B4-BE49-F238E27FC236}">
-                <a16:creationId xmlns="" xmlns:a16="http://schemas.microsoft.com/office/drawing/2014/main" id="{08F4761C-DFDF-4BED-B6DA-B12B84123C85}"/>
+                <a16:creationId xmlns:a16="http://schemas.microsoft.com/office/drawing/2014/main" xmlns="" id="{08F4761C-DFDF-4BED-B6DA-B12B84123C85}"/>
               </a:ext>
             </a:extLst>
           </p:cNvPr>
@@ -1906,7 +2060,7 @@
           <p:cNvPr id="3" name="Content Placeholder 2">
             <a:extLst>
               <a:ext uri="{FF2B5EF4-FFF2-40B4-BE49-F238E27FC236}">
-                <a16:creationId xmlns="" xmlns:a16="http://schemas.microsoft.com/office/drawing/2014/main" id="{79F31278-087B-4BEB-9BE3-0F8DC19F4A57}"/>
+                <a16:creationId xmlns:a16="http://schemas.microsoft.com/office/drawing/2014/main" xmlns="" id="{79F31278-087B-4BEB-9BE3-0F8DC19F4A57}"/>
               </a:ext>
             </a:extLst>
           </p:cNvPr>
@@ -1963,7 +2117,7 @@
           <p:cNvPr id="4" name="Date Placeholder 3">
             <a:extLst>
               <a:ext uri="{FF2B5EF4-FFF2-40B4-BE49-F238E27FC236}">
-                <a16:creationId xmlns="" xmlns:a16="http://schemas.microsoft.com/office/drawing/2014/main" id="{37E6CAAD-9100-4A5F-9A47-5E37CEE46E2E}"/>
+                <a16:creationId xmlns:a16="http://schemas.microsoft.com/office/drawing/2014/main" xmlns="" id="{37E6CAAD-9100-4A5F-9A47-5E37CEE46E2E}"/>
               </a:ext>
             </a:extLst>
           </p:cNvPr>
@@ -1981,7 +2135,7 @@
           <a:p>
             <a:fld id="{38D4318C-2CF8-4E6B-ADD8-B5FDE2DDEB84}" type="datetimeFigureOut">
               <a:rPr lang="en-US" smtClean="0"/>
-              <a:t>9/28/18</a:t>
+              <a:t>9/29/18</a:t>
             </a:fld>
             <a:endParaRPr lang="en-US"/>
           </a:p>
@@ -1992,7 +2146,7 @@
           <p:cNvPr id="5" name="Footer Placeholder 4">
             <a:extLst>
               <a:ext uri="{FF2B5EF4-FFF2-40B4-BE49-F238E27FC236}">
-                <a16:creationId xmlns="" xmlns:a16="http://schemas.microsoft.com/office/drawing/2014/main" id="{A6346B6E-6081-4251-85B4-0F5F4EC66056}"/>
+                <a16:creationId xmlns:a16="http://schemas.microsoft.com/office/drawing/2014/main" xmlns="" id="{A6346B6E-6081-4251-85B4-0F5F4EC66056}"/>
               </a:ext>
             </a:extLst>
           </p:cNvPr>
@@ -2017,7 +2171,7 @@
           <p:cNvPr id="6" name="Slide Number Placeholder 5">
             <a:extLst>
               <a:ext uri="{FF2B5EF4-FFF2-40B4-BE49-F238E27FC236}">
-                <a16:creationId xmlns="" xmlns:a16="http://schemas.microsoft.com/office/drawing/2014/main" id="{A08ADCFC-1628-46AF-8D8B-11BF134F6FFB}"/>
+                <a16:creationId xmlns:a16="http://schemas.microsoft.com/office/drawing/2014/main" xmlns="" id="{A08ADCFC-1628-46AF-8D8B-11BF134F6FFB}"/>
               </a:ext>
             </a:extLst>
           </p:cNvPr>
@@ -2076,7 +2230,7 @@
           <p:cNvPr id="2" name="Title 1">
             <a:extLst>
               <a:ext uri="{FF2B5EF4-FFF2-40B4-BE49-F238E27FC236}">
-                <a16:creationId xmlns="" xmlns:a16="http://schemas.microsoft.com/office/drawing/2014/main" id="{20A06FCD-43B2-4062-ADE9-5196C80E947B}"/>
+                <a16:creationId xmlns:a16="http://schemas.microsoft.com/office/drawing/2014/main" xmlns="" id="{20A06FCD-43B2-4062-ADE9-5196C80E947B}"/>
               </a:ext>
             </a:extLst>
           </p:cNvPr>
@@ -2113,7 +2267,7 @@
           <p:cNvPr id="3" name="Text Placeholder 2">
             <a:extLst>
               <a:ext uri="{FF2B5EF4-FFF2-40B4-BE49-F238E27FC236}">
-                <a16:creationId xmlns="" xmlns:a16="http://schemas.microsoft.com/office/drawing/2014/main" id="{9689C800-F457-4EAA-8B68-FDB9E698C04A}"/>
+                <a16:creationId xmlns:a16="http://schemas.microsoft.com/office/drawing/2014/main" xmlns="" id="{9689C800-F457-4EAA-8B68-FDB9E698C04A}"/>
               </a:ext>
             </a:extLst>
           </p:cNvPr>
@@ -2238,7 +2392,7 @@
           <p:cNvPr id="4" name="Date Placeholder 3">
             <a:extLst>
               <a:ext uri="{FF2B5EF4-FFF2-40B4-BE49-F238E27FC236}">
-                <a16:creationId xmlns="" xmlns:a16="http://schemas.microsoft.com/office/drawing/2014/main" id="{DEEE74FC-0F00-42EC-9DA8-6938CA580240}"/>
+                <a16:creationId xmlns:a16="http://schemas.microsoft.com/office/drawing/2014/main" xmlns="" id="{DEEE74FC-0F00-42EC-9DA8-6938CA580240}"/>
               </a:ext>
             </a:extLst>
           </p:cNvPr>
@@ -2256,7 +2410,7 @@
           <a:p>
             <a:fld id="{38D4318C-2CF8-4E6B-ADD8-B5FDE2DDEB84}" type="datetimeFigureOut">
               <a:rPr lang="en-US" smtClean="0"/>
-              <a:t>9/28/18</a:t>
+              <a:t>9/29/18</a:t>
             </a:fld>
             <a:endParaRPr lang="en-US"/>
           </a:p>
@@ -2267,7 +2421,7 @@
           <p:cNvPr id="5" name="Footer Placeholder 4">
             <a:extLst>
               <a:ext uri="{FF2B5EF4-FFF2-40B4-BE49-F238E27FC236}">
-                <a16:creationId xmlns="" xmlns:a16="http://schemas.microsoft.com/office/drawing/2014/main" id="{741D09C9-5481-4587-9C28-A3ED2A914B01}"/>
+                <a16:creationId xmlns:a16="http://schemas.microsoft.com/office/drawing/2014/main" xmlns="" id="{741D09C9-5481-4587-9C28-A3ED2A914B01}"/>
               </a:ext>
             </a:extLst>
           </p:cNvPr>
@@ -2292,7 +2446,7 @@
           <p:cNvPr id="6" name="Slide Number Placeholder 5">
             <a:extLst>
               <a:ext uri="{FF2B5EF4-FFF2-40B4-BE49-F238E27FC236}">
-                <a16:creationId xmlns="" xmlns:a16="http://schemas.microsoft.com/office/drawing/2014/main" id="{1AC83BC7-E8A4-486F-9C06-B334B53F37B9}"/>
+                <a16:creationId xmlns:a16="http://schemas.microsoft.com/office/drawing/2014/main" xmlns="" id="{1AC83BC7-E8A4-486F-9C06-B334B53F37B9}"/>
               </a:ext>
             </a:extLst>
           </p:cNvPr>
@@ -2351,7 +2505,7 @@
           <p:cNvPr id="2" name="Title 1">
             <a:extLst>
               <a:ext uri="{FF2B5EF4-FFF2-40B4-BE49-F238E27FC236}">
-                <a16:creationId xmlns="" xmlns:a16="http://schemas.microsoft.com/office/drawing/2014/main" id="{E81E36C7-0816-4A92-853C-ED3B09023EDB}"/>
+                <a16:creationId xmlns:a16="http://schemas.microsoft.com/office/drawing/2014/main" xmlns="" id="{E81E36C7-0816-4A92-853C-ED3B09023EDB}"/>
               </a:ext>
             </a:extLst>
           </p:cNvPr>
@@ -2379,7 +2533,7 @@
           <p:cNvPr id="3" name="Content Placeholder 2">
             <a:extLst>
               <a:ext uri="{FF2B5EF4-FFF2-40B4-BE49-F238E27FC236}">
-                <a16:creationId xmlns="" xmlns:a16="http://schemas.microsoft.com/office/drawing/2014/main" id="{7F707701-A54F-45E1-8A6C-2C8B8867BC9D}"/>
+                <a16:creationId xmlns:a16="http://schemas.microsoft.com/office/drawing/2014/main" xmlns="" id="{7F707701-A54F-45E1-8A6C-2C8B8867BC9D}"/>
               </a:ext>
             </a:extLst>
           </p:cNvPr>
@@ -2441,7 +2595,7 @@
           <p:cNvPr id="4" name="Content Placeholder 3">
             <a:extLst>
               <a:ext uri="{FF2B5EF4-FFF2-40B4-BE49-F238E27FC236}">
-                <a16:creationId xmlns="" xmlns:a16="http://schemas.microsoft.com/office/drawing/2014/main" id="{4B5786FD-7A65-4D8C-B15D-DA773068698C}"/>
+                <a16:creationId xmlns:a16="http://schemas.microsoft.com/office/drawing/2014/main" xmlns="" id="{4B5786FD-7A65-4D8C-B15D-DA773068698C}"/>
               </a:ext>
             </a:extLst>
           </p:cNvPr>
@@ -2503,7 +2657,7 @@
           <p:cNvPr id="5" name="Date Placeholder 4">
             <a:extLst>
               <a:ext uri="{FF2B5EF4-FFF2-40B4-BE49-F238E27FC236}">
-                <a16:creationId xmlns="" xmlns:a16="http://schemas.microsoft.com/office/drawing/2014/main" id="{CEAE3A29-2487-420C-866B-57CD44BF44A3}"/>
+                <a16:creationId xmlns:a16="http://schemas.microsoft.com/office/drawing/2014/main" xmlns="" id="{CEAE3A29-2487-420C-866B-57CD44BF44A3}"/>
               </a:ext>
             </a:extLst>
           </p:cNvPr>
@@ -2521,7 +2675,7 @@
           <a:p>
             <a:fld id="{38D4318C-2CF8-4E6B-ADD8-B5FDE2DDEB84}" type="datetimeFigureOut">
               <a:rPr lang="en-US" smtClean="0"/>
-              <a:t>9/28/18</a:t>
+              <a:t>9/29/18</a:t>
             </a:fld>
             <a:endParaRPr lang="en-US"/>
           </a:p>
@@ -2532,7 +2686,7 @@
           <p:cNvPr id="6" name="Footer Placeholder 5">
             <a:extLst>
               <a:ext uri="{FF2B5EF4-FFF2-40B4-BE49-F238E27FC236}">
-                <a16:creationId xmlns="" xmlns:a16="http://schemas.microsoft.com/office/drawing/2014/main" id="{377443B9-9470-4D6A-AE0A-C326BCCBE642}"/>
+                <a16:creationId xmlns:a16="http://schemas.microsoft.com/office/drawing/2014/main" xmlns="" id="{377443B9-9470-4D6A-AE0A-C326BCCBE642}"/>
               </a:ext>
             </a:extLst>
           </p:cNvPr>
@@ -2557,7 +2711,7 @@
           <p:cNvPr id="7" name="Slide Number Placeholder 6">
             <a:extLst>
               <a:ext uri="{FF2B5EF4-FFF2-40B4-BE49-F238E27FC236}">
-                <a16:creationId xmlns="" xmlns:a16="http://schemas.microsoft.com/office/drawing/2014/main" id="{F90CCD6F-1F56-4850-98DF-5DD0EEE3738E}"/>
+                <a16:creationId xmlns:a16="http://schemas.microsoft.com/office/drawing/2014/main" xmlns="" id="{F90CCD6F-1F56-4850-98DF-5DD0EEE3738E}"/>
               </a:ext>
             </a:extLst>
           </p:cNvPr>
@@ -2616,7 +2770,7 @@
           <p:cNvPr id="2" name="Title 1">
             <a:extLst>
               <a:ext uri="{FF2B5EF4-FFF2-40B4-BE49-F238E27FC236}">
-                <a16:creationId xmlns="" xmlns:a16="http://schemas.microsoft.com/office/drawing/2014/main" id="{C3C414C3-8278-4588-933C-78CE8DB9A1BC}"/>
+                <a16:creationId xmlns:a16="http://schemas.microsoft.com/office/drawing/2014/main" xmlns="" id="{C3C414C3-8278-4588-933C-78CE8DB9A1BC}"/>
               </a:ext>
             </a:extLst>
           </p:cNvPr>
@@ -2649,7 +2803,7 @@
           <p:cNvPr id="3" name="Text Placeholder 2">
             <a:extLst>
               <a:ext uri="{FF2B5EF4-FFF2-40B4-BE49-F238E27FC236}">
-                <a16:creationId xmlns="" xmlns:a16="http://schemas.microsoft.com/office/drawing/2014/main" id="{71A200F1-57DD-46A6-A4EE-96E99875E1A2}"/>
+                <a16:creationId xmlns:a16="http://schemas.microsoft.com/office/drawing/2014/main" xmlns="" id="{71A200F1-57DD-46A6-A4EE-96E99875E1A2}"/>
               </a:ext>
             </a:extLst>
           </p:cNvPr>
@@ -2720,7 +2874,7 @@
           <p:cNvPr id="4" name="Content Placeholder 3">
             <a:extLst>
               <a:ext uri="{FF2B5EF4-FFF2-40B4-BE49-F238E27FC236}">
-                <a16:creationId xmlns="" xmlns:a16="http://schemas.microsoft.com/office/drawing/2014/main" id="{75083360-E32C-4B35-9766-9BA6CE824D44}"/>
+                <a16:creationId xmlns:a16="http://schemas.microsoft.com/office/drawing/2014/main" xmlns="" id="{75083360-E32C-4B35-9766-9BA6CE824D44}"/>
               </a:ext>
             </a:extLst>
           </p:cNvPr>
@@ -2782,7 +2936,7 @@
           <p:cNvPr id="5" name="Text Placeholder 4">
             <a:extLst>
               <a:ext uri="{FF2B5EF4-FFF2-40B4-BE49-F238E27FC236}">
-                <a16:creationId xmlns="" xmlns:a16="http://schemas.microsoft.com/office/drawing/2014/main" id="{9C302DCE-0AE3-4442-B76D-919B39B34647}"/>
+                <a16:creationId xmlns:a16="http://schemas.microsoft.com/office/drawing/2014/main" xmlns="" id="{9C302DCE-0AE3-4442-B76D-919B39B34647}"/>
               </a:ext>
             </a:extLst>
           </p:cNvPr>
@@ -2853,7 +3007,7 @@
           <p:cNvPr id="6" name="Content Placeholder 5">
             <a:extLst>
               <a:ext uri="{FF2B5EF4-FFF2-40B4-BE49-F238E27FC236}">
-                <a16:creationId xmlns="" xmlns:a16="http://schemas.microsoft.com/office/drawing/2014/main" id="{860A80C0-6965-48FB-B6A7-3D0F192940A6}"/>
+                <a16:creationId xmlns:a16="http://schemas.microsoft.com/office/drawing/2014/main" xmlns="" id="{860A80C0-6965-48FB-B6A7-3D0F192940A6}"/>
               </a:ext>
             </a:extLst>
           </p:cNvPr>
@@ -2915,7 +3069,7 @@
           <p:cNvPr id="7" name="Date Placeholder 6">
             <a:extLst>
               <a:ext uri="{FF2B5EF4-FFF2-40B4-BE49-F238E27FC236}">
-                <a16:creationId xmlns="" xmlns:a16="http://schemas.microsoft.com/office/drawing/2014/main" id="{FAA6129C-58F2-44B7-A8EB-4F5D1F1A7E66}"/>
+                <a16:creationId xmlns:a16="http://schemas.microsoft.com/office/drawing/2014/main" xmlns="" id="{FAA6129C-58F2-44B7-A8EB-4F5D1F1A7E66}"/>
               </a:ext>
             </a:extLst>
           </p:cNvPr>
@@ -2933,7 +3087,7 @@
           <a:p>
             <a:fld id="{38D4318C-2CF8-4E6B-ADD8-B5FDE2DDEB84}" type="datetimeFigureOut">
               <a:rPr lang="en-US" smtClean="0"/>
-              <a:t>9/28/18</a:t>
+              <a:t>9/29/18</a:t>
             </a:fld>
             <a:endParaRPr lang="en-US"/>
           </a:p>
@@ -2944,7 +3098,7 @@
           <p:cNvPr id="8" name="Footer Placeholder 7">
             <a:extLst>
               <a:ext uri="{FF2B5EF4-FFF2-40B4-BE49-F238E27FC236}">
-                <a16:creationId xmlns="" xmlns:a16="http://schemas.microsoft.com/office/drawing/2014/main" id="{A6F5F6FD-2BE8-4B93-89BA-8F9D8CF99BB5}"/>
+                <a16:creationId xmlns:a16="http://schemas.microsoft.com/office/drawing/2014/main" xmlns="" id="{A6F5F6FD-2BE8-4B93-89BA-8F9D8CF99BB5}"/>
               </a:ext>
             </a:extLst>
           </p:cNvPr>
@@ -2969,7 +3123,7 @@
           <p:cNvPr id="9" name="Slide Number Placeholder 8">
             <a:extLst>
               <a:ext uri="{FF2B5EF4-FFF2-40B4-BE49-F238E27FC236}">
-                <a16:creationId xmlns="" xmlns:a16="http://schemas.microsoft.com/office/drawing/2014/main" id="{1F59AA36-72EF-4232-BC09-0155524D0938}"/>
+                <a16:creationId xmlns:a16="http://schemas.microsoft.com/office/drawing/2014/main" xmlns="" id="{1F59AA36-72EF-4232-BC09-0155524D0938}"/>
               </a:ext>
             </a:extLst>
           </p:cNvPr>
@@ -3028,7 +3182,7 @@
           <p:cNvPr id="2" name="Title 1">
             <a:extLst>
               <a:ext uri="{FF2B5EF4-FFF2-40B4-BE49-F238E27FC236}">
-                <a16:creationId xmlns="" xmlns:a16="http://schemas.microsoft.com/office/drawing/2014/main" id="{E81D2CF1-816D-48C2-ABCE-F0D1287A86EE}"/>
+                <a16:creationId xmlns:a16="http://schemas.microsoft.com/office/drawing/2014/main" xmlns="" id="{E81D2CF1-816D-48C2-ABCE-F0D1287A86EE}"/>
               </a:ext>
             </a:extLst>
           </p:cNvPr>
@@ -3056,7 +3210,7 @@
           <p:cNvPr id="3" name="Date Placeholder 2">
             <a:extLst>
               <a:ext uri="{FF2B5EF4-FFF2-40B4-BE49-F238E27FC236}">
-                <a16:creationId xmlns="" xmlns:a16="http://schemas.microsoft.com/office/drawing/2014/main" id="{AC9624E7-366F-48BC-B811-C38D8D34F6EF}"/>
+                <a16:creationId xmlns:a16="http://schemas.microsoft.com/office/drawing/2014/main" xmlns="" id="{AC9624E7-366F-48BC-B811-C38D8D34F6EF}"/>
               </a:ext>
             </a:extLst>
           </p:cNvPr>
@@ -3074,7 +3228,7 @@
           <a:p>
             <a:fld id="{38D4318C-2CF8-4E6B-ADD8-B5FDE2DDEB84}" type="datetimeFigureOut">
               <a:rPr lang="en-US" smtClean="0"/>
-              <a:t>9/28/18</a:t>
+              <a:t>9/29/18</a:t>
             </a:fld>
             <a:endParaRPr lang="en-US"/>
           </a:p>
@@ -3085,7 +3239,7 @@
           <p:cNvPr id="4" name="Footer Placeholder 3">
             <a:extLst>
               <a:ext uri="{FF2B5EF4-FFF2-40B4-BE49-F238E27FC236}">
-                <a16:creationId xmlns="" xmlns:a16="http://schemas.microsoft.com/office/drawing/2014/main" id="{4BC120F3-5F3C-4B89-98B6-984CF95D89C8}"/>
+                <a16:creationId xmlns:a16="http://schemas.microsoft.com/office/drawing/2014/main" xmlns="" id="{4BC120F3-5F3C-4B89-98B6-984CF95D89C8}"/>
               </a:ext>
             </a:extLst>
           </p:cNvPr>
@@ -3110,7 +3264,7 @@
           <p:cNvPr id="5" name="Slide Number Placeholder 4">
             <a:extLst>
               <a:ext uri="{FF2B5EF4-FFF2-40B4-BE49-F238E27FC236}">
-                <a16:creationId xmlns="" xmlns:a16="http://schemas.microsoft.com/office/drawing/2014/main" id="{05D47124-544E-4C80-A43C-2E9B6C999EA9}"/>
+                <a16:creationId xmlns:a16="http://schemas.microsoft.com/office/drawing/2014/main" xmlns="" id="{05D47124-544E-4C80-A43C-2E9B6C999EA9}"/>
               </a:ext>
             </a:extLst>
           </p:cNvPr>
@@ -3169,7 +3323,7 @@
           <p:cNvPr id="2" name="Date Placeholder 1">
             <a:extLst>
               <a:ext uri="{FF2B5EF4-FFF2-40B4-BE49-F238E27FC236}">
-                <a16:creationId xmlns="" xmlns:a16="http://schemas.microsoft.com/office/drawing/2014/main" id="{641D9391-9D60-4076-8F79-DF77CFB04523}"/>
+                <a16:creationId xmlns:a16="http://schemas.microsoft.com/office/drawing/2014/main" xmlns="" id="{641D9391-9D60-4076-8F79-DF77CFB04523}"/>
               </a:ext>
             </a:extLst>
           </p:cNvPr>
@@ -3187,7 +3341,7 @@
           <a:p>
             <a:fld id="{38D4318C-2CF8-4E6B-ADD8-B5FDE2DDEB84}" type="datetimeFigureOut">
               <a:rPr lang="en-US" smtClean="0"/>
-              <a:t>9/28/18</a:t>
+              <a:t>9/29/18</a:t>
             </a:fld>
             <a:endParaRPr lang="en-US"/>
           </a:p>
@@ -3198,7 +3352,7 @@
           <p:cNvPr id="3" name="Footer Placeholder 2">
             <a:extLst>
               <a:ext uri="{FF2B5EF4-FFF2-40B4-BE49-F238E27FC236}">
-                <a16:creationId xmlns="" xmlns:a16="http://schemas.microsoft.com/office/drawing/2014/main" id="{0E3F688F-5CA7-432F-B591-328DA41C4640}"/>
+                <a16:creationId xmlns:a16="http://schemas.microsoft.com/office/drawing/2014/main" xmlns="" id="{0E3F688F-5CA7-432F-B591-328DA41C4640}"/>
               </a:ext>
             </a:extLst>
           </p:cNvPr>
@@ -3223,7 +3377,7 @@
           <p:cNvPr id="4" name="Slide Number Placeholder 3">
             <a:extLst>
               <a:ext uri="{FF2B5EF4-FFF2-40B4-BE49-F238E27FC236}">
-                <a16:creationId xmlns="" xmlns:a16="http://schemas.microsoft.com/office/drawing/2014/main" id="{9CE96E86-76CD-492C-BDC2-0B211B4A758F}"/>
+                <a16:creationId xmlns:a16="http://schemas.microsoft.com/office/drawing/2014/main" xmlns="" id="{9CE96E86-76CD-492C-BDC2-0B211B4A758F}"/>
               </a:ext>
             </a:extLst>
           </p:cNvPr>
@@ -3282,7 +3436,7 @@
           <p:cNvPr id="2" name="Title 1">
             <a:extLst>
               <a:ext uri="{FF2B5EF4-FFF2-40B4-BE49-F238E27FC236}">
-                <a16:creationId xmlns="" xmlns:a16="http://schemas.microsoft.com/office/drawing/2014/main" id="{7F423E4D-6C40-4DC2-B1DF-B3C0C94E8786}"/>
+                <a16:creationId xmlns:a16="http://schemas.microsoft.com/office/drawing/2014/main" xmlns="" id="{7F423E4D-6C40-4DC2-B1DF-B3C0C94E8786}"/>
               </a:ext>
             </a:extLst>
           </p:cNvPr>
@@ -3319,7 +3473,7 @@
           <p:cNvPr id="3" name="Content Placeholder 2">
             <a:extLst>
               <a:ext uri="{FF2B5EF4-FFF2-40B4-BE49-F238E27FC236}">
-                <a16:creationId xmlns="" xmlns:a16="http://schemas.microsoft.com/office/drawing/2014/main" id="{5548D7BC-A06F-4A7E-AF6A-AEF48F162ACE}"/>
+                <a16:creationId xmlns:a16="http://schemas.microsoft.com/office/drawing/2014/main" xmlns="" id="{5548D7BC-A06F-4A7E-AF6A-AEF48F162ACE}"/>
               </a:ext>
             </a:extLst>
           </p:cNvPr>
@@ -3409,7 +3563,7 @@
           <p:cNvPr id="4" name="Text Placeholder 3">
             <a:extLst>
               <a:ext uri="{FF2B5EF4-FFF2-40B4-BE49-F238E27FC236}">
-                <a16:creationId xmlns="" xmlns:a16="http://schemas.microsoft.com/office/drawing/2014/main" id="{365731FF-334D-4CE5-9EC6-DD57EFD0CE6C}"/>
+                <a16:creationId xmlns:a16="http://schemas.microsoft.com/office/drawing/2014/main" xmlns="" id="{365731FF-334D-4CE5-9EC6-DD57EFD0CE6C}"/>
               </a:ext>
             </a:extLst>
           </p:cNvPr>
@@ -3480,7 +3634,7 @@
           <p:cNvPr id="5" name="Date Placeholder 4">
             <a:extLst>
               <a:ext uri="{FF2B5EF4-FFF2-40B4-BE49-F238E27FC236}">
-                <a16:creationId xmlns="" xmlns:a16="http://schemas.microsoft.com/office/drawing/2014/main" id="{941E5FD8-3FAA-42DC-B8EB-F27BE66BD2AF}"/>
+                <a16:creationId xmlns:a16="http://schemas.microsoft.com/office/drawing/2014/main" xmlns="" id="{941E5FD8-3FAA-42DC-B8EB-F27BE66BD2AF}"/>
               </a:ext>
             </a:extLst>
           </p:cNvPr>
@@ -3498,7 +3652,7 @@
           <a:p>
             <a:fld id="{38D4318C-2CF8-4E6B-ADD8-B5FDE2DDEB84}" type="datetimeFigureOut">
               <a:rPr lang="en-US" smtClean="0"/>
-              <a:t>9/28/18</a:t>
+              <a:t>9/29/18</a:t>
             </a:fld>
             <a:endParaRPr lang="en-US"/>
           </a:p>
@@ -3509,7 +3663,7 @@
           <p:cNvPr id="6" name="Footer Placeholder 5">
             <a:extLst>
               <a:ext uri="{FF2B5EF4-FFF2-40B4-BE49-F238E27FC236}">
-                <a16:creationId xmlns="" xmlns:a16="http://schemas.microsoft.com/office/drawing/2014/main" id="{63C37809-3388-4A1D-B1D2-743B93135834}"/>
+                <a16:creationId xmlns:a16="http://schemas.microsoft.com/office/drawing/2014/main" xmlns="" id="{63C37809-3388-4A1D-B1D2-743B93135834}"/>
               </a:ext>
             </a:extLst>
           </p:cNvPr>
@@ -3534,7 +3688,7 @@
           <p:cNvPr id="7" name="Slide Number Placeholder 6">
             <a:extLst>
               <a:ext uri="{FF2B5EF4-FFF2-40B4-BE49-F238E27FC236}">
-                <a16:creationId xmlns="" xmlns:a16="http://schemas.microsoft.com/office/drawing/2014/main" id="{5E5C9D74-8181-4410-BBA3-7261D943FAFC}"/>
+                <a16:creationId xmlns:a16="http://schemas.microsoft.com/office/drawing/2014/main" xmlns="" id="{5E5C9D74-8181-4410-BBA3-7261D943FAFC}"/>
               </a:ext>
             </a:extLst>
           </p:cNvPr>
@@ -3593,7 +3747,7 @@
           <p:cNvPr id="2" name="Title 1">
             <a:extLst>
               <a:ext uri="{FF2B5EF4-FFF2-40B4-BE49-F238E27FC236}">
-                <a16:creationId xmlns="" xmlns:a16="http://schemas.microsoft.com/office/drawing/2014/main" id="{B661A0EF-4640-4EF6-A916-A1C1D59C7345}"/>
+                <a16:creationId xmlns:a16="http://schemas.microsoft.com/office/drawing/2014/main" xmlns="" id="{B661A0EF-4640-4EF6-A916-A1C1D59C7345}"/>
               </a:ext>
             </a:extLst>
           </p:cNvPr>
@@ -3630,7 +3784,7 @@
           <p:cNvPr id="3" name="Picture Placeholder 2">
             <a:extLst>
               <a:ext uri="{FF2B5EF4-FFF2-40B4-BE49-F238E27FC236}">
-                <a16:creationId xmlns="" xmlns:a16="http://schemas.microsoft.com/office/drawing/2014/main" id="{81CA8A45-1AAC-49D1-9E71-D973BEB1A220}"/>
+                <a16:creationId xmlns:a16="http://schemas.microsoft.com/office/drawing/2014/main" xmlns="" id="{81CA8A45-1AAC-49D1-9E71-D973BEB1A220}"/>
               </a:ext>
             </a:extLst>
           </p:cNvPr>
@@ -3697,7 +3851,7 @@
           <p:cNvPr id="4" name="Text Placeholder 3">
             <a:extLst>
               <a:ext uri="{FF2B5EF4-FFF2-40B4-BE49-F238E27FC236}">
-                <a16:creationId xmlns="" xmlns:a16="http://schemas.microsoft.com/office/drawing/2014/main" id="{1BBED5FC-EAD8-4BBB-AFD6-F031672AE133}"/>
+                <a16:creationId xmlns:a16="http://schemas.microsoft.com/office/drawing/2014/main" xmlns="" id="{1BBED5FC-EAD8-4BBB-AFD6-F031672AE133}"/>
               </a:ext>
             </a:extLst>
           </p:cNvPr>
@@ -3768,7 +3922,7 @@
           <p:cNvPr id="5" name="Date Placeholder 4">
             <a:extLst>
               <a:ext uri="{FF2B5EF4-FFF2-40B4-BE49-F238E27FC236}">
-                <a16:creationId xmlns="" xmlns:a16="http://schemas.microsoft.com/office/drawing/2014/main" id="{E89FBE54-B46E-4C19-8C0D-267CD05DB014}"/>
+                <a16:creationId xmlns:a16="http://schemas.microsoft.com/office/drawing/2014/main" xmlns="" id="{E89FBE54-B46E-4C19-8C0D-267CD05DB014}"/>
               </a:ext>
             </a:extLst>
           </p:cNvPr>
@@ -3786,7 +3940,7 @@
           <a:p>
             <a:fld id="{38D4318C-2CF8-4E6B-ADD8-B5FDE2DDEB84}" type="datetimeFigureOut">
               <a:rPr lang="en-US" smtClean="0"/>
-              <a:t>9/28/18</a:t>
+              <a:t>9/29/18</a:t>
             </a:fld>
             <a:endParaRPr lang="en-US"/>
           </a:p>
@@ -3797,7 +3951,7 @@
           <p:cNvPr id="6" name="Footer Placeholder 5">
             <a:extLst>
               <a:ext uri="{FF2B5EF4-FFF2-40B4-BE49-F238E27FC236}">
-                <a16:creationId xmlns="" xmlns:a16="http://schemas.microsoft.com/office/drawing/2014/main" id="{B6E0C9C3-4DB8-4258-97FC-8416E1E5474F}"/>
+                <a16:creationId xmlns:a16="http://schemas.microsoft.com/office/drawing/2014/main" xmlns="" id="{B6E0C9C3-4DB8-4258-97FC-8416E1E5474F}"/>
               </a:ext>
             </a:extLst>
           </p:cNvPr>
@@ -3822,7 +3976,7 @@
           <p:cNvPr id="7" name="Slide Number Placeholder 6">
             <a:extLst>
               <a:ext uri="{FF2B5EF4-FFF2-40B4-BE49-F238E27FC236}">
-                <a16:creationId xmlns="" xmlns:a16="http://schemas.microsoft.com/office/drawing/2014/main" id="{593932B1-FCA9-4C15-A951-EA0A956F20CB}"/>
+                <a16:creationId xmlns:a16="http://schemas.microsoft.com/office/drawing/2014/main" xmlns="" id="{593932B1-FCA9-4C15-A951-EA0A956F20CB}"/>
               </a:ext>
             </a:extLst>
           </p:cNvPr>
@@ -3886,7 +4040,7 @@
           <p:cNvPr id="2" name="Title Placeholder 1">
             <a:extLst>
               <a:ext uri="{FF2B5EF4-FFF2-40B4-BE49-F238E27FC236}">
-                <a16:creationId xmlns="" xmlns:a16="http://schemas.microsoft.com/office/drawing/2014/main" id="{7C0C664C-58A9-46A0-9CC1-0EEDE6285BFF}"/>
+                <a16:creationId xmlns:a16="http://schemas.microsoft.com/office/drawing/2014/main" xmlns="" id="{7C0C664C-58A9-46A0-9CC1-0EEDE6285BFF}"/>
               </a:ext>
             </a:extLst>
           </p:cNvPr>
@@ -3924,7 +4078,7 @@
           <p:cNvPr id="3" name="Text Placeholder 2">
             <a:extLst>
               <a:ext uri="{FF2B5EF4-FFF2-40B4-BE49-F238E27FC236}">
-                <a16:creationId xmlns="" xmlns:a16="http://schemas.microsoft.com/office/drawing/2014/main" id="{65562DF5-BE86-4DB8-9E27-E4F718173D1B}"/>
+                <a16:creationId xmlns:a16="http://schemas.microsoft.com/office/drawing/2014/main" xmlns="" id="{65562DF5-BE86-4DB8-9E27-E4F718173D1B}"/>
               </a:ext>
             </a:extLst>
           </p:cNvPr>
@@ -3991,7 +4145,7 @@
           <p:cNvPr id="4" name="Date Placeholder 3">
             <a:extLst>
               <a:ext uri="{FF2B5EF4-FFF2-40B4-BE49-F238E27FC236}">
-                <a16:creationId xmlns="" xmlns:a16="http://schemas.microsoft.com/office/drawing/2014/main" id="{DDA4EFC7-3387-4CAF-889C-4C468A0A1E5B}"/>
+                <a16:creationId xmlns:a16="http://schemas.microsoft.com/office/drawing/2014/main" xmlns="" id="{DDA4EFC7-3387-4CAF-889C-4C468A0A1E5B}"/>
               </a:ext>
             </a:extLst>
           </p:cNvPr>
@@ -4027,7 +4181,7 @@
           <a:p>
             <a:fld id="{38D4318C-2CF8-4E6B-ADD8-B5FDE2DDEB84}" type="datetimeFigureOut">
               <a:rPr lang="en-US" smtClean="0"/>
-              <a:t>9/28/18</a:t>
+              <a:t>9/29/18</a:t>
             </a:fld>
             <a:endParaRPr lang="en-US"/>
           </a:p>
@@ -4038,7 +4192,7 @@
           <p:cNvPr id="5" name="Footer Placeholder 4">
             <a:extLst>
               <a:ext uri="{FF2B5EF4-FFF2-40B4-BE49-F238E27FC236}">
-                <a16:creationId xmlns="" xmlns:a16="http://schemas.microsoft.com/office/drawing/2014/main" id="{37275286-A5F9-4A85-B019-61F07876BEAF}"/>
+                <a16:creationId xmlns:a16="http://schemas.microsoft.com/office/drawing/2014/main" xmlns="" id="{37275286-A5F9-4A85-B019-61F07876BEAF}"/>
               </a:ext>
             </a:extLst>
           </p:cNvPr>
@@ -4081,7 +4235,7 @@
           <p:cNvPr id="6" name="Slide Number Placeholder 5">
             <a:extLst>
               <a:ext uri="{FF2B5EF4-FFF2-40B4-BE49-F238E27FC236}">
-                <a16:creationId xmlns="" xmlns:a16="http://schemas.microsoft.com/office/drawing/2014/main" id="{AF635EAA-95A3-4DE3-A775-A7F3B84FB9B8}"/>
+                <a16:creationId xmlns:a16="http://schemas.microsoft.com/office/drawing/2014/main" xmlns="" id="{AF635EAA-95A3-4DE3-A775-A7F3B84FB9B8}"/>
               </a:ext>
             </a:extLst>
           </p:cNvPr>
@@ -4457,7 +4611,7 @@
           <p:cNvPr id="4" name="Rectangle 3">
             <a:extLst>
               <a:ext uri="{FF2B5EF4-FFF2-40B4-BE49-F238E27FC236}">
-                <a16:creationId xmlns="" xmlns:a16="http://schemas.microsoft.com/office/drawing/2014/main" id="{3263A579-F937-472F-BAC8-0F6DBD133059}"/>
+                <a16:creationId xmlns:a16="http://schemas.microsoft.com/office/drawing/2014/main" xmlns="" id="{3263A579-F937-472F-BAC8-0F6DBD133059}"/>
               </a:ext>
             </a:extLst>
           </p:cNvPr>
@@ -4835,7 +4989,7 @@
           <p:cNvPr id="6" name="Flowchart: Terminator 5">
             <a:extLst>
               <a:ext uri="{FF2B5EF4-FFF2-40B4-BE49-F238E27FC236}">
-                <a16:creationId xmlns="" xmlns:a16="http://schemas.microsoft.com/office/drawing/2014/main" id="{BC26BFB4-0829-4EF7-B551-E33F9117E645}"/>
+                <a16:creationId xmlns:a16="http://schemas.microsoft.com/office/drawing/2014/main" xmlns="" id="{BC26BFB4-0829-4EF7-B551-E33F9117E645}"/>
               </a:ext>
             </a:extLst>
           </p:cNvPr>
@@ -4893,7 +5047,7 @@
           <p:cNvPr id="45" name="Rectangle: Rounded Corners 44">
             <a:extLst>
               <a:ext uri="{FF2B5EF4-FFF2-40B4-BE49-F238E27FC236}">
-                <a16:creationId xmlns="" xmlns:a16="http://schemas.microsoft.com/office/drawing/2014/main" id="{382337C1-3DAB-4E1C-A8B6-4AA16C3410CE}"/>
+                <a16:creationId xmlns:a16="http://schemas.microsoft.com/office/drawing/2014/main" xmlns="" id="{382337C1-3DAB-4E1C-A8B6-4AA16C3410CE}"/>
               </a:ext>
             </a:extLst>
           </p:cNvPr>
@@ -5045,7 +5199,7 @@
           <p:cNvPr id="46" name="Rectangle: Rounded Corners 45">
             <a:extLst>
               <a:ext uri="{FF2B5EF4-FFF2-40B4-BE49-F238E27FC236}">
-                <a16:creationId xmlns="" xmlns:a16="http://schemas.microsoft.com/office/drawing/2014/main" id="{4369A102-1733-46FB-85EB-77C0CAB96BEB}"/>
+                <a16:creationId xmlns:a16="http://schemas.microsoft.com/office/drawing/2014/main" xmlns="" id="{4369A102-1733-46FB-85EB-77C0CAB96BEB}"/>
               </a:ext>
             </a:extLst>
           </p:cNvPr>
@@ -5295,7 +5449,7 @@
           <p:cNvPr id="70" name="Group 69">
             <a:extLst>
               <a:ext uri="{FF2B5EF4-FFF2-40B4-BE49-F238E27FC236}">
-                <a16:creationId xmlns="" xmlns:a16="http://schemas.microsoft.com/office/drawing/2014/main" id="{03E82210-D12A-4472-8E82-5C642547A5AD}"/>
+                <a16:creationId xmlns:a16="http://schemas.microsoft.com/office/drawing/2014/main" xmlns="" id="{03E82210-D12A-4472-8E82-5C642547A5AD}"/>
               </a:ext>
             </a:extLst>
           </p:cNvPr>
@@ -5315,7 +5469,7 @@
             <p:cNvPr id="49" name="Arrow: Down 48">
               <a:extLst>
                 <a:ext uri="{FF2B5EF4-FFF2-40B4-BE49-F238E27FC236}">
-                  <a16:creationId xmlns="" xmlns:a16="http://schemas.microsoft.com/office/drawing/2014/main" id="{3B31D1CB-EE12-4C30-9755-0315B7051AAC}"/>
+                  <a16:creationId xmlns:a16="http://schemas.microsoft.com/office/drawing/2014/main" xmlns="" id="{3B31D1CB-EE12-4C30-9755-0315B7051AAC}"/>
                 </a:ext>
               </a:extLst>
             </p:cNvPr>
@@ -5361,7 +5515,7 @@
             <p:cNvPr id="50" name="Arrow: Down 49">
               <a:extLst>
                 <a:ext uri="{FF2B5EF4-FFF2-40B4-BE49-F238E27FC236}">
-                  <a16:creationId xmlns="" xmlns:a16="http://schemas.microsoft.com/office/drawing/2014/main" id="{4CC7C068-0CD8-48B4-8CCB-6BAC503024B1}"/>
+                  <a16:creationId xmlns:a16="http://schemas.microsoft.com/office/drawing/2014/main" xmlns="" id="{4CC7C068-0CD8-48B4-8CCB-6BAC503024B1}"/>
                 </a:ext>
               </a:extLst>
             </p:cNvPr>
@@ -5407,7 +5561,7 @@
             <p:cNvPr id="56" name="Arrow: Down 55">
               <a:extLst>
                 <a:ext uri="{FF2B5EF4-FFF2-40B4-BE49-F238E27FC236}">
-                  <a16:creationId xmlns="" xmlns:a16="http://schemas.microsoft.com/office/drawing/2014/main" id="{08705A44-8E76-40A6-9AEF-3E38498993A3}"/>
+                  <a16:creationId xmlns:a16="http://schemas.microsoft.com/office/drawing/2014/main" xmlns="" id="{08705A44-8E76-40A6-9AEF-3E38498993A3}"/>
                 </a:ext>
               </a:extLst>
             </p:cNvPr>
@@ -5453,7 +5607,7 @@
             <p:cNvPr id="58" name="Arrow: Down 57">
               <a:extLst>
                 <a:ext uri="{FF2B5EF4-FFF2-40B4-BE49-F238E27FC236}">
-                  <a16:creationId xmlns="" xmlns:a16="http://schemas.microsoft.com/office/drawing/2014/main" id="{6F9F05EB-A54D-4318-88A2-04FBDC868428}"/>
+                  <a16:creationId xmlns:a16="http://schemas.microsoft.com/office/drawing/2014/main" xmlns="" id="{6F9F05EB-A54D-4318-88A2-04FBDC868428}"/>
                 </a:ext>
               </a:extLst>
             </p:cNvPr>
@@ -5499,7 +5653,7 @@
             <p:cNvPr id="60" name="Arrow: Down 59">
               <a:extLst>
                 <a:ext uri="{FF2B5EF4-FFF2-40B4-BE49-F238E27FC236}">
-                  <a16:creationId xmlns="" xmlns:a16="http://schemas.microsoft.com/office/drawing/2014/main" id="{A048F72C-C2B7-4E3D-AE7F-6909FE6D260C}"/>
+                  <a16:creationId xmlns:a16="http://schemas.microsoft.com/office/drawing/2014/main" xmlns="" id="{A048F72C-C2B7-4E3D-AE7F-6909FE6D260C}"/>
                 </a:ext>
               </a:extLst>
             </p:cNvPr>
@@ -5545,7 +5699,7 @@
             <p:cNvPr id="61" name="Arrow: Down 60">
               <a:extLst>
                 <a:ext uri="{FF2B5EF4-FFF2-40B4-BE49-F238E27FC236}">
-                  <a16:creationId xmlns="" xmlns:a16="http://schemas.microsoft.com/office/drawing/2014/main" id="{A7694F96-6FA9-4070-811F-859DE3C6C575}"/>
+                  <a16:creationId xmlns:a16="http://schemas.microsoft.com/office/drawing/2014/main" xmlns="" id="{A7694F96-6FA9-4070-811F-859DE3C6C575}"/>
                 </a:ext>
               </a:extLst>
             </p:cNvPr>
@@ -5592,7 +5746,7 @@
           <p:cNvPr id="69" name="Group 68">
             <a:extLst>
               <a:ext uri="{FF2B5EF4-FFF2-40B4-BE49-F238E27FC236}">
-                <a16:creationId xmlns="" xmlns:a16="http://schemas.microsoft.com/office/drawing/2014/main" id="{3065794C-32D8-4296-9C9A-EFC920F7B83A}"/>
+                <a16:creationId xmlns:a16="http://schemas.microsoft.com/office/drawing/2014/main" xmlns="" id="{3065794C-32D8-4296-9C9A-EFC920F7B83A}"/>
               </a:ext>
             </a:extLst>
           </p:cNvPr>
@@ -5612,7 +5766,7 @@
             <p:cNvPr id="51" name="Arrow: Down 50">
               <a:extLst>
                 <a:ext uri="{FF2B5EF4-FFF2-40B4-BE49-F238E27FC236}">
-                  <a16:creationId xmlns="" xmlns:a16="http://schemas.microsoft.com/office/drawing/2014/main" id="{B06F4C8A-27C8-401F-9C7F-ACE6014CB994}"/>
+                  <a16:creationId xmlns:a16="http://schemas.microsoft.com/office/drawing/2014/main" xmlns="" id="{B06F4C8A-27C8-401F-9C7F-ACE6014CB994}"/>
                 </a:ext>
               </a:extLst>
             </p:cNvPr>
@@ -5658,7 +5812,7 @@
             <p:cNvPr id="52" name="Arrow: Down 51">
               <a:extLst>
                 <a:ext uri="{FF2B5EF4-FFF2-40B4-BE49-F238E27FC236}">
-                  <a16:creationId xmlns="" xmlns:a16="http://schemas.microsoft.com/office/drawing/2014/main" id="{3F6578B2-F999-412C-9C07-3C6816BF840C}"/>
+                  <a16:creationId xmlns:a16="http://schemas.microsoft.com/office/drawing/2014/main" xmlns="" id="{3F6578B2-F999-412C-9C07-3C6816BF840C}"/>
                 </a:ext>
               </a:extLst>
             </p:cNvPr>
@@ -5704,7 +5858,7 @@
             <p:cNvPr id="53" name="Arrow: Down 52">
               <a:extLst>
                 <a:ext uri="{FF2B5EF4-FFF2-40B4-BE49-F238E27FC236}">
-                  <a16:creationId xmlns="" xmlns:a16="http://schemas.microsoft.com/office/drawing/2014/main" id="{450EE119-954E-44FE-B4A3-B3DB96644AB9}"/>
+                  <a16:creationId xmlns:a16="http://schemas.microsoft.com/office/drawing/2014/main" xmlns="" id="{450EE119-954E-44FE-B4A3-B3DB96644AB9}"/>
                 </a:ext>
               </a:extLst>
             </p:cNvPr>
@@ -5750,7 +5904,7 @@
             <p:cNvPr id="54" name="Arrow: Down 53">
               <a:extLst>
                 <a:ext uri="{FF2B5EF4-FFF2-40B4-BE49-F238E27FC236}">
-                  <a16:creationId xmlns="" xmlns:a16="http://schemas.microsoft.com/office/drawing/2014/main" id="{A185CF80-D658-411D-BF04-97A9C0FDCFD4}"/>
+                  <a16:creationId xmlns:a16="http://schemas.microsoft.com/office/drawing/2014/main" xmlns="" id="{A185CF80-D658-411D-BF04-97A9C0FDCFD4}"/>
                 </a:ext>
               </a:extLst>
             </p:cNvPr>
@@ -5796,7 +5950,7 @@
             <p:cNvPr id="55" name="Arrow: Down 54">
               <a:extLst>
                 <a:ext uri="{FF2B5EF4-FFF2-40B4-BE49-F238E27FC236}">
-                  <a16:creationId xmlns="" xmlns:a16="http://schemas.microsoft.com/office/drawing/2014/main" id="{305D5E87-D088-4E16-9AAA-9B61A0231F86}"/>
+                  <a16:creationId xmlns:a16="http://schemas.microsoft.com/office/drawing/2014/main" xmlns="" id="{305D5E87-D088-4E16-9AAA-9B61A0231F86}"/>
                 </a:ext>
               </a:extLst>
             </p:cNvPr>
@@ -5842,7 +5996,7 @@
             <p:cNvPr id="57" name="Arrow: Down 56">
               <a:extLst>
                 <a:ext uri="{FF2B5EF4-FFF2-40B4-BE49-F238E27FC236}">
-                  <a16:creationId xmlns="" xmlns:a16="http://schemas.microsoft.com/office/drawing/2014/main" id="{BB4A2EA1-8C7C-4D6C-BC70-96B197B76702}"/>
+                  <a16:creationId xmlns:a16="http://schemas.microsoft.com/office/drawing/2014/main" xmlns="" id="{BB4A2EA1-8C7C-4D6C-BC70-96B197B76702}"/>
                 </a:ext>
               </a:extLst>
             </p:cNvPr>
@@ -5888,7 +6042,7 @@
             <p:cNvPr id="62" name="Arrow: Down 61">
               <a:extLst>
                 <a:ext uri="{FF2B5EF4-FFF2-40B4-BE49-F238E27FC236}">
-                  <a16:creationId xmlns="" xmlns:a16="http://schemas.microsoft.com/office/drawing/2014/main" id="{21AE7CA0-F8AF-4ECD-8916-5286110EECC3}"/>
+                  <a16:creationId xmlns:a16="http://schemas.microsoft.com/office/drawing/2014/main" xmlns="" id="{21AE7CA0-F8AF-4ECD-8916-5286110EECC3}"/>
                 </a:ext>
               </a:extLst>
             </p:cNvPr>
@@ -5934,7 +6088,7 @@
             <p:cNvPr id="63" name="Arrow: Down 62">
               <a:extLst>
                 <a:ext uri="{FF2B5EF4-FFF2-40B4-BE49-F238E27FC236}">
-                  <a16:creationId xmlns="" xmlns:a16="http://schemas.microsoft.com/office/drawing/2014/main" id="{751F3152-1F2D-4A6E-A117-0416A26B03AA}"/>
+                  <a16:creationId xmlns:a16="http://schemas.microsoft.com/office/drawing/2014/main" xmlns="" id="{751F3152-1F2D-4A6E-A117-0416A26B03AA}"/>
                 </a:ext>
               </a:extLst>
             </p:cNvPr>
@@ -5980,7 +6134,7 @@
             <p:cNvPr id="64" name="Arrow: Down 63">
               <a:extLst>
                 <a:ext uri="{FF2B5EF4-FFF2-40B4-BE49-F238E27FC236}">
-                  <a16:creationId xmlns="" xmlns:a16="http://schemas.microsoft.com/office/drawing/2014/main" id="{807E50BC-DEF8-4CE2-A25C-A4DFC88D14A0}"/>
+                  <a16:creationId xmlns:a16="http://schemas.microsoft.com/office/drawing/2014/main" xmlns="" id="{807E50BC-DEF8-4CE2-A25C-A4DFC88D14A0}"/>
                 </a:ext>
               </a:extLst>
             </p:cNvPr>
@@ -6026,7 +6180,7 @@
             <p:cNvPr id="65" name="Arrow: Down 64">
               <a:extLst>
                 <a:ext uri="{FF2B5EF4-FFF2-40B4-BE49-F238E27FC236}">
-                  <a16:creationId xmlns="" xmlns:a16="http://schemas.microsoft.com/office/drawing/2014/main" id="{5569AB8E-DA9B-4319-BB74-F7B35ED9C963}"/>
+                  <a16:creationId xmlns:a16="http://schemas.microsoft.com/office/drawing/2014/main" xmlns="" id="{5569AB8E-DA9B-4319-BB74-F7B35ED9C963}"/>
                 </a:ext>
               </a:extLst>
             </p:cNvPr>
@@ -6072,7 +6226,7 @@
             <p:cNvPr id="66" name="Arrow: Down 65">
               <a:extLst>
                 <a:ext uri="{FF2B5EF4-FFF2-40B4-BE49-F238E27FC236}">
-                  <a16:creationId xmlns="" xmlns:a16="http://schemas.microsoft.com/office/drawing/2014/main" id="{4FF32172-E710-4741-8DB4-EB4A9F2D3C59}"/>
+                  <a16:creationId xmlns:a16="http://schemas.microsoft.com/office/drawing/2014/main" xmlns="" id="{4FF32172-E710-4741-8DB4-EB4A9F2D3C59}"/>
                 </a:ext>
               </a:extLst>
             </p:cNvPr>
@@ -6118,7 +6272,7 @@
             <p:cNvPr id="67" name="Arrow: Down 66">
               <a:extLst>
                 <a:ext uri="{FF2B5EF4-FFF2-40B4-BE49-F238E27FC236}">
-                  <a16:creationId xmlns="" xmlns:a16="http://schemas.microsoft.com/office/drawing/2014/main" id="{3AFFA1E1-8DAA-4BA0-88A8-91731D3A12CC}"/>
+                  <a16:creationId xmlns:a16="http://schemas.microsoft.com/office/drawing/2014/main" xmlns="" id="{3AFFA1E1-8DAA-4BA0-88A8-91731D3A12CC}"/>
                 </a:ext>
               </a:extLst>
             </p:cNvPr>
@@ -6164,7 +6318,7 @@
             <p:cNvPr id="68" name="Arrow: Down 67">
               <a:extLst>
                 <a:ext uri="{FF2B5EF4-FFF2-40B4-BE49-F238E27FC236}">
-                  <a16:creationId xmlns="" xmlns:a16="http://schemas.microsoft.com/office/drawing/2014/main" id="{4AF4710B-7AD0-4B1D-8526-591AB2625845}"/>
+                  <a16:creationId xmlns:a16="http://schemas.microsoft.com/office/drawing/2014/main" xmlns="" id="{4AF4710B-7AD0-4B1D-8526-591AB2625845}"/>
                 </a:ext>
               </a:extLst>
             </p:cNvPr>
@@ -6211,7 +6365,7 @@
           <p:cNvPr id="71" name="Rectangle: Rounded Corners 70">
             <a:extLst>
               <a:ext uri="{FF2B5EF4-FFF2-40B4-BE49-F238E27FC236}">
-                <a16:creationId xmlns="" xmlns:a16="http://schemas.microsoft.com/office/drawing/2014/main" id="{5F7A2BB6-CE87-4F3B-A640-9373397F480A}"/>
+                <a16:creationId xmlns:a16="http://schemas.microsoft.com/office/drawing/2014/main" xmlns="" id="{5F7A2BB6-CE87-4F3B-A640-9373397F480A}"/>
               </a:ext>
             </a:extLst>
           </p:cNvPr>
@@ -6391,7 +6545,7 @@
           <p:cNvPr id="80" name="Group 79">
             <a:extLst>
               <a:ext uri="{FF2B5EF4-FFF2-40B4-BE49-F238E27FC236}">
-                <a16:creationId xmlns="" xmlns:a16="http://schemas.microsoft.com/office/drawing/2014/main" id="{9C240103-050A-4695-BF9F-5537C248F66A}"/>
+                <a16:creationId xmlns:a16="http://schemas.microsoft.com/office/drawing/2014/main" xmlns="" id="{9C240103-050A-4695-BF9F-5537C248F66A}"/>
               </a:ext>
             </a:extLst>
           </p:cNvPr>
@@ -6411,7 +6565,7 @@
             <p:cNvPr id="72" name="Oval 71">
               <a:extLst>
                 <a:ext uri="{FF2B5EF4-FFF2-40B4-BE49-F238E27FC236}">
-                  <a16:creationId xmlns="" xmlns:a16="http://schemas.microsoft.com/office/drawing/2014/main" id="{72173DFC-7F98-4DB4-B138-D097FF7B3FD7}"/>
+                  <a16:creationId xmlns:a16="http://schemas.microsoft.com/office/drawing/2014/main" xmlns="" id="{72173DFC-7F98-4DB4-B138-D097FF7B3FD7}"/>
                 </a:ext>
               </a:extLst>
             </p:cNvPr>
@@ -6457,7 +6611,7 @@
             <p:cNvPr id="73" name="Oval 72">
               <a:extLst>
                 <a:ext uri="{FF2B5EF4-FFF2-40B4-BE49-F238E27FC236}">
-                  <a16:creationId xmlns="" xmlns:a16="http://schemas.microsoft.com/office/drawing/2014/main" id="{5EAF5F0D-D560-4D91-87F0-B88A371197A7}"/>
+                  <a16:creationId xmlns:a16="http://schemas.microsoft.com/office/drawing/2014/main" xmlns="" id="{5EAF5F0D-D560-4D91-87F0-B88A371197A7}"/>
                 </a:ext>
               </a:extLst>
             </p:cNvPr>
@@ -6503,7 +6657,7 @@
             <p:cNvPr id="74" name="Oval 73">
               <a:extLst>
                 <a:ext uri="{FF2B5EF4-FFF2-40B4-BE49-F238E27FC236}">
-                  <a16:creationId xmlns="" xmlns:a16="http://schemas.microsoft.com/office/drawing/2014/main" id="{6E325FF1-3D01-4062-A828-C83B2E9C2E01}"/>
+                  <a16:creationId xmlns:a16="http://schemas.microsoft.com/office/drawing/2014/main" xmlns="" id="{6E325FF1-3D01-4062-A828-C83B2E9C2E01}"/>
                 </a:ext>
               </a:extLst>
             </p:cNvPr>
@@ -6549,7 +6703,7 @@
             <p:cNvPr id="75" name="Oval 74">
               <a:extLst>
                 <a:ext uri="{FF2B5EF4-FFF2-40B4-BE49-F238E27FC236}">
-                  <a16:creationId xmlns="" xmlns:a16="http://schemas.microsoft.com/office/drawing/2014/main" id="{041CAB99-80D9-49CB-961D-7B48F675860D}"/>
+                  <a16:creationId xmlns:a16="http://schemas.microsoft.com/office/drawing/2014/main" xmlns="" id="{041CAB99-80D9-49CB-961D-7B48F675860D}"/>
                 </a:ext>
               </a:extLst>
             </p:cNvPr>
@@ -6595,7 +6749,7 @@
             <p:cNvPr id="76" name="Oval 75">
               <a:extLst>
                 <a:ext uri="{FF2B5EF4-FFF2-40B4-BE49-F238E27FC236}">
-                  <a16:creationId xmlns="" xmlns:a16="http://schemas.microsoft.com/office/drawing/2014/main" id="{0831FE5F-41A6-4901-A63B-4B4D462CBFF8}"/>
+                  <a16:creationId xmlns:a16="http://schemas.microsoft.com/office/drawing/2014/main" xmlns="" id="{0831FE5F-41A6-4901-A63B-4B4D462CBFF8}"/>
                 </a:ext>
               </a:extLst>
             </p:cNvPr>
@@ -6641,7 +6795,7 @@
             <p:cNvPr id="77" name="Oval 76">
               <a:extLst>
                 <a:ext uri="{FF2B5EF4-FFF2-40B4-BE49-F238E27FC236}">
-                  <a16:creationId xmlns="" xmlns:a16="http://schemas.microsoft.com/office/drawing/2014/main" id="{20E7703C-2A7D-4793-9329-B009C393EF66}"/>
+                  <a16:creationId xmlns:a16="http://schemas.microsoft.com/office/drawing/2014/main" xmlns="" id="{20E7703C-2A7D-4793-9329-B009C393EF66}"/>
                 </a:ext>
               </a:extLst>
             </p:cNvPr>
@@ -6687,7 +6841,7 @@
             <p:cNvPr id="78" name="Oval 77">
               <a:extLst>
                 <a:ext uri="{FF2B5EF4-FFF2-40B4-BE49-F238E27FC236}">
-                  <a16:creationId xmlns="" xmlns:a16="http://schemas.microsoft.com/office/drawing/2014/main" id="{D5806448-D69B-446D-AB6C-3D9967150298}"/>
+                  <a16:creationId xmlns:a16="http://schemas.microsoft.com/office/drawing/2014/main" xmlns="" id="{D5806448-D69B-446D-AB6C-3D9967150298}"/>
                 </a:ext>
               </a:extLst>
             </p:cNvPr>
@@ -6733,7 +6887,7 @@
             <p:cNvPr id="79" name="Oval 78">
               <a:extLst>
                 <a:ext uri="{FF2B5EF4-FFF2-40B4-BE49-F238E27FC236}">
-                  <a16:creationId xmlns="" xmlns:a16="http://schemas.microsoft.com/office/drawing/2014/main" id="{80035BDB-E69C-4D0D-9A50-0249359E0168}"/>
+                  <a16:creationId xmlns:a16="http://schemas.microsoft.com/office/drawing/2014/main" xmlns="" id="{80035BDB-E69C-4D0D-9A50-0249359E0168}"/>
                 </a:ext>
               </a:extLst>
             </p:cNvPr>
@@ -6818,7 +6972,7 @@
           <p:cNvPr id="4" name="Rectangle 3">
             <a:extLst>
               <a:ext uri="{FF2B5EF4-FFF2-40B4-BE49-F238E27FC236}">
-                <a16:creationId xmlns="" xmlns:a16="http://schemas.microsoft.com/office/drawing/2014/main" id="{3263A579-F937-472F-BAC8-0F6DBD133059}"/>
+                <a16:creationId xmlns:a16="http://schemas.microsoft.com/office/drawing/2014/main" xmlns="" id="{3263A579-F937-472F-BAC8-0F6DBD133059}"/>
               </a:ext>
             </a:extLst>
           </p:cNvPr>
@@ -7204,7 +7358,7 @@
           <p:cNvPr id="6" name="Flowchart: Terminator 5">
             <a:extLst>
               <a:ext uri="{FF2B5EF4-FFF2-40B4-BE49-F238E27FC236}">
-                <a16:creationId xmlns="" xmlns:a16="http://schemas.microsoft.com/office/drawing/2014/main" id="{BC26BFB4-0829-4EF7-B551-E33F9117E645}"/>
+                <a16:creationId xmlns:a16="http://schemas.microsoft.com/office/drawing/2014/main" xmlns="" id="{BC26BFB4-0829-4EF7-B551-E33F9117E645}"/>
               </a:ext>
             </a:extLst>
           </p:cNvPr>
@@ -7262,7 +7416,7 @@
           <p:cNvPr id="12" name="Rectangle: Rounded Corners 11">
             <a:extLst>
               <a:ext uri="{FF2B5EF4-FFF2-40B4-BE49-F238E27FC236}">
-                <a16:creationId xmlns="" xmlns:a16="http://schemas.microsoft.com/office/drawing/2014/main" id="{C9F7093C-C50F-438A-839F-B4C8765447D9}"/>
+                <a16:creationId xmlns:a16="http://schemas.microsoft.com/office/drawing/2014/main" xmlns="" id="{C9F7093C-C50F-438A-839F-B4C8765447D9}"/>
               </a:ext>
             </a:extLst>
           </p:cNvPr>
@@ -7312,7 +7466,7 @@
           <p:cNvPr id="16" name="Rectangle: Rounded Corners 15">
             <a:extLst>
               <a:ext uri="{FF2B5EF4-FFF2-40B4-BE49-F238E27FC236}">
-                <a16:creationId xmlns="" xmlns:a16="http://schemas.microsoft.com/office/drawing/2014/main" id="{D7EEB2C4-B890-4392-A7C8-E0EC180B599F}"/>
+                <a16:creationId xmlns:a16="http://schemas.microsoft.com/office/drawing/2014/main" xmlns="" id="{D7EEB2C4-B890-4392-A7C8-E0EC180B599F}"/>
               </a:ext>
             </a:extLst>
           </p:cNvPr>
@@ -7369,7 +7523,7 @@
           <p:cNvPr id="17" name="Rectangle: Rounded Corners 16">
             <a:extLst>
               <a:ext uri="{FF2B5EF4-FFF2-40B4-BE49-F238E27FC236}">
-                <a16:creationId xmlns="" xmlns:a16="http://schemas.microsoft.com/office/drawing/2014/main" id="{8D71A6A2-5002-4E07-8233-8FECD70213FF}"/>
+                <a16:creationId xmlns:a16="http://schemas.microsoft.com/office/drawing/2014/main" xmlns="" id="{8D71A6A2-5002-4E07-8233-8FECD70213FF}"/>
               </a:ext>
             </a:extLst>
           </p:cNvPr>
@@ -7431,7 +7585,7 @@
           <p:cNvPr id="18" name="Rectangle: Rounded Corners 17">
             <a:extLst>
               <a:ext uri="{FF2B5EF4-FFF2-40B4-BE49-F238E27FC236}">
-                <a16:creationId xmlns="" xmlns:a16="http://schemas.microsoft.com/office/drawing/2014/main" id="{D86FA6EC-8703-4B04-A6F7-1E04207D8415}"/>
+                <a16:creationId xmlns:a16="http://schemas.microsoft.com/office/drawing/2014/main" xmlns="" id="{D86FA6EC-8703-4B04-A6F7-1E04207D8415}"/>
               </a:ext>
             </a:extLst>
           </p:cNvPr>
@@ -7493,7 +7647,7 @@
           <p:cNvPr id="22" name="Rectangle: Rounded Corners 21">
             <a:extLst>
               <a:ext uri="{FF2B5EF4-FFF2-40B4-BE49-F238E27FC236}">
-                <a16:creationId xmlns="" xmlns:a16="http://schemas.microsoft.com/office/drawing/2014/main" id="{A6AEB402-3F5C-4753-BA98-17D23F1489EC}"/>
+                <a16:creationId xmlns:a16="http://schemas.microsoft.com/office/drawing/2014/main" xmlns="" id="{A6AEB402-3F5C-4753-BA98-17D23F1489EC}"/>
               </a:ext>
             </a:extLst>
           </p:cNvPr>
@@ -7555,7 +7709,7 @@
           <p:cNvPr id="23" name="Rectangle: Rounded Corners 22">
             <a:extLst>
               <a:ext uri="{FF2B5EF4-FFF2-40B4-BE49-F238E27FC236}">
-                <a16:creationId xmlns="" xmlns:a16="http://schemas.microsoft.com/office/drawing/2014/main" id="{56F285B2-2513-4C85-99BA-0A54326A4B7D}"/>
+                <a16:creationId xmlns:a16="http://schemas.microsoft.com/office/drawing/2014/main" xmlns="" id="{56F285B2-2513-4C85-99BA-0A54326A4B7D}"/>
               </a:ext>
             </a:extLst>
           </p:cNvPr>
@@ -7617,7 +7771,7 @@
           <p:cNvPr id="24" name="Rectangle: Rounded Corners 23">
             <a:extLst>
               <a:ext uri="{FF2B5EF4-FFF2-40B4-BE49-F238E27FC236}">
-                <a16:creationId xmlns="" xmlns:a16="http://schemas.microsoft.com/office/drawing/2014/main" id="{F597A463-A8FF-4FF5-BC0F-153123683A10}"/>
+                <a16:creationId xmlns:a16="http://schemas.microsoft.com/office/drawing/2014/main" xmlns="" id="{F597A463-A8FF-4FF5-BC0F-153123683A10}"/>
               </a:ext>
             </a:extLst>
           </p:cNvPr>
@@ -7676,7 +7830,7 @@
           <p:cNvPr id="25" name="Rectangle: Rounded Corners 24">
             <a:extLst>
               <a:ext uri="{FF2B5EF4-FFF2-40B4-BE49-F238E27FC236}">
-                <a16:creationId xmlns="" xmlns:a16="http://schemas.microsoft.com/office/drawing/2014/main" id="{19DB7B19-D874-405C-A27B-8A5D038EA782}"/>
+                <a16:creationId xmlns:a16="http://schemas.microsoft.com/office/drawing/2014/main" xmlns="" id="{19DB7B19-D874-405C-A27B-8A5D038EA782}"/>
               </a:ext>
             </a:extLst>
           </p:cNvPr>
@@ -7738,7 +7892,7 @@
           <p:cNvPr id="26" name="Rectangle: Rounded Corners 25">
             <a:extLst>
               <a:ext uri="{FF2B5EF4-FFF2-40B4-BE49-F238E27FC236}">
-                <a16:creationId xmlns="" xmlns:a16="http://schemas.microsoft.com/office/drawing/2014/main" id="{2B5C6BA9-D2AF-486B-8361-ED0C4EEDD119}"/>
+                <a16:creationId xmlns:a16="http://schemas.microsoft.com/office/drawing/2014/main" xmlns="" id="{2B5C6BA9-D2AF-486B-8361-ED0C4EEDD119}"/>
               </a:ext>
             </a:extLst>
           </p:cNvPr>
@@ -7800,7 +7954,7 @@
           <p:cNvPr id="27" name="Rectangle: Rounded Corners 26">
             <a:extLst>
               <a:ext uri="{FF2B5EF4-FFF2-40B4-BE49-F238E27FC236}">
-                <a16:creationId xmlns="" xmlns:a16="http://schemas.microsoft.com/office/drawing/2014/main" id="{54C5C5E1-A442-4CFB-8B18-10B68FD458C5}"/>
+                <a16:creationId xmlns:a16="http://schemas.microsoft.com/office/drawing/2014/main" xmlns="" id="{54C5C5E1-A442-4CFB-8B18-10B68FD458C5}"/>
               </a:ext>
             </a:extLst>
           </p:cNvPr>
@@ -7859,7 +8013,7 @@
           <p:cNvPr id="29" name="Flowchart: Terminator 28">
             <a:extLst>
               <a:ext uri="{FF2B5EF4-FFF2-40B4-BE49-F238E27FC236}">
-                <a16:creationId xmlns="" xmlns:a16="http://schemas.microsoft.com/office/drawing/2014/main" id="{ADF703A3-E58C-49CA-86A6-62D3D4DB9A13}"/>
+                <a16:creationId xmlns:a16="http://schemas.microsoft.com/office/drawing/2014/main" xmlns="" id="{ADF703A3-E58C-49CA-86A6-62D3D4DB9A13}"/>
               </a:ext>
             </a:extLst>
           </p:cNvPr>
@@ -7919,7 +8073,7 @@
           <p:cNvPr id="30" name="Rectangle: Rounded Corners 29">
             <a:extLst>
               <a:ext uri="{FF2B5EF4-FFF2-40B4-BE49-F238E27FC236}">
-                <a16:creationId xmlns="" xmlns:a16="http://schemas.microsoft.com/office/drawing/2014/main" id="{92C05959-AC73-403C-A95A-568E2827F8D0}"/>
+                <a16:creationId xmlns:a16="http://schemas.microsoft.com/office/drawing/2014/main" xmlns="" id="{92C05959-AC73-403C-A95A-568E2827F8D0}"/>
               </a:ext>
             </a:extLst>
           </p:cNvPr>
@@ -7978,7 +8132,7 @@
           <p:cNvPr id="31" name="Rectangle: Rounded Corners 30">
             <a:extLst>
               <a:ext uri="{FF2B5EF4-FFF2-40B4-BE49-F238E27FC236}">
-                <a16:creationId xmlns="" xmlns:a16="http://schemas.microsoft.com/office/drawing/2014/main" id="{43AF902B-C890-4D65-9F93-738A95F259B5}"/>
+                <a16:creationId xmlns:a16="http://schemas.microsoft.com/office/drawing/2014/main" xmlns="" id="{43AF902B-C890-4D65-9F93-738A95F259B5}"/>
               </a:ext>
             </a:extLst>
           </p:cNvPr>
@@ -8037,7 +8191,7 @@
           <p:cNvPr id="32" name="Rectangle: Rounded Corners 31">
             <a:extLst>
               <a:ext uri="{FF2B5EF4-FFF2-40B4-BE49-F238E27FC236}">
-                <a16:creationId xmlns="" xmlns:a16="http://schemas.microsoft.com/office/drawing/2014/main" id="{1854DCE2-341D-4C82-9567-30AF7CE5C5B6}"/>
+                <a16:creationId xmlns:a16="http://schemas.microsoft.com/office/drawing/2014/main" xmlns="" id="{1854DCE2-341D-4C82-9567-30AF7CE5C5B6}"/>
               </a:ext>
             </a:extLst>
           </p:cNvPr>
@@ -8096,7 +8250,7 @@
           <p:cNvPr id="37" name="Group 36">
             <a:extLst>
               <a:ext uri="{FF2B5EF4-FFF2-40B4-BE49-F238E27FC236}">
-                <a16:creationId xmlns="" xmlns:a16="http://schemas.microsoft.com/office/drawing/2014/main" id="{95307ECB-14EA-44E0-8191-47990F854CBD}"/>
+                <a16:creationId xmlns:a16="http://schemas.microsoft.com/office/drawing/2014/main" xmlns="" id="{95307ECB-14EA-44E0-8191-47990F854CBD}"/>
               </a:ext>
             </a:extLst>
           </p:cNvPr>
@@ -8116,7 +8270,7 @@
             <p:cNvPr id="34" name="Straight Connector 33">
               <a:extLst>
                 <a:ext uri="{FF2B5EF4-FFF2-40B4-BE49-F238E27FC236}">
-                  <a16:creationId xmlns="" xmlns:a16="http://schemas.microsoft.com/office/drawing/2014/main" id="{2025FCE6-7418-45FE-B895-69BA30956D65}"/>
+                  <a16:creationId xmlns:a16="http://schemas.microsoft.com/office/drawing/2014/main" xmlns="" id="{2025FCE6-7418-45FE-B895-69BA30956D65}"/>
                 </a:ext>
               </a:extLst>
             </p:cNvPr>
@@ -8157,7 +8311,7 @@
             <p:cNvPr id="36" name="Straight Connector 35">
               <a:extLst>
                 <a:ext uri="{FF2B5EF4-FFF2-40B4-BE49-F238E27FC236}">
-                  <a16:creationId xmlns="" xmlns:a16="http://schemas.microsoft.com/office/drawing/2014/main" id="{92FF3B5C-04C1-426B-B996-38950C257456}"/>
+                  <a16:creationId xmlns:a16="http://schemas.microsoft.com/office/drawing/2014/main" xmlns="" id="{92FF3B5C-04C1-426B-B996-38950C257456}"/>
                 </a:ext>
               </a:extLst>
             </p:cNvPr>
@@ -8199,7 +8353,7 @@
           <p:cNvPr id="38" name="Freeform: Shape 37">
             <a:extLst>
               <a:ext uri="{FF2B5EF4-FFF2-40B4-BE49-F238E27FC236}">
-                <a16:creationId xmlns="" xmlns:a16="http://schemas.microsoft.com/office/drawing/2014/main" id="{F0626870-8373-43C4-B3D8-1925FCF6898B}"/>
+                <a16:creationId xmlns:a16="http://schemas.microsoft.com/office/drawing/2014/main" xmlns="" id="{F0626870-8373-43C4-B3D8-1925FCF6898B}"/>
               </a:ext>
             </a:extLst>
           </p:cNvPr>
@@ -8328,7 +8482,7 @@
           <p:cNvPr id="42" name="Straight Connector 41">
             <a:extLst>
               <a:ext uri="{FF2B5EF4-FFF2-40B4-BE49-F238E27FC236}">
-                <a16:creationId xmlns="" xmlns:a16="http://schemas.microsoft.com/office/drawing/2014/main" id="{027B55EC-0664-42E0-B88D-690128D86096}"/>
+                <a16:creationId xmlns:a16="http://schemas.microsoft.com/office/drawing/2014/main" xmlns="" id="{027B55EC-0664-42E0-B88D-690128D86096}"/>
               </a:ext>
             </a:extLst>
           </p:cNvPr>
@@ -9278,6 +9432,812 @@
     <p:extLst>
       <p:ext uri="{BB962C8B-B14F-4D97-AF65-F5344CB8AC3E}">
         <p14:creationId xmlns:p14="http://schemas.microsoft.com/office/powerpoint/2010/main" val="747454550"/>
+      </p:ext>
+    </p:extLst>
+  </p:cSld>
+  <p:clrMapOvr>
+    <a:masterClrMapping/>
+  </p:clrMapOvr>
+</p:sld>
+</file>
+
+<file path=ppt/slides/slide5.xml><?xml version="1.0" encoding="utf-8"?>
+<p:sld xmlns:a="http://schemas.openxmlformats.org/drawingml/2006/main" xmlns:r="http://schemas.openxmlformats.org/officeDocument/2006/relationships" xmlns:p="http://schemas.openxmlformats.org/presentationml/2006/main">
+  <p:cSld>
+    <p:spTree>
+      <p:nvGrpSpPr>
+        <p:cNvPr id="1" name=""/>
+        <p:cNvGrpSpPr/>
+        <p:nvPr/>
+      </p:nvGrpSpPr>
+      <p:grpSpPr>
+        <a:xfrm>
+          <a:off x="0" y="0"/>
+          <a:ext cx="0" cy="0"/>
+          <a:chOff x="0" y="0"/>
+          <a:chExt cx="0" cy="0"/>
+        </a:xfrm>
+      </p:grpSpPr>
+      <p:sp>
+        <p:nvSpPr>
+          <p:cNvPr id="6" name="Rounded Rectangle 5"/>
+          <p:cNvSpPr/>
+          <p:nvPr/>
+        </p:nvSpPr>
+        <p:spPr>
+          <a:xfrm>
+            <a:off x="130629" y="21264"/>
+            <a:ext cx="11739638" cy="3420173"/>
+          </a:xfrm>
+          <a:prstGeom prst="roundRect">
+            <a:avLst/>
+          </a:prstGeom>
+          <a:ln w="12700"/>
+        </p:spPr>
+        <p:style>
+          <a:lnRef idx="2">
+            <a:schemeClr val="dk1"/>
+          </a:lnRef>
+          <a:fillRef idx="1">
+            <a:schemeClr val="lt1"/>
+          </a:fillRef>
+          <a:effectRef idx="0">
+            <a:schemeClr val="dk1"/>
+          </a:effectRef>
+          <a:fontRef idx="minor">
+            <a:schemeClr val="dk1"/>
+          </a:fontRef>
+        </p:style>
+        <p:txBody>
+          <a:bodyPr vert="vert270" lIns="0" rIns="0" rtlCol="0" anchor="t" anchorCtr="0"/>
+          <a:lstStyle/>
+          <a:p>
+            <a:pPr algn="ctr"/>
+            <a:r>
+              <a:rPr lang="en-US" dirty="0" smtClean="0"/>
+              <a:t>Option 1</a:t>
+            </a:r>
+            <a:endParaRPr lang="en-US" dirty="0"/>
+          </a:p>
+        </p:txBody>
+      </p:sp>
+      <p:sp>
+        <p:nvSpPr>
+          <p:cNvPr id="3" name="TextBox 2"/>
+          <p:cNvSpPr txBox="1"/>
+          <p:nvPr/>
+        </p:nvSpPr>
+        <p:spPr>
+          <a:xfrm>
+            <a:off x="1975758" y="471301"/>
+            <a:ext cx="2971800" cy="2585323"/>
+          </a:xfrm>
+          <a:prstGeom prst="rect">
+            <a:avLst/>
+          </a:prstGeom>
+          <a:noFill/>
+          <a:ln>
+            <a:solidFill>
+              <a:schemeClr val="dk1"/>
+            </a:solidFill>
+          </a:ln>
+        </p:spPr>
+        <p:txBody>
+          <a:bodyPr wrap="square" rtlCol="0">
+            <a:spAutoFit/>
+          </a:bodyPr>
+          <a:lstStyle/>
+          <a:p>
+            <a:r>
+              <a:rPr lang="en-US" b="1" dirty="0" smtClean="0"/>
+              <a:t>Stock Class</a:t>
+            </a:r>
+          </a:p>
+          <a:p>
+            <a:r>
+              <a:rPr lang="en-US" dirty="0" smtClean="0"/>
+              <a:t>-</a:t>
+            </a:r>
+            <a:r>
+              <a:rPr lang="en-US" dirty="0"/>
+              <a:t>c</a:t>
+            </a:r>
+            <a:r>
+              <a:rPr lang="en-US" dirty="0" smtClean="0"/>
+              <a:t>ompany name</a:t>
+            </a:r>
+          </a:p>
+          <a:p>
+            <a:r>
+              <a:rPr lang="en-US" dirty="0" smtClean="0"/>
+              <a:t>-ticker symbol</a:t>
+            </a:r>
+          </a:p>
+          <a:p>
+            <a:r>
+              <a:rPr lang="en-US" dirty="0" smtClean="0"/>
+              <a:t>-buy signal</a:t>
+            </a:r>
+          </a:p>
+          <a:p>
+            <a:r>
+              <a:rPr lang="en-US" dirty="0" smtClean="0"/>
+              <a:t>-sell signal</a:t>
+            </a:r>
+          </a:p>
+          <a:p>
+            <a:r>
+              <a:rPr lang="en-US" dirty="0" smtClean="0"/>
+              <a:t>-hold signal</a:t>
+            </a:r>
+          </a:p>
+          <a:p>
+            <a:r>
+              <a:rPr lang="en-US" dirty="0" smtClean="0"/>
+              <a:t>-</a:t>
+            </a:r>
+            <a:r>
+              <a:rPr lang="en-US" dirty="0"/>
+              <a:t>Array of </a:t>
+            </a:r>
+            <a:r>
+              <a:rPr lang="en-US" dirty="0" err="1"/>
+              <a:t>StockModels</a:t>
+            </a:r>
+            <a:r>
+              <a:rPr lang="en-US" dirty="0"/>
+              <a:t> </a:t>
+            </a:r>
+            <a:endParaRPr lang="en-US" dirty="0" smtClean="0"/>
+          </a:p>
+          <a:p>
+            <a:r>
+              <a:rPr lang="en-US" dirty="0"/>
+              <a:t>-Time Series Data </a:t>
+            </a:r>
+            <a:r>
+              <a:rPr lang="en-US" dirty="0" smtClean="0"/>
+              <a:t>of raw prices, closing, etc.</a:t>
+            </a:r>
+          </a:p>
+        </p:txBody>
+      </p:sp>
+      <p:sp>
+        <p:nvSpPr>
+          <p:cNvPr id="4" name="TextBox 3"/>
+          <p:cNvSpPr txBox="1"/>
+          <p:nvPr/>
+        </p:nvSpPr>
+        <p:spPr>
+          <a:xfrm>
+            <a:off x="5320394" y="471301"/>
+            <a:ext cx="2759529" cy="2308324"/>
+          </a:xfrm>
+          <a:prstGeom prst="rect">
+            <a:avLst/>
+          </a:prstGeom>
+          <a:noFill/>
+          <a:ln>
+            <a:solidFill>
+              <a:schemeClr val="dk1"/>
+            </a:solidFill>
+          </a:ln>
+        </p:spPr>
+        <p:txBody>
+          <a:bodyPr wrap="square" rtlCol="0">
+            <a:spAutoFit/>
+          </a:bodyPr>
+          <a:lstStyle/>
+          <a:p>
+            <a:r>
+              <a:rPr lang="en-US" b="1" dirty="0" err="1" smtClean="0"/>
+              <a:t>StockModel</a:t>
+            </a:r>
+            <a:r>
+              <a:rPr lang="en-US" b="1" dirty="0" smtClean="0"/>
+              <a:t> Class</a:t>
+            </a:r>
+          </a:p>
+          <a:p>
+            <a:r>
+              <a:rPr lang="en-US" dirty="0" smtClean="0"/>
+              <a:t>-model name</a:t>
+            </a:r>
+          </a:p>
+          <a:p>
+            <a:r>
+              <a:rPr lang="en-US" dirty="0" smtClean="0"/>
+              <a:t>-health color</a:t>
+            </a:r>
+          </a:p>
+          <a:p>
+            <a:r>
+              <a:rPr lang="en-US" dirty="0"/>
+              <a:t>-buy signal</a:t>
+            </a:r>
+          </a:p>
+          <a:p>
+            <a:r>
+              <a:rPr lang="en-US" dirty="0"/>
+              <a:t>-sell signal</a:t>
+            </a:r>
+          </a:p>
+          <a:p>
+            <a:r>
+              <a:rPr lang="en-US" dirty="0"/>
+              <a:t>-hold </a:t>
+            </a:r>
+            <a:r>
+              <a:rPr lang="en-US" dirty="0" smtClean="0"/>
+              <a:t>signal</a:t>
+            </a:r>
+          </a:p>
+          <a:p>
+            <a:r>
+              <a:rPr lang="en-US" dirty="0"/>
+              <a:t>-Time Series Data </a:t>
+            </a:r>
+            <a:r>
+              <a:rPr lang="en-US" dirty="0" smtClean="0"/>
+              <a:t>Class of processed stock data</a:t>
+            </a:r>
+            <a:endParaRPr lang="en-US" dirty="0"/>
+          </a:p>
+        </p:txBody>
+      </p:sp>
+      <p:sp>
+        <p:nvSpPr>
+          <p:cNvPr id="5" name="TextBox 4"/>
+          <p:cNvSpPr txBox="1"/>
+          <p:nvPr/>
+        </p:nvSpPr>
+        <p:spPr>
+          <a:xfrm>
+            <a:off x="8452759" y="471301"/>
+            <a:ext cx="2759529" cy="923330"/>
+          </a:xfrm>
+          <a:prstGeom prst="rect">
+            <a:avLst/>
+          </a:prstGeom>
+          <a:noFill/>
+          <a:ln>
+            <a:solidFill>
+              <a:schemeClr val="dk1"/>
+            </a:solidFill>
+          </a:ln>
+        </p:spPr>
+        <p:txBody>
+          <a:bodyPr wrap="square" rtlCol="0">
+            <a:spAutoFit/>
+          </a:bodyPr>
+          <a:lstStyle/>
+          <a:p>
+            <a:r>
+              <a:rPr lang="en-US" b="1" dirty="0" smtClean="0"/>
+              <a:t>Time Series Data Class</a:t>
+            </a:r>
+          </a:p>
+          <a:p>
+            <a:r>
+              <a:rPr lang="en-US" dirty="0" smtClean="0"/>
+              <a:t>-time range of data</a:t>
+            </a:r>
+          </a:p>
+          <a:p>
+            <a:r>
+              <a:rPr lang="en-US" dirty="0"/>
+              <a:t>-pandas </a:t>
+            </a:r>
+            <a:r>
+              <a:rPr lang="en-US" dirty="0" err="1"/>
+              <a:t>dataframe</a:t>
+            </a:r>
+            <a:r>
+              <a:rPr lang="en-US" dirty="0"/>
+              <a:t> of </a:t>
+            </a:r>
+            <a:r>
+              <a:rPr lang="en-US" dirty="0" smtClean="0"/>
+              <a:t>data</a:t>
+            </a:r>
+            <a:endParaRPr lang="en-US" dirty="0"/>
+          </a:p>
+        </p:txBody>
+      </p:sp>
+      <p:sp>
+        <p:nvSpPr>
+          <p:cNvPr id="7" name="Rounded Rectangle 6"/>
+          <p:cNvSpPr/>
+          <p:nvPr/>
+        </p:nvSpPr>
+        <p:spPr>
+          <a:xfrm>
+            <a:off x="130629" y="3457766"/>
+            <a:ext cx="11739638" cy="3400234"/>
+          </a:xfrm>
+          <a:prstGeom prst="roundRect">
+            <a:avLst/>
+          </a:prstGeom>
+        </p:spPr>
+        <p:style>
+          <a:lnRef idx="2">
+            <a:schemeClr val="dk1"/>
+          </a:lnRef>
+          <a:fillRef idx="1">
+            <a:schemeClr val="lt1"/>
+          </a:fillRef>
+          <a:effectRef idx="0">
+            <a:schemeClr val="dk1"/>
+          </a:effectRef>
+          <a:fontRef idx="minor">
+            <a:schemeClr val="dk1"/>
+          </a:fontRef>
+        </p:style>
+        <p:txBody>
+          <a:bodyPr vert="vert270" lIns="0" rIns="0" rtlCol="0" anchor="t" anchorCtr="0"/>
+          <a:lstStyle/>
+          <a:p>
+            <a:pPr algn="ctr"/>
+            <a:r>
+              <a:rPr lang="en-US" smtClean="0"/>
+              <a:t>Option 2</a:t>
+            </a:r>
+            <a:endParaRPr lang="en-US" dirty="0"/>
+          </a:p>
+        </p:txBody>
+      </p:sp>
+      <p:sp>
+        <p:nvSpPr>
+          <p:cNvPr id="8" name="TextBox 7"/>
+          <p:cNvSpPr txBox="1"/>
+          <p:nvPr/>
+        </p:nvSpPr>
+        <p:spPr>
+          <a:xfrm>
+            <a:off x="1975758" y="3956788"/>
+            <a:ext cx="2971800" cy="2308324"/>
+          </a:xfrm>
+          <a:prstGeom prst="rect">
+            <a:avLst/>
+          </a:prstGeom>
+          <a:noFill/>
+          <a:ln>
+            <a:solidFill>
+              <a:schemeClr val="dk1"/>
+            </a:solidFill>
+          </a:ln>
+        </p:spPr>
+        <p:txBody>
+          <a:bodyPr wrap="square" rtlCol="0">
+            <a:spAutoFit/>
+          </a:bodyPr>
+          <a:lstStyle/>
+          <a:p>
+            <a:r>
+              <a:rPr lang="en-US" b="1" dirty="0" smtClean="0"/>
+              <a:t>Stock Class</a:t>
+            </a:r>
+          </a:p>
+          <a:p>
+            <a:r>
+              <a:rPr lang="en-US" dirty="0" smtClean="0"/>
+              <a:t>-</a:t>
+            </a:r>
+            <a:r>
+              <a:rPr lang="en-US" dirty="0"/>
+              <a:t>c</a:t>
+            </a:r>
+            <a:r>
+              <a:rPr lang="en-US" dirty="0" smtClean="0"/>
+              <a:t>ompany name</a:t>
+            </a:r>
+          </a:p>
+          <a:p>
+            <a:r>
+              <a:rPr lang="en-US" dirty="0" smtClean="0"/>
+              <a:t>-ticker symbol</a:t>
+            </a:r>
+          </a:p>
+          <a:p>
+            <a:r>
+              <a:rPr lang="en-US" dirty="0" smtClean="0"/>
+              <a:t>-buy signal</a:t>
+            </a:r>
+          </a:p>
+          <a:p>
+            <a:r>
+              <a:rPr lang="en-US" dirty="0" smtClean="0"/>
+              <a:t>-sell signal</a:t>
+            </a:r>
+          </a:p>
+          <a:p>
+            <a:r>
+              <a:rPr lang="en-US" dirty="0" smtClean="0"/>
+              <a:t>-hold signal</a:t>
+            </a:r>
+          </a:p>
+          <a:p>
+            <a:r>
+              <a:rPr lang="en-US" dirty="0"/>
+              <a:t>-Time Series Data </a:t>
+            </a:r>
+            <a:r>
+              <a:rPr lang="en-US" dirty="0" smtClean="0"/>
+              <a:t>Class of raw prices, closing, etc.</a:t>
+            </a:r>
+          </a:p>
+        </p:txBody>
+      </p:sp>
+      <p:sp>
+        <p:nvSpPr>
+          <p:cNvPr id="9" name="TextBox 8"/>
+          <p:cNvSpPr txBox="1"/>
+          <p:nvPr/>
+        </p:nvSpPr>
+        <p:spPr>
+          <a:xfrm>
+            <a:off x="5320394" y="3956788"/>
+            <a:ext cx="2759529" cy="2585323"/>
+          </a:xfrm>
+          <a:prstGeom prst="rect">
+            <a:avLst/>
+          </a:prstGeom>
+          <a:noFill/>
+          <a:ln>
+            <a:solidFill>
+              <a:schemeClr val="dk1"/>
+            </a:solidFill>
+          </a:ln>
+        </p:spPr>
+        <p:txBody>
+          <a:bodyPr wrap="square" rtlCol="0">
+            <a:spAutoFit/>
+          </a:bodyPr>
+          <a:lstStyle/>
+          <a:p>
+            <a:r>
+              <a:rPr lang="en-US" b="1" dirty="0" err="1" smtClean="0"/>
+              <a:t>StockModel</a:t>
+            </a:r>
+            <a:r>
+              <a:rPr lang="en-US" b="1" dirty="0" smtClean="0"/>
+              <a:t> Class</a:t>
+            </a:r>
+          </a:p>
+          <a:p>
+            <a:r>
+              <a:rPr lang="en-US" dirty="0" smtClean="0"/>
+              <a:t>-model name</a:t>
+            </a:r>
+          </a:p>
+          <a:p>
+            <a:r>
+              <a:rPr lang="en-US" dirty="0" smtClean="0"/>
+              <a:t>-health color</a:t>
+            </a:r>
+          </a:p>
+          <a:p>
+            <a:r>
+              <a:rPr lang="en-US" dirty="0"/>
+              <a:t>-buy signal</a:t>
+            </a:r>
+          </a:p>
+          <a:p>
+            <a:r>
+              <a:rPr lang="en-US" dirty="0"/>
+              <a:t>-sell signal</a:t>
+            </a:r>
+          </a:p>
+          <a:p>
+            <a:r>
+              <a:rPr lang="en-US" dirty="0"/>
+              <a:t>-hold </a:t>
+            </a:r>
+            <a:r>
+              <a:rPr lang="en-US" dirty="0" smtClean="0"/>
+              <a:t>signal</a:t>
+            </a:r>
+          </a:p>
+          <a:p>
+            <a:r>
+              <a:rPr lang="en-US" dirty="0"/>
+              <a:t>-Array of </a:t>
+            </a:r>
+            <a:r>
+              <a:rPr lang="en-US" dirty="0" smtClean="0"/>
+              <a:t>Stocks</a:t>
+            </a:r>
+          </a:p>
+          <a:p>
+            <a:r>
+              <a:rPr lang="en-US" dirty="0"/>
+              <a:t>-Time Series Data </a:t>
+            </a:r>
+            <a:r>
+              <a:rPr lang="en-US" dirty="0" smtClean="0"/>
+              <a:t>Class of processed stock data</a:t>
+            </a:r>
+            <a:endParaRPr lang="en-US" dirty="0"/>
+          </a:p>
+        </p:txBody>
+      </p:sp>
+      <p:sp>
+        <p:nvSpPr>
+          <p:cNvPr id="10" name="TextBox 9"/>
+          <p:cNvSpPr txBox="1"/>
+          <p:nvPr/>
+        </p:nvSpPr>
+        <p:spPr>
+          <a:xfrm>
+            <a:off x="8452759" y="3956788"/>
+            <a:ext cx="2759529" cy="923330"/>
+          </a:xfrm>
+          <a:prstGeom prst="rect">
+            <a:avLst/>
+          </a:prstGeom>
+          <a:noFill/>
+          <a:ln>
+            <a:solidFill>
+              <a:schemeClr val="dk1"/>
+            </a:solidFill>
+          </a:ln>
+        </p:spPr>
+        <p:txBody>
+          <a:bodyPr wrap="square" rtlCol="0">
+            <a:spAutoFit/>
+          </a:bodyPr>
+          <a:lstStyle/>
+          <a:p>
+            <a:r>
+              <a:rPr lang="en-US" b="1" dirty="0" smtClean="0"/>
+              <a:t>Time Series Data Class</a:t>
+            </a:r>
+          </a:p>
+          <a:p>
+            <a:r>
+              <a:rPr lang="en-US" dirty="0" smtClean="0"/>
+              <a:t>-time range of data</a:t>
+            </a:r>
+          </a:p>
+          <a:p>
+            <a:r>
+              <a:rPr lang="en-US" dirty="0"/>
+              <a:t>-pandas </a:t>
+            </a:r>
+            <a:r>
+              <a:rPr lang="en-US" dirty="0" err="1"/>
+              <a:t>dataframe</a:t>
+            </a:r>
+            <a:r>
+              <a:rPr lang="en-US" dirty="0"/>
+              <a:t> of </a:t>
+            </a:r>
+            <a:r>
+              <a:rPr lang="en-US" dirty="0" smtClean="0"/>
+              <a:t>data</a:t>
+            </a:r>
+            <a:endParaRPr lang="en-US" dirty="0"/>
+          </a:p>
+        </p:txBody>
+      </p:sp>
+      <p:cxnSp>
+        <p:nvCxnSpPr>
+          <p:cNvPr id="12" name="Straight Arrow Connector 11"/>
+          <p:cNvCxnSpPr>
+            <a:stCxn id="3" idx="3"/>
+          </p:cNvCxnSpPr>
+          <p:nvPr/>
+        </p:nvCxnSpPr>
+        <p:spPr>
+          <a:xfrm flipV="1">
+            <a:off x="4947558" y="1642225"/>
+            <a:ext cx="372836" cy="121738"/>
+          </a:xfrm>
+          <a:prstGeom prst="straightConnector1">
+            <a:avLst/>
+          </a:prstGeom>
+          <a:ln w="25400" cap="flat">
+            <a:tailEnd type="triangle"/>
+          </a:ln>
+        </p:spPr>
+        <p:style>
+          <a:lnRef idx="1">
+            <a:schemeClr val="accent1"/>
+          </a:lnRef>
+          <a:fillRef idx="0">
+            <a:schemeClr val="accent1"/>
+          </a:fillRef>
+          <a:effectRef idx="0">
+            <a:schemeClr val="accent1"/>
+          </a:effectRef>
+          <a:fontRef idx="minor">
+            <a:schemeClr val="tx1"/>
+          </a:fontRef>
+        </p:style>
+      </p:cxnSp>
+      <p:cxnSp>
+        <p:nvCxnSpPr>
+          <p:cNvPr id="18" name="Straight Arrow Connector 17"/>
+          <p:cNvCxnSpPr>
+            <a:endCxn id="5" idx="1"/>
+          </p:cNvCxnSpPr>
+          <p:nvPr/>
+        </p:nvCxnSpPr>
+        <p:spPr>
+          <a:xfrm flipV="1">
+            <a:off x="4947558" y="932966"/>
+            <a:ext cx="3505201" cy="847759"/>
+          </a:xfrm>
+          <a:prstGeom prst="straightConnector1">
+            <a:avLst/>
+          </a:prstGeom>
+          <a:ln w="25400" cap="flat">
+            <a:tailEnd type="triangle"/>
+          </a:ln>
+        </p:spPr>
+        <p:style>
+          <a:lnRef idx="1">
+            <a:schemeClr val="accent1"/>
+          </a:lnRef>
+          <a:fillRef idx="0">
+            <a:schemeClr val="accent1"/>
+          </a:fillRef>
+          <a:effectRef idx="0">
+            <a:schemeClr val="accent1"/>
+          </a:effectRef>
+          <a:fontRef idx="minor">
+            <a:schemeClr val="tx1"/>
+          </a:fontRef>
+        </p:style>
+      </p:cxnSp>
+      <p:cxnSp>
+        <p:nvCxnSpPr>
+          <p:cNvPr id="22" name="Straight Arrow Connector 21"/>
+          <p:cNvCxnSpPr>
+            <a:stCxn id="4" idx="3"/>
+            <a:endCxn id="5" idx="1"/>
+          </p:cNvCxnSpPr>
+          <p:nvPr/>
+        </p:nvCxnSpPr>
+        <p:spPr>
+          <a:xfrm flipV="1">
+            <a:off x="8079923" y="932966"/>
+            <a:ext cx="372836" cy="692497"/>
+          </a:xfrm>
+          <a:prstGeom prst="straightConnector1">
+            <a:avLst/>
+          </a:prstGeom>
+          <a:ln w="25400" cap="flat">
+            <a:tailEnd type="triangle"/>
+          </a:ln>
+        </p:spPr>
+        <p:style>
+          <a:lnRef idx="1">
+            <a:schemeClr val="accent1"/>
+          </a:lnRef>
+          <a:fillRef idx="0">
+            <a:schemeClr val="accent1"/>
+          </a:fillRef>
+          <a:effectRef idx="0">
+            <a:schemeClr val="accent1"/>
+          </a:effectRef>
+          <a:fontRef idx="minor">
+            <a:schemeClr val="tx1"/>
+          </a:fontRef>
+        </p:style>
+      </p:cxnSp>
+      <p:cxnSp>
+        <p:nvCxnSpPr>
+          <p:cNvPr id="36" name="Straight Arrow Connector 35"/>
+          <p:cNvCxnSpPr>
+            <a:stCxn id="9" idx="3"/>
+            <a:endCxn id="10" idx="1"/>
+          </p:cNvCxnSpPr>
+          <p:nvPr/>
+        </p:nvCxnSpPr>
+        <p:spPr>
+          <a:xfrm flipV="1">
+            <a:off x="8079923" y="4418453"/>
+            <a:ext cx="372836" cy="830997"/>
+          </a:xfrm>
+          <a:prstGeom prst="straightConnector1">
+            <a:avLst/>
+          </a:prstGeom>
+          <a:ln w="25400" cap="flat">
+            <a:tailEnd type="triangle"/>
+          </a:ln>
+        </p:spPr>
+        <p:style>
+          <a:lnRef idx="1">
+            <a:schemeClr val="accent1"/>
+          </a:lnRef>
+          <a:fillRef idx="0">
+            <a:schemeClr val="accent1"/>
+          </a:fillRef>
+          <a:effectRef idx="0">
+            <a:schemeClr val="accent1"/>
+          </a:effectRef>
+          <a:fontRef idx="minor">
+            <a:schemeClr val="tx1"/>
+          </a:fontRef>
+        </p:style>
+      </p:cxnSp>
+      <p:cxnSp>
+        <p:nvCxnSpPr>
+          <p:cNvPr id="41" name="Straight Arrow Connector 40"/>
+          <p:cNvCxnSpPr>
+            <a:stCxn id="9" idx="1"/>
+            <a:endCxn id="8" idx="3"/>
+          </p:cNvCxnSpPr>
+          <p:nvPr/>
+        </p:nvCxnSpPr>
+        <p:spPr>
+          <a:xfrm flipH="1" flipV="1">
+            <a:off x="4947558" y="5110950"/>
+            <a:ext cx="372836" cy="138500"/>
+          </a:xfrm>
+          <a:prstGeom prst="straightConnector1">
+            <a:avLst/>
+          </a:prstGeom>
+          <a:ln w="25400" cap="flat">
+            <a:tailEnd type="triangle"/>
+          </a:ln>
+        </p:spPr>
+        <p:style>
+          <a:lnRef idx="1">
+            <a:schemeClr val="accent1"/>
+          </a:lnRef>
+          <a:fillRef idx="0">
+            <a:schemeClr val="accent1"/>
+          </a:fillRef>
+          <a:effectRef idx="0">
+            <a:schemeClr val="accent1"/>
+          </a:effectRef>
+          <a:fontRef idx="minor">
+            <a:schemeClr val="tx1"/>
+          </a:fontRef>
+        </p:style>
+      </p:cxnSp>
+      <p:cxnSp>
+        <p:nvCxnSpPr>
+          <p:cNvPr id="54" name="Straight Arrow Connector 53"/>
+          <p:cNvCxnSpPr>
+            <a:stCxn id="8" idx="3"/>
+            <a:endCxn id="10" idx="1"/>
+          </p:cNvCxnSpPr>
+          <p:nvPr/>
+        </p:nvCxnSpPr>
+        <p:spPr>
+          <a:xfrm flipV="1">
+            <a:off x="4947558" y="4418453"/>
+            <a:ext cx="3505201" cy="692497"/>
+          </a:xfrm>
+          <a:prstGeom prst="straightConnector1">
+            <a:avLst/>
+          </a:prstGeom>
+          <a:ln w="25400" cap="flat">
+            <a:tailEnd type="triangle"/>
+          </a:ln>
+        </p:spPr>
+        <p:style>
+          <a:lnRef idx="1">
+            <a:schemeClr val="accent1"/>
+          </a:lnRef>
+          <a:fillRef idx="0">
+            <a:schemeClr val="accent1"/>
+          </a:fillRef>
+          <a:effectRef idx="0">
+            <a:schemeClr val="accent1"/>
+          </a:effectRef>
+          <a:fontRef idx="minor">
+            <a:schemeClr val="tx1"/>
+          </a:fontRef>
+        </p:style>
+      </p:cxnSp>
+    </p:spTree>
+    <p:extLst>
+      <p:ext uri="{BB962C8B-B14F-4D97-AF65-F5344CB8AC3E}">
+        <p14:creationId xmlns:p14="http://schemas.microsoft.com/office/powerpoint/2010/main" val="65337055"/>
       </p:ext>
     </p:extLst>
   </p:cSld>

</xml_diff>

<commit_message>
updated mockup to include Model layout
</commit_message>
<xml_diff>
--- a/Visualizer/Mockup.pptx
+++ b/Visualizer/Mockup.pptx
@@ -1287,6 +1287,17 @@
           <a:p>
             <a:r>
               <a:rPr lang="en-US" baseline="0" dirty="0" smtClean="0"/>
+              <a:t>I think I’m going with option one since it’s so </a:t>
+            </a:r>
+            <a:r>
+              <a:rPr lang="en-US" baseline="0" smtClean="0"/>
+              <a:t>much easier to add or remove stocks</a:t>
+            </a:r>
+            <a:endParaRPr lang="en-US" baseline="0" dirty="0" smtClean="0"/>
+          </a:p>
+          <a:p>
+            <a:r>
+              <a:rPr lang="en-US" baseline="0" dirty="0" smtClean="0"/>
               <a:t>Option 1: Stocks have </a:t>
             </a:r>
             <a:r>
@@ -1334,15 +1345,7 @@
             </a:r>
             <a:r>
               <a:rPr lang="en-US" baseline="0" dirty="0" smtClean="0"/>
-              <a:t> class. Adding and removing stocks is probably more frequent than adding </a:t>
-            </a:r>
-            <a:r>
-              <a:rPr lang="en-US" baseline="0" smtClean="0"/>
-              <a:t>and removing </a:t>
-            </a:r>
-            <a:r>
-              <a:rPr lang="en-US" baseline="0" dirty="0" smtClean="0"/>
-              <a:t>models</a:t>
+              <a:t> class. Adding and removing stocks is probably more frequent than adding and removing models</a:t>
             </a:r>
             <a:endParaRPr lang="en-US" dirty="0"/>
           </a:p>

</xml_diff>